<commit_message>
Updates to S5 presentation
</commit_message>
<xml_diff>
--- a/presentations/S5_SoI_Architecture_Group.pptx
+++ b/presentations/S5_SoI_Architecture_Group.pptx
@@ -4184,31 +4184,7 @@
                   </a:outerShdw>
                 </a:effectLst>
               </a:rPr>
-              <a:t> </a:t>
-            </a:r>
-            <a:r>
-              <a:rPr lang="en-US" b="1" dirty="0" smtClean="0">
-                <a:effectLst>
-                  <a:outerShdw blurRad="38100" dist="38100" dir="2700000" algn="tl">
-                    <a:srgbClr val="000000">
-                      <a:alpha val="43137"/>
-                    </a:srgbClr>
-                  </a:outerShdw>
-                </a:effectLst>
-              </a:rPr>
-              <a:t>Architecture </a:t>
-            </a:r>
-            <a:r>
-              <a:rPr lang="en-US" b="1" dirty="0" smtClean="0">
-                <a:effectLst>
-                  <a:outerShdw blurRad="38100" dist="38100" dir="2700000" algn="tl">
-                    <a:srgbClr val="000000">
-                      <a:alpha val="43137"/>
-                    </a:srgbClr>
-                  </a:outerShdw>
-                </a:effectLst>
-              </a:rPr>
-              <a:t>Group</a:t>
+              <a:t> Architecture Group</a:t>
             </a:r>
             <a:endParaRPr lang="en-US" b="1" dirty="0">
               <a:effectLst>
@@ -4455,7 +4431,9 @@
         </p:nvSpPr>
         <p:spPr/>
         <p:txBody>
-          <a:bodyPr/>
+          <a:bodyPr>
+            <a:normAutofit lnSpcReduction="10000"/>
+          </a:bodyPr>
           <a:lstStyle/>
           <a:p>
             <a:pPr>
@@ -4468,8 +4446,138 @@
             </a:pPr>
             <a:r>
               <a:rPr lang="en-US" dirty="0" smtClean="0"/>
-              <a:t>[TBD]</a:t>
-            </a:r>
+              <a:t>Data types (or an ontology), ports, and connections can be automatically extracted from code (with some moderate up front work)</a:t>
+            </a:r>
+          </a:p>
+          <a:p>
+            <a:pPr>
+              <a:lnSpc>
+                <a:spcPct val="100000"/>
+              </a:lnSpc>
+              <a:spcBef>
+                <a:spcPts val="200"/>
+              </a:spcBef>
+            </a:pPr>
+            <a:r>
+              <a:rPr lang="en-US" dirty="0" smtClean="0"/>
+              <a:t>Reusable (template) properties help find common mistakes</a:t>
+            </a:r>
+          </a:p>
+          <a:p>
+            <a:pPr>
+              <a:lnSpc>
+                <a:spcPct val="100000"/>
+              </a:lnSpc>
+              <a:spcBef>
+                <a:spcPts val="200"/>
+              </a:spcBef>
+            </a:pPr>
+            <a:r>
+              <a:rPr lang="en-US" dirty="0" smtClean="0"/>
+              <a:t>Not every error can be detected with a template property--a review of the specification itself is still worthwhile</a:t>
+            </a:r>
+          </a:p>
+          <a:p>
+            <a:pPr>
+              <a:lnSpc>
+                <a:spcPct val="100000"/>
+              </a:lnSpc>
+              <a:spcBef>
+                <a:spcPts val="200"/>
+              </a:spcBef>
+            </a:pPr>
+            <a:r>
+              <a:rPr lang="en-US" dirty="0" smtClean="0"/>
+              <a:t>Assurance arguments are useful to capture the “rest of the story”</a:t>
+            </a:r>
+          </a:p>
+          <a:p>
+            <a:pPr lvl="1">
+              <a:lnSpc>
+                <a:spcPct val="100000"/>
+              </a:lnSpc>
+              <a:spcBef>
+                <a:spcPts val="200"/>
+              </a:spcBef>
+            </a:pPr>
+            <a:r>
+              <a:rPr lang="en-US" dirty="0" smtClean="0"/>
+              <a:t>Differences between the model and the real world</a:t>
+            </a:r>
+          </a:p>
+          <a:p>
+            <a:pPr lvl="1">
+              <a:lnSpc>
+                <a:spcPct val="100000"/>
+              </a:lnSpc>
+              <a:spcBef>
+                <a:spcPts val="200"/>
+              </a:spcBef>
+            </a:pPr>
+            <a:r>
+              <a:rPr lang="en-US" dirty="0" smtClean="0"/>
+              <a:t>Specification versus intent</a:t>
+            </a:r>
+          </a:p>
+          <a:p>
+            <a:pPr>
+              <a:lnSpc>
+                <a:spcPct val="100000"/>
+              </a:lnSpc>
+              <a:spcBef>
+                <a:spcPts val="200"/>
+              </a:spcBef>
+            </a:pPr>
+            <a:r>
+              <a:rPr lang="en-US" dirty="0" smtClean="0"/>
+              <a:t>SpeAR, ASSERT, and AADL/AGREE are all very capable analysis tools. Each one has some advantages over the others.</a:t>
+            </a:r>
+          </a:p>
+          <a:p>
+            <a:pPr>
+              <a:lnSpc>
+                <a:spcPct val="100000"/>
+              </a:lnSpc>
+              <a:spcBef>
+                <a:spcPts val="200"/>
+              </a:spcBef>
+            </a:pPr>
+            <a:r>
+              <a:rPr lang="en-US" dirty="0" smtClean="0"/>
+              <a:t>Challenges: arrays, inheritance</a:t>
+            </a:r>
+          </a:p>
+          <a:p>
+            <a:pPr>
+              <a:lnSpc>
+                <a:spcPct val="100000"/>
+              </a:lnSpc>
+              <a:spcBef>
+                <a:spcPts val="200"/>
+              </a:spcBef>
+            </a:pPr>
+            <a:endParaRPr lang="en-US" dirty="0" smtClean="0"/>
+          </a:p>
+          <a:p>
+            <a:pPr>
+              <a:lnSpc>
+                <a:spcPct val="100000"/>
+              </a:lnSpc>
+              <a:spcBef>
+                <a:spcPts val="200"/>
+              </a:spcBef>
+            </a:pPr>
+            <a:endParaRPr lang="en-US" dirty="0" smtClean="0"/>
+          </a:p>
+          <a:p>
+            <a:pPr>
+              <a:lnSpc>
+                <a:spcPct val="100000"/>
+              </a:lnSpc>
+              <a:spcBef>
+                <a:spcPts val="200"/>
+              </a:spcBef>
+            </a:pPr>
             <a:endParaRPr lang="en-US" dirty="0" smtClean="0"/>
           </a:p>
           <a:p>
@@ -4619,8 +4727,93 @@
             </a:pPr>
             <a:r>
               <a:rPr lang="en-US" dirty="0" smtClean="0"/>
-              <a:t>[TBD]</a:t>
-            </a:r>
+              <a:t>Write contracts for the remaining components</a:t>
+            </a:r>
+          </a:p>
+          <a:p>
+            <a:pPr>
+              <a:lnSpc>
+                <a:spcPct val="100000"/>
+              </a:lnSpc>
+              <a:spcBef>
+                <a:spcPts val="200"/>
+              </a:spcBef>
+            </a:pPr>
+            <a:r>
+              <a:rPr lang="en-US" dirty="0" smtClean="0"/>
+              <a:t>State and analyze system-level properties</a:t>
+            </a:r>
+          </a:p>
+          <a:p>
+            <a:pPr>
+              <a:lnSpc>
+                <a:spcPct val="100000"/>
+              </a:lnSpc>
+              <a:spcBef>
+                <a:spcPts val="200"/>
+              </a:spcBef>
+            </a:pPr>
+            <a:r>
+              <a:rPr lang="en-US" dirty="0" smtClean="0"/>
+              <a:t>Generate code from AADL</a:t>
+            </a:r>
+          </a:p>
+          <a:p>
+            <a:pPr>
+              <a:lnSpc>
+                <a:spcPct val="100000"/>
+              </a:lnSpc>
+              <a:spcBef>
+                <a:spcPts val="200"/>
+              </a:spcBef>
+            </a:pPr>
+            <a:r>
+              <a:rPr lang="en-US" dirty="0" smtClean="0"/>
+              <a:t>Generate test cases from AGREE and run on </a:t>
+            </a:r>
+            <a:r>
+              <a:rPr lang="en-US" dirty="0" err="1" smtClean="0"/>
+              <a:t>UxAS</a:t>
+            </a:r>
+            <a:r>
+              <a:rPr lang="en-US" dirty="0" smtClean="0"/>
+              <a:t> implementation</a:t>
+            </a:r>
+          </a:p>
+          <a:p>
+            <a:pPr>
+              <a:lnSpc>
+                <a:spcPct val="100000"/>
+              </a:lnSpc>
+              <a:spcBef>
+                <a:spcPts val="200"/>
+              </a:spcBef>
+            </a:pPr>
+            <a:r>
+              <a:rPr lang="en-US" dirty="0" smtClean="0"/>
+              <a:t>Continue documenting decisions and the assurance case for the architecture</a:t>
+            </a:r>
+          </a:p>
+          <a:p>
+            <a:pPr>
+              <a:lnSpc>
+                <a:spcPct val="100000"/>
+              </a:lnSpc>
+              <a:spcBef>
+                <a:spcPts val="200"/>
+              </a:spcBef>
+            </a:pPr>
+            <a:endParaRPr lang="en-US" dirty="0" smtClean="0"/>
+          </a:p>
+          <a:p>
+            <a:pPr>
+              <a:lnSpc>
+                <a:spcPct val="100000"/>
+              </a:lnSpc>
+              <a:spcBef>
+                <a:spcPts val="200"/>
+              </a:spcBef>
+            </a:pPr>
             <a:endParaRPr lang="en-US" dirty="0" smtClean="0"/>
           </a:p>
           <a:p>
@@ -5052,8 +5245,13 @@
             </a:r>
             <a:r>
               <a:rPr lang="en-US" dirty="0"/>
-              <a:t> – LinQuest/AFRL</a:t>
-            </a:r>
+              <a:t> – </a:t>
+            </a:r>
+            <a:r>
+              <a:rPr lang="en-US" dirty="0" smtClean="0"/>
+              <a:t>LinQuest (LQ)/AFRL</a:t>
+            </a:r>
+            <a:endParaRPr lang="en-US" dirty="0"/>
           </a:p>
           <a:p>
             <a:pPr lvl="1">
@@ -5066,8 +5264,13 @@
             </a:pPr>
             <a:r>
               <a:rPr lang="en-US" dirty="0" smtClean="0"/>
-              <a:t>Brian Hulbert – LinQuest/AFRL</a:t>
-            </a:r>
+              <a:t>Brian Hulbert – </a:t>
+            </a:r>
+            <a:r>
+              <a:rPr lang="en-US" dirty="0" smtClean="0"/>
+              <a:t>LinQuest (LQ)/AFRL</a:t>
+            </a:r>
+            <a:endParaRPr lang="en-US" dirty="0" smtClean="0"/>
           </a:p>
           <a:p>
             <a:pPr lvl="1">
@@ -5080,8 +5283,13 @@
             </a:pPr>
             <a:r>
               <a:rPr lang="en-US" dirty="0" smtClean="0"/>
-              <a:t>Jen Davis – Rockwell Collins</a:t>
-            </a:r>
+              <a:t>Jen Davis – Rockwell </a:t>
+            </a:r>
+            <a:r>
+              <a:rPr lang="en-US" dirty="0" smtClean="0"/>
+              <a:t>Collins (RC)</a:t>
+            </a:r>
+            <a:endParaRPr lang="en-US" dirty="0" smtClean="0"/>
           </a:p>
           <a:p>
             <a:pPr lvl="1">
@@ -5098,8 +5306,13 @@
             </a:r>
             <a:r>
               <a:rPr lang="en-US" dirty="0"/>
-              <a:t> Kumar – Iowa State University</a:t>
-            </a:r>
+              <a:t> Kumar – Iowa State </a:t>
+            </a:r>
+            <a:r>
+              <a:rPr lang="en-US" dirty="0" smtClean="0"/>
+              <a:t>University (ISU)</a:t>
+            </a:r>
+            <a:endParaRPr lang="en-US" dirty="0"/>
           </a:p>
           <a:p>
             <a:pPr lvl="1">
@@ -5122,6 +5335,11 @@
               <a:rPr lang="en-US" dirty="0"/>
               <a:t> – University of Cincinnati </a:t>
             </a:r>
+            <a:r>
+              <a:rPr lang="en-US" dirty="0" smtClean="0"/>
+              <a:t>(UC)</a:t>
+            </a:r>
+            <a:endParaRPr lang="en-US" dirty="0"/>
           </a:p>
           <a:p>
             <a:pPr lvl="1">
@@ -5160,8 +5378,13 @@
             </a:r>
             <a:r>
               <a:rPr lang="en-US" dirty="0"/>
-              <a:t> Ren – Honeywell</a:t>
-            </a:r>
+              <a:t> Ren – </a:t>
+            </a:r>
+            <a:r>
+              <a:rPr lang="en-US" dirty="0" smtClean="0"/>
+              <a:t>Honeywell (H)</a:t>
+            </a:r>
+            <a:endParaRPr lang="en-US" dirty="0"/>
           </a:p>
           <a:p>
             <a:pPr lvl="1">
@@ -5182,8 +5405,13 @@
             </a:r>
             <a:r>
               <a:rPr lang="en-US" dirty="0"/>
-              <a:t> – Dependable Computing</a:t>
-            </a:r>
+              <a:t> – Dependable </a:t>
+            </a:r>
+            <a:r>
+              <a:rPr lang="en-US" dirty="0" smtClean="0"/>
+              <a:t>Computing (DC)</a:t>
+            </a:r>
+            <a:endParaRPr lang="en-US" dirty="0"/>
           </a:p>
           <a:p>
             <a:pPr lvl="1">
@@ -5547,14 +5775,43 @@
             <a:pPr fontAlgn="base"/>
             <a:r>
               <a:rPr lang="en-US" dirty="0"/>
-              <a:t>Extracted data types, input and output ports, and connections from code into both AADL/AGREE and ASSERT</a:t>
-            </a:r>
+              <a:t>Extracted data types, input and output ports, and connections from code into both AADL/AGREE and </a:t>
+            </a:r>
+            <a:r>
+              <a:rPr lang="en-US" dirty="0" smtClean="0"/>
+              <a:t>ASSERT </a:t>
+            </a:r>
+            <a:r>
+              <a:rPr lang="en-US" dirty="0" smtClean="0">
+                <a:solidFill>
+                  <a:srgbClr val="0000FF"/>
+                </a:solidFill>
+              </a:rPr>
+              <a:t>(LQ/AFRL, GE, RC)</a:t>
+            </a:r>
+            <a:endParaRPr lang="en-US" dirty="0">
+              <a:solidFill>
+                <a:srgbClr val="0000FF"/>
+              </a:solidFill>
+            </a:endParaRPr>
           </a:p>
           <a:p>
             <a:pPr fontAlgn="base"/>
             <a:r>
               <a:rPr lang="en-US" dirty="0"/>
-              <a:t>Created formal contracts for 6-8 services and tasks based on the </a:t>
+              <a:t>Created formal contracts for </a:t>
+            </a:r>
+            <a:r>
+              <a:rPr lang="en-US" dirty="0">
+                <a:solidFill>
+                  <a:srgbClr val="FF0000"/>
+                </a:solidFill>
+              </a:rPr>
+              <a:t>6-8</a:t>
+            </a:r>
+            <a:r>
+              <a:rPr lang="en-US" dirty="0"/>
+              <a:t> services and tasks based on the </a:t>
             </a:r>
             <a:r>
               <a:rPr lang="en-US" dirty="0" err="1"/>
@@ -5562,29 +5819,87 @@
             </a:r>
             <a:r>
               <a:rPr lang="en-US" dirty="0"/>
-              <a:t> Wiki and conversations with the developer</a:t>
-            </a:r>
+              <a:t> Wiki and conversations with the </a:t>
+            </a:r>
+            <a:r>
+              <a:rPr lang="en-US" dirty="0" smtClean="0"/>
+              <a:t>developer </a:t>
+            </a:r>
+            <a:r>
+              <a:rPr lang="en-US" dirty="0" smtClean="0">
+                <a:solidFill>
+                  <a:srgbClr val="0000FF"/>
+                </a:solidFill>
+              </a:rPr>
+              <a:t>(DC, RC)</a:t>
+            </a:r>
+            <a:endParaRPr lang="en-US" dirty="0">
+              <a:solidFill>
+                <a:srgbClr val="0000FF"/>
+              </a:solidFill>
+            </a:endParaRPr>
           </a:p>
           <a:p>
             <a:pPr fontAlgn="base"/>
             <a:r>
+              <a:rPr lang="en-US" dirty="0">
+                <a:solidFill>
+                  <a:srgbClr val="FF0000"/>
+                </a:solidFill>
+              </a:rPr>
+              <a:t>**</a:t>
+            </a:r>
+            <a:r>
               <a:rPr lang="en-US" dirty="0"/>
-              <a:t>**Stated and analyzed </a:t>
+              <a:t>Stated and analyzed </a:t>
             </a:r>
             <a:r>
               <a:rPr lang="en-US" dirty="0" smtClean="0"/>
               <a:t>behavioral properties </a:t>
             </a:r>
             <a:r>
+              <a:rPr lang="en-US" dirty="0" smtClean="0"/>
+              <a:t>of these </a:t>
+            </a:r>
+            <a:r>
               <a:rPr lang="en-US" dirty="0"/>
-              <a:t>about these component-level contracts</a:t>
-            </a:r>
+              <a:t>component-level </a:t>
+            </a:r>
+            <a:r>
+              <a:rPr lang="en-US" dirty="0" smtClean="0"/>
+              <a:t>contracts </a:t>
+            </a:r>
+            <a:r>
+              <a:rPr lang="en-US" dirty="0" smtClean="0">
+                <a:solidFill>
+                  <a:srgbClr val="0000FF"/>
+                </a:solidFill>
+              </a:rPr>
+              <a:t>(DC, RC)</a:t>
+            </a:r>
+            <a:endParaRPr lang="en-US" dirty="0">
+              <a:solidFill>
+                <a:srgbClr val="0000FF"/>
+              </a:solidFill>
+            </a:endParaRPr>
           </a:p>
           <a:p>
             <a:pPr fontAlgn="base"/>
             <a:r>
+              <a:rPr lang="en-US" dirty="0">
+                <a:solidFill>
+                  <a:srgbClr val="FF0000"/>
+                </a:solidFill>
+              </a:rPr>
+              <a:t>**</a:t>
+            </a:r>
+            <a:r>
               <a:rPr lang="en-US" dirty="0"/>
-              <a:t>**Stated and analyzed structural properties about </a:t>
+              <a:t>Stated and analyzed structural properties </a:t>
+            </a:r>
+            <a:r>
+              <a:rPr lang="en-US" dirty="0" smtClean="0"/>
+              <a:t>of </a:t>
             </a:r>
             <a:r>
               <a:rPr lang="en-US" dirty="0" err="1" smtClean="0"/>
@@ -5595,23 +5910,74 @@
               <a:t> in </a:t>
             </a:r>
             <a:r>
+              <a:rPr lang="en-US" dirty="0" smtClean="0"/>
+              <a:t>Resolute </a:t>
+            </a:r>
+            <a:r>
+              <a:rPr lang="en-US" dirty="0" smtClean="0">
+                <a:solidFill>
+                  <a:srgbClr val="0000FF"/>
+                </a:solidFill>
+              </a:rPr>
+              <a:t>(LQ/AFRL, DC)</a:t>
+            </a:r>
+            <a:endParaRPr lang="en-US" dirty="0">
+              <a:solidFill>
+                <a:srgbClr val="0000FF"/>
+              </a:solidFill>
+            </a:endParaRPr>
+          </a:p>
+          <a:p>
+            <a:pPr fontAlgn="base"/>
+            <a:r>
+              <a:rPr lang="en-US" dirty="0" smtClean="0"/>
+              <a:t>Idioms and lemmas </a:t>
+            </a:r>
+            <a:r>
               <a:rPr lang="en-US" dirty="0"/>
-              <a:t>Resolute</a:t>
-            </a:r>
+              <a:t>developed and documented for effective use of </a:t>
+            </a:r>
+            <a:r>
+              <a:rPr lang="en-US" dirty="0" smtClean="0"/>
+              <a:t>AGREE </a:t>
+            </a:r>
+            <a:r>
+              <a:rPr lang="en-US" dirty="0" smtClean="0">
+                <a:solidFill>
+                  <a:srgbClr val="0000FF"/>
+                </a:solidFill>
+              </a:rPr>
+              <a:t>(DC, RC)</a:t>
+            </a:r>
+            <a:endParaRPr lang="en-US" dirty="0">
+              <a:solidFill>
+                <a:srgbClr val="0000FF"/>
+              </a:solidFill>
+            </a:endParaRPr>
           </a:p>
           <a:p>
             <a:pPr fontAlgn="base"/>
             <a:r>
               <a:rPr lang="en-US" dirty="0"/>
-              <a:t>Idioms developed and documented for effective use of AGREE</a:t>
-            </a:r>
-          </a:p>
-          <a:p>
-            <a:pPr fontAlgn="base"/>
-            <a:r>
-              <a:rPr lang="en-US" dirty="0"/>
-              <a:t>Developed tool to compose component contracts into a system contract</a:t>
-            </a:r>
+              <a:t>Developed tool to compose component contracts into a system </a:t>
+            </a:r>
+            <a:r>
+              <a:rPr lang="en-US" dirty="0" smtClean="0"/>
+              <a:t>contract </a:t>
+            </a:r>
+            <a:r>
+              <a:rPr lang="en-US" dirty="0" smtClean="0">
+                <a:solidFill>
+                  <a:srgbClr val="0000FF"/>
+                </a:solidFill>
+              </a:rPr>
+              <a:t>(H, ISU)</a:t>
+            </a:r>
+            <a:endParaRPr lang="en-US" dirty="0">
+              <a:solidFill>
+                <a:srgbClr val="0000FF"/>
+              </a:solidFill>
+            </a:endParaRPr>
           </a:p>
           <a:p>
             <a:pPr lvl="1" fontAlgn="base"/>
@@ -5636,16 +6002,49 @@
             </a:r>
             <a:r>
               <a:rPr lang="en-US" dirty="0" smtClean="0"/>
-              <a:t> to the Robot Operating System (ROS)</a:t>
-            </a:r>
+              <a:t> to the Robot Operating System (ROS</a:t>
+            </a:r>
+            <a:r>
+              <a:rPr lang="en-US" dirty="0" smtClean="0"/>
+              <a:t>) </a:t>
+            </a:r>
+            <a:r>
+              <a:rPr lang="en-US" dirty="0" smtClean="0">
+                <a:solidFill>
+                  <a:srgbClr val="0000FF"/>
+                </a:solidFill>
+              </a:rPr>
+              <a:t>(UC)</a:t>
+            </a:r>
+            <a:endParaRPr lang="en-US" dirty="0" smtClean="0">
+              <a:solidFill>
+                <a:srgbClr val="0000FF"/>
+              </a:solidFill>
+            </a:endParaRPr>
           </a:p>
           <a:p>
             <a:pPr fontAlgn="base"/>
             <a:r>
               <a:rPr lang="en-US" dirty="0" smtClean="0"/>
-              <a:t>Created an assurance argument for state machine correctness</a:t>
-            </a:r>
-            <a:endParaRPr lang="en-US" dirty="0"/>
+              <a:t>Created an assurance argument for state machine </a:t>
+            </a:r>
+            <a:r>
+              <a:rPr lang="en-US" dirty="0" smtClean="0"/>
+              <a:t>correctness </a:t>
+            </a:r>
+            <a:r>
+              <a:rPr lang="en-US" dirty="0" smtClean="0">
+                <a:solidFill>
+                  <a:srgbClr val="0000FF"/>
+                </a:solidFill>
+              </a:rPr>
+              <a:t>(DC)</a:t>
+            </a:r>
+            <a:endParaRPr lang="en-US" dirty="0">
+              <a:solidFill>
+                <a:srgbClr val="0000FF"/>
+              </a:solidFill>
+            </a:endParaRPr>
           </a:p>
           <a:p>
             <a:pPr fontAlgn="base"/>
@@ -6080,6 +6479,34 @@
           </a:extLst>
         </p:spPr>
       </p:pic>
+      <p:sp>
+        <p:nvSpPr>
+          <p:cNvPr id="9" name="Footer Placeholder 3"/>
+          <p:cNvSpPr>
+            <a:spLocks noGrp="1"/>
+          </p:cNvSpPr>
+          <p:nvPr>
+            <p:ph type="ftr" sz="quarter" idx="11"/>
+          </p:nvPr>
+        </p:nvSpPr>
+        <p:spPr>
+          <a:xfrm>
+            <a:off x="4038600" y="6419124"/>
+            <a:ext cx="4114800" cy="306936"/>
+          </a:xfrm>
+        </p:spPr>
+        <p:txBody>
+          <a:bodyPr/>
+          <a:lstStyle/>
+          <a:p>
+            <a:r>
+              <a:rPr lang="en-US" dirty="0" smtClean="0"/>
+              <a:t>Architecture Group</a:t>
+            </a:r>
+            <a:endParaRPr lang="en-US" dirty="0"/>
+          </a:p>
+        </p:txBody>
+      </p:sp>
     </p:spTree>
     <p:extLst>
       <p:ext uri="{BB962C8B-B14F-4D97-AF65-F5344CB8AC3E}">
@@ -6151,18 +6578,74 @@
           <a:lstStyle/>
           <a:p>
             <a:r>
+              <a:rPr lang="en-US" dirty="0" smtClean="0"/>
+              <a:t>For components with state machines, we can check that</a:t>
+            </a:r>
+          </a:p>
+          <a:p>
+            <a:pPr lvl="1"/>
+            <a:r>
+              <a:rPr lang="en-US" dirty="0" smtClean="0"/>
+              <a:t>All states </a:t>
+            </a:r>
+            <a:r>
               <a:rPr lang="en-US" dirty="0"/>
-              <a:t>States and transitions are </a:t>
-            </a:r>
-            <a:r>
-              <a:rPr lang="en-US" dirty="0" smtClean="0"/>
-              <a:t>reachable</a:t>
-            </a:r>
-          </a:p>
-          <a:p>
-            <a:r>
-              <a:rPr lang="en-US" dirty="0" smtClean="0"/>
-              <a:t>[Ben and Jen fill in]</a:t>
+              <a:t>and </a:t>
+            </a:r>
+            <a:r>
+              <a:rPr lang="en-US" dirty="0" smtClean="0"/>
+              <a:t>transitions are reachable</a:t>
+            </a:r>
+          </a:p>
+          <a:p>
+            <a:pPr lvl="1"/>
+            <a:r>
+              <a:rPr lang="en-US" dirty="0" smtClean="0"/>
+              <a:t>Only the states and transitions specified are possible</a:t>
+            </a:r>
+          </a:p>
+          <a:p>
+            <a:r>
+              <a:rPr lang="en-US" dirty="0" smtClean="0"/>
+              <a:t>All input/output events are possible</a:t>
+            </a:r>
+          </a:p>
+          <a:p>
+            <a:r>
+              <a:rPr lang="en-US" dirty="0" smtClean="0"/>
+              <a:t>We can also check that each component is </a:t>
+            </a:r>
+            <a:r>
+              <a:rPr lang="en-US" i="1" dirty="0" smtClean="0"/>
+              <a:t>realizable</a:t>
+            </a:r>
+            <a:endParaRPr lang="en-US" dirty="0" smtClean="0"/>
+          </a:p>
+        </p:txBody>
+      </p:sp>
+      <p:sp>
+        <p:nvSpPr>
+          <p:cNvPr id="4" name="Footer Placeholder 3"/>
+          <p:cNvSpPr>
+            <a:spLocks noGrp="1"/>
+          </p:cNvSpPr>
+          <p:nvPr>
+            <p:ph type="ftr" sz="quarter" idx="11"/>
+          </p:nvPr>
+        </p:nvSpPr>
+        <p:spPr>
+          <a:xfrm>
+            <a:off x="4038600" y="6419124"/>
+            <a:ext cx="4114800" cy="306936"/>
+          </a:xfrm>
+        </p:spPr>
+        <p:txBody>
+          <a:bodyPr/>
+          <a:lstStyle/>
+          <a:p>
+            <a:r>
+              <a:rPr lang="en-US" dirty="0" smtClean="0"/>
+              <a:t>Architecture Group</a:t>
             </a:r>
             <a:endParaRPr lang="en-US" dirty="0"/>
           </a:p>
@@ -6250,6 +6733,34 @@
           </a:p>
         </p:txBody>
       </p:sp>
+      <p:sp>
+        <p:nvSpPr>
+          <p:cNvPr id="4" name="Footer Placeholder 3"/>
+          <p:cNvSpPr>
+            <a:spLocks noGrp="1"/>
+          </p:cNvSpPr>
+          <p:nvPr>
+            <p:ph type="ftr" sz="quarter" idx="11"/>
+          </p:nvPr>
+        </p:nvSpPr>
+        <p:spPr>
+          <a:xfrm>
+            <a:off x="4038600" y="6419124"/>
+            <a:ext cx="4114800" cy="306936"/>
+          </a:xfrm>
+        </p:spPr>
+        <p:txBody>
+          <a:bodyPr/>
+          <a:lstStyle/>
+          <a:p>
+            <a:r>
+              <a:rPr lang="en-US" dirty="0" smtClean="0"/>
+              <a:t>Architecture Group</a:t>
+            </a:r>
+            <a:endParaRPr lang="en-US" dirty="0"/>
+          </a:p>
+        </p:txBody>
+      </p:sp>
     </p:spTree>
     <p:extLst>
       <p:ext uri="{BB962C8B-B14F-4D97-AF65-F5344CB8AC3E}">
@@ -6323,6 +6834,34 @@
             <a:r>
               <a:rPr lang="en-US" dirty="0" smtClean="0"/>
               <a:t>[Ben fill in]</a:t>
+            </a:r>
+            <a:endParaRPr lang="en-US" dirty="0"/>
+          </a:p>
+        </p:txBody>
+      </p:sp>
+      <p:sp>
+        <p:nvSpPr>
+          <p:cNvPr id="4" name="Footer Placeholder 3"/>
+          <p:cNvSpPr>
+            <a:spLocks noGrp="1"/>
+          </p:cNvSpPr>
+          <p:nvPr>
+            <p:ph type="ftr" sz="quarter" idx="11"/>
+          </p:nvPr>
+        </p:nvSpPr>
+        <p:spPr>
+          <a:xfrm>
+            <a:off x="4038600" y="6419124"/>
+            <a:ext cx="4114800" cy="306936"/>
+          </a:xfrm>
+        </p:spPr>
+        <p:txBody>
+          <a:bodyPr/>
+          <a:lstStyle/>
+          <a:p>
+            <a:r>
+              <a:rPr lang="en-US" dirty="0" smtClean="0"/>
+              <a:t>Architecture Group</a:t>
             </a:r>
             <a:endParaRPr lang="en-US" dirty="0"/>
           </a:p>

</xml_diff>

<commit_message>
slide updates. new placeholders
</commit_message>
<xml_diff>
--- a/presentations/S5_SoI_Architecture_Group.pptx
+++ b/presentations/S5_SoI_Architecture_Group.pptx
@@ -5,7 +5,7 @@
     <p:sldMasterId id="2147483648" r:id="rId1"/>
   </p:sldMasterIdLst>
   <p:notesMasterIdLst>
-    <p:notesMasterId r:id="rId13"/>
+    <p:notesMasterId r:id="rId14"/>
   </p:notesMasterIdLst>
   <p:sldIdLst>
     <p:sldId id="256" r:id="rId2"/>
@@ -15,10 +15,11 @@
     <p:sldId id="260" r:id="rId6"/>
     <p:sldId id="265" r:id="rId7"/>
     <p:sldId id="263" r:id="rId8"/>
-    <p:sldId id="264" r:id="rId9"/>
-    <p:sldId id="266" r:id="rId10"/>
-    <p:sldId id="261" r:id="rId11"/>
-    <p:sldId id="262" r:id="rId12"/>
+    <p:sldId id="266" r:id="rId9"/>
+    <p:sldId id="267" r:id="rId10"/>
+    <p:sldId id="268" r:id="rId11"/>
+    <p:sldId id="261" r:id="rId12"/>
+    <p:sldId id="262" r:id="rId13"/>
   </p:sldIdLst>
   <p:sldSz cx="12192000" cy="6858000"/>
   <p:notesSz cx="6858000" cy="9144000"/>
@@ -207,7 +208,7 @@
           <a:p>
             <a:fld id="{7E04793A-A12B-44AC-A0A5-947722C372BD}" type="datetimeFigureOut">
               <a:rPr lang="en-US" smtClean="0"/>
-              <a:t>7/14/2017</a:t>
+              <a:t>7/25/2017</a:t>
             </a:fld>
             <a:endParaRPr lang="en-US"/>
           </a:p>
@@ -960,7 +961,7 @@
           <a:p>
             <a:fld id="{563BCB51-F13E-4501-921D-7D4EB39EDE9B}" type="slidenum">
               <a:rPr lang="en-US" smtClean="0"/>
-              <a:t>10</a:t>
+              <a:t>11</a:t>
             </a:fld>
             <a:endParaRPr lang="en-US"/>
           </a:p>
@@ -1044,7 +1045,7 @@
           <a:p>
             <a:fld id="{563BCB51-F13E-4501-921D-7D4EB39EDE9B}" type="slidenum">
               <a:rPr lang="en-US" smtClean="0"/>
-              <a:t>11</a:t>
+              <a:t>12</a:t>
             </a:fld>
             <a:endParaRPr lang="en-US"/>
           </a:p>
@@ -1194,7 +1195,7 @@
           <a:p>
             <a:fld id="{9228EC5D-0FAB-4052-8D3C-D3FC4849CE90}" type="datetimeFigureOut">
               <a:rPr lang="en-US" smtClean="0"/>
-              <a:t>7/14/2017</a:t>
+              <a:t>7/25/2017</a:t>
             </a:fld>
             <a:endParaRPr lang="en-US"/>
           </a:p>
@@ -1369,7 +1370,7 @@
           <a:p>
             <a:fld id="{9228EC5D-0FAB-4052-8D3C-D3FC4849CE90}" type="datetimeFigureOut">
               <a:rPr lang="en-US" smtClean="0"/>
-              <a:t>7/14/2017</a:t>
+              <a:t>7/25/2017</a:t>
             </a:fld>
             <a:endParaRPr lang="en-US"/>
           </a:p>
@@ -1549,7 +1550,7 @@
           <a:p>
             <a:fld id="{9228EC5D-0FAB-4052-8D3C-D3FC4849CE90}" type="datetimeFigureOut">
               <a:rPr lang="en-US" smtClean="0"/>
-              <a:t>7/14/2017</a:t>
+              <a:t>7/25/2017</a:t>
             </a:fld>
             <a:endParaRPr lang="en-US"/>
           </a:p>
@@ -1724,7 +1725,7 @@
           <a:p>
             <a:fld id="{9228EC5D-0FAB-4052-8D3C-D3FC4849CE90}" type="datetimeFigureOut">
               <a:rPr lang="en-US" smtClean="0"/>
-              <a:t>7/14/2017</a:t>
+              <a:t>7/25/2017</a:t>
             </a:fld>
             <a:endParaRPr lang="en-US"/>
           </a:p>
@@ -1970,7 +1971,7 @@
           <a:p>
             <a:fld id="{9228EC5D-0FAB-4052-8D3C-D3FC4849CE90}" type="datetimeFigureOut">
               <a:rPr lang="en-US" smtClean="0"/>
-              <a:t>7/14/2017</a:t>
+              <a:t>7/25/2017</a:t>
             </a:fld>
             <a:endParaRPr lang="en-US"/>
           </a:p>
@@ -2207,7 +2208,7 @@
           <a:p>
             <a:fld id="{9228EC5D-0FAB-4052-8D3C-D3FC4849CE90}" type="datetimeFigureOut">
               <a:rPr lang="en-US" smtClean="0"/>
-              <a:t>7/14/2017</a:t>
+              <a:t>7/25/2017</a:t>
             </a:fld>
             <a:endParaRPr lang="en-US"/>
           </a:p>
@@ -2574,7 +2575,7 @@
           <a:p>
             <a:fld id="{9228EC5D-0FAB-4052-8D3C-D3FC4849CE90}" type="datetimeFigureOut">
               <a:rPr lang="en-US" smtClean="0"/>
-              <a:t>7/14/2017</a:t>
+              <a:t>7/25/2017</a:t>
             </a:fld>
             <a:endParaRPr lang="en-US"/>
           </a:p>
@@ -2697,7 +2698,7 @@
           <a:p>
             <a:fld id="{9228EC5D-0FAB-4052-8D3C-D3FC4849CE90}" type="datetimeFigureOut">
               <a:rPr lang="en-US" smtClean="0"/>
-              <a:t>7/14/2017</a:t>
+              <a:t>7/25/2017</a:t>
             </a:fld>
             <a:endParaRPr lang="en-US"/>
           </a:p>
@@ -2792,7 +2793,7 @@
           <a:p>
             <a:fld id="{9228EC5D-0FAB-4052-8D3C-D3FC4849CE90}" type="datetimeFigureOut">
               <a:rPr lang="en-US" smtClean="0"/>
-              <a:t>7/14/2017</a:t>
+              <a:t>7/25/2017</a:t>
             </a:fld>
             <a:endParaRPr lang="en-US"/>
           </a:p>
@@ -3069,7 +3070,7 @@
           <a:p>
             <a:fld id="{9228EC5D-0FAB-4052-8D3C-D3FC4849CE90}" type="datetimeFigureOut">
               <a:rPr lang="en-US" smtClean="0"/>
-              <a:t>7/14/2017</a:t>
+              <a:t>7/25/2017</a:t>
             </a:fld>
             <a:endParaRPr lang="en-US"/>
           </a:p>
@@ -3322,7 +3323,7 @@
           <a:p>
             <a:fld id="{9228EC5D-0FAB-4052-8D3C-D3FC4849CE90}" type="datetimeFigureOut">
               <a:rPr lang="en-US" smtClean="0"/>
-              <a:t>7/14/2017</a:t>
+              <a:t>7/25/2017</a:t>
             </a:fld>
             <a:endParaRPr lang="en-US"/>
           </a:p>
@@ -3535,7 +3536,7 @@
           <a:p>
             <a:fld id="{9228EC5D-0FAB-4052-8D3C-D3FC4849CE90}" type="datetimeFigureOut">
               <a:rPr lang="en-US" smtClean="0"/>
-              <a:t>7/14/2017</a:t>
+              <a:t>7/25/2017</a:t>
             </a:fld>
             <a:endParaRPr lang="en-US"/>
           </a:p>
@@ -4411,6 +4412,106 @@
           <a:bodyPr/>
           <a:lstStyle/>
           <a:p>
+            <a:endParaRPr lang="en-US"/>
+          </a:p>
+        </p:txBody>
+      </p:sp>
+      <p:sp>
+        <p:nvSpPr>
+          <p:cNvPr id="3" name="Content Placeholder 2"/>
+          <p:cNvSpPr>
+            <a:spLocks noGrp="1"/>
+          </p:cNvSpPr>
+          <p:nvPr>
+            <p:ph idx="1"/>
+          </p:nvPr>
+        </p:nvSpPr>
+        <p:spPr/>
+        <p:txBody>
+          <a:bodyPr/>
+          <a:lstStyle/>
+          <a:p>
+            <a:r>
+              <a:rPr lang="en-US" dirty="0" smtClean="0"/>
+              <a:t>[Placeholder for Chris Elliott’s work]</a:t>
+            </a:r>
+            <a:endParaRPr lang="en-US" dirty="0"/>
+          </a:p>
+        </p:txBody>
+      </p:sp>
+      <p:sp>
+        <p:nvSpPr>
+          <p:cNvPr id="4" name="Footer Placeholder 3"/>
+          <p:cNvSpPr>
+            <a:spLocks noGrp="1"/>
+          </p:cNvSpPr>
+          <p:nvPr>
+            <p:ph type="ftr" sz="quarter" idx="11"/>
+          </p:nvPr>
+        </p:nvSpPr>
+        <p:spPr>
+          <a:xfrm>
+            <a:off x="4038600" y="6419124"/>
+            <a:ext cx="4114800" cy="306936"/>
+          </a:xfrm>
+        </p:spPr>
+        <p:txBody>
+          <a:bodyPr/>
+          <a:lstStyle/>
+          <a:p>
+            <a:r>
+              <a:rPr lang="en-US" dirty="0" smtClean="0"/>
+              <a:t>Architecture Group</a:t>
+            </a:r>
+            <a:endParaRPr lang="en-US" dirty="0"/>
+          </a:p>
+        </p:txBody>
+      </p:sp>
+    </p:spTree>
+    <p:extLst>
+      <p:ext uri="{BB962C8B-B14F-4D97-AF65-F5344CB8AC3E}">
+        <p14:creationId xmlns:p14="http://schemas.microsoft.com/office/powerpoint/2010/main" val="1619698478"/>
+      </p:ext>
+    </p:extLst>
+  </p:cSld>
+  <p:clrMapOvr>
+    <a:masterClrMapping/>
+  </p:clrMapOvr>
+</p:sld>
+</file>
+
+<file path=ppt/slides/slide11.xml><?xml version="1.0" encoding="utf-8"?>
+<p:sld xmlns:a="http://schemas.openxmlformats.org/drawingml/2006/main" xmlns:r="http://schemas.openxmlformats.org/officeDocument/2006/relationships" xmlns:p="http://schemas.openxmlformats.org/presentationml/2006/main">
+  <p:cSld>
+    <p:spTree>
+      <p:nvGrpSpPr>
+        <p:cNvPr id="1" name=""/>
+        <p:cNvGrpSpPr/>
+        <p:nvPr/>
+      </p:nvGrpSpPr>
+      <p:grpSpPr>
+        <a:xfrm>
+          <a:off x="0" y="0"/>
+          <a:ext cx="0" cy="0"/>
+          <a:chOff x="0" y="0"/>
+          <a:chExt cx="0" cy="0"/>
+        </a:xfrm>
+      </p:grpSpPr>
+      <p:sp>
+        <p:nvSpPr>
+          <p:cNvPr id="2" name="Title 1"/>
+          <p:cNvSpPr>
+            <a:spLocks noGrp="1"/>
+          </p:cNvSpPr>
+          <p:nvPr>
+            <p:ph type="title"/>
+          </p:nvPr>
+        </p:nvSpPr>
+        <p:spPr/>
+        <p:txBody>
+          <a:bodyPr/>
+          <a:lstStyle/>
+          <a:p>
             <a:r>
               <a:rPr lang="en-US" dirty="0" smtClean="0"/>
               <a:t>Lessons Learned</a:t>
@@ -4432,7 +4533,7 @@
         <p:spPr/>
         <p:txBody>
           <a:bodyPr>
-            <a:normAutofit lnSpcReduction="10000"/>
+            <a:normAutofit fontScale="92500" lnSpcReduction="10000"/>
           </a:bodyPr>
           <a:lstStyle/>
           <a:p>
@@ -4446,7 +4547,25 @@
             </a:pPr>
             <a:r>
               <a:rPr lang="en-US" dirty="0" smtClean="0"/>
-              <a:t>Data types (or an ontology), ports, and connections can be automatically extracted from code (with some moderate up front work)</a:t>
+              <a:t>Many problems are identified through the process of formalization, before analysis</a:t>
+            </a:r>
+          </a:p>
+          <a:p>
+            <a:pPr>
+              <a:lnSpc>
+                <a:spcPct val="100000"/>
+              </a:lnSpc>
+              <a:spcBef>
+                <a:spcPts val="200"/>
+              </a:spcBef>
+            </a:pPr>
+            <a:r>
+              <a:rPr lang="en-US" dirty="0" smtClean="0"/>
+              <a:t>Data </a:t>
+            </a:r>
+            <a:r>
+              <a:rPr lang="en-US" dirty="0" smtClean="0"/>
+              <a:t>types (or an ontology), ports, and connections can be automatically extracted from code (with some moderate up front work)</a:t>
             </a:r>
           </a:p>
           <a:p>
@@ -4636,7 +4755,7 @@
           <a:p>
             <a:fld id="{22900CBD-C7D3-47FA-BEF9-49DBBEB1A58F}" type="slidenum">
               <a:rPr lang="en-US" smtClean="0"/>
-              <a:t>10</a:t>
+              <a:t>11</a:t>
             </a:fld>
             <a:endParaRPr lang="en-US"/>
           </a:p>
@@ -4662,7 +4781,7 @@
 </p:sld>
 </file>
 
-<file path=ppt/slides/slide11.xml><?xml version="1.0" encoding="utf-8"?>
+<file path=ppt/slides/slide12.xml><?xml version="1.0" encoding="utf-8"?>
 <p:sld xmlns:a="http://schemas.openxmlformats.org/drawingml/2006/main" xmlns:r="http://schemas.openxmlformats.org/officeDocument/2006/relationships" xmlns:p="http://schemas.openxmlformats.org/presentationml/2006/main">
   <p:cSld>
     <p:spTree>
@@ -4872,7 +4991,7 @@
           <a:p>
             <a:fld id="{22900CBD-C7D3-47FA-BEF9-49DBBEB1A58F}" type="slidenum">
               <a:rPr lang="en-US" smtClean="0"/>
-              <a:t>11</a:t>
+              <a:t>12</a:t>
             </a:fld>
             <a:endParaRPr lang="en-US"/>
           </a:p>
@@ -5264,13 +5383,8 @@
             </a:pPr>
             <a:r>
               <a:rPr lang="en-US" dirty="0" smtClean="0"/>
-              <a:t>Brian Hulbert – </a:t>
-            </a:r>
-            <a:r>
-              <a:rPr lang="en-US" dirty="0" smtClean="0"/>
-              <a:t>LinQuest (LQ)/AFRL</a:t>
-            </a:r>
-            <a:endParaRPr lang="en-US" dirty="0" smtClean="0"/>
+              <a:t>Brian Hulbert – LinQuest (LQ)/AFRL</a:t>
+            </a:r>
           </a:p>
           <a:p>
             <a:pPr lvl="1">
@@ -5283,13 +5397,8 @@
             </a:pPr>
             <a:r>
               <a:rPr lang="en-US" dirty="0" smtClean="0"/>
-              <a:t>Jen Davis – Rockwell </a:t>
-            </a:r>
-            <a:r>
-              <a:rPr lang="en-US" dirty="0" smtClean="0"/>
-              <a:t>Collins (RC)</a:t>
-            </a:r>
-            <a:endParaRPr lang="en-US" dirty="0" smtClean="0"/>
+              <a:t>Jen Davis – Rockwell Collins (RC)</a:t>
+            </a:r>
           </a:p>
           <a:p>
             <a:pPr lvl="1">
@@ -5768,7 +5877,7 @@
         <p:spPr/>
         <p:txBody>
           <a:bodyPr>
-            <a:normAutofit fontScale="85000" lnSpcReduction="10000"/>
+            <a:normAutofit fontScale="92500" lnSpcReduction="20000"/>
           </a:bodyPr>
           <a:lstStyle/>
           <a:p>
@@ -5855,11 +5964,7 @@
             </a:r>
             <a:r>
               <a:rPr lang="en-US" dirty="0" smtClean="0"/>
-              <a:t>behavioral properties </a:t>
-            </a:r>
-            <a:r>
-              <a:rPr lang="en-US" dirty="0" smtClean="0"/>
-              <a:t>of these </a:t>
+              <a:t>behavioral properties of these </a:t>
             </a:r>
             <a:r>
               <a:rPr lang="en-US" dirty="0"/>
@@ -5886,52 +5991,12 @@
           <a:p>
             <a:pPr fontAlgn="base"/>
             <a:r>
-              <a:rPr lang="en-US" dirty="0">
-                <a:solidFill>
-                  <a:srgbClr val="FF0000"/>
-                </a:solidFill>
-              </a:rPr>
-              <a:t>**</a:t>
-            </a:r>
-            <a:r>
-              <a:rPr lang="en-US" dirty="0"/>
-              <a:t>Stated and analyzed structural properties </a:t>
-            </a:r>
-            <a:r>
-              <a:rPr lang="en-US" dirty="0" smtClean="0"/>
-              <a:t>of </a:t>
-            </a:r>
-            <a:r>
-              <a:rPr lang="en-US" dirty="0" err="1" smtClean="0"/>
-              <a:t>UxAS</a:t>
-            </a:r>
-            <a:r>
-              <a:rPr lang="en-US" dirty="0" smtClean="0"/>
-              <a:t> in </a:t>
-            </a:r>
-            <a:r>
-              <a:rPr lang="en-US" dirty="0" smtClean="0"/>
-              <a:t>Resolute </a:t>
-            </a:r>
-            <a:r>
-              <a:rPr lang="en-US" dirty="0" smtClean="0">
-                <a:solidFill>
-                  <a:srgbClr val="0000FF"/>
-                </a:solidFill>
-              </a:rPr>
-              <a:t>(LQ/AFRL, DC)</a:t>
-            </a:r>
-            <a:endParaRPr lang="en-US" dirty="0">
-              <a:solidFill>
-                <a:srgbClr val="0000FF"/>
-              </a:solidFill>
-            </a:endParaRPr>
-          </a:p>
-          <a:p>
-            <a:pPr fontAlgn="base"/>
-            <a:r>
-              <a:rPr lang="en-US" dirty="0" smtClean="0"/>
-              <a:t>Idioms and lemmas </a:t>
+              <a:rPr lang="en-US" dirty="0" smtClean="0"/>
+              <a:t>Idioms </a:t>
+            </a:r>
+            <a:r>
+              <a:rPr lang="en-US" dirty="0" smtClean="0"/>
+              <a:t>and lemmas </a:t>
             </a:r>
             <a:r>
               <a:rPr lang="en-US" dirty="0"/>
@@ -6002,11 +6067,7 @@
             </a:r>
             <a:r>
               <a:rPr lang="en-US" dirty="0" smtClean="0"/>
-              <a:t> to the Robot Operating System (ROS</a:t>
-            </a:r>
-            <a:r>
-              <a:rPr lang="en-US" dirty="0" smtClean="0"/>
-              <a:t>) </a:t>
+              <a:t> to the Robot Operating System (ROS) </a:t>
             </a:r>
             <a:r>
               <a:rPr lang="en-US" dirty="0" smtClean="0">
@@ -6016,21 +6077,12 @@
               </a:rPr>
               <a:t>(UC)</a:t>
             </a:r>
-            <a:endParaRPr lang="en-US" dirty="0" smtClean="0">
-              <a:solidFill>
-                <a:srgbClr val="0000FF"/>
-              </a:solidFill>
-            </a:endParaRPr>
           </a:p>
           <a:p>
             <a:pPr fontAlgn="base"/>
             <a:r>
               <a:rPr lang="en-US" dirty="0" smtClean="0"/>
-              <a:t>Created an assurance argument for state machine </a:t>
-            </a:r>
-            <a:r>
-              <a:rPr lang="en-US" dirty="0" smtClean="0"/>
-              <a:t>correctness </a:t>
+              <a:t>Created an assurance argument for state machine correctness </a:t>
             </a:r>
             <a:r>
               <a:rPr lang="en-US" dirty="0" smtClean="0">
@@ -6700,11 +6752,7 @@
           <a:p>
             <a:r>
               <a:rPr lang="en-US" dirty="0" smtClean="0"/>
-              <a:t>Accomplishments: Structural properties of </a:t>
-            </a:r>
-            <a:r>
-              <a:rPr lang="en-US" dirty="0" err="1" smtClean="0"/>
-              <a:t>UxAS</a:t>
+              <a:t>Accomplishments: State Machine Correctness Argument</a:t>
             </a:r>
             <a:endParaRPr lang="en-US" dirty="0"/>
           </a:p>
@@ -6727,7 +6775,7 @@
           <a:p>
             <a:r>
               <a:rPr lang="en-US" dirty="0" smtClean="0"/>
-              <a:t>[Aaron and Ben fill in]</a:t>
+              <a:t>[Ben fill in]</a:t>
             </a:r>
             <a:endParaRPr lang="en-US" dirty="0"/>
           </a:p>
@@ -6761,10 +6809,40 @@
           </a:p>
         </p:txBody>
       </p:sp>
+      <p:pic>
+        <p:nvPicPr>
+          <p:cNvPr id="5" name="Content Placeholder 4"/>
+          <p:cNvPicPr>
+            <a:picLocks noChangeAspect="1"/>
+          </p:cNvPicPr>
+          <p:nvPr/>
+        </p:nvPicPr>
+        <p:blipFill>
+          <a:blip r:embed="rId2">
+            <a:extLst>
+              <a:ext uri="{28A0092B-C50C-407E-A947-70E740481C1C}">
+                <a14:useLocalDpi xmlns:a14="http://schemas.microsoft.com/office/drawing/2010/main" val="0"/>
+              </a:ext>
+            </a:extLst>
+          </a:blip>
+          <a:stretch>
+            <a:fillRect/>
+          </a:stretch>
+        </p:blipFill>
+        <p:spPr>
+          <a:xfrm>
+            <a:off x="1403163" y="781917"/>
+            <a:ext cx="7106186" cy="5637207"/>
+          </a:xfrm>
+          <a:prstGeom prst="rect">
+            <a:avLst/>
+          </a:prstGeom>
+        </p:spPr>
+      </p:pic>
     </p:spTree>
     <p:extLst>
       <p:ext uri="{BB962C8B-B14F-4D97-AF65-F5344CB8AC3E}">
-        <p14:creationId xmlns:p14="http://schemas.microsoft.com/office/powerpoint/2010/main" val="3332586287"/>
+        <p14:creationId xmlns:p14="http://schemas.microsoft.com/office/powerpoint/2010/main" val="286898037"/>
       </p:ext>
     </p:extLst>
   </p:cSld>
@@ -6803,16 +6881,10 @@
         </p:nvSpPr>
         <p:spPr/>
         <p:txBody>
-          <a:bodyPr>
-            <a:normAutofit fontScale="90000"/>
-          </a:bodyPr>
-          <a:lstStyle/>
-          <a:p>
-            <a:r>
-              <a:rPr lang="en-US" dirty="0" smtClean="0"/>
-              <a:t>Accomplishments: State Machine Correctness Argument</a:t>
-            </a:r>
-            <a:endParaRPr lang="en-US" dirty="0"/>
+          <a:bodyPr/>
+          <a:lstStyle/>
+          <a:p>
+            <a:endParaRPr lang="en-US"/>
           </a:p>
         </p:txBody>
       </p:sp>
@@ -6833,7 +6905,7 @@
           <a:p>
             <a:r>
               <a:rPr lang="en-US" dirty="0" smtClean="0"/>
-              <a:t>[Ben fill in]</a:t>
+              <a:t>[Placeholder for GE’s work]</a:t>
             </a:r>
             <a:endParaRPr lang="en-US" dirty="0"/>
           </a:p>
@@ -6870,7 +6942,7 @@
     </p:spTree>
     <p:extLst>
       <p:ext uri="{BB962C8B-B14F-4D97-AF65-F5344CB8AC3E}">
-        <p14:creationId xmlns:p14="http://schemas.microsoft.com/office/powerpoint/2010/main" val="286898037"/>
+        <p14:creationId xmlns:p14="http://schemas.microsoft.com/office/powerpoint/2010/main" val="2960052227"/>
       </p:ext>
     </p:extLst>
   </p:cSld>

</xml_diff>

<commit_message>
end of work day slides update
</commit_message>
<xml_diff>
--- a/presentations/S5_SoI_Architecture_Group.pptx
+++ b/presentations/S5_SoI_Architecture_Group.pptx
@@ -5,7 +5,7 @@
     <p:sldMasterId id="2147483648" r:id="rId1"/>
   </p:sldMasterIdLst>
   <p:notesMasterIdLst>
-    <p:notesMasterId r:id="rId38"/>
+    <p:notesMasterId r:id="rId40"/>
   </p:notesMasterIdLst>
   <p:sldIdLst>
     <p:sldId id="256" r:id="rId2"/>
@@ -22,28 +22,30 @@
     <p:sldId id="293" r:id="rId13"/>
     <p:sldId id="294" r:id="rId14"/>
     <p:sldId id="324" r:id="rId15"/>
-    <p:sldId id="307" r:id="rId16"/>
-    <p:sldId id="322" r:id="rId17"/>
-    <p:sldId id="309" r:id="rId18"/>
-    <p:sldId id="312" r:id="rId19"/>
-    <p:sldId id="327" r:id="rId20"/>
-    <p:sldId id="328" r:id="rId21"/>
-    <p:sldId id="329" r:id="rId22"/>
-    <p:sldId id="330" r:id="rId23"/>
-    <p:sldId id="331" r:id="rId24"/>
-    <p:sldId id="315" r:id="rId25"/>
-    <p:sldId id="279" r:id="rId26"/>
-    <p:sldId id="289" r:id="rId27"/>
-    <p:sldId id="326" r:id="rId28"/>
-    <p:sldId id="266" r:id="rId29"/>
-    <p:sldId id="269" r:id="rId30"/>
-    <p:sldId id="268" r:id="rId31"/>
-    <p:sldId id="295" r:id="rId32"/>
-    <p:sldId id="305" r:id="rId33"/>
-    <p:sldId id="261" r:id="rId34"/>
-    <p:sldId id="262" r:id="rId35"/>
-    <p:sldId id="306" r:id="rId36"/>
-    <p:sldId id="313" r:id="rId37"/>
+    <p:sldId id="334" r:id="rId16"/>
+    <p:sldId id="307" r:id="rId17"/>
+    <p:sldId id="322" r:id="rId18"/>
+    <p:sldId id="309" r:id="rId19"/>
+    <p:sldId id="312" r:id="rId20"/>
+    <p:sldId id="327" r:id="rId21"/>
+    <p:sldId id="328" r:id="rId22"/>
+    <p:sldId id="329" r:id="rId23"/>
+    <p:sldId id="330" r:id="rId24"/>
+    <p:sldId id="331" r:id="rId25"/>
+    <p:sldId id="315" r:id="rId26"/>
+    <p:sldId id="279" r:id="rId27"/>
+    <p:sldId id="289" r:id="rId28"/>
+    <p:sldId id="335" r:id="rId29"/>
+    <p:sldId id="326" r:id="rId30"/>
+    <p:sldId id="266" r:id="rId31"/>
+    <p:sldId id="269" r:id="rId32"/>
+    <p:sldId id="268" r:id="rId33"/>
+    <p:sldId id="295" r:id="rId34"/>
+    <p:sldId id="305" r:id="rId35"/>
+    <p:sldId id="261" r:id="rId36"/>
+    <p:sldId id="262" r:id="rId37"/>
+    <p:sldId id="306" r:id="rId38"/>
+    <p:sldId id="313" r:id="rId39"/>
   </p:sldIdLst>
   <p:sldSz cx="12192000" cy="6858000"/>
   <p:notesSz cx="6858000" cy="9144000"/>
@@ -649,7 +651,7 @@
           <a:p>
             <a:fld id="{563BCB51-F13E-4501-921D-7D4EB39EDE9B}" type="slidenum">
               <a:rPr lang="en-US" smtClean="0"/>
-              <a:t>16</a:t>
+              <a:t>17</a:t>
             </a:fld>
             <a:endParaRPr lang="en-US"/>
           </a:p>
@@ -753,7 +755,7 @@
           <a:p>
             <a:fld id="{563BCB51-F13E-4501-921D-7D4EB39EDE9B}" type="slidenum">
               <a:rPr lang="en-US" smtClean="0"/>
-              <a:t>17</a:t>
+              <a:t>18</a:t>
             </a:fld>
             <a:endParaRPr lang="en-US"/>
           </a:p>
@@ -881,7 +883,7 @@
           <a:p>
             <a:fld id="{563BCB51-F13E-4501-921D-7D4EB39EDE9B}" type="slidenum">
               <a:rPr lang="en-US" smtClean="0"/>
-              <a:t>18</a:t>
+              <a:t>19</a:t>
             </a:fld>
             <a:endParaRPr lang="en-US"/>
           </a:p>
@@ -973,7 +975,7 @@
           <a:p>
             <a:fld id="{563BCB51-F13E-4501-921D-7D4EB39EDE9B}" type="slidenum">
               <a:rPr lang="en-US" smtClean="0"/>
-              <a:t>19</a:t>
+              <a:t>20</a:t>
             </a:fld>
             <a:endParaRPr lang="en-US"/>
           </a:p>
@@ -1057,7 +1059,7 @@
           <a:p>
             <a:fld id="{563BCB51-F13E-4501-921D-7D4EB39EDE9B}" type="slidenum">
               <a:rPr lang="en-US" smtClean="0"/>
-              <a:t>24</a:t>
+              <a:t>25</a:t>
             </a:fld>
             <a:endParaRPr lang="en-US"/>
           </a:p>
@@ -1151,7 +1153,7 @@
           <a:p>
             <a:fld id="{563BCB51-F13E-4501-921D-7D4EB39EDE9B}" type="slidenum">
               <a:rPr lang="en-US" smtClean="0"/>
-              <a:t>25</a:t>
+              <a:t>26</a:t>
             </a:fld>
             <a:endParaRPr lang="en-US"/>
           </a:p>
@@ -1235,7 +1237,7 @@
           <a:p>
             <a:fld id="{563BCB51-F13E-4501-921D-7D4EB39EDE9B}" type="slidenum">
               <a:rPr lang="en-US" smtClean="0"/>
-              <a:t>30</a:t>
+              <a:t>32</a:t>
             </a:fld>
             <a:endParaRPr lang="en-US"/>
           </a:p>
@@ -1327,7 +1329,7 @@
           <a:p>
             <a:fld id="{563BCB51-F13E-4501-921D-7D4EB39EDE9B}" type="slidenum">
               <a:rPr lang="en-US" smtClean="0"/>
-              <a:t>31</a:t>
+              <a:t>33</a:t>
             </a:fld>
             <a:endParaRPr lang="en-US"/>
           </a:p>
@@ -1415,7 +1417,7 @@
           <a:p>
             <a:fld id="{563BCB51-F13E-4501-921D-7D4EB39EDE9B}" type="slidenum">
               <a:rPr lang="en-US" smtClean="0"/>
-              <a:t>32</a:t>
+              <a:t>34</a:t>
             </a:fld>
             <a:endParaRPr lang="en-US"/>
           </a:p>
@@ -1547,7 +1549,7 @@
           <a:p>
             <a:fld id="{563BCB51-F13E-4501-921D-7D4EB39EDE9B}" type="slidenum">
               <a:rPr lang="en-US" smtClean="0"/>
-              <a:t>33</a:t>
+              <a:t>35</a:t>
             </a:fld>
             <a:endParaRPr lang="en-US"/>
           </a:p>
@@ -1754,7 +1756,7 @@
           <a:p>
             <a:fld id="{563BCB51-F13E-4501-921D-7D4EB39EDE9B}" type="slidenum">
               <a:rPr lang="en-US" smtClean="0"/>
-              <a:t>34</a:t>
+              <a:t>36</a:t>
             </a:fld>
             <a:endParaRPr lang="en-US"/>
           </a:p>
@@ -1848,7 +1850,7 @@
           <a:p>
             <a:fld id="{563BCB51-F13E-4501-921D-7D4EB39EDE9B}" type="slidenum">
               <a:rPr lang="en-US" smtClean="0"/>
-              <a:t>35</a:t>
+              <a:t>37</a:t>
             </a:fld>
             <a:endParaRPr lang="en-US"/>
           </a:p>
@@ -1940,7 +1942,7 @@
           <a:p>
             <a:fld id="{563BCB51-F13E-4501-921D-7D4EB39EDE9B}" type="slidenum">
               <a:rPr lang="en-US" smtClean="0"/>
-              <a:t>36</a:t>
+              <a:t>38</a:t>
             </a:fld>
             <a:endParaRPr lang="en-US"/>
           </a:p>
@@ -2804,7 +2806,7 @@
           <a:p>
             <a:fld id="{563BCB51-F13E-4501-921D-7D4EB39EDE9B}" type="slidenum">
               <a:rPr lang="en-US" smtClean="0"/>
-              <a:t>15</a:t>
+              <a:t>16</a:t>
             </a:fld>
             <a:endParaRPr lang="en-US"/>
           </a:p>
@@ -8938,95 +8940,62 @@
             </a:r>
           </a:p>
           <a:p>
-            <a:pPr lvl="1"/>
-            <a:r>
-              <a:rPr lang="en-US" dirty="0" smtClean="0"/>
-              <a:t>Responsiveness/timing</a:t>
-            </a:r>
-          </a:p>
-          <a:p>
-            <a:r>
-              <a:rPr lang="en-US" dirty="0" smtClean="0"/>
-              <a:t>Challenges</a:t>
-            </a:r>
-          </a:p>
-          <a:p>
-            <a:pPr lvl="1"/>
-            <a:r>
-              <a:rPr lang="en-US" dirty="0" smtClean="0"/>
-              <a:t>Many system-level requirements for </a:t>
-            </a:r>
-            <a:r>
-              <a:rPr lang="en-US" dirty="0" err="1" smtClean="0"/>
-              <a:t>UxAS</a:t>
-            </a:r>
-            <a:r>
-              <a:rPr lang="en-US" dirty="0" smtClean="0"/>
-              <a:t> are informal </a:t>
-            </a:r>
-          </a:p>
-          <a:p>
-            <a:pPr lvl="1"/>
-            <a:r>
-              <a:rPr lang="en-US" dirty="0" smtClean="0"/>
-              <a:t>Others require significant infrastructure (supporting contract guarantees) in order to prove them</a:t>
-            </a:r>
-          </a:p>
-          <a:p>
-            <a:r>
-              <a:rPr lang="en-US" dirty="0" smtClean="0"/>
-              <a:t>Perhaps we can compose the component contracts we have to discover new system-level properties…</a:t>
-            </a:r>
+            <a:pPr marL="457200" lvl="1" indent="0">
+              <a:buNone/>
+            </a:pPr>
+            <a:endParaRPr lang="en-US" sz="900" b="1" dirty="0" smtClean="0"/>
+          </a:p>
+          <a:p>
+            <a:pPr marL="457200" lvl="1" indent="0">
+              <a:buNone/>
+            </a:pPr>
+            <a:r>
+              <a:rPr lang="en-US" b="1" dirty="0" smtClean="0"/>
+              <a:t>Responsiveness/timing example</a:t>
+            </a:r>
+          </a:p>
+          <a:p>
+            <a:pPr marL="457200" lvl="1" indent="0">
+              <a:buNone/>
+            </a:pPr>
+            <a:endParaRPr lang="en-US" sz="400" b="1" dirty="0" smtClean="0"/>
+          </a:p>
+          <a:p>
+            <a:pPr marL="457200" lvl="1" indent="0">
+              <a:buNone/>
+            </a:pPr>
+            <a:r>
+              <a:rPr lang="en-US" i="1" dirty="0" smtClean="0"/>
+              <a:t>Task Manager Service:</a:t>
+            </a:r>
+          </a:p>
+          <a:p>
+            <a:pPr lvl="2"/>
             <a:endParaRPr lang="en-US" dirty="0"/>
+          </a:p>
+          <a:p>
+            <a:pPr lvl="2"/>
+            <a:endParaRPr lang="en-US" dirty="0" smtClean="0"/>
+          </a:p>
+          <a:p>
+            <a:pPr lvl="2"/>
+            <a:endParaRPr lang="en-US" dirty="0"/>
+          </a:p>
+          <a:p>
+            <a:pPr lvl="2"/>
+            <a:endParaRPr lang="en-US" dirty="0" smtClean="0"/>
+          </a:p>
+          <a:p>
+            <a:pPr marL="457200" lvl="1" indent="0">
+              <a:buNone/>
+            </a:pPr>
+            <a:r>
+              <a:rPr lang="en-US" i="1" dirty="0" smtClean="0"/>
+              <a:t>Waterways (system-level) – not yet proven:</a:t>
+            </a:r>
           </a:p>
         </p:txBody>
       </p:sp>
-      <p:pic>
-        <p:nvPicPr>
-          <p:cNvPr id="5" name="Picture 4"/>
-          <p:cNvPicPr>
-            <a:picLocks noChangeAspect="1"/>
-          </p:cNvPicPr>
-          <p:nvPr/>
-        </p:nvPicPr>
-        <p:blipFill rotWithShape="1">
-          <a:blip r:embed="rId2"/>
-          <a:srcRect b="55559"/>
-          <a:stretch/>
-        </p:blipFill>
-        <p:spPr>
-          <a:xfrm>
-            <a:off x="6829546" y="2884573"/>
-            <a:ext cx="5201160" cy="3204500"/>
-          </a:xfrm>
-          <a:prstGeom prst="rect">
-            <a:avLst/>
-          </a:prstGeom>
-        </p:spPr>
-      </p:pic>
-      <p:pic>
-        <p:nvPicPr>
-          <p:cNvPr id="6" name="Picture 5"/>
-          <p:cNvPicPr>
-            <a:picLocks noChangeAspect="1"/>
-          </p:cNvPicPr>
-          <p:nvPr/>
-        </p:nvPicPr>
-        <p:blipFill rotWithShape="1">
-          <a:blip r:embed="rId3"/>
-          <a:srcRect b="53632"/>
-          <a:stretch/>
-        </p:blipFill>
-        <p:spPr>
-          <a:xfrm>
-            <a:off x="7210206" y="1536751"/>
-            <a:ext cx="4579974" cy="1259528"/>
-          </a:xfrm>
-          <a:prstGeom prst="rect">
-            <a:avLst/>
-          </a:prstGeom>
-        </p:spPr>
-      </p:pic>
       <p:sp>
         <p:nvSpPr>
           <p:cNvPr id="8" name="Footer Placeholder 7"/>
@@ -9037,16 +9006,21 @@
             <p:ph type="ftr" sz="quarter" idx="11"/>
           </p:nvPr>
         </p:nvSpPr>
-        <p:spPr/>
+        <p:spPr>
+          <a:xfrm>
+            <a:off x="3991732" y="6437441"/>
+            <a:ext cx="4114800" cy="306936"/>
+          </a:xfrm>
+        </p:spPr>
         <p:txBody>
           <a:bodyPr/>
           <a:lstStyle/>
           <a:p>
             <a:r>
-              <a:rPr lang="en-US" smtClean="0"/>
+              <a:rPr lang="en-US" dirty="0" smtClean="0"/>
               <a:t>Architecture Group</a:t>
             </a:r>
-            <a:endParaRPr lang="en-US"/>
+            <a:endParaRPr lang="en-US" dirty="0"/>
           </a:p>
         </p:txBody>
       </p:sp>
@@ -9174,10 +9148,414 @@
           </a:p>
         </p:txBody>
       </p:sp>
+      <p:pic>
+        <p:nvPicPr>
+          <p:cNvPr id="10" name="Picture 9"/>
+          <p:cNvPicPr>
+            <a:picLocks noChangeAspect="1"/>
+          </p:cNvPicPr>
+          <p:nvPr/>
+        </p:nvPicPr>
+        <p:blipFill>
+          <a:blip r:embed="rId2"/>
+          <a:stretch>
+            <a:fillRect/>
+          </a:stretch>
+        </p:blipFill>
+        <p:spPr>
+          <a:xfrm>
+            <a:off x="674594" y="3178873"/>
+            <a:ext cx="11150753" cy="1210785"/>
+          </a:xfrm>
+          <a:prstGeom prst="rect">
+            <a:avLst/>
+          </a:prstGeom>
+        </p:spPr>
+      </p:pic>
+      <p:pic>
+        <p:nvPicPr>
+          <p:cNvPr id="14" name="Picture 13"/>
+          <p:cNvPicPr>
+            <a:picLocks noChangeAspect="1"/>
+          </p:cNvPicPr>
+          <p:nvPr/>
+        </p:nvPicPr>
+        <p:blipFill>
+          <a:blip r:embed="rId3"/>
+          <a:stretch>
+            <a:fillRect/>
+          </a:stretch>
+        </p:blipFill>
+        <p:spPr>
+          <a:xfrm>
+            <a:off x="674594" y="4892018"/>
+            <a:ext cx="10319715" cy="969718"/>
+          </a:xfrm>
+          <a:prstGeom prst="rect">
+            <a:avLst/>
+          </a:prstGeom>
+        </p:spPr>
+      </p:pic>
+      <p:sp>
+        <p:nvSpPr>
+          <p:cNvPr id="15" name="Rectangle 14"/>
+          <p:cNvSpPr/>
+          <p:nvPr/>
+        </p:nvSpPr>
+        <p:spPr>
+          <a:xfrm>
+            <a:off x="565608" y="2036190"/>
+            <a:ext cx="11368726" cy="3959257"/>
+          </a:xfrm>
+          <a:prstGeom prst="rect">
+            <a:avLst/>
+          </a:prstGeom>
+          <a:noFill/>
+        </p:spPr>
+        <p:style>
+          <a:lnRef idx="2">
+            <a:schemeClr val="accent1">
+              <a:shade val="50000"/>
+            </a:schemeClr>
+          </a:lnRef>
+          <a:fillRef idx="1">
+            <a:schemeClr val="accent1"/>
+          </a:fillRef>
+          <a:effectRef idx="0">
+            <a:schemeClr val="accent1"/>
+          </a:effectRef>
+          <a:fontRef idx="minor">
+            <a:schemeClr val="lt1"/>
+          </a:fontRef>
+        </p:style>
+        <p:txBody>
+          <a:bodyPr rtlCol="0" anchor="ctr"/>
+          <a:lstStyle/>
+          <a:p>
+            <a:pPr algn="ctr"/>
+            <a:endParaRPr lang="en-US"/>
+          </a:p>
+        </p:txBody>
+      </p:sp>
     </p:spTree>
     <p:extLst>
       <p:ext uri="{BB962C8B-B14F-4D97-AF65-F5344CB8AC3E}">
         <p14:creationId xmlns:p14="http://schemas.microsoft.com/office/powerpoint/2010/main" val="2309602601"/>
+      </p:ext>
+    </p:extLst>
+  </p:cSld>
+  <p:clrMapOvr>
+    <a:masterClrMapping/>
+  </p:clrMapOvr>
+  <p:timing>
+    <p:tnLst>
+      <p:par>
+        <p:cTn id="1" dur="indefinite" restart="never" nodeType="tmRoot"/>
+      </p:par>
+    </p:tnLst>
+  </p:timing>
+</p:sld>
+</file>
+
+<file path=ppt/slides/slide15.xml><?xml version="1.0" encoding="utf-8"?>
+<p:sld xmlns:a="http://schemas.openxmlformats.org/drawingml/2006/main" xmlns:r="http://schemas.openxmlformats.org/officeDocument/2006/relationships" xmlns:p="http://schemas.openxmlformats.org/presentationml/2006/main">
+  <p:cSld>
+    <p:spTree>
+      <p:nvGrpSpPr>
+        <p:cNvPr id="1" name=""/>
+        <p:cNvGrpSpPr/>
+        <p:nvPr/>
+      </p:nvGrpSpPr>
+      <p:grpSpPr>
+        <a:xfrm>
+          <a:off x="0" y="0"/>
+          <a:ext cx="0" cy="0"/>
+          <a:chOff x="0" y="0"/>
+          <a:chExt cx="0" cy="0"/>
+        </a:xfrm>
+      </p:grpSpPr>
+      <p:sp>
+        <p:nvSpPr>
+          <p:cNvPr id="2" name="Title 1"/>
+          <p:cNvSpPr>
+            <a:spLocks noGrp="1"/>
+          </p:cNvSpPr>
+          <p:nvPr>
+            <p:ph type="title"/>
+          </p:nvPr>
+        </p:nvSpPr>
+        <p:spPr/>
+        <p:txBody>
+          <a:bodyPr/>
+          <a:lstStyle/>
+          <a:p>
+            <a:r>
+              <a:rPr lang="en-US" dirty="0" smtClean="0"/>
+              <a:t>System-level contracts</a:t>
+            </a:r>
+            <a:endParaRPr lang="en-US" dirty="0"/>
+          </a:p>
+        </p:txBody>
+      </p:sp>
+      <p:sp>
+        <p:nvSpPr>
+          <p:cNvPr id="3" name="Content Placeholder 2"/>
+          <p:cNvSpPr>
+            <a:spLocks noGrp="1"/>
+          </p:cNvSpPr>
+          <p:nvPr>
+            <p:ph idx="1"/>
+          </p:nvPr>
+        </p:nvSpPr>
+        <p:spPr>
+          <a:xfrm>
+            <a:off x="210065" y="1508511"/>
+            <a:ext cx="6219015" cy="4668452"/>
+          </a:xfrm>
+        </p:spPr>
+        <p:txBody>
+          <a:bodyPr/>
+          <a:lstStyle/>
+          <a:p>
+            <a:r>
+              <a:rPr lang="en-US" dirty="0" smtClean="0"/>
+              <a:t>System-level guarantees are in progress</a:t>
+            </a:r>
+          </a:p>
+          <a:p>
+            <a:r>
+              <a:rPr lang="en-US" dirty="0" smtClean="0"/>
+              <a:t>Challenges</a:t>
+            </a:r>
+          </a:p>
+          <a:p>
+            <a:pPr lvl="1"/>
+            <a:r>
+              <a:rPr lang="en-US" dirty="0" smtClean="0"/>
+              <a:t>Many system-level requirements for </a:t>
+            </a:r>
+            <a:r>
+              <a:rPr lang="en-US" dirty="0" err="1" smtClean="0"/>
+              <a:t>UxAS</a:t>
+            </a:r>
+            <a:r>
+              <a:rPr lang="en-US" dirty="0" smtClean="0"/>
+              <a:t> are informal </a:t>
+            </a:r>
+          </a:p>
+          <a:p>
+            <a:pPr lvl="1"/>
+            <a:r>
+              <a:rPr lang="en-US" dirty="0" smtClean="0"/>
+              <a:t>Others require significant infrastructure (supporting contract guarantees) in order to prove them</a:t>
+            </a:r>
+          </a:p>
+          <a:p>
+            <a:r>
+              <a:rPr lang="en-US" dirty="0" smtClean="0"/>
+              <a:t>Perhaps we can compose the component contracts we have to discover new system-level properties…</a:t>
+            </a:r>
+            <a:endParaRPr lang="en-US" dirty="0"/>
+          </a:p>
+        </p:txBody>
+      </p:sp>
+      <p:pic>
+        <p:nvPicPr>
+          <p:cNvPr id="5" name="Picture 4"/>
+          <p:cNvPicPr>
+            <a:picLocks noChangeAspect="1"/>
+          </p:cNvPicPr>
+          <p:nvPr/>
+        </p:nvPicPr>
+        <p:blipFill rotWithShape="1">
+          <a:blip r:embed="rId2"/>
+          <a:srcRect b="62218"/>
+          <a:stretch/>
+        </p:blipFill>
+        <p:spPr>
+          <a:xfrm>
+            <a:off x="6429080" y="3254625"/>
+            <a:ext cx="5579095" cy="2922338"/>
+          </a:xfrm>
+          <a:prstGeom prst="rect">
+            <a:avLst/>
+          </a:prstGeom>
+        </p:spPr>
+      </p:pic>
+      <p:pic>
+        <p:nvPicPr>
+          <p:cNvPr id="6" name="Picture 5"/>
+          <p:cNvPicPr>
+            <a:picLocks noChangeAspect="1"/>
+          </p:cNvPicPr>
+          <p:nvPr/>
+        </p:nvPicPr>
+        <p:blipFill rotWithShape="1">
+          <a:blip r:embed="rId3"/>
+          <a:srcRect r="13111" b="43321"/>
+          <a:stretch/>
+        </p:blipFill>
+        <p:spPr>
+          <a:xfrm>
+            <a:off x="7079530" y="1536830"/>
+            <a:ext cx="4440024" cy="1717795"/>
+          </a:xfrm>
+          <a:prstGeom prst="rect">
+            <a:avLst/>
+          </a:prstGeom>
+        </p:spPr>
+      </p:pic>
+      <p:sp>
+        <p:nvSpPr>
+          <p:cNvPr id="8" name="Footer Placeholder 7"/>
+          <p:cNvSpPr>
+            <a:spLocks noGrp="1"/>
+          </p:cNvSpPr>
+          <p:nvPr>
+            <p:ph type="ftr" sz="quarter" idx="11"/>
+          </p:nvPr>
+        </p:nvSpPr>
+        <p:spPr/>
+        <p:txBody>
+          <a:bodyPr/>
+          <a:lstStyle/>
+          <a:p>
+            <a:r>
+              <a:rPr lang="en-US" smtClean="0"/>
+              <a:t>Architecture Group</a:t>
+            </a:r>
+            <a:endParaRPr lang="en-US"/>
+          </a:p>
+        </p:txBody>
+      </p:sp>
+      <p:sp>
+        <p:nvSpPr>
+          <p:cNvPr id="9" name="Footer Placeholder 3"/>
+          <p:cNvSpPr txBox="1">
+            <a:spLocks/>
+          </p:cNvSpPr>
+          <p:nvPr/>
+        </p:nvSpPr>
+        <p:spPr>
+          <a:xfrm>
+            <a:off x="102476" y="6437441"/>
+            <a:ext cx="4532586" cy="306936"/>
+          </a:xfrm>
+          <a:prstGeom prst="rect">
+            <a:avLst/>
+          </a:prstGeom>
+        </p:spPr>
+        <p:txBody>
+          <a:bodyPr vert="horz" lIns="91440" tIns="45720" rIns="91440" bIns="45720" rtlCol="0" anchor="ctr"/>
+          <a:lstStyle>
+            <a:defPPr>
+              <a:defRPr lang="en-US"/>
+            </a:defPPr>
+            <a:lvl1pPr marL="0" algn="ctr" defTabSz="914400" rtl="0" eaLnBrk="1" latinLnBrk="0" hangingPunct="1">
+              <a:defRPr sz="1400" kern="1200">
+                <a:solidFill>
+                  <a:srgbClr val="000000"/>
+                </a:solidFill>
+                <a:latin typeface="+mn-lt"/>
+                <a:ea typeface="+mn-ea"/>
+                <a:cs typeface="+mn-cs"/>
+              </a:defRPr>
+            </a:lvl1pPr>
+            <a:lvl2pPr marL="457200" algn="l" defTabSz="914400" rtl="0" eaLnBrk="1" latinLnBrk="0" hangingPunct="1">
+              <a:defRPr sz="1800" kern="1200">
+                <a:solidFill>
+                  <a:schemeClr val="tx1"/>
+                </a:solidFill>
+                <a:latin typeface="+mn-lt"/>
+                <a:ea typeface="+mn-ea"/>
+                <a:cs typeface="+mn-cs"/>
+              </a:defRPr>
+            </a:lvl2pPr>
+            <a:lvl3pPr marL="914400" algn="l" defTabSz="914400" rtl="0" eaLnBrk="1" latinLnBrk="0" hangingPunct="1">
+              <a:defRPr sz="1800" kern="1200">
+                <a:solidFill>
+                  <a:schemeClr val="tx1"/>
+                </a:solidFill>
+                <a:latin typeface="+mn-lt"/>
+                <a:ea typeface="+mn-ea"/>
+                <a:cs typeface="+mn-cs"/>
+              </a:defRPr>
+            </a:lvl3pPr>
+            <a:lvl4pPr marL="1371600" algn="l" defTabSz="914400" rtl="0" eaLnBrk="1" latinLnBrk="0" hangingPunct="1">
+              <a:defRPr sz="1800" kern="1200">
+                <a:solidFill>
+                  <a:schemeClr val="tx1"/>
+                </a:solidFill>
+                <a:latin typeface="+mn-lt"/>
+                <a:ea typeface="+mn-ea"/>
+                <a:cs typeface="+mn-cs"/>
+              </a:defRPr>
+            </a:lvl4pPr>
+            <a:lvl5pPr marL="1828800" algn="l" defTabSz="914400" rtl="0" eaLnBrk="1" latinLnBrk="0" hangingPunct="1">
+              <a:defRPr sz="1800" kern="1200">
+                <a:solidFill>
+                  <a:schemeClr val="tx1"/>
+                </a:solidFill>
+                <a:latin typeface="+mn-lt"/>
+                <a:ea typeface="+mn-ea"/>
+                <a:cs typeface="+mn-cs"/>
+              </a:defRPr>
+            </a:lvl5pPr>
+            <a:lvl6pPr marL="2286000" algn="l" defTabSz="914400" rtl="0" eaLnBrk="1" latinLnBrk="0" hangingPunct="1">
+              <a:defRPr sz="1800" kern="1200">
+                <a:solidFill>
+                  <a:schemeClr val="tx1"/>
+                </a:solidFill>
+                <a:latin typeface="+mn-lt"/>
+                <a:ea typeface="+mn-ea"/>
+                <a:cs typeface="+mn-cs"/>
+              </a:defRPr>
+            </a:lvl6pPr>
+            <a:lvl7pPr marL="2743200" algn="l" defTabSz="914400" rtl="0" eaLnBrk="1" latinLnBrk="0" hangingPunct="1">
+              <a:defRPr sz="1800" kern="1200">
+                <a:solidFill>
+                  <a:schemeClr val="tx1"/>
+                </a:solidFill>
+                <a:latin typeface="+mn-lt"/>
+                <a:ea typeface="+mn-ea"/>
+                <a:cs typeface="+mn-cs"/>
+              </a:defRPr>
+            </a:lvl7pPr>
+            <a:lvl8pPr marL="3200400" algn="l" defTabSz="914400" rtl="0" eaLnBrk="1" latinLnBrk="0" hangingPunct="1">
+              <a:defRPr sz="1800" kern="1200">
+                <a:solidFill>
+                  <a:schemeClr val="tx1"/>
+                </a:solidFill>
+                <a:latin typeface="+mn-lt"/>
+                <a:ea typeface="+mn-ea"/>
+                <a:cs typeface="+mn-cs"/>
+              </a:defRPr>
+            </a:lvl8pPr>
+            <a:lvl9pPr marL="3657600" algn="l" defTabSz="914400" rtl="0" eaLnBrk="1" latinLnBrk="0" hangingPunct="1">
+              <a:defRPr sz="1800" kern="1200">
+                <a:solidFill>
+                  <a:schemeClr val="tx1"/>
+                </a:solidFill>
+                <a:latin typeface="+mn-lt"/>
+                <a:ea typeface="+mn-ea"/>
+                <a:cs typeface="+mn-cs"/>
+              </a:defRPr>
+            </a:lvl9pPr>
+          </a:lstStyle>
+          <a:p>
+            <a:pPr algn="l"/>
+            <a:r>
+              <a:rPr lang="en-US" dirty="0" smtClean="0"/>
+              <a:t>Rockwell Collins, Dependable Computing, AFRL/LinQuest</a:t>
+            </a:r>
+            <a:endParaRPr lang="en-US" dirty="0"/>
+          </a:p>
+        </p:txBody>
+      </p:sp>
+    </p:spTree>
+    <p:extLst>
+      <p:ext uri="{BB962C8B-B14F-4D97-AF65-F5344CB8AC3E}">
+        <p14:creationId xmlns:p14="http://schemas.microsoft.com/office/powerpoint/2010/main" val="337961903"/>
       </p:ext>
     </p:extLst>
   </p:cSld>
@@ -9220,7 +9598,7 @@
                                         <p:tgtEl>
                                           <p:spTgt spid="3">
                                             <p:txEl>
-                                              <p:pRg st="3" end="3"/>
+                                              <p:pRg st="2" end="2"/>
                                             </p:txEl>
                                           </p:spTgt>
                                         </p:tgtEl>
@@ -9296,7 +9674,7 @@
                                         <p:tgtEl>
                                           <p:spTgt spid="3">
                                             <p:txEl>
-                                              <p:pRg st="4" end="4"/>
+                                              <p:pRg st="3" end="3"/>
                                             </p:txEl>
                                           </p:spTgt>
                                         </p:tgtEl>
@@ -9372,7 +9750,7 @@
                                         <p:tgtEl>
                                           <p:spTgt spid="3">
                                             <p:txEl>
-                                              <p:pRg st="5" end="5"/>
+                                              <p:pRg st="4" end="4"/>
                                             </p:txEl>
                                           </p:spTgt>
                                         </p:tgtEl>
@@ -9418,7 +9796,7 @@
 </p:sld>
 </file>
 
-<file path=ppt/slides/slide15.xml><?xml version="1.0" encoding="utf-8"?>
+<file path=ppt/slides/slide16.xml><?xml version="1.0" encoding="utf-8"?>
 <p:sld xmlns:a="http://schemas.openxmlformats.org/drawingml/2006/main" xmlns:r="http://schemas.openxmlformats.org/officeDocument/2006/relationships" xmlns:p="http://schemas.openxmlformats.org/presentationml/2006/main">
   <p:cSld>
     <p:spTree>
@@ -11385,7 +11763,7 @@
 </p:sld>
 </file>
 
-<file path=ppt/slides/slide16.xml><?xml version="1.0" encoding="utf-8"?>
+<file path=ppt/slides/slide17.xml><?xml version="1.0" encoding="utf-8"?>
 <p:sld xmlns:a="http://schemas.openxmlformats.org/drawingml/2006/main" xmlns:r="http://schemas.openxmlformats.org/officeDocument/2006/relationships" xmlns:p="http://schemas.openxmlformats.org/presentationml/2006/main">
   <p:cSld>
     <p:spTree>
@@ -13396,7 +13774,7 @@
 </p:sld>
 </file>
 
-<file path=ppt/slides/slide17.xml><?xml version="1.0" encoding="utf-8"?>
+<file path=ppt/slides/slide18.xml><?xml version="1.0" encoding="utf-8"?>
 <p:sld xmlns:a="http://schemas.openxmlformats.org/drawingml/2006/main" xmlns:r="http://schemas.openxmlformats.org/officeDocument/2006/relationships" xmlns:p="http://schemas.openxmlformats.org/presentationml/2006/main">
   <p:cSld>
     <p:spTree>
@@ -14544,7 +14922,7 @@
 </p:sld>
 </file>
 
-<file path=ppt/slides/slide18.xml><?xml version="1.0" encoding="utf-8"?>
+<file path=ppt/slides/slide19.xml><?xml version="1.0" encoding="utf-8"?>
 <p:sld xmlns:a="http://schemas.openxmlformats.org/drawingml/2006/main" xmlns:r="http://schemas.openxmlformats.org/officeDocument/2006/relationships" xmlns:p="http://schemas.openxmlformats.org/presentationml/2006/main">
   <p:cSld>
     <p:spTree>
@@ -15595,238 +15973,6 @@
 </p:sld>
 </file>
 
-<file path=ppt/slides/slide19.xml><?xml version="1.0" encoding="utf-8"?>
-<p:sld xmlns:a="http://schemas.openxmlformats.org/drawingml/2006/main" xmlns:r="http://schemas.openxmlformats.org/officeDocument/2006/relationships" xmlns:p="http://schemas.openxmlformats.org/presentationml/2006/main">
-  <p:cSld>
-    <p:spTree>
-      <p:nvGrpSpPr>
-        <p:cNvPr id="1" name=""/>
-        <p:cNvGrpSpPr/>
-        <p:nvPr/>
-      </p:nvGrpSpPr>
-      <p:grpSpPr>
-        <a:xfrm>
-          <a:off x="0" y="0"/>
-          <a:ext cx="0" cy="0"/>
-          <a:chOff x="0" y="0"/>
-          <a:chExt cx="0" cy="0"/>
-        </a:xfrm>
-      </p:grpSpPr>
-      <p:sp>
-        <p:nvSpPr>
-          <p:cNvPr id="2" name="Title 1"/>
-          <p:cNvSpPr>
-            <a:spLocks noGrp="1"/>
-          </p:cNvSpPr>
-          <p:nvPr>
-            <p:ph type="title"/>
-          </p:nvPr>
-        </p:nvSpPr>
-        <p:spPr/>
-        <p:txBody>
-          <a:bodyPr>
-            <a:normAutofit fontScale="90000"/>
-          </a:bodyPr>
-          <a:lstStyle/>
-          <a:p>
-            <a:r>
-              <a:rPr lang="en-US" dirty="0"/>
-              <a:t>Modeling UxAS System Architecture in SADL Ontology</a:t>
-            </a:r>
-          </a:p>
-        </p:txBody>
-      </p:sp>
-      <p:pic>
-        <p:nvPicPr>
-          <p:cNvPr id="4" name="Picture 3"/>
-          <p:cNvPicPr>
-            <a:picLocks noChangeAspect="1"/>
-          </p:cNvPicPr>
-          <p:nvPr/>
-        </p:nvPicPr>
-        <p:blipFill>
-          <a:blip r:embed="rId3"/>
-          <a:stretch>
-            <a:fillRect/>
-          </a:stretch>
-        </p:blipFill>
-        <p:spPr>
-          <a:xfrm>
-            <a:off x="1128567" y="1514924"/>
-            <a:ext cx="9853662" cy="4678486"/>
-          </a:xfrm>
-          <a:prstGeom prst="rect">
-            <a:avLst/>
-          </a:prstGeom>
-        </p:spPr>
-      </p:pic>
-      <p:sp>
-        <p:nvSpPr>
-          <p:cNvPr id="5" name="Footer Placeholder 4"/>
-          <p:cNvSpPr>
-            <a:spLocks noGrp="1"/>
-          </p:cNvSpPr>
-          <p:nvPr>
-            <p:ph type="ftr" sz="quarter" idx="11"/>
-          </p:nvPr>
-        </p:nvSpPr>
-        <p:spPr/>
-        <p:txBody>
-          <a:bodyPr/>
-          <a:lstStyle/>
-          <a:p>
-            <a:r>
-              <a:rPr lang="en-US" smtClean="0"/>
-              <a:t>Architecture Group</a:t>
-            </a:r>
-            <a:endParaRPr lang="en-US"/>
-          </a:p>
-        </p:txBody>
-      </p:sp>
-      <p:sp>
-        <p:nvSpPr>
-          <p:cNvPr id="7" name="Footer Placeholder 3"/>
-          <p:cNvSpPr txBox="1">
-            <a:spLocks/>
-          </p:cNvSpPr>
-          <p:nvPr/>
-        </p:nvSpPr>
-        <p:spPr>
-          <a:xfrm>
-            <a:off x="102476" y="6437441"/>
-            <a:ext cx="4532586" cy="306936"/>
-          </a:xfrm>
-          <a:prstGeom prst="rect">
-            <a:avLst/>
-          </a:prstGeom>
-        </p:spPr>
-        <p:txBody>
-          <a:bodyPr vert="horz" lIns="91440" tIns="45720" rIns="91440" bIns="45720" rtlCol="0" anchor="ctr"/>
-          <a:lstStyle>
-            <a:defPPr>
-              <a:defRPr lang="en-US"/>
-            </a:defPPr>
-            <a:lvl1pPr marL="0" algn="ctr" defTabSz="914400" rtl="0" eaLnBrk="1" latinLnBrk="0" hangingPunct="1">
-              <a:defRPr sz="1400" kern="1200">
-                <a:solidFill>
-                  <a:srgbClr val="000000"/>
-                </a:solidFill>
-                <a:latin typeface="+mn-lt"/>
-                <a:ea typeface="+mn-ea"/>
-                <a:cs typeface="+mn-cs"/>
-              </a:defRPr>
-            </a:lvl1pPr>
-            <a:lvl2pPr marL="457200" algn="l" defTabSz="914400" rtl="0" eaLnBrk="1" latinLnBrk="0" hangingPunct="1">
-              <a:defRPr sz="1800" kern="1200">
-                <a:solidFill>
-                  <a:schemeClr val="tx1"/>
-                </a:solidFill>
-                <a:latin typeface="+mn-lt"/>
-                <a:ea typeface="+mn-ea"/>
-                <a:cs typeface="+mn-cs"/>
-              </a:defRPr>
-            </a:lvl2pPr>
-            <a:lvl3pPr marL="914400" algn="l" defTabSz="914400" rtl="0" eaLnBrk="1" latinLnBrk="0" hangingPunct="1">
-              <a:defRPr sz="1800" kern="1200">
-                <a:solidFill>
-                  <a:schemeClr val="tx1"/>
-                </a:solidFill>
-                <a:latin typeface="+mn-lt"/>
-                <a:ea typeface="+mn-ea"/>
-                <a:cs typeface="+mn-cs"/>
-              </a:defRPr>
-            </a:lvl3pPr>
-            <a:lvl4pPr marL="1371600" algn="l" defTabSz="914400" rtl="0" eaLnBrk="1" latinLnBrk="0" hangingPunct="1">
-              <a:defRPr sz="1800" kern="1200">
-                <a:solidFill>
-                  <a:schemeClr val="tx1"/>
-                </a:solidFill>
-                <a:latin typeface="+mn-lt"/>
-                <a:ea typeface="+mn-ea"/>
-                <a:cs typeface="+mn-cs"/>
-              </a:defRPr>
-            </a:lvl4pPr>
-            <a:lvl5pPr marL="1828800" algn="l" defTabSz="914400" rtl="0" eaLnBrk="1" latinLnBrk="0" hangingPunct="1">
-              <a:defRPr sz="1800" kern="1200">
-                <a:solidFill>
-                  <a:schemeClr val="tx1"/>
-                </a:solidFill>
-                <a:latin typeface="+mn-lt"/>
-                <a:ea typeface="+mn-ea"/>
-                <a:cs typeface="+mn-cs"/>
-              </a:defRPr>
-            </a:lvl5pPr>
-            <a:lvl6pPr marL="2286000" algn="l" defTabSz="914400" rtl="0" eaLnBrk="1" latinLnBrk="0" hangingPunct="1">
-              <a:defRPr sz="1800" kern="1200">
-                <a:solidFill>
-                  <a:schemeClr val="tx1"/>
-                </a:solidFill>
-                <a:latin typeface="+mn-lt"/>
-                <a:ea typeface="+mn-ea"/>
-                <a:cs typeface="+mn-cs"/>
-              </a:defRPr>
-            </a:lvl6pPr>
-            <a:lvl7pPr marL="2743200" algn="l" defTabSz="914400" rtl="0" eaLnBrk="1" latinLnBrk="0" hangingPunct="1">
-              <a:defRPr sz="1800" kern="1200">
-                <a:solidFill>
-                  <a:schemeClr val="tx1"/>
-                </a:solidFill>
-                <a:latin typeface="+mn-lt"/>
-                <a:ea typeface="+mn-ea"/>
-                <a:cs typeface="+mn-cs"/>
-              </a:defRPr>
-            </a:lvl7pPr>
-            <a:lvl8pPr marL="3200400" algn="l" defTabSz="914400" rtl="0" eaLnBrk="1" latinLnBrk="0" hangingPunct="1">
-              <a:defRPr sz="1800" kern="1200">
-                <a:solidFill>
-                  <a:schemeClr val="tx1"/>
-                </a:solidFill>
-                <a:latin typeface="+mn-lt"/>
-                <a:ea typeface="+mn-ea"/>
-                <a:cs typeface="+mn-cs"/>
-              </a:defRPr>
-            </a:lvl8pPr>
-            <a:lvl9pPr marL="3657600" algn="l" defTabSz="914400" rtl="0" eaLnBrk="1" latinLnBrk="0" hangingPunct="1">
-              <a:defRPr sz="1800" kern="1200">
-                <a:solidFill>
-                  <a:schemeClr val="tx1"/>
-                </a:solidFill>
-                <a:latin typeface="+mn-lt"/>
-                <a:ea typeface="+mn-ea"/>
-                <a:cs typeface="+mn-cs"/>
-              </a:defRPr>
-            </a:lvl9pPr>
-          </a:lstStyle>
-          <a:p>
-            <a:pPr algn="l"/>
-            <a:r>
-              <a:rPr lang="en-US" dirty="0" smtClean="0"/>
-              <a:t>GE</a:t>
-            </a:r>
-            <a:endParaRPr lang="en-US" dirty="0"/>
-          </a:p>
-        </p:txBody>
-      </p:sp>
-    </p:spTree>
-    <p:extLst>
-      <p:ext uri="{BB962C8B-B14F-4D97-AF65-F5344CB8AC3E}">
-        <p14:creationId xmlns:p14="http://schemas.microsoft.com/office/powerpoint/2010/main" val="1742350916"/>
-      </p:ext>
-    </p:extLst>
-  </p:cSld>
-  <p:clrMapOvr>
-    <a:masterClrMapping/>
-  </p:clrMapOvr>
-  <p:timing>
-    <p:tnLst>
-      <p:par>
-        <p:cTn id="1" dur="indefinite" restart="never" nodeType="tmRoot"/>
-      </p:par>
-    </p:tnLst>
-  </p:timing>
-</p:sld>
-</file>
-
 <file path=ppt/slides/slide2.xml><?xml version="1.0" encoding="utf-8"?>
 <p:sld xmlns:a="http://schemas.openxmlformats.org/drawingml/2006/main" xmlns:r="http://schemas.openxmlformats.org/officeDocument/2006/relationships" xmlns:p="http://schemas.openxmlformats.org/presentationml/2006/main">
   <p:cSld>
@@ -16052,6 +16198,238 @@
           </a:bodyPr>
           <a:lstStyle/>
           <a:p>
+            <a:r>
+              <a:rPr lang="en-US" dirty="0"/>
+              <a:t>Modeling UxAS System Architecture in SADL Ontology</a:t>
+            </a:r>
+          </a:p>
+        </p:txBody>
+      </p:sp>
+      <p:pic>
+        <p:nvPicPr>
+          <p:cNvPr id="4" name="Picture 3"/>
+          <p:cNvPicPr>
+            <a:picLocks noChangeAspect="1"/>
+          </p:cNvPicPr>
+          <p:nvPr/>
+        </p:nvPicPr>
+        <p:blipFill>
+          <a:blip r:embed="rId3"/>
+          <a:stretch>
+            <a:fillRect/>
+          </a:stretch>
+        </p:blipFill>
+        <p:spPr>
+          <a:xfrm>
+            <a:off x="1128567" y="1514924"/>
+            <a:ext cx="9853662" cy="4678486"/>
+          </a:xfrm>
+          <a:prstGeom prst="rect">
+            <a:avLst/>
+          </a:prstGeom>
+        </p:spPr>
+      </p:pic>
+      <p:sp>
+        <p:nvSpPr>
+          <p:cNvPr id="5" name="Footer Placeholder 4"/>
+          <p:cNvSpPr>
+            <a:spLocks noGrp="1"/>
+          </p:cNvSpPr>
+          <p:nvPr>
+            <p:ph type="ftr" sz="quarter" idx="11"/>
+          </p:nvPr>
+        </p:nvSpPr>
+        <p:spPr/>
+        <p:txBody>
+          <a:bodyPr/>
+          <a:lstStyle/>
+          <a:p>
+            <a:r>
+              <a:rPr lang="en-US" smtClean="0"/>
+              <a:t>Architecture Group</a:t>
+            </a:r>
+            <a:endParaRPr lang="en-US"/>
+          </a:p>
+        </p:txBody>
+      </p:sp>
+      <p:sp>
+        <p:nvSpPr>
+          <p:cNvPr id="7" name="Footer Placeholder 3"/>
+          <p:cNvSpPr txBox="1">
+            <a:spLocks/>
+          </p:cNvSpPr>
+          <p:nvPr/>
+        </p:nvSpPr>
+        <p:spPr>
+          <a:xfrm>
+            <a:off x="102476" y="6437441"/>
+            <a:ext cx="4532586" cy="306936"/>
+          </a:xfrm>
+          <a:prstGeom prst="rect">
+            <a:avLst/>
+          </a:prstGeom>
+        </p:spPr>
+        <p:txBody>
+          <a:bodyPr vert="horz" lIns="91440" tIns="45720" rIns="91440" bIns="45720" rtlCol="0" anchor="ctr"/>
+          <a:lstStyle>
+            <a:defPPr>
+              <a:defRPr lang="en-US"/>
+            </a:defPPr>
+            <a:lvl1pPr marL="0" algn="ctr" defTabSz="914400" rtl="0" eaLnBrk="1" latinLnBrk="0" hangingPunct="1">
+              <a:defRPr sz="1400" kern="1200">
+                <a:solidFill>
+                  <a:srgbClr val="000000"/>
+                </a:solidFill>
+                <a:latin typeface="+mn-lt"/>
+                <a:ea typeface="+mn-ea"/>
+                <a:cs typeface="+mn-cs"/>
+              </a:defRPr>
+            </a:lvl1pPr>
+            <a:lvl2pPr marL="457200" algn="l" defTabSz="914400" rtl="0" eaLnBrk="1" latinLnBrk="0" hangingPunct="1">
+              <a:defRPr sz="1800" kern="1200">
+                <a:solidFill>
+                  <a:schemeClr val="tx1"/>
+                </a:solidFill>
+                <a:latin typeface="+mn-lt"/>
+                <a:ea typeface="+mn-ea"/>
+                <a:cs typeface="+mn-cs"/>
+              </a:defRPr>
+            </a:lvl2pPr>
+            <a:lvl3pPr marL="914400" algn="l" defTabSz="914400" rtl="0" eaLnBrk="1" latinLnBrk="0" hangingPunct="1">
+              <a:defRPr sz="1800" kern="1200">
+                <a:solidFill>
+                  <a:schemeClr val="tx1"/>
+                </a:solidFill>
+                <a:latin typeface="+mn-lt"/>
+                <a:ea typeface="+mn-ea"/>
+                <a:cs typeface="+mn-cs"/>
+              </a:defRPr>
+            </a:lvl3pPr>
+            <a:lvl4pPr marL="1371600" algn="l" defTabSz="914400" rtl="0" eaLnBrk="1" latinLnBrk="0" hangingPunct="1">
+              <a:defRPr sz="1800" kern="1200">
+                <a:solidFill>
+                  <a:schemeClr val="tx1"/>
+                </a:solidFill>
+                <a:latin typeface="+mn-lt"/>
+                <a:ea typeface="+mn-ea"/>
+                <a:cs typeface="+mn-cs"/>
+              </a:defRPr>
+            </a:lvl4pPr>
+            <a:lvl5pPr marL="1828800" algn="l" defTabSz="914400" rtl="0" eaLnBrk="1" latinLnBrk="0" hangingPunct="1">
+              <a:defRPr sz="1800" kern="1200">
+                <a:solidFill>
+                  <a:schemeClr val="tx1"/>
+                </a:solidFill>
+                <a:latin typeface="+mn-lt"/>
+                <a:ea typeface="+mn-ea"/>
+                <a:cs typeface="+mn-cs"/>
+              </a:defRPr>
+            </a:lvl5pPr>
+            <a:lvl6pPr marL="2286000" algn="l" defTabSz="914400" rtl="0" eaLnBrk="1" latinLnBrk="0" hangingPunct="1">
+              <a:defRPr sz="1800" kern="1200">
+                <a:solidFill>
+                  <a:schemeClr val="tx1"/>
+                </a:solidFill>
+                <a:latin typeface="+mn-lt"/>
+                <a:ea typeface="+mn-ea"/>
+                <a:cs typeface="+mn-cs"/>
+              </a:defRPr>
+            </a:lvl6pPr>
+            <a:lvl7pPr marL="2743200" algn="l" defTabSz="914400" rtl="0" eaLnBrk="1" latinLnBrk="0" hangingPunct="1">
+              <a:defRPr sz="1800" kern="1200">
+                <a:solidFill>
+                  <a:schemeClr val="tx1"/>
+                </a:solidFill>
+                <a:latin typeface="+mn-lt"/>
+                <a:ea typeface="+mn-ea"/>
+                <a:cs typeface="+mn-cs"/>
+              </a:defRPr>
+            </a:lvl7pPr>
+            <a:lvl8pPr marL="3200400" algn="l" defTabSz="914400" rtl="0" eaLnBrk="1" latinLnBrk="0" hangingPunct="1">
+              <a:defRPr sz="1800" kern="1200">
+                <a:solidFill>
+                  <a:schemeClr val="tx1"/>
+                </a:solidFill>
+                <a:latin typeface="+mn-lt"/>
+                <a:ea typeface="+mn-ea"/>
+                <a:cs typeface="+mn-cs"/>
+              </a:defRPr>
+            </a:lvl8pPr>
+            <a:lvl9pPr marL="3657600" algn="l" defTabSz="914400" rtl="0" eaLnBrk="1" latinLnBrk="0" hangingPunct="1">
+              <a:defRPr sz="1800" kern="1200">
+                <a:solidFill>
+                  <a:schemeClr val="tx1"/>
+                </a:solidFill>
+                <a:latin typeface="+mn-lt"/>
+                <a:ea typeface="+mn-ea"/>
+                <a:cs typeface="+mn-cs"/>
+              </a:defRPr>
+            </a:lvl9pPr>
+          </a:lstStyle>
+          <a:p>
+            <a:pPr algn="l"/>
+            <a:r>
+              <a:rPr lang="en-US" dirty="0" smtClean="0"/>
+              <a:t>GE</a:t>
+            </a:r>
+            <a:endParaRPr lang="en-US" dirty="0"/>
+          </a:p>
+        </p:txBody>
+      </p:sp>
+    </p:spTree>
+    <p:extLst>
+      <p:ext uri="{BB962C8B-B14F-4D97-AF65-F5344CB8AC3E}">
+        <p14:creationId xmlns:p14="http://schemas.microsoft.com/office/powerpoint/2010/main" val="1742350916"/>
+      </p:ext>
+    </p:extLst>
+  </p:cSld>
+  <p:clrMapOvr>
+    <a:masterClrMapping/>
+  </p:clrMapOvr>
+  <p:timing>
+    <p:tnLst>
+      <p:par>
+        <p:cTn id="1" dur="indefinite" restart="never" nodeType="tmRoot"/>
+      </p:par>
+    </p:tnLst>
+  </p:timing>
+</p:sld>
+</file>
+
+<file path=ppt/slides/slide21.xml><?xml version="1.0" encoding="utf-8"?>
+<p:sld xmlns:a="http://schemas.openxmlformats.org/drawingml/2006/main" xmlns:r="http://schemas.openxmlformats.org/officeDocument/2006/relationships" xmlns:p="http://schemas.openxmlformats.org/presentationml/2006/main">
+  <p:cSld>
+    <p:spTree>
+      <p:nvGrpSpPr>
+        <p:cNvPr id="1" name=""/>
+        <p:cNvGrpSpPr/>
+        <p:nvPr/>
+      </p:nvGrpSpPr>
+      <p:grpSpPr>
+        <a:xfrm>
+          <a:off x="0" y="0"/>
+          <a:ext cx="0" cy="0"/>
+          <a:chOff x="0" y="0"/>
+          <a:chExt cx="0" cy="0"/>
+        </a:xfrm>
+      </p:grpSpPr>
+      <p:sp>
+        <p:nvSpPr>
+          <p:cNvPr id="2" name="Title 1"/>
+          <p:cNvSpPr>
+            <a:spLocks noGrp="1"/>
+          </p:cNvSpPr>
+          <p:nvPr>
+            <p:ph type="title"/>
+          </p:nvPr>
+        </p:nvSpPr>
+        <p:spPr/>
+        <p:txBody>
+          <a:bodyPr>
+            <a:normAutofit fontScale="90000"/>
+          </a:bodyPr>
+          <a:lstStyle/>
+          <a:p>
             <a:pPr algn="ctr"/>
             <a:r>
               <a:rPr lang="en-US" dirty="0"/>
@@ -16255,7 +16633,7 @@
 </p:sld>
 </file>
 
-<file path=ppt/slides/slide21.xml><?xml version="1.0" encoding="utf-8"?>
+<file path=ppt/slides/slide22.xml><?xml version="1.0" encoding="utf-8"?>
 <p:sld xmlns:a="http://schemas.openxmlformats.org/drawingml/2006/main" xmlns:r="http://schemas.openxmlformats.org/officeDocument/2006/relationships" xmlns:p="http://schemas.openxmlformats.org/presentationml/2006/main">
   <p:cSld>
     <p:spTree>
@@ -17459,7 +17837,7 @@
 </p:sld>
 </file>
 
-<file path=ppt/slides/slide22.xml><?xml version="1.0" encoding="utf-8"?>
+<file path=ppt/slides/slide23.xml><?xml version="1.0" encoding="utf-8"?>
 <p:sld xmlns:a="http://schemas.openxmlformats.org/drawingml/2006/main" xmlns:r="http://schemas.openxmlformats.org/officeDocument/2006/relationships" xmlns:p="http://schemas.openxmlformats.org/presentationml/2006/main">
   <p:cSld>
     <p:spTree>
@@ -17701,7 +18079,7 @@
 </p:sld>
 </file>
 
-<file path=ppt/slides/slide23.xml><?xml version="1.0" encoding="utf-8"?>
+<file path=ppt/slides/slide24.xml><?xml version="1.0" encoding="utf-8"?>
 <p:sld xmlns:a="http://schemas.openxmlformats.org/drawingml/2006/main" xmlns:r="http://schemas.openxmlformats.org/officeDocument/2006/relationships" xmlns:p="http://schemas.openxmlformats.org/presentationml/2006/main">
   <p:cSld>
     <p:spTree>
@@ -18464,7 +18842,7 @@
 </p:sld>
 </file>
 
-<file path=ppt/slides/slide24.xml><?xml version="1.0" encoding="utf-8"?>
+<file path=ppt/slides/slide25.xml><?xml version="1.0" encoding="utf-8"?>
 <p:sld xmlns:a="http://schemas.openxmlformats.org/drawingml/2006/main" xmlns:r="http://schemas.openxmlformats.org/officeDocument/2006/relationships" xmlns:p="http://schemas.openxmlformats.org/presentationml/2006/main">
   <p:cSld>
     <p:spTree>
@@ -18941,7 +19319,7 @@
 </p:sld>
 </file>
 
-<file path=ppt/slides/slide25.xml><?xml version="1.0" encoding="utf-8"?>
+<file path=ppt/slides/slide26.xml><?xml version="1.0" encoding="utf-8"?>
 <p:sld xmlns:a="http://schemas.openxmlformats.org/drawingml/2006/main" xmlns:r="http://schemas.openxmlformats.org/officeDocument/2006/relationships" xmlns:p="http://schemas.openxmlformats.org/presentationml/2006/main">
   <p:cSld>
     <p:spTree>
@@ -19156,93 +19534,6 @@
     <p:extLst>
       <p:ext uri="{BB962C8B-B14F-4D97-AF65-F5344CB8AC3E}">
         <p14:creationId xmlns:p14="http://schemas.microsoft.com/office/powerpoint/2010/main" val="3185477435"/>
-      </p:ext>
-    </p:extLst>
-  </p:cSld>
-  <p:clrMapOvr>
-    <a:masterClrMapping/>
-  </p:clrMapOvr>
-  <mc:AlternateContent xmlns:mc="http://schemas.openxmlformats.org/markup-compatibility/2006" xmlns:p14="http://schemas.microsoft.com/office/powerpoint/2010/main">
-    <mc:Choice Requires="p14">
-      <p:transition spd="slow" p14:dur="2000"/>
-    </mc:Choice>
-    <mc:Fallback xmlns="">
-      <p:transition spd="slow"/>
-    </mc:Fallback>
-  </mc:AlternateContent>
-  <p:timing>
-    <p:tnLst>
-      <p:par>
-        <p:cTn id="1" dur="indefinite" restart="never" nodeType="tmRoot"/>
-      </p:par>
-    </p:tnLst>
-  </p:timing>
-</p:sld>
-</file>
-
-<file path=ppt/slides/slide26.xml><?xml version="1.0" encoding="utf-8"?>
-<p:sld xmlns:a="http://schemas.openxmlformats.org/drawingml/2006/main" xmlns:r="http://schemas.openxmlformats.org/officeDocument/2006/relationships" xmlns:p="http://schemas.openxmlformats.org/presentationml/2006/main">
-  <p:cSld>
-    <p:spTree>
-      <p:nvGrpSpPr>
-        <p:cNvPr id="1" name=""/>
-        <p:cNvGrpSpPr/>
-        <p:nvPr/>
-      </p:nvGrpSpPr>
-      <p:grpSpPr>
-        <a:xfrm>
-          <a:off x="0" y="0"/>
-          <a:ext cx="0" cy="0"/>
-          <a:chOff x="0" y="0"/>
-          <a:chExt cx="0" cy="0"/>
-        </a:xfrm>
-      </p:grpSpPr>
-      <p:sp>
-        <p:nvSpPr>
-          <p:cNvPr id="4" name="Title 3"/>
-          <p:cNvSpPr>
-            <a:spLocks noGrp="1"/>
-          </p:cNvSpPr>
-          <p:nvPr>
-            <p:ph type="ctrTitle"/>
-          </p:nvPr>
-        </p:nvSpPr>
-        <p:spPr/>
-        <p:txBody>
-          <a:bodyPr/>
-          <a:lstStyle/>
-          <a:p>
-            <a:r>
-              <a:rPr lang="en-US" dirty="0" smtClean="0"/>
-              <a:t>State Machine Reasoning</a:t>
-            </a:r>
-            <a:endParaRPr lang="en-US" dirty="0"/>
-          </a:p>
-        </p:txBody>
-      </p:sp>
-      <p:sp>
-        <p:nvSpPr>
-          <p:cNvPr id="5" name="Subtitle 4"/>
-          <p:cNvSpPr>
-            <a:spLocks noGrp="1"/>
-          </p:cNvSpPr>
-          <p:nvPr>
-            <p:ph type="subTitle" idx="1"/>
-          </p:nvPr>
-        </p:nvSpPr>
-        <p:spPr/>
-        <p:txBody>
-          <a:bodyPr/>
-          <a:lstStyle/>
-          <a:p>
-            <a:endParaRPr lang="en-US"/>
-          </a:p>
-        </p:txBody>
-      </p:sp>
-    </p:spTree>
-    <p:extLst>
-      <p:ext uri="{BB962C8B-B14F-4D97-AF65-F5344CB8AC3E}">
-        <p14:creationId xmlns:p14="http://schemas.microsoft.com/office/powerpoint/2010/main" val="1155288964"/>
       </p:ext>
     </p:extLst>
   </p:cSld>
@@ -19286,12 +19577,12 @@
       </p:grpSpPr>
       <p:sp>
         <p:nvSpPr>
-          <p:cNvPr id="2" name="Title 1"/>
+          <p:cNvPr id="4" name="Title 3"/>
           <p:cNvSpPr>
             <a:spLocks noGrp="1"/>
           </p:cNvSpPr>
           <p:nvPr>
-            <p:ph type="title"/>
+            <p:ph type="ctrTitle"/>
           </p:nvPr>
         </p:nvSpPr>
         <p:spPr/>
@@ -19299,18 +19590,22 @@
           <a:bodyPr/>
           <a:lstStyle/>
           <a:p>
-            <a:endParaRPr lang="en-US"/>
+            <a:r>
+              <a:rPr lang="en-US" dirty="0" smtClean="0"/>
+              <a:t>State Machine Reasoning</a:t>
+            </a:r>
+            <a:endParaRPr lang="en-US" dirty="0"/>
           </a:p>
         </p:txBody>
       </p:sp>
       <p:sp>
         <p:nvSpPr>
-          <p:cNvPr id="3" name="Content Placeholder 2"/>
+          <p:cNvPr id="5" name="Subtitle 4"/>
           <p:cNvSpPr>
             <a:spLocks noGrp="1"/>
           </p:cNvSpPr>
           <p:nvPr>
-            <p:ph idx="1"/>
+            <p:ph type="subTitle" idx="1"/>
           </p:nvPr>
         </p:nvSpPr>
         <p:spPr/>
@@ -19318,78 +19613,6 @@
           <a:bodyPr/>
           <a:lstStyle/>
           <a:p>
-            <a:r>
-              <a:rPr lang="en-US" dirty="0" smtClean="0">
-                <a:solidFill>
-                  <a:srgbClr val="FF0000"/>
-                </a:solidFill>
-              </a:rPr>
-              <a:t>What we show in AGREE about state machines</a:t>
-            </a:r>
-          </a:p>
-          <a:p>
-            <a:r>
-              <a:rPr lang="en-US" dirty="0" smtClean="0">
-                <a:solidFill>
-                  <a:srgbClr val="FF0000"/>
-                </a:solidFill>
-              </a:rPr>
-              <a:t>Why it doesn’t catch all issues – reference document</a:t>
-            </a:r>
-          </a:p>
-          <a:p>
-            <a:r>
-              <a:rPr lang="en-US" dirty="0" smtClean="0">
-                <a:solidFill>
-                  <a:srgbClr val="FF0000"/>
-                </a:solidFill>
-              </a:rPr>
-              <a:t>Hence an assurance case</a:t>
-            </a:r>
-          </a:p>
-          <a:p>
-            <a:endParaRPr lang="en-US" dirty="0">
-              <a:solidFill>
-                <a:srgbClr val="FF0000"/>
-              </a:solidFill>
-            </a:endParaRPr>
-          </a:p>
-          <a:p>
-            <a:r>
-              <a:rPr lang="en-US" dirty="0" smtClean="0">
-                <a:solidFill>
-                  <a:srgbClr val="FF0000"/>
-                </a:solidFill>
-              </a:rPr>
-              <a:t>Bring back screenshot of analysis in AGREE</a:t>
-            </a:r>
-            <a:endParaRPr lang="en-US" dirty="0">
-              <a:solidFill>
-                <a:srgbClr val="FF0000"/>
-              </a:solidFill>
-            </a:endParaRPr>
-          </a:p>
-        </p:txBody>
-      </p:sp>
-      <p:sp>
-        <p:nvSpPr>
-          <p:cNvPr id="5" name="Footer Placeholder 4"/>
-          <p:cNvSpPr>
-            <a:spLocks noGrp="1"/>
-          </p:cNvSpPr>
-          <p:nvPr>
-            <p:ph type="ftr" sz="quarter" idx="11"/>
-          </p:nvPr>
-        </p:nvSpPr>
-        <p:spPr/>
-        <p:txBody>
-          <a:bodyPr/>
-          <a:lstStyle/>
-          <a:p>
-            <a:r>
-              <a:rPr lang="en-US" smtClean="0"/>
-              <a:t>Architecture Group</a:t>
-            </a:r>
             <a:endParaRPr lang="en-US"/>
           </a:p>
         </p:txBody>
@@ -19397,13 +19620,21 @@
     </p:spTree>
     <p:extLst>
       <p:ext uri="{BB962C8B-B14F-4D97-AF65-F5344CB8AC3E}">
-        <p14:creationId xmlns:p14="http://schemas.microsoft.com/office/powerpoint/2010/main" val="3980395289"/>
+        <p14:creationId xmlns:p14="http://schemas.microsoft.com/office/powerpoint/2010/main" val="1155288964"/>
       </p:ext>
     </p:extLst>
   </p:cSld>
   <p:clrMapOvr>
     <a:masterClrMapping/>
   </p:clrMapOvr>
+  <mc:AlternateContent xmlns:mc="http://schemas.openxmlformats.org/markup-compatibility/2006" xmlns:p14="http://schemas.microsoft.com/office/powerpoint/2010/main">
+    <mc:Choice Requires="p14">
+      <p:transition spd="slow" p14:dur="2000"/>
+    </mc:Choice>
+    <mc:Fallback xmlns="">
+      <p:transition spd="slow"/>
+    </mc:Fallback>
+  </mc:AlternateContent>
   <p:timing>
     <p:tnLst>
       <p:par>
@@ -19431,35 +19662,6 @@
           <a:chExt cx="0" cy="0"/>
         </a:xfrm>
       </p:grpSpPr>
-      <p:pic>
-        <p:nvPicPr>
-          <p:cNvPr id="5" name="Content Placeholder 4"/>
-          <p:cNvPicPr>
-            <a:picLocks noChangeAspect="1"/>
-          </p:cNvPicPr>
-          <p:nvPr/>
-        </p:nvPicPr>
-        <p:blipFill rotWithShape="1">
-          <a:blip r:embed="rId2">
-            <a:extLst>
-              <a:ext uri="{28A0092B-C50C-407E-A947-70E740481C1C}">
-                <a14:useLocalDpi xmlns:a14="http://schemas.microsoft.com/office/drawing/2010/main" val="0"/>
-              </a:ext>
-            </a:extLst>
-          </a:blip>
-          <a:srcRect t="24566"/>
-          <a:stretch/>
-        </p:blipFill>
-        <p:spPr>
-          <a:xfrm>
-            <a:off x="3131209" y="1508512"/>
-            <a:ext cx="8939582" cy="5349488"/>
-          </a:xfrm>
-          <a:prstGeom prst="rect">
-            <a:avLst/>
-          </a:prstGeom>
-        </p:spPr>
-      </p:pic>
       <p:sp>
         <p:nvSpPr>
           <p:cNvPr id="2" name="Title 1"/>
@@ -19473,13 +19675,13 @@
         <p:spPr/>
         <p:txBody>
           <a:bodyPr>
-            <a:normAutofit/>
+            <a:normAutofit fontScale="90000"/>
           </a:bodyPr>
           <a:lstStyle/>
           <a:p>
             <a:r>
               <a:rPr lang="en-US" dirty="0" smtClean="0"/>
-              <a:t>State Machine Correctness Argument</a:t>
+              <a:t>State Machine for the Route Aggregator Service</a:t>
             </a:r>
             <a:endParaRPr lang="en-US" dirty="0"/>
           </a:p>
@@ -19495,233 +19697,224 @@
             <p:ph idx="1"/>
           </p:nvPr>
         </p:nvSpPr>
-        <p:spPr>
-          <a:xfrm>
-            <a:off x="95003" y="1508511"/>
-            <a:ext cx="6460176" cy="4668452"/>
-          </a:xfrm>
-        </p:spPr>
+        <p:spPr/>
         <p:txBody>
-          <a:bodyPr>
-            <a:normAutofit/>
-          </a:bodyPr>
+          <a:bodyPr/>
           <a:lstStyle/>
           <a:p>
-            <a:r>
-              <a:rPr lang="en-US" dirty="0"/>
-              <a:t>Argument pattern for individual AADL component state machine correctness:</a:t>
-            </a:r>
-          </a:p>
-          <a:p>
-            <a:pPr marL="800100" lvl="1" indent="-342900">
-              <a:buFont typeface="Arial" charset="0"/>
-              <a:buChar char="•"/>
-            </a:pPr>
-            <a:r>
-              <a:rPr lang="en-US" dirty="0"/>
-              <a:t>Structure repeated for each component</a:t>
-            </a:r>
-          </a:p>
-          <a:p>
-            <a:pPr marL="800100" lvl="1" indent="-342900">
-              <a:buFont typeface="Arial" charset="0"/>
-              <a:buChar char="•"/>
-            </a:pPr>
-            <a:r>
-              <a:rPr lang="en-US" dirty="0"/>
-              <a:t>Vision: Situated within a larger model correctness argument</a:t>
-            </a:r>
-          </a:p>
-          <a:p>
-            <a:r>
-              <a:rPr lang="en-US" dirty="0" smtClean="0"/>
-              <a:t>Argument </a:t>
-            </a:r>
-            <a:r>
-              <a:rPr lang="en-US" dirty="0"/>
-              <a:t>situates proposed AGREE lemmas:</a:t>
-            </a:r>
-          </a:p>
-          <a:p>
-            <a:pPr marL="800100" lvl="1" indent="-342900">
-              <a:buFont typeface="Arial" charset="0"/>
-              <a:buChar char="•"/>
-            </a:pPr>
-            <a:r>
-              <a:rPr lang="en-US" dirty="0"/>
-              <a:t>Purpose</a:t>
-            </a:r>
-          </a:p>
-          <a:p>
-            <a:pPr marL="800100" lvl="1" indent="-342900">
-              <a:buFont typeface="Arial" charset="0"/>
-              <a:buChar char="•"/>
-            </a:pPr>
-            <a:r>
-              <a:rPr lang="en-US" dirty="0"/>
-              <a:t>Rationale</a:t>
-            </a:r>
-          </a:p>
-          <a:p>
-            <a:pPr marL="800100" lvl="1" indent="-342900">
-              <a:buFont typeface="Arial" charset="0"/>
-              <a:buChar char="•"/>
-            </a:pPr>
-            <a:r>
-              <a:rPr lang="en-US" dirty="0"/>
-              <a:t>Limitations and benefits</a:t>
-            </a:r>
-          </a:p>
-          <a:p>
-            <a:pPr marL="0" indent="0">
-              <a:buNone/>
-            </a:pPr>
             <a:endParaRPr lang="en-US" dirty="0"/>
           </a:p>
         </p:txBody>
       </p:sp>
       <p:sp>
         <p:nvSpPr>
-          <p:cNvPr id="6" name="Footer Placeholder 3"/>
-          <p:cNvSpPr txBox="1">
-            <a:spLocks/>
+          <p:cNvPr id="4" name="Footer Placeholder 3"/>
+          <p:cNvSpPr>
+            <a:spLocks noGrp="1"/>
           </p:cNvSpPr>
+          <p:nvPr>
+            <p:ph type="ftr" sz="quarter" idx="11"/>
+          </p:nvPr>
+        </p:nvSpPr>
+        <p:spPr/>
+        <p:txBody>
+          <a:bodyPr/>
+          <a:lstStyle/>
+          <a:p>
+            <a:r>
+              <a:rPr lang="en-US" smtClean="0"/>
+              <a:t>Architecture Group</a:t>
+            </a:r>
+            <a:endParaRPr lang="en-US"/>
+          </a:p>
+        </p:txBody>
+      </p:sp>
+      <p:pic>
+        <p:nvPicPr>
+          <p:cNvPr id="6" name="Picture 5"/>
+          <p:cNvPicPr>
+            <a:picLocks noChangeAspect="1"/>
+          </p:cNvPicPr>
           <p:nvPr/>
-        </p:nvSpPr>
+        </p:nvPicPr>
+        <p:blipFill>
+          <a:blip r:embed="rId2"/>
+          <a:stretch>
+            <a:fillRect/>
+          </a:stretch>
+        </p:blipFill>
         <p:spPr>
           <a:xfrm>
-            <a:off x="102476" y="6437441"/>
-            <a:ext cx="4532586" cy="306936"/>
+            <a:off x="2320133" y="1523262"/>
+            <a:ext cx="9400131" cy="4575517"/>
           </a:xfrm>
           <a:prstGeom prst="rect">
             <a:avLst/>
           </a:prstGeom>
         </p:spPr>
+      </p:pic>
+      <p:sp>
+        <p:nvSpPr>
+          <p:cNvPr id="7" name="TextBox 6"/>
+          <p:cNvSpPr txBox="1"/>
+          <p:nvPr/>
+        </p:nvSpPr>
+        <p:spPr>
+          <a:xfrm>
+            <a:off x="839621" y="2966484"/>
+            <a:ext cx="606055" cy="369332"/>
+          </a:xfrm>
+          <a:prstGeom prst="rect">
+            <a:avLst/>
+          </a:prstGeom>
+          <a:noFill/>
+          <a:ln>
+            <a:solidFill>
+              <a:schemeClr val="tx1"/>
+            </a:solidFill>
+          </a:ln>
+        </p:spPr>
         <p:txBody>
-          <a:bodyPr vert="horz" lIns="91440" tIns="45720" rIns="91440" bIns="45720" rtlCol="0" anchor="ctr"/>
-          <a:lstStyle>
-            <a:defPPr>
-              <a:defRPr lang="en-US"/>
-            </a:defPPr>
-            <a:lvl1pPr marL="0" algn="ctr" defTabSz="914400" rtl="0" eaLnBrk="1" latinLnBrk="0" hangingPunct="1">
-              <a:defRPr sz="1400" kern="1200">
-                <a:solidFill>
-                  <a:srgbClr val="000000"/>
-                </a:solidFill>
-                <a:latin typeface="+mn-lt"/>
-                <a:ea typeface="+mn-ea"/>
-                <a:cs typeface="+mn-cs"/>
-              </a:defRPr>
-            </a:lvl1pPr>
-            <a:lvl2pPr marL="457200" algn="l" defTabSz="914400" rtl="0" eaLnBrk="1" latinLnBrk="0" hangingPunct="1">
-              <a:defRPr sz="1800" kern="1200">
-                <a:solidFill>
-                  <a:schemeClr val="tx1"/>
-                </a:solidFill>
-                <a:latin typeface="+mn-lt"/>
-                <a:ea typeface="+mn-ea"/>
-                <a:cs typeface="+mn-cs"/>
-              </a:defRPr>
-            </a:lvl2pPr>
-            <a:lvl3pPr marL="914400" algn="l" defTabSz="914400" rtl="0" eaLnBrk="1" latinLnBrk="0" hangingPunct="1">
-              <a:defRPr sz="1800" kern="1200">
-                <a:solidFill>
-                  <a:schemeClr val="tx1"/>
-                </a:solidFill>
-                <a:latin typeface="+mn-lt"/>
-                <a:ea typeface="+mn-ea"/>
-                <a:cs typeface="+mn-cs"/>
-              </a:defRPr>
-            </a:lvl3pPr>
-            <a:lvl4pPr marL="1371600" algn="l" defTabSz="914400" rtl="0" eaLnBrk="1" latinLnBrk="0" hangingPunct="1">
-              <a:defRPr sz="1800" kern="1200">
-                <a:solidFill>
-                  <a:schemeClr val="tx1"/>
-                </a:solidFill>
-                <a:latin typeface="+mn-lt"/>
-                <a:ea typeface="+mn-ea"/>
-                <a:cs typeface="+mn-cs"/>
-              </a:defRPr>
-            </a:lvl4pPr>
-            <a:lvl5pPr marL="1828800" algn="l" defTabSz="914400" rtl="0" eaLnBrk="1" latinLnBrk="0" hangingPunct="1">
-              <a:defRPr sz="1800" kern="1200">
-                <a:solidFill>
-                  <a:schemeClr val="tx1"/>
-                </a:solidFill>
-                <a:latin typeface="+mn-lt"/>
-                <a:ea typeface="+mn-ea"/>
-                <a:cs typeface="+mn-cs"/>
-              </a:defRPr>
-            </a:lvl5pPr>
-            <a:lvl6pPr marL="2286000" algn="l" defTabSz="914400" rtl="0" eaLnBrk="1" latinLnBrk="0" hangingPunct="1">
-              <a:defRPr sz="1800" kern="1200">
-                <a:solidFill>
-                  <a:schemeClr val="tx1"/>
-                </a:solidFill>
-                <a:latin typeface="+mn-lt"/>
-                <a:ea typeface="+mn-ea"/>
-                <a:cs typeface="+mn-cs"/>
-              </a:defRPr>
-            </a:lvl6pPr>
-            <a:lvl7pPr marL="2743200" algn="l" defTabSz="914400" rtl="0" eaLnBrk="1" latinLnBrk="0" hangingPunct="1">
-              <a:defRPr sz="1800" kern="1200">
-                <a:solidFill>
-                  <a:schemeClr val="tx1"/>
-                </a:solidFill>
-                <a:latin typeface="+mn-lt"/>
-                <a:ea typeface="+mn-ea"/>
-                <a:cs typeface="+mn-cs"/>
-              </a:defRPr>
-            </a:lvl7pPr>
-            <a:lvl8pPr marL="3200400" algn="l" defTabSz="914400" rtl="0" eaLnBrk="1" latinLnBrk="0" hangingPunct="1">
-              <a:defRPr sz="1800" kern="1200">
-                <a:solidFill>
-                  <a:schemeClr val="tx1"/>
-                </a:solidFill>
-                <a:latin typeface="+mn-lt"/>
-                <a:ea typeface="+mn-ea"/>
-                <a:cs typeface="+mn-cs"/>
-              </a:defRPr>
-            </a:lvl8pPr>
-            <a:lvl9pPr marL="3657600" algn="l" defTabSz="914400" rtl="0" eaLnBrk="1" latinLnBrk="0" hangingPunct="1">
-              <a:defRPr sz="1800" kern="1200">
-                <a:solidFill>
-                  <a:schemeClr val="tx1"/>
-                </a:solidFill>
-                <a:latin typeface="+mn-lt"/>
-                <a:ea typeface="+mn-ea"/>
-                <a:cs typeface="+mn-cs"/>
-              </a:defRPr>
-            </a:lvl9pPr>
-          </a:lstStyle>
-          <a:p>
-            <a:pPr algn="l"/>
+          <a:bodyPr wrap="square" rtlCol="0">
+            <a:spAutoFit/>
+          </a:bodyPr>
+          <a:lstStyle/>
+          <a:p>
             <a:r>
               <a:rPr lang="en-US" dirty="0" smtClean="0"/>
-              <a:t>Dependable Computing</a:t>
+              <a:t>IDLE</a:t>
             </a:r>
             <a:endParaRPr lang="en-US" dirty="0"/>
           </a:p>
         </p:txBody>
       </p:sp>
+      <p:sp>
+        <p:nvSpPr>
+          <p:cNvPr id="8" name="TextBox 7"/>
+          <p:cNvSpPr txBox="1"/>
+          <p:nvPr/>
+        </p:nvSpPr>
+        <p:spPr>
+          <a:xfrm>
+            <a:off x="595423" y="3971925"/>
+            <a:ext cx="1095154" cy="369332"/>
+          </a:xfrm>
+          <a:prstGeom prst="rect">
+            <a:avLst/>
+          </a:prstGeom>
+          <a:noFill/>
+          <a:ln>
+            <a:solidFill>
+              <a:schemeClr val="tx1"/>
+            </a:solidFill>
+          </a:ln>
+        </p:spPr>
+        <p:txBody>
+          <a:bodyPr wrap="square" rtlCol="0">
+            <a:spAutoFit/>
+          </a:bodyPr>
+          <a:lstStyle/>
+          <a:p>
+            <a:r>
+              <a:rPr lang="en-US" dirty="0" smtClean="0"/>
+              <a:t>PENDING</a:t>
+            </a:r>
+            <a:endParaRPr lang="en-US" dirty="0"/>
+          </a:p>
+        </p:txBody>
+      </p:sp>
+      <p:cxnSp>
+        <p:nvCxnSpPr>
+          <p:cNvPr id="14" name="Elbow Connector 13"/>
+          <p:cNvCxnSpPr>
+            <a:stCxn id="7" idx="3"/>
+            <a:endCxn id="8" idx="3"/>
+          </p:cNvCxnSpPr>
+          <p:nvPr/>
+        </p:nvCxnSpPr>
+        <p:spPr>
+          <a:xfrm>
+            <a:off x="1445676" y="3151150"/>
+            <a:ext cx="244901" cy="1005441"/>
+          </a:xfrm>
+          <a:prstGeom prst="bentConnector3">
+            <a:avLst>
+              <a:gd name="adj1" fmla="val 193344"/>
+            </a:avLst>
+          </a:prstGeom>
+          <a:ln>
+            <a:solidFill>
+              <a:schemeClr val="tx1"/>
+            </a:solidFill>
+            <a:tailEnd type="triangle"/>
+          </a:ln>
+        </p:spPr>
+        <p:style>
+          <a:lnRef idx="1">
+            <a:schemeClr val="accent1"/>
+          </a:lnRef>
+          <a:fillRef idx="0">
+            <a:schemeClr val="accent1"/>
+          </a:fillRef>
+          <a:effectRef idx="0">
+            <a:schemeClr val="accent1"/>
+          </a:effectRef>
+          <a:fontRef idx="minor">
+            <a:schemeClr val="tx1"/>
+          </a:fontRef>
+        </p:style>
+      </p:cxnSp>
+      <p:cxnSp>
+        <p:nvCxnSpPr>
+          <p:cNvPr id="18" name="Elbow Connector 17"/>
+          <p:cNvCxnSpPr>
+            <a:stCxn id="8" idx="1"/>
+            <a:endCxn id="7" idx="1"/>
+          </p:cNvCxnSpPr>
+          <p:nvPr/>
+        </p:nvCxnSpPr>
+        <p:spPr>
+          <a:xfrm rot="10800000" flipH="1">
+            <a:off x="595423" y="3151151"/>
+            <a:ext cx="244198" cy="1005441"/>
+          </a:xfrm>
+          <a:prstGeom prst="bentConnector3">
+            <a:avLst>
+              <a:gd name="adj1" fmla="val -93613"/>
+            </a:avLst>
+          </a:prstGeom>
+          <a:ln>
+            <a:solidFill>
+              <a:schemeClr val="tx1"/>
+            </a:solidFill>
+            <a:tailEnd type="triangle"/>
+          </a:ln>
+        </p:spPr>
+        <p:style>
+          <a:lnRef idx="1">
+            <a:schemeClr val="accent1"/>
+          </a:lnRef>
+          <a:fillRef idx="0">
+            <a:schemeClr val="accent1"/>
+          </a:fillRef>
+          <a:effectRef idx="0">
+            <a:schemeClr val="accent1"/>
+          </a:effectRef>
+          <a:fontRef idx="minor">
+            <a:schemeClr val="tx1"/>
+          </a:fontRef>
+        </p:style>
+      </p:cxnSp>
     </p:spTree>
     <p:extLst>
       <p:ext uri="{BB962C8B-B14F-4D97-AF65-F5344CB8AC3E}">
-        <p14:creationId xmlns:p14="http://schemas.microsoft.com/office/powerpoint/2010/main" val="286898037"/>
+        <p14:creationId xmlns:p14="http://schemas.microsoft.com/office/powerpoint/2010/main" val="3818518847"/>
       </p:ext>
     </p:extLst>
   </p:cSld>
   <p:clrMapOvr>
     <a:masterClrMapping/>
   </p:clrMapOvr>
-  <mc:AlternateContent xmlns:mc="http://schemas.openxmlformats.org/markup-compatibility/2006" xmlns:p14="http://schemas.microsoft.com/office/powerpoint/2010/main">
-    <mc:Choice Requires="p14">
-      <p:transition spd="slow" p14:dur="2000"/>
-    </mc:Choice>
-    <mc:Fallback xmlns="">
-      <p:transition spd="slow"/>
-    </mc:Fallback>
-  </mc:AlternateContent>
   <p:timing>
     <p:tnLst>
       <p:par>
@@ -19766,7 +19959,7 @@
           <a:p>
             <a:r>
               <a:rPr lang="en-US" dirty="0" smtClean="0"/>
-              <a:t>Argument-Derived Observations</a:t>
+              <a:t>State Machine Reasoning in AGREE</a:t>
             </a:r>
             <a:endParaRPr lang="en-US" dirty="0"/>
           </a:p>
@@ -19782,227 +19975,70 @@
             <p:ph idx="1"/>
           </p:nvPr>
         </p:nvSpPr>
-        <p:spPr/>
+        <p:spPr>
+          <a:xfrm>
+            <a:off x="210065" y="1508511"/>
+            <a:ext cx="11507014" cy="4668452"/>
+          </a:xfrm>
+        </p:spPr>
         <p:txBody>
-          <a:bodyPr>
-            <a:normAutofit lnSpcReduction="10000"/>
-          </a:bodyPr>
+          <a:bodyPr/>
           <a:lstStyle/>
           <a:p>
             <a:r>
-              <a:rPr lang="en-US" dirty="0"/>
-              <a:t>Best practices/standards for AADL/AGREE use are needed</a:t>
+              <a:rPr lang="en-US" dirty="0" smtClean="0"/>
+              <a:t>Example properties that we can prove:</a:t>
             </a:r>
           </a:p>
           <a:p>
             <a:pPr lvl="1"/>
             <a:r>
-              <a:rPr lang="en-US" dirty="0"/>
-              <a:t>Situate proofs within modeling fault analysis/mitigation</a:t>
+              <a:rPr lang="en-US" dirty="0" smtClean="0"/>
+              <a:t>States are reachable</a:t>
             </a:r>
           </a:p>
           <a:p>
             <a:pPr lvl="1"/>
-            <a:r>
-              <a:rPr lang="en-US" dirty="0"/>
-              <a:t>Supports arguments that the set of lemmas are complete and correct</a:t>
-            </a:r>
-          </a:p>
-          <a:p>
-            <a:r>
-              <a:rPr lang="en-US" dirty="0"/>
-              <a:t>Additional tool support to reduce human error</a:t>
-            </a:r>
+            <a:endParaRPr lang="en-US" dirty="0" smtClean="0"/>
           </a:p>
           <a:p>
             <a:pPr lvl="1"/>
-            <a:r>
-              <a:rPr lang="en-US" dirty="0"/>
-              <a:t>E.g., </a:t>
-            </a:r>
+            <a:endParaRPr lang="en-US" dirty="0" smtClean="0"/>
+          </a:p>
+          <a:p>
+            <a:pPr lvl="1"/>
             <a:r>
               <a:rPr lang="en-US" dirty="0" smtClean="0"/>
-              <a:t>lemmas </a:t>
-            </a:r>
-            <a:r>
-              <a:rPr lang="en-US" dirty="0"/>
-              <a:t>and repetitive infrastructure are developed manually</a:t>
+              <a:t>Transitions are viable</a:t>
             </a:r>
           </a:p>
           <a:p>
             <a:pPr lvl="1"/>
-            <a:r>
-              <a:rPr lang="en-US" dirty="0"/>
-              <a:t>Minimize repetitive concerns in the argument about human error</a:t>
-            </a:r>
-          </a:p>
-          <a:p>
-            <a:r>
-              <a:rPr lang="en-US" dirty="0"/>
-              <a:t>Enhanced integration between AADL and AGREE </a:t>
-            </a:r>
-          </a:p>
-          <a:p>
-            <a:pPr lvl="1"/>
-            <a:r>
-              <a:rPr lang="en-US" dirty="0"/>
-              <a:t>Minimize repetitive arguments about AADL and AGREE consistency/agreement</a:t>
-            </a:r>
-          </a:p>
-          <a:p>
-            <a:r>
-              <a:rPr lang="en-US" dirty="0"/>
-              <a:t>A simpler higher-level protocol state machine spec for validation</a:t>
-            </a:r>
-          </a:p>
-          <a:p>
-            <a:pPr lvl="1"/>
-            <a:r>
-              <a:rPr lang="en-US" dirty="0"/>
-              <a:t>Provide a structure to validate against</a:t>
-            </a:r>
-          </a:p>
-          <a:p>
-            <a:pPr lvl="1"/>
-            <a:r>
-              <a:rPr lang="en-US" dirty="0"/>
-              <a:t>Simplify validation activity and simplify validation </a:t>
-            </a:r>
+            <a:endParaRPr lang="en-US" dirty="0" smtClean="0"/>
+          </a:p>
+          <a:p>
+            <a:endParaRPr lang="en-US" dirty="0" smtClean="0"/>
+          </a:p>
+          <a:p>
+            <a:endParaRPr lang="en-US" dirty="0" smtClean="0"/>
+          </a:p>
+          <a:p>
             <a:r>
               <a:rPr lang="en-US" dirty="0" smtClean="0"/>
-              <a:t>arguments</a:t>
-            </a:r>
-            <a:endParaRPr lang="en-US" dirty="0"/>
+              <a:t>Even so, the modeler can make mistakes</a:t>
+            </a:r>
+          </a:p>
+          <a:p>
+            <a:r>
+              <a:rPr lang="en-US" dirty="0" smtClean="0"/>
+              <a:t>We use an assurance case to capture the rest of the argument</a:t>
+            </a:r>
           </a:p>
         </p:txBody>
       </p:sp>
       <p:sp>
         <p:nvSpPr>
-          <p:cNvPr id="5" name="Footer Placeholder 3"/>
-          <p:cNvSpPr txBox="1">
-            <a:spLocks/>
-          </p:cNvSpPr>
-          <p:nvPr/>
-        </p:nvSpPr>
-        <p:spPr>
-          <a:xfrm>
-            <a:off x="102476" y="6437441"/>
-            <a:ext cx="4532586" cy="306936"/>
-          </a:xfrm>
-          <a:prstGeom prst="rect">
-            <a:avLst/>
-          </a:prstGeom>
-        </p:spPr>
-        <p:txBody>
-          <a:bodyPr vert="horz" lIns="91440" tIns="45720" rIns="91440" bIns="45720" rtlCol="0" anchor="ctr"/>
-          <a:lstStyle>
-            <a:defPPr>
-              <a:defRPr lang="en-US"/>
-            </a:defPPr>
-            <a:lvl1pPr marL="0" algn="ctr" defTabSz="914400" rtl="0" eaLnBrk="1" latinLnBrk="0" hangingPunct="1">
-              <a:defRPr sz="1400" kern="1200">
-                <a:solidFill>
-                  <a:srgbClr val="000000"/>
-                </a:solidFill>
-                <a:latin typeface="+mn-lt"/>
-                <a:ea typeface="+mn-ea"/>
-                <a:cs typeface="+mn-cs"/>
-              </a:defRPr>
-            </a:lvl1pPr>
-            <a:lvl2pPr marL="457200" algn="l" defTabSz="914400" rtl="0" eaLnBrk="1" latinLnBrk="0" hangingPunct="1">
-              <a:defRPr sz="1800" kern="1200">
-                <a:solidFill>
-                  <a:schemeClr val="tx1"/>
-                </a:solidFill>
-                <a:latin typeface="+mn-lt"/>
-                <a:ea typeface="+mn-ea"/>
-                <a:cs typeface="+mn-cs"/>
-              </a:defRPr>
-            </a:lvl2pPr>
-            <a:lvl3pPr marL="914400" algn="l" defTabSz="914400" rtl="0" eaLnBrk="1" latinLnBrk="0" hangingPunct="1">
-              <a:defRPr sz="1800" kern="1200">
-                <a:solidFill>
-                  <a:schemeClr val="tx1"/>
-                </a:solidFill>
-                <a:latin typeface="+mn-lt"/>
-                <a:ea typeface="+mn-ea"/>
-                <a:cs typeface="+mn-cs"/>
-              </a:defRPr>
-            </a:lvl3pPr>
-            <a:lvl4pPr marL="1371600" algn="l" defTabSz="914400" rtl="0" eaLnBrk="1" latinLnBrk="0" hangingPunct="1">
-              <a:defRPr sz="1800" kern="1200">
-                <a:solidFill>
-                  <a:schemeClr val="tx1"/>
-                </a:solidFill>
-                <a:latin typeface="+mn-lt"/>
-                <a:ea typeface="+mn-ea"/>
-                <a:cs typeface="+mn-cs"/>
-              </a:defRPr>
-            </a:lvl4pPr>
-            <a:lvl5pPr marL="1828800" algn="l" defTabSz="914400" rtl="0" eaLnBrk="1" latinLnBrk="0" hangingPunct="1">
-              <a:defRPr sz="1800" kern="1200">
-                <a:solidFill>
-                  <a:schemeClr val="tx1"/>
-                </a:solidFill>
-                <a:latin typeface="+mn-lt"/>
-                <a:ea typeface="+mn-ea"/>
-                <a:cs typeface="+mn-cs"/>
-              </a:defRPr>
-            </a:lvl5pPr>
-            <a:lvl6pPr marL="2286000" algn="l" defTabSz="914400" rtl="0" eaLnBrk="1" latinLnBrk="0" hangingPunct="1">
-              <a:defRPr sz="1800" kern="1200">
-                <a:solidFill>
-                  <a:schemeClr val="tx1"/>
-                </a:solidFill>
-                <a:latin typeface="+mn-lt"/>
-                <a:ea typeface="+mn-ea"/>
-                <a:cs typeface="+mn-cs"/>
-              </a:defRPr>
-            </a:lvl6pPr>
-            <a:lvl7pPr marL="2743200" algn="l" defTabSz="914400" rtl="0" eaLnBrk="1" latinLnBrk="0" hangingPunct="1">
-              <a:defRPr sz="1800" kern="1200">
-                <a:solidFill>
-                  <a:schemeClr val="tx1"/>
-                </a:solidFill>
-                <a:latin typeface="+mn-lt"/>
-                <a:ea typeface="+mn-ea"/>
-                <a:cs typeface="+mn-cs"/>
-              </a:defRPr>
-            </a:lvl7pPr>
-            <a:lvl8pPr marL="3200400" algn="l" defTabSz="914400" rtl="0" eaLnBrk="1" latinLnBrk="0" hangingPunct="1">
-              <a:defRPr sz="1800" kern="1200">
-                <a:solidFill>
-                  <a:schemeClr val="tx1"/>
-                </a:solidFill>
-                <a:latin typeface="+mn-lt"/>
-                <a:ea typeface="+mn-ea"/>
-                <a:cs typeface="+mn-cs"/>
-              </a:defRPr>
-            </a:lvl8pPr>
-            <a:lvl9pPr marL="3657600" algn="l" defTabSz="914400" rtl="0" eaLnBrk="1" latinLnBrk="0" hangingPunct="1">
-              <a:defRPr sz="1800" kern="1200">
-                <a:solidFill>
-                  <a:schemeClr val="tx1"/>
-                </a:solidFill>
-                <a:latin typeface="+mn-lt"/>
-                <a:ea typeface="+mn-ea"/>
-                <a:cs typeface="+mn-cs"/>
-              </a:defRPr>
-            </a:lvl9pPr>
-          </a:lstStyle>
-          <a:p>
-            <a:pPr algn="l"/>
-            <a:r>
-              <a:rPr lang="en-US" dirty="0" smtClean="0"/>
-              <a:t>Dependable Computing</a:t>
-            </a:r>
-            <a:endParaRPr lang="en-US" dirty="0"/>
-          </a:p>
-        </p:txBody>
-      </p:sp>
-      <p:sp>
-        <p:nvSpPr>
-          <p:cNvPr id="7" name="Footer Placeholder 6"/>
+          <p:cNvPr id="5" name="Footer Placeholder 4"/>
           <p:cNvSpPr>
             <a:spLocks noGrp="1"/>
           </p:cNvSpPr>
@@ -20023,24 +20059,133 @@
           </a:p>
         </p:txBody>
       </p:sp>
+      <p:pic>
+        <p:nvPicPr>
+          <p:cNvPr id="6" name="Picture 5"/>
+          <p:cNvPicPr>
+            <a:picLocks noChangeAspect="1"/>
+          </p:cNvPicPr>
+          <p:nvPr/>
+        </p:nvPicPr>
+        <p:blipFill rotWithShape="1">
+          <a:blip r:embed="rId2"/>
+          <a:srcRect t="61135" r="2191" b="30824"/>
+          <a:stretch/>
+        </p:blipFill>
+        <p:spPr>
+          <a:xfrm>
+            <a:off x="1016294" y="4538608"/>
+            <a:ext cx="8368984" cy="378684"/>
+          </a:xfrm>
+          <a:prstGeom prst="rect">
+            <a:avLst/>
+          </a:prstGeom>
+        </p:spPr>
+      </p:pic>
+      <p:pic>
+        <p:nvPicPr>
+          <p:cNvPr id="12" name="Picture 11"/>
+          <p:cNvPicPr>
+            <a:picLocks noChangeAspect="1"/>
+          </p:cNvPicPr>
+          <p:nvPr/>
+        </p:nvPicPr>
+        <p:blipFill>
+          <a:blip r:embed="rId3"/>
+          <a:stretch>
+            <a:fillRect/>
+          </a:stretch>
+        </p:blipFill>
+        <p:spPr>
+          <a:xfrm>
+            <a:off x="1016294" y="2379313"/>
+            <a:ext cx="10515761" cy="278827"/>
+          </a:xfrm>
+          <a:prstGeom prst="rect">
+            <a:avLst/>
+          </a:prstGeom>
+        </p:spPr>
+      </p:pic>
+      <p:pic>
+        <p:nvPicPr>
+          <p:cNvPr id="13" name="Picture 12"/>
+          <p:cNvPicPr>
+            <a:picLocks noChangeAspect="1"/>
+          </p:cNvPicPr>
+          <p:nvPr/>
+        </p:nvPicPr>
+        <p:blipFill rotWithShape="1">
+          <a:blip r:embed="rId2"/>
+          <a:srcRect l="-316" t="46039" r="2507" b="46207"/>
+          <a:stretch/>
+        </p:blipFill>
+        <p:spPr>
+          <a:xfrm>
+            <a:off x="1016294" y="2744645"/>
+            <a:ext cx="7974483" cy="347946"/>
+          </a:xfrm>
+          <a:prstGeom prst="rect">
+            <a:avLst/>
+          </a:prstGeom>
+        </p:spPr>
+      </p:pic>
+      <p:pic>
+        <p:nvPicPr>
+          <p:cNvPr id="14" name="Picture 13"/>
+          <p:cNvPicPr>
+            <a:picLocks noChangeAspect="1"/>
+          </p:cNvPicPr>
+          <p:nvPr/>
+        </p:nvPicPr>
+        <p:blipFill rotWithShape="1">
+          <a:blip r:embed="rId4"/>
+          <a:srcRect t="10933" b="-1"/>
+          <a:stretch/>
+        </p:blipFill>
+        <p:spPr>
+          <a:xfrm>
+            <a:off x="1016294" y="4154281"/>
+            <a:ext cx="9969497" cy="268739"/>
+          </a:xfrm>
+          <a:prstGeom prst="rect">
+            <a:avLst/>
+          </a:prstGeom>
+        </p:spPr>
+      </p:pic>
+      <p:pic>
+        <p:nvPicPr>
+          <p:cNvPr id="15" name="Picture 14"/>
+          <p:cNvPicPr>
+            <a:picLocks noChangeAspect="1"/>
+          </p:cNvPicPr>
+          <p:nvPr/>
+        </p:nvPicPr>
+        <p:blipFill>
+          <a:blip r:embed="rId5"/>
+          <a:stretch>
+            <a:fillRect/>
+          </a:stretch>
+        </p:blipFill>
+        <p:spPr>
+          <a:xfrm>
+            <a:off x="1016294" y="3528942"/>
+            <a:ext cx="8244664" cy="517548"/>
+          </a:xfrm>
+          <a:prstGeom prst="rect">
+            <a:avLst/>
+          </a:prstGeom>
+        </p:spPr>
+      </p:pic>
     </p:spTree>
     <p:extLst>
       <p:ext uri="{BB962C8B-B14F-4D97-AF65-F5344CB8AC3E}">
-        <p14:creationId xmlns:p14="http://schemas.microsoft.com/office/powerpoint/2010/main" val="1512231083"/>
+        <p14:creationId xmlns:p14="http://schemas.microsoft.com/office/powerpoint/2010/main" val="3980395289"/>
       </p:ext>
     </p:extLst>
   </p:cSld>
   <p:clrMapOvr>
     <a:masterClrMapping/>
   </p:clrMapOvr>
-  <mc:AlternateContent xmlns:mc="http://schemas.openxmlformats.org/markup-compatibility/2006" xmlns:p14="http://schemas.microsoft.com/office/powerpoint/2010/main">
-    <mc:Choice Requires="p14">
-      <p:transition spd="slow" p14:dur="2000"/>
-    </mc:Choice>
-    <mc:Fallback xmlns="">
-      <p:transition spd="slow"/>
-    </mc:Fallback>
-  </mc:AlternateContent>
   <p:timing>
     <p:tnLst>
       <p:par>
@@ -20748,6 +20893,643 @@
           <a:chExt cx="0" cy="0"/>
         </a:xfrm>
       </p:grpSpPr>
+      <p:pic>
+        <p:nvPicPr>
+          <p:cNvPr id="5" name="Content Placeholder 4"/>
+          <p:cNvPicPr>
+            <a:picLocks noChangeAspect="1"/>
+          </p:cNvPicPr>
+          <p:nvPr/>
+        </p:nvPicPr>
+        <p:blipFill rotWithShape="1">
+          <a:blip r:embed="rId2">
+            <a:extLst>
+              <a:ext uri="{28A0092B-C50C-407E-A947-70E740481C1C}">
+                <a14:useLocalDpi xmlns:a14="http://schemas.microsoft.com/office/drawing/2010/main" val="0"/>
+              </a:ext>
+            </a:extLst>
+          </a:blip>
+          <a:srcRect t="24566"/>
+          <a:stretch/>
+        </p:blipFill>
+        <p:spPr>
+          <a:xfrm>
+            <a:off x="3131209" y="1508512"/>
+            <a:ext cx="8939582" cy="5349488"/>
+          </a:xfrm>
+          <a:prstGeom prst="rect">
+            <a:avLst/>
+          </a:prstGeom>
+        </p:spPr>
+      </p:pic>
+      <p:sp>
+        <p:nvSpPr>
+          <p:cNvPr id="2" name="Title 1"/>
+          <p:cNvSpPr>
+            <a:spLocks noGrp="1"/>
+          </p:cNvSpPr>
+          <p:nvPr>
+            <p:ph type="title"/>
+          </p:nvPr>
+        </p:nvSpPr>
+        <p:spPr/>
+        <p:txBody>
+          <a:bodyPr>
+            <a:normAutofit/>
+          </a:bodyPr>
+          <a:lstStyle/>
+          <a:p>
+            <a:r>
+              <a:rPr lang="en-US" dirty="0" smtClean="0"/>
+              <a:t>State Machine Correctness Argument</a:t>
+            </a:r>
+            <a:endParaRPr lang="en-US" dirty="0"/>
+          </a:p>
+        </p:txBody>
+      </p:sp>
+      <p:sp>
+        <p:nvSpPr>
+          <p:cNvPr id="3" name="Content Placeholder 2"/>
+          <p:cNvSpPr>
+            <a:spLocks noGrp="1"/>
+          </p:cNvSpPr>
+          <p:nvPr>
+            <p:ph idx="1"/>
+          </p:nvPr>
+        </p:nvSpPr>
+        <p:spPr>
+          <a:xfrm>
+            <a:off x="95003" y="1508511"/>
+            <a:ext cx="6460176" cy="4668452"/>
+          </a:xfrm>
+        </p:spPr>
+        <p:txBody>
+          <a:bodyPr>
+            <a:normAutofit/>
+          </a:bodyPr>
+          <a:lstStyle/>
+          <a:p>
+            <a:r>
+              <a:rPr lang="en-US" dirty="0"/>
+              <a:t>Argument pattern for individual AADL component state machine correctness:</a:t>
+            </a:r>
+          </a:p>
+          <a:p>
+            <a:pPr marL="800100" lvl="1" indent="-342900">
+              <a:buFont typeface="Arial" charset="0"/>
+              <a:buChar char="•"/>
+            </a:pPr>
+            <a:r>
+              <a:rPr lang="en-US" dirty="0"/>
+              <a:t>Structure repeated for each component</a:t>
+            </a:r>
+          </a:p>
+          <a:p>
+            <a:pPr marL="800100" lvl="1" indent="-342900">
+              <a:buFont typeface="Arial" charset="0"/>
+              <a:buChar char="•"/>
+            </a:pPr>
+            <a:r>
+              <a:rPr lang="en-US" dirty="0"/>
+              <a:t>Vision: Situated within a larger model correctness argument</a:t>
+            </a:r>
+          </a:p>
+          <a:p>
+            <a:r>
+              <a:rPr lang="en-US" dirty="0" smtClean="0"/>
+              <a:t>Argument </a:t>
+            </a:r>
+            <a:r>
+              <a:rPr lang="en-US" dirty="0"/>
+              <a:t>situates proposed AGREE lemmas:</a:t>
+            </a:r>
+          </a:p>
+          <a:p>
+            <a:pPr marL="800100" lvl="1" indent="-342900">
+              <a:buFont typeface="Arial" charset="0"/>
+              <a:buChar char="•"/>
+            </a:pPr>
+            <a:r>
+              <a:rPr lang="en-US" dirty="0"/>
+              <a:t>Purpose</a:t>
+            </a:r>
+          </a:p>
+          <a:p>
+            <a:pPr marL="800100" lvl="1" indent="-342900">
+              <a:buFont typeface="Arial" charset="0"/>
+              <a:buChar char="•"/>
+            </a:pPr>
+            <a:r>
+              <a:rPr lang="en-US" dirty="0"/>
+              <a:t>Rationale</a:t>
+            </a:r>
+          </a:p>
+          <a:p>
+            <a:pPr marL="800100" lvl="1" indent="-342900">
+              <a:buFont typeface="Arial" charset="0"/>
+              <a:buChar char="•"/>
+            </a:pPr>
+            <a:r>
+              <a:rPr lang="en-US" dirty="0"/>
+              <a:t>Limitations and benefits</a:t>
+            </a:r>
+          </a:p>
+          <a:p>
+            <a:pPr marL="0" indent="0">
+              <a:buNone/>
+            </a:pPr>
+            <a:endParaRPr lang="en-US" dirty="0"/>
+          </a:p>
+        </p:txBody>
+      </p:sp>
+      <p:sp>
+        <p:nvSpPr>
+          <p:cNvPr id="6" name="Footer Placeholder 3"/>
+          <p:cNvSpPr txBox="1">
+            <a:spLocks/>
+          </p:cNvSpPr>
+          <p:nvPr/>
+        </p:nvSpPr>
+        <p:spPr>
+          <a:xfrm>
+            <a:off x="102476" y="6437441"/>
+            <a:ext cx="4532586" cy="306936"/>
+          </a:xfrm>
+          <a:prstGeom prst="rect">
+            <a:avLst/>
+          </a:prstGeom>
+        </p:spPr>
+        <p:txBody>
+          <a:bodyPr vert="horz" lIns="91440" tIns="45720" rIns="91440" bIns="45720" rtlCol="0" anchor="ctr"/>
+          <a:lstStyle>
+            <a:defPPr>
+              <a:defRPr lang="en-US"/>
+            </a:defPPr>
+            <a:lvl1pPr marL="0" algn="ctr" defTabSz="914400" rtl="0" eaLnBrk="1" latinLnBrk="0" hangingPunct="1">
+              <a:defRPr sz="1400" kern="1200">
+                <a:solidFill>
+                  <a:srgbClr val="000000"/>
+                </a:solidFill>
+                <a:latin typeface="+mn-lt"/>
+                <a:ea typeface="+mn-ea"/>
+                <a:cs typeface="+mn-cs"/>
+              </a:defRPr>
+            </a:lvl1pPr>
+            <a:lvl2pPr marL="457200" algn="l" defTabSz="914400" rtl="0" eaLnBrk="1" latinLnBrk="0" hangingPunct="1">
+              <a:defRPr sz="1800" kern="1200">
+                <a:solidFill>
+                  <a:schemeClr val="tx1"/>
+                </a:solidFill>
+                <a:latin typeface="+mn-lt"/>
+                <a:ea typeface="+mn-ea"/>
+                <a:cs typeface="+mn-cs"/>
+              </a:defRPr>
+            </a:lvl2pPr>
+            <a:lvl3pPr marL="914400" algn="l" defTabSz="914400" rtl="0" eaLnBrk="1" latinLnBrk="0" hangingPunct="1">
+              <a:defRPr sz="1800" kern="1200">
+                <a:solidFill>
+                  <a:schemeClr val="tx1"/>
+                </a:solidFill>
+                <a:latin typeface="+mn-lt"/>
+                <a:ea typeface="+mn-ea"/>
+                <a:cs typeface="+mn-cs"/>
+              </a:defRPr>
+            </a:lvl3pPr>
+            <a:lvl4pPr marL="1371600" algn="l" defTabSz="914400" rtl="0" eaLnBrk="1" latinLnBrk="0" hangingPunct="1">
+              <a:defRPr sz="1800" kern="1200">
+                <a:solidFill>
+                  <a:schemeClr val="tx1"/>
+                </a:solidFill>
+                <a:latin typeface="+mn-lt"/>
+                <a:ea typeface="+mn-ea"/>
+                <a:cs typeface="+mn-cs"/>
+              </a:defRPr>
+            </a:lvl4pPr>
+            <a:lvl5pPr marL="1828800" algn="l" defTabSz="914400" rtl="0" eaLnBrk="1" latinLnBrk="0" hangingPunct="1">
+              <a:defRPr sz="1800" kern="1200">
+                <a:solidFill>
+                  <a:schemeClr val="tx1"/>
+                </a:solidFill>
+                <a:latin typeface="+mn-lt"/>
+                <a:ea typeface="+mn-ea"/>
+                <a:cs typeface="+mn-cs"/>
+              </a:defRPr>
+            </a:lvl5pPr>
+            <a:lvl6pPr marL="2286000" algn="l" defTabSz="914400" rtl="0" eaLnBrk="1" latinLnBrk="0" hangingPunct="1">
+              <a:defRPr sz="1800" kern="1200">
+                <a:solidFill>
+                  <a:schemeClr val="tx1"/>
+                </a:solidFill>
+                <a:latin typeface="+mn-lt"/>
+                <a:ea typeface="+mn-ea"/>
+                <a:cs typeface="+mn-cs"/>
+              </a:defRPr>
+            </a:lvl6pPr>
+            <a:lvl7pPr marL="2743200" algn="l" defTabSz="914400" rtl="0" eaLnBrk="1" latinLnBrk="0" hangingPunct="1">
+              <a:defRPr sz="1800" kern="1200">
+                <a:solidFill>
+                  <a:schemeClr val="tx1"/>
+                </a:solidFill>
+                <a:latin typeface="+mn-lt"/>
+                <a:ea typeface="+mn-ea"/>
+                <a:cs typeface="+mn-cs"/>
+              </a:defRPr>
+            </a:lvl7pPr>
+            <a:lvl8pPr marL="3200400" algn="l" defTabSz="914400" rtl="0" eaLnBrk="1" latinLnBrk="0" hangingPunct="1">
+              <a:defRPr sz="1800" kern="1200">
+                <a:solidFill>
+                  <a:schemeClr val="tx1"/>
+                </a:solidFill>
+                <a:latin typeface="+mn-lt"/>
+                <a:ea typeface="+mn-ea"/>
+                <a:cs typeface="+mn-cs"/>
+              </a:defRPr>
+            </a:lvl8pPr>
+            <a:lvl9pPr marL="3657600" algn="l" defTabSz="914400" rtl="0" eaLnBrk="1" latinLnBrk="0" hangingPunct="1">
+              <a:defRPr sz="1800" kern="1200">
+                <a:solidFill>
+                  <a:schemeClr val="tx1"/>
+                </a:solidFill>
+                <a:latin typeface="+mn-lt"/>
+                <a:ea typeface="+mn-ea"/>
+                <a:cs typeface="+mn-cs"/>
+              </a:defRPr>
+            </a:lvl9pPr>
+          </a:lstStyle>
+          <a:p>
+            <a:pPr algn="l"/>
+            <a:r>
+              <a:rPr lang="en-US" dirty="0" smtClean="0"/>
+              <a:t>Dependable Computing</a:t>
+            </a:r>
+            <a:endParaRPr lang="en-US" dirty="0"/>
+          </a:p>
+        </p:txBody>
+      </p:sp>
+    </p:spTree>
+    <p:extLst>
+      <p:ext uri="{BB962C8B-B14F-4D97-AF65-F5344CB8AC3E}">
+        <p14:creationId xmlns:p14="http://schemas.microsoft.com/office/powerpoint/2010/main" val="286898037"/>
+      </p:ext>
+    </p:extLst>
+  </p:cSld>
+  <p:clrMapOvr>
+    <a:masterClrMapping/>
+  </p:clrMapOvr>
+  <mc:AlternateContent xmlns:mc="http://schemas.openxmlformats.org/markup-compatibility/2006" xmlns:p14="http://schemas.microsoft.com/office/powerpoint/2010/main">
+    <mc:Choice Requires="p14">
+      <p:transition spd="slow" p14:dur="2000"/>
+    </mc:Choice>
+    <mc:Fallback xmlns="">
+      <p:transition spd="slow"/>
+    </mc:Fallback>
+  </mc:AlternateContent>
+  <p:timing>
+    <p:tnLst>
+      <p:par>
+        <p:cTn id="1" dur="indefinite" restart="never" nodeType="tmRoot"/>
+      </p:par>
+    </p:tnLst>
+  </p:timing>
+</p:sld>
+</file>
+
+<file path=ppt/slides/slide31.xml><?xml version="1.0" encoding="utf-8"?>
+<p:sld xmlns:a="http://schemas.openxmlformats.org/drawingml/2006/main" xmlns:r="http://schemas.openxmlformats.org/officeDocument/2006/relationships" xmlns:p="http://schemas.openxmlformats.org/presentationml/2006/main">
+  <p:cSld>
+    <p:spTree>
+      <p:nvGrpSpPr>
+        <p:cNvPr id="1" name=""/>
+        <p:cNvGrpSpPr/>
+        <p:nvPr/>
+      </p:nvGrpSpPr>
+      <p:grpSpPr>
+        <a:xfrm>
+          <a:off x="0" y="0"/>
+          <a:ext cx="0" cy="0"/>
+          <a:chOff x="0" y="0"/>
+          <a:chExt cx="0" cy="0"/>
+        </a:xfrm>
+      </p:grpSpPr>
+      <p:sp>
+        <p:nvSpPr>
+          <p:cNvPr id="2" name="Title 1"/>
+          <p:cNvSpPr>
+            <a:spLocks noGrp="1"/>
+          </p:cNvSpPr>
+          <p:nvPr>
+            <p:ph type="title"/>
+          </p:nvPr>
+        </p:nvSpPr>
+        <p:spPr/>
+        <p:txBody>
+          <a:bodyPr/>
+          <a:lstStyle/>
+          <a:p>
+            <a:r>
+              <a:rPr lang="en-US" dirty="0" smtClean="0"/>
+              <a:t>Argument-Derived Observations</a:t>
+            </a:r>
+            <a:endParaRPr lang="en-US" dirty="0"/>
+          </a:p>
+        </p:txBody>
+      </p:sp>
+      <p:sp>
+        <p:nvSpPr>
+          <p:cNvPr id="3" name="Content Placeholder 2"/>
+          <p:cNvSpPr>
+            <a:spLocks noGrp="1"/>
+          </p:cNvSpPr>
+          <p:nvPr>
+            <p:ph idx="1"/>
+          </p:nvPr>
+        </p:nvSpPr>
+        <p:spPr/>
+        <p:txBody>
+          <a:bodyPr>
+            <a:normAutofit lnSpcReduction="10000"/>
+          </a:bodyPr>
+          <a:lstStyle/>
+          <a:p>
+            <a:r>
+              <a:rPr lang="en-US" dirty="0"/>
+              <a:t>Best practices/standards for AADL/AGREE use are needed</a:t>
+            </a:r>
+          </a:p>
+          <a:p>
+            <a:pPr lvl="1"/>
+            <a:r>
+              <a:rPr lang="en-US" dirty="0"/>
+              <a:t>Situate proofs within modeling fault analysis/mitigation</a:t>
+            </a:r>
+          </a:p>
+          <a:p>
+            <a:pPr lvl="1"/>
+            <a:r>
+              <a:rPr lang="en-US" dirty="0"/>
+              <a:t>Supports arguments that the set of lemmas are complete and correct</a:t>
+            </a:r>
+          </a:p>
+          <a:p>
+            <a:r>
+              <a:rPr lang="en-US" dirty="0"/>
+              <a:t>Additional tool support to reduce human error</a:t>
+            </a:r>
+          </a:p>
+          <a:p>
+            <a:pPr lvl="1"/>
+            <a:r>
+              <a:rPr lang="en-US" dirty="0"/>
+              <a:t>E.g., </a:t>
+            </a:r>
+            <a:r>
+              <a:rPr lang="en-US" dirty="0" smtClean="0"/>
+              <a:t>lemmas </a:t>
+            </a:r>
+            <a:r>
+              <a:rPr lang="en-US" dirty="0"/>
+              <a:t>and repetitive infrastructure are developed manually</a:t>
+            </a:r>
+          </a:p>
+          <a:p>
+            <a:pPr lvl="1"/>
+            <a:r>
+              <a:rPr lang="en-US" dirty="0"/>
+              <a:t>Minimize repetitive concerns in the argument about human error</a:t>
+            </a:r>
+          </a:p>
+          <a:p>
+            <a:r>
+              <a:rPr lang="en-US" dirty="0"/>
+              <a:t>Enhanced integration between AADL and AGREE </a:t>
+            </a:r>
+          </a:p>
+          <a:p>
+            <a:pPr lvl="1"/>
+            <a:r>
+              <a:rPr lang="en-US" dirty="0"/>
+              <a:t>Minimize repetitive arguments about AADL and AGREE consistency/agreement</a:t>
+            </a:r>
+          </a:p>
+          <a:p>
+            <a:r>
+              <a:rPr lang="en-US" dirty="0"/>
+              <a:t>A simpler higher-level protocol state machine spec for validation</a:t>
+            </a:r>
+          </a:p>
+          <a:p>
+            <a:pPr lvl="1"/>
+            <a:r>
+              <a:rPr lang="en-US" dirty="0"/>
+              <a:t>Provide a structure to validate against</a:t>
+            </a:r>
+          </a:p>
+          <a:p>
+            <a:pPr lvl="1"/>
+            <a:r>
+              <a:rPr lang="en-US" dirty="0"/>
+              <a:t>Simplify validation activity and simplify validation </a:t>
+            </a:r>
+            <a:r>
+              <a:rPr lang="en-US" dirty="0" smtClean="0"/>
+              <a:t>arguments</a:t>
+            </a:r>
+            <a:endParaRPr lang="en-US" dirty="0"/>
+          </a:p>
+        </p:txBody>
+      </p:sp>
+      <p:sp>
+        <p:nvSpPr>
+          <p:cNvPr id="5" name="Footer Placeholder 3"/>
+          <p:cNvSpPr txBox="1">
+            <a:spLocks/>
+          </p:cNvSpPr>
+          <p:nvPr/>
+        </p:nvSpPr>
+        <p:spPr>
+          <a:xfrm>
+            <a:off x="102476" y="6437441"/>
+            <a:ext cx="4532586" cy="306936"/>
+          </a:xfrm>
+          <a:prstGeom prst="rect">
+            <a:avLst/>
+          </a:prstGeom>
+        </p:spPr>
+        <p:txBody>
+          <a:bodyPr vert="horz" lIns="91440" tIns="45720" rIns="91440" bIns="45720" rtlCol="0" anchor="ctr"/>
+          <a:lstStyle>
+            <a:defPPr>
+              <a:defRPr lang="en-US"/>
+            </a:defPPr>
+            <a:lvl1pPr marL="0" algn="ctr" defTabSz="914400" rtl="0" eaLnBrk="1" latinLnBrk="0" hangingPunct="1">
+              <a:defRPr sz="1400" kern="1200">
+                <a:solidFill>
+                  <a:srgbClr val="000000"/>
+                </a:solidFill>
+                <a:latin typeface="+mn-lt"/>
+                <a:ea typeface="+mn-ea"/>
+                <a:cs typeface="+mn-cs"/>
+              </a:defRPr>
+            </a:lvl1pPr>
+            <a:lvl2pPr marL="457200" algn="l" defTabSz="914400" rtl="0" eaLnBrk="1" latinLnBrk="0" hangingPunct="1">
+              <a:defRPr sz="1800" kern="1200">
+                <a:solidFill>
+                  <a:schemeClr val="tx1"/>
+                </a:solidFill>
+                <a:latin typeface="+mn-lt"/>
+                <a:ea typeface="+mn-ea"/>
+                <a:cs typeface="+mn-cs"/>
+              </a:defRPr>
+            </a:lvl2pPr>
+            <a:lvl3pPr marL="914400" algn="l" defTabSz="914400" rtl="0" eaLnBrk="1" latinLnBrk="0" hangingPunct="1">
+              <a:defRPr sz="1800" kern="1200">
+                <a:solidFill>
+                  <a:schemeClr val="tx1"/>
+                </a:solidFill>
+                <a:latin typeface="+mn-lt"/>
+                <a:ea typeface="+mn-ea"/>
+                <a:cs typeface="+mn-cs"/>
+              </a:defRPr>
+            </a:lvl3pPr>
+            <a:lvl4pPr marL="1371600" algn="l" defTabSz="914400" rtl="0" eaLnBrk="1" latinLnBrk="0" hangingPunct="1">
+              <a:defRPr sz="1800" kern="1200">
+                <a:solidFill>
+                  <a:schemeClr val="tx1"/>
+                </a:solidFill>
+                <a:latin typeface="+mn-lt"/>
+                <a:ea typeface="+mn-ea"/>
+                <a:cs typeface="+mn-cs"/>
+              </a:defRPr>
+            </a:lvl4pPr>
+            <a:lvl5pPr marL="1828800" algn="l" defTabSz="914400" rtl="0" eaLnBrk="1" latinLnBrk="0" hangingPunct="1">
+              <a:defRPr sz="1800" kern="1200">
+                <a:solidFill>
+                  <a:schemeClr val="tx1"/>
+                </a:solidFill>
+                <a:latin typeface="+mn-lt"/>
+                <a:ea typeface="+mn-ea"/>
+                <a:cs typeface="+mn-cs"/>
+              </a:defRPr>
+            </a:lvl5pPr>
+            <a:lvl6pPr marL="2286000" algn="l" defTabSz="914400" rtl="0" eaLnBrk="1" latinLnBrk="0" hangingPunct="1">
+              <a:defRPr sz="1800" kern="1200">
+                <a:solidFill>
+                  <a:schemeClr val="tx1"/>
+                </a:solidFill>
+                <a:latin typeface="+mn-lt"/>
+                <a:ea typeface="+mn-ea"/>
+                <a:cs typeface="+mn-cs"/>
+              </a:defRPr>
+            </a:lvl6pPr>
+            <a:lvl7pPr marL="2743200" algn="l" defTabSz="914400" rtl="0" eaLnBrk="1" latinLnBrk="0" hangingPunct="1">
+              <a:defRPr sz="1800" kern="1200">
+                <a:solidFill>
+                  <a:schemeClr val="tx1"/>
+                </a:solidFill>
+                <a:latin typeface="+mn-lt"/>
+                <a:ea typeface="+mn-ea"/>
+                <a:cs typeface="+mn-cs"/>
+              </a:defRPr>
+            </a:lvl7pPr>
+            <a:lvl8pPr marL="3200400" algn="l" defTabSz="914400" rtl="0" eaLnBrk="1" latinLnBrk="0" hangingPunct="1">
+              <a:defRPr sz="1800" kern="1200">
+                <a:solidFill>
+                  <a:schemeClr val="tx1"/>
+                </a:solidFill>
+                <a:latin typeface="+mn-lt"/>
+                <a:ea typeface="+mn-ea"/>
+                <a:cs typeface="+mn-cs"/>
+              </a:defRPr>
+            </a:lvl8pPr>
+            <a:lvl9pPr marL="3657600" algn="l" defTabSz="914400" rtl="0" eaLnBrk="1" latinLnBrk="0" hangingPunct="1">
+              <a:defRPr sz="1800" kern="1200">
+                <a:solidFill>
+                  <a:schemeClr val="tx1"/>
+                </a:solidFill>
+                <a:latin typeface="+mn-lt"/>
+                <a:ea typeface="+mn-ea"/>
+                <a:cs typeface="+mn-cs"/>
+              </a:defRPr>
+            </a:lvl9pPr>
+          </a:lstStyle>
+          <a:p>
+            <a:pPr algn="l"/>
+            <a:r>
+              <a:rPr lang="en-US" dirty="0" smtClean="0"/>
+              <a:t>Dependable Computing</a:t>
+            </a:r>
+            <a:endParaRPr lang="en-US" dirty="0"/>
+          </a:p>
+        </p:txBody>
+      </p:sp>
+      <p:sp>
+        <p:nvSpPr>
+          <p:cNvPr id="7" name="Footer Placeholder 6"/>
+          <p:cNvSpPr>
+            <a:spLocks noGrp="1"/>
+          </p:cNvSpPr>
+          <p:nvPr>
+            <p:ph type="ftr" sz="quarter" idx="11"/>
+          </p:nvPr>
+        </p:nvSpPr>
+        <p:spPr/>
+        <p:txBody>
+          <a:bodyPr/>
+          <a:lstStyle/>
+          <a:p>
+            <a:r>
+              <a:rPr lang="en-US" smtClean="0"/>
+              <a:t>Architecture Group</a:t>
+            </a:r>
+            <a:endParaRPr lang="en-US"/>
+          </a:p>
+        </p:txBody>
+      </p:sp>
+    </p:spTree>
+    <p:extLst>
+      <p:ext uri="{BB962C8B-B14F-4D97-AF65-F5344CB8AC3E}">
+        <p14:creationId xmlns:p14="http://schemas.microsoft.com/office/powerpoint/2010/main" val="1512231083"/>
+      </p:ext>
+    </p:extLst>
+  </p:cSld>
+  <p:clrMapOvr>
+    <a:masterClrMapping/>
+  </p:clrMapOvr>
+  <mc:AlternateContent xmlns:mc="http://schemas.openxmlformats.org/markup-compatibility/2006" xmlns:p14="http://schemas.microsoft.com/office/powerpoint/2010/main">
+    <mc:Choice Requires="p14">
+      <p:transition spd="slow" p14:dur="2000"/>
+    </mc:Choice>
+    <mc:Fallback xmlns="">
+      <p:transition spd="slow"/>
+    </mc:Fallback>
+  </mc:AlternateContent>
+  <p:timing>
+    <p:tnLst>
+      <p:par>
+        <p:cTn id="1" dur="indefinite" restart="never" nodeType="tmRoot"/>
+      </p:par>
+    </p:tnLst>
+  </p:timing>
+</p:sld>
+</file>
+
+<file path=ppt/slides/slide32.xml><?xml version="1.0" encoding="utf-8"?>
+<p:sld xmlns:a="http://schemas.openxmlformats.org/drawingml/2006/main" xmlns:r="http://schemas.openxmlformats.org/officeDocument/2006/relationships" xmlns:p="http://schemas.openxmlformats.org/presentationml/2006/main">
+  <p:cSld>
+    <p:spTree>
+      <p:nvGrpSpPr>
+        <p:cNvPr id="1" name=""/>
+        <p:cNvGrpSpPr/>
+        <p:nvPr/>
+      </p:nvGrpSpPr>
+      <p:grpSpPr>
+        <a:xfrm>
+          <a:off x="0" y="0"/>
+          <a:ext cx="0" cy="0"/>
+          <a:chOff x="0" y="0"/>
+          <a:chExt cx="0" cy="0"/>
+        </a:xfrm>
+      </p:grpSpPr>
       <p:sp>
         <p:nvSpPr>
           <p:cNvPr id="2" name="Title 1"/>
@@ -21087,7 +21869,7 @@
 </p:sld>
 </file>
 
-<file path=ppt/slides/slide31.xml><?xml version="1.0" encoding="utf-8"?>
+<file path=ppt/slides/slide33.xml><?xml version="1.0" encoding="utf-8"?>
 <p:sld xmlns:a="http://schemas.openxmlformats.org/drawingml/2006/main" xmlns:r="http://schemas.openxmlformats.org/officeDocument/2006/relationships" xmlns:p="http://schemas.openxmlformats.org/presentationml/2006/main">
   <p:cSld>
     <p:spTree>
@@ -21155,7 +21937,7 @@
 </p:sld>
 </file>
 
-<file path=ppt/slides/slide32.xml><?xml version="1.0" encoding="utf-8"?>
+<file path=ppt/slides/slide34.xml><?xml version="1.0" encoding="utf-8"?>
 <p:sld xmlns:a="http://schemas.openxmlformats.org/drawingml/2006/main" xmlns:r="http://schemas.openxmlformats.org/officeDocument/2006/relationships" xmlns:p="http://schemas.openxmlformats.org/presentationml/2006/main">
   <p:cSld>
     <p:spTree>
@@ -21945,7 +22727,7 @@
 </p:sld>
 </file>
 
-<file path=ppt/slides/slide33.xml><?xml version="1.0" encoding="utf-8"?>
+<file path=ppt/slides/slide35.xml><?xml version="1.0" encoding="utf-8"?>
 <p:sld xmlns:a="http://schemas.openxmlformats.org/drawingml/2006/main" xmlns:r="http://schemas.openxmlformats.org/officeDocument/2006/relationships" xmlns:p="http://schemas.openxmlformats.org/presentationml/2006/main">
   <p:cSld>
     <p:spTree>
@@ -22174,7 +22956,7 @@
 </p:sld>
 </file>
 
-<file path=ppt/slides/slide34.xml><?xml version="1.0" encoding="utf-8"?>
+<file path=ppt/slides/slide36.xml><?xml version="1.0" encoding="utf-8"?>
 <p:sld xmlns:a="http://schemas.openxmlformats.org/drawingml/2006/main" xmlns:r="http://schemas.openxmlformats.org/officeDocument/2006/relationships" xmlns:p="http://schemas.openxmlformats.org/presentationml/2006/main">
   <p:cSld>
     <p:spTree>
@@ -22471,7 +23253,7 @@
 </p:sld>
 </file>
 
-<file path=ppt/slides/slide35.xml><?xml version="1.0" encoding="utf-8"?>
+<file path=ppt/slides/slide37.xml><?xml version="1.0" encoding="utf-8"?>
 <p:sld xmlns:a="http://schemas.openxmlformats.org/drawingml/2006/main" xmlns:r="http://schemas.openxmlformats.org/officeDocument/2006/relationships" xmlns:p="http://schemas.openxmlformats.org/presentationml/2006/main">
   <p:cSld>
     <p:spTree>
@@ -22558,7 +23340,7 @@
 </p:sld>
 </file>
 
-<file path=ppt/slides/slide36.xml><?xml version="1.0" encoding="utf-8"?>
+<file path=ppt/slides/slide38.xml><?xml version="1.0" encoding="utf-8"?>
 <p:sld xmlns:a="http://schemas.openxmlformats.org/drawingml/2006/main" xmlns:r="http://schemas.openxmlformats.org/officeDocument/2006/relationships" xmlns:p="http://schemas.openxmlformats.org/presentationml/2006/main">
   <p:cSld>
     <p:spTree>

</xml_diff>

<commit_message>
moved an assurance arg slide to backup, at least for now
</commit_message>
<xml_diff>
--- a/presentations/S5_SoI_Architecture_Group.pptx
+++ b/presentations/S5_SoI_Architecture_Group.pptx
@@ -37,15 +37,15 @@
     <p:sldId id="335" r:id="rId28"/>
     <p:sldId id="326" r:id="rId29"/>
     <p:sldId id="266" r:id="rId30"/>
-    <p:sldId id="269" r:id="rId31"/>
-    <p:sldId id="268" r:id="rId32"/>
-    <p:sldId id="295" r:id="rId33"/>
-    <p:sldId id="305" r:id="rId34"/>
-    <p:sldId id="261" r:id="rId35"/>
-    <p:sldId id="262" r:id="rId36"/>
-    <p:sldId id="306" r:id="rId37"/>
-    <p:sldId id="313" r:id="rId38"/>
-    <p:sldId id="290" r:id="rId39"/>
+    <p:sldId id="268" r:id="rId31"/>
+    <p:sldId id="295" r:id="rId32"/>
+    <p:sldId id="305" r:id="rId33"/>
+    <p:sldId id="261" r:id="rId34"/>
+    <p:sldId id="262" r:id="rId35"/>
+    <p:sldId id="306" r:id="rId36"/>
+    <p:sldId id="313" r:id="rId37"/>
+    <p:sldId id="290" r:id="rId38"/>
+    <p:sldId id="269" r:id="rId39"/>
   </p:sldIdLst>
   <p:sldSz cx="12192000" cy="6858000"/>
   <p:notesSz cx="6858000" cy="9144000"/>
@@ -1237,7 +1237,7 @@
           <a:p>
             <a:fld id="{563BCB51-F13E-4501-921D-7D4EB39EDE9B}" type="slidenum">
               <a:rPr lang="en-US" smtClean="0"/>
-              <a:t>31</a:t>
+              <a:t>30</a:t>
             </a:fld>
             <a:endParaRPr lang="en-US"/>
           </a:p>
@@ -1329,7 +1329,7 @@
           <a:p>
             <a:fld id="{563BCB51-F13E-4501-921D-7D4EB39EDE9B}" type="slidenum">
               <a:rPr lang="en-US" smtClean="0"/>
-              <a:t>32</a:t>
+              <a:t>31</a:t>
             </a:fld>
             <a:endParaRPr lang="en-US"/>
           </a:p>
@@ -1413,7 +1413,7 @@
           <a:p>
             <a:fld id="{563BCB51-F13E-4501-921D-7D4EB39EDE9B}" type="slidenum">
               <a:rPr lang="en-US" smtClean="0"/>
-              <a:t>33</a:t>
+              <a:t>32</a:t>
             </a:fld>
             <a:endParaRPr lang="en-US"/>
           </a:p>
@@ -1545,7 +1545,7 @@
           <a:p>
             <a:fld id="{563BCB51-F13E-4501-921D-7D4EB39EDE9B}" type="slidenum">
               <a:rPr lang="en-US" smtClean="0"/>
-              <a:t>34</a:t>
+              <a:t>33</a:t>
             </a:fld>
             <a:endParaRPr lang="en-US"/>
           </a:p>
@@ -1752,7 +1752,7 @@
           <a:p>
             <a:fld id="{563BCB51-F13E-4501-921D-7D4EB39EDE9B}" type="slidenum">
               <a:rPr lang="en-US" smtClean="0"/>
-              <a:t>35</a:t>
+              <a:t>34</a:t>
             </a:fld>
             <a:endParaRPr lang="en-US"/>
           </a:p>
@@ -1846,7 +1846,7 @@
           <a:p>
             <a:fld id="{563BCB51-F13E-4501-921D-7D4EB39EDE9B}" type="slidenum">
               <a:rPr lang="en-US" smtClean="0"/>
-              <a:t>36</a:t>
+              <a:t>35</a:t>
             </a:fld>
             <a:endParaRPr lang="en-US"/>
           </a:p>
@@ -1938,7 +1938,7 @@
           <a:p>
             <a:fld id="{563BCB51-F13E-4501-921D-7D4EB39EDE9B}" type="slidenum">
               <a:rPr lang="en-US" smtClean="0"/>
-              <a:t>37</a:t>
+              <a:t>36</a:t>
             </a:fld>
             <a:endParaRPr lang="en-US"/>
           </a:p>
@@ -2239,7 +2239,6 @@
               <a:rPr lang="en-US" dirty="0" smtClean="0"/>
               <a:t>Restructure?:</a:t>
             </a:r>
-            <a:endParaRPr lang="en-US" dirty="0" smtClean="0"/>
           </a:p>
           <a:p>
             <a:pPr fontAlgn="base"/>
@@ -2690,15 +2689,7 @@
             </a:r>
             <a:r>
               <a:rPr lang="en-US" baseline="0" dirty="0" smtClean="0"/>
-              <a:t> timing properties and </a:t>
-            </a:r>
-            <a:r>
-              <a:rPr lang="en-US" baseline="0" dirty="0" smtClean="0"/>
-              <a:t>their </a:t>
-            </a:r>
-            <a:r>
-              <a:rPr lang="en-US" baseline="0" dirty="0" smtClean="0"/>
-              <a:t>difficulty</a:t>
+              <a:t> timing properties and their difficulty</a:t>
             </a:r>
           </a:p>
           <a:p>
@@ -7186,23 +7177,7 @@
             </a:pPr>
             <a:r>
               <a:rPr lang="en-US" dirty="0" smtClean="0"/>
-              <a:t>Checks </a:t>
-            </a:r>
-            <a:r>
-              <a:rPr lang="en-US" dirty="0" smtClean="0"/>
-              <a:t>higher-level </a:t>
-            </a:r>
-            <a:r>
-              <a:rPr lang="en-US" dirty="0" smtClean="0"/>
-              <a:t>guarantees and lemmas using the guarantees of the subcomponents, and </a:t>
-            </a:r>
-            <a:r>
-              <a:rPr lang="en-US" dirty="0" smtClean="0"/>
-              <a:t>checks </a:t>
-            </a:r>
-            <a:r>
-              <a:rPr lang="en-US" dirty="0" smtClean="0"/>
-              <a:t>that the assumptions of the subcomponents hold</a:t>
+              <a:t>Checks higher-level guarantees and lemmas using the guarantees of the subcomponents, and checks that the assumptions of the subcomponents hold</a:t>
             </a:r>
           </a:p>
           <a:p>
@@ -18957,6 +18932,130 @@
           </a:fontRef>
         </p:style>
       </p:cxnSp>
+      <p:sp>
+        <p:nvSpPr>
+          <p:cNvPr id="10" name="Footer Placeholder 3"/>
+          <p:cNvSpPr txBox="1">
+            <a:spLocks/>
+          </p:cNvSpPr>
+          <p:nvPr/>
+        </p:nvSpPr>
+        <p:spPr>
+          <a:xfrm>
+            <a:off x="102476" y="6437441"/>
+            <a:ext cx="4532586" cy="306936"/>
+          </a:xfrm>
+          <a:prstGeom prst="rect">
+            <a:avLst/>
+          </a:prstGeom>
+        </p:spPr>
+        <p:txBody>
+          <a:bodyPr vert="horz" lIns="91440" tIns="45720" rIns="91440" bIns="45720" rtlCol="0" anchor="ctr"/>
+          <a:lstStyle>
+            <a:defPPr>
+              <a:defRPr lang="en-US"/>
+            </a:defPPr>
+            <a:lvl1pPr marL="0" algn="ctr" defTabSz="914400" rtl="0" eaLnBrk="1" latinLnBrk="0" hangingPunct="1">
+              <a:defRPr sz="1400" kern="1200">
+                <a:solidFill>
+                  <a:srgbClr val="000000"/>
+                </a:solidFill>
+                <a:latin typeface="+mn-lt"/>
+                <a:ea typeface="+mn-ea"/>
+                <a:cs typeface="+mn-cs"/>
+              </a:defRPr>
+            </a:lvl1pPr>
+            <a:lvl2pPr marL="457200" algn="l" defTabSz="914400" rtl="0" eaLnBrk="1" latinLnBrk="0" hangingPunct="1">
+              <a:defRPr sz="1800" kern="1200">
+                <a:solidFill>
+                  <a:schemeClr val="tx1"/>
+                </a:solidFill>
+                <a:latin typeface="+mn-lt"/>
+                <a:ea typeface="+mn-ea"/>
+                <a:cs typeface="+mn-cs"/>
+              </a:defRPr>
+            </a:lvl2pPr>
+            <a:lvl3pPr marL="914400" algn="l" defTabSz="914400" rtl="0" eaLnBrk="1" latinLnBrk="0" hangingPunct="1">
+              <a:defRPr sz="1800" kern="1200">
+                <a:solidFill>
+                  <a:schemeClr val="tx1"/>
+                </a:solidFill>
+                <a:latin typeface="+mn-lt"/>
+                <a:ea typeface="+mn-ea"/>
+                <a:cs typeface="+mn-cs"/>
+              </a:defRPr>
+            </a:lvl3pPr>
+            <a:lvl4pPr marL="1371600" algn="l" defTabSz="914400" rtl="0" eaLnBrk="1" latinLnBrk="0" hangingPunct="1">
+              <a:defRPr sz="1800" kern="1200">
+                <a:solidFill>
+                  <a:schemeClr val="tx1"/>
+                </a:solidFill>
+                <a:latin typeface="+mn-lt"/>
+                <a:ea typeface="+mn-ea"/>
+                <a:cs typeface="+mn-cs"/>
+              </a:defRPr>
+            </a:lvl4pPr>
+            <a:lvl5pPr marL="1828800" algn="l" defTabSz="914400" rtl="0" eaLnBrk="1" latinLnBrk="0" hangingPunct="1">
+              <a:defRPr sz="1800" kern="1200">
+                <a:solidFill>
+                  <a:schemeClr val="tx1"/>
+                </a:solidFill>
+                <a:latin typeface="+mn-lt"/>
+                <a:ea typeface="+mn-ea"/>
+                <a:cs typeface="+mn-cs"/>
+              </a:defRPr>
+            </a:lvl5pPr>
+            <a:lvl6pPr marL="2286000" algn="l" defTabSz="914400" rtl="0" eaLnBrk="1" latinLnBrk="0" hangingPunct="1">
+              <a:defRPr sz="1800" kern="1200">
+                <a:solidFill>
+                  <a:schemeClr val="tx1"/>
+                </a:solidFill>
+                <a:latin typeface="+mn-lt"/>
+                <a:ea typeface="+mn-ea"/>
+                <a:cs typeface="+mn-cs"/>
+              </a:defRPr>
+            </a:lvl6pPr>
+            <a:lvl7pPr marL="2743200" algn="l" defTabSz="914400" rtl="0" eaLnBrk="1" latinLnBrk="0" hangingPunct="1">
+              <a:defRPr sz="1800" kern="1200">
+                <a:solidFill>
+                  <a:schemeClr val="tx1"/>
+                </a:solidFill>
+                <a:latin typeface="+mn-lt"/>
+                <a:ea typeface="+mn-ea"/>
+                <a:cs typeface="+mn-cs"/>
+              </a:defRPr>
+            </a:lvl7pPr>
+            <a:lvl8pPr marL="3200400" algn="l" defTabSz="914400" rtl="0" eaLnBrk="1" latinLnBrk="0" hangingPunct="1">
+              <a:defRPr sz="1800" kern="1200">
+                <a:solidFill>
+                  <a:schemeClr val="tx1"/>
+                </a:solidFill>
+                <a:latin typeface="+mn-lt"/>
+                <a:ea typeface="+mn-ea"/>
+                <a:cs typeface="+mn-cs"/>
+              </a:defRPr>
+            </a:lvl8pPr>
+            <a:lvl9pPr marL="3657600" algn="l" defTabSz="914400" rtl="0" eaLnBrk="1" latinLnBrk="0" hangingPunct="1">
+              <a:defRPr sz="1800" kern="1200">
+                <a:solidFill>
+                  <a:schemeClr val="tx1"/>
+                </a:solidFill>
+                <a:latin typeface="+mn-lt"/>
+                <a:ea typeface="+mn-ea"/>
+                <a:cs typeface="+mn-cs"/>
+              </a:defRPr>
+            </a:lvl9pPr>
+          </a:lstStyle>
+          <a:p>
+            <a:pPr algn="l"/>
+            <a:r>
+              <a:rPr lang="en-US" dirty="0" smtClean="0"/>
+              <a:t>Rockwell Collins, Dependable Computing, AFRL/LinQuest</a:t>
+            </a:r>
+            <a:endParaRPr lang="en-US" dirty="0"/>
+          </a:p>
+        </p:txBody>
+      </p:sp>
     </p:spTree>
     <p:extLst>
       <p:ext uri="{BB962C8B-B14F-4D97-AF65-F5344CB8AC3E}">
@@ -19077,15 +19176,7 @@
           <a:p>
             <a:r>
               <a:rPr lang="en-US" dirty="0" smtClean="0"/>
-              <a:t>Even so, the </a:t>
-            </a:r>
-            <a:r>
-              <a:rPr lang="en-US" dirty="0" smtClean="0"/>
-              <a:t>(human) modeler can </a:t>
-            </a:r>
-            <a:r>
-              <a:rPr lang="en-US" dirty="0" smtClean="0"/>
-              <a:t>make mistakes</a:t>
+              <a:t>Even so, the (human) modeler can make mistakes</a:t>
             </a:r>
           </a:p>
           <a:p>
@@ -19236,6 +19327,130 @@
           </a:prstGeom>
         </p:spPr>
       </p:pic>
+      <p:sp>
+        <p:nvSpPr>
+          <p:cNvPr id="10" name="Footer Placeholder 3"/>
+          <p:cNvSpPr txBox="1">
+            <a:spLocks/>
+          </p:cNvSpPr>
+          <p:nvPr/>
+        </p:nvSpPr>
+        <p:spPr>
+          <a:xfrm>
+            <a:off x="102476" y="6437441"/>
+            <a:ext cx="4532586" cy="306936"/>
+          </a:xfrm>
+          <a:prstGeom prst="rect">
+            <a:avLst/>
+          </a:prstGeom>
+        </p:spPr>
+        <p:txBody>
+          <a:bodyPr vert="horz" lIns="91440" tIns="45720" rIns="91440" bIns="45720" rtlCol="0" anchor="ctr"/>
+          <a:lstStyle>
+            <a:defPPr>
+              <a:defRPr lang="en-US"/>
+            </a:defPPr>
+            <a:lvl1pPr marL="0" algn="ctr" defTabSz="914400" rtl="0" eaLnBrk="1" latinLnBrk="0" hangingPunct="1">
+              <a:defRPr sz="1400" kern="1200">
+                <a:solidFill>
+                  <a:srgbClr val="000000"/>
+                </a:solidFill>
+                <a:latin typeface="+mn-lt"/>
+                <a:ea typeface="+mn-ea"/>
+                <a:cs typeface="+mn-cs"/>
+              </a:defRPr>
+            </a:lvl1pPr>
+            <a:lvl2pPr marL="457200" algn="l" defTabSz="914400" rtl="0" eaLnBrk="1" latinLnBrk="0" hangingPunct="1">
+              <a:defRPr sz="1800" kern="1200">
+                <a:solidFill>
+                  <a:schemeClr val="tx1"/>
+                </a:solidFill>
+                <a:latin typeface="+mn-lt"/>
+                <a:ea typeface="+mn-ea"/>
+                <a:cs typeface="+mn-cs"/>
+              </a:defRPr>
+            </a:lvl2pPr>
+            <a:lvl3pPr marL="914400" algn="l" defTabSz="914400" rtl="0" eaLnBrk="1" latinLnBrk="0" hangingPunct="1">
+              <a:defRPr sz="1800" kern="1200">
+                <a:solidFill>
+                  <a:schemeClr val="tx1"/>
+                </a:solidFill>
+                <a:latin typeface="+mn-lt"/>
+                <a:ea typeface="+mn-ea"/>
+                <a:cs typeface="+mn-cs"/>
+              </a:defRPr>
+            </a:lvl3pPr>
+            <a:lvl4pPr marL="1371600" algn="l" defTabSz="914400" rtl="0" eaLnBrk="1" latinLnBrk="0" hangingPunct="1">
+              <a:defRPr sz="1800" kern="1200">
+                <a:solidFill>
+                  <a:schemeClr val="tx1"/>
+                </a:solidFill>
+                <a:latin typeface="+mn-lt"/>
+                <a:ea typeface="+mn-ea"/>
+                <a:cs typeface="+mn-cs"/>
+              </a:defRPr>
+            </a:lvl4pPr>
+            <a:lvl5pPr marL="1828800" algn="l" defTabSz="914400" rtl="0" eaLnBrk="1" latinLnBrk="0" hangingPunct="1">
+              <a:defRPr sz="1800" kern="1200">
+                <a:solidFill>
+                  <a:schemeClr val="tx1"/>
+                </a:solidFill>
+                <a:latin typeface="+mn-lt"/>
+                <a:ea typeface="+mn-ea"/>
+                <a:cs typeface="+mn-cs"/>
+              </a:defRPr>
+            </a:lvl5pPr>
+            <a:lvl6pPr marL="2286000" algn="l" defTabSz="914400" rtl="0" eaLnBrk="1" latinLnBrk="0" hangingPunct="1">
+              <a:defRPr sz="1800" kern="1200">
+                <a:solidFill>
+                  <a:schemeClr val="tx1"/>
+                </a:solidFill>
+                <a:latin typeface="+mn-lt"/>
+                <a:ea typeface="+mn-ea"/>
+                <a:cs typeface="+mn-cs"/>
+              </a:defRPr>
+            </a:lvl6pPr>
+            <a:lvl7pPr marL="2743200" algn="l" defTabSz="914400" rtl="0" eaLnBrk="1" latinLnBrk="0" hangingPunct="1">
+              <a:defRPr sz="1800" kern="1200">
+                <a:solidFill>
+                  <a:schemeClr val="tx1"/>
+                </a:solidFill>
+                <a:latin typeface="+mn-lt"/>
+                <a:ea typeface="+mn-ea"/>
+                <a:cs typeface="+mn-cs"/>
+              </a:defRPr>
+            </a:lvl7pPr>
+            <a:lvl8pPr marL="3200400" algn="l" defTabSz="914400" rtl="0" eaLnBrk="1" latinLnBrk="0" hangingPunct="1">
+              <a:defRPr sz="1800" kern="1200">
+                <a:solidFill>
+                  <a:schemeClr val="tx1"/>
+                </a:solidFill>
+                <a:latin typeface="+mn-lt"/>
+                <a:ea typeface="+mn-ea"/>
+                <a:cs typeface="+mn-cs"/>
+              </a:defRPr>
+            </a:lvl8pPr>
+            <a:lvl9pPr marL="3657600" algn="l" defTabSz="914400" rtl="0" eaLnBrk="1" latinLnBrk="0" hangingPunct="1">
+              <a:defRPr sz="1800" kern="1200">
+                <a:solidFill>
+                  <a:schemeClr val="tx1"/>
+                </a:solidFill>
+                <a:latin typeface="+mn-lt"/>
+                <a:ea typeface="+mn-ea"/>
+                <a:cs typeface="+mn-cs"/>
+              </a:defRPr>
+            </a:lvl9pPr>
+          </a:lstStyle>
+          <a:p>
+            <a:pPr algn="l"/>
+            <a:r>
+              <a:rPr lang="en-US" dirty="0" smtClean="0"/>
+              <a:t>Rockwell Collins, Dependable Computing, AFRL/LinQuest</a:t>
+            </a:r>
+            <a:endParaRPr lang="en-US" dirty="0"/>
+          </a:p>
+        </p:txBody>
+      </p:sp>
     </p:spTree>
     <p:extLst>
       <p:ext uri="{BB962C8B-B14F-4D97-AF65-F5344CB8AC3E}">
@@ -20288,7 +20503,7 @@
           <a:p>
             <a:r>
               <a:rPr lang="en-US" dirty="0" smtClean="0"/>
-              <a:t>Argument-Derived Observations</a:t>
+              <a:t>Stateflow Representation</a:t>
             </a:r>
             <a:endParaRPr lang="en-US" dirty="0"/>
           </a:p>
@@ -20312,325 +20527,6 @@
           <a:lstStyle/>
           <a:p>
             <a:r>
-              <a:rPr lang="en-US" dirty="0"/>
-              <a:t>Best practices/standards for AADL/AGREE use are needed</a:t>
-            </a:r>
-          </a:p>
-          <a:p>
-            <a:pPr lvl="1"/>
-            <a:r>
-              <a:rPr lang="en-US" dirty="0"/>
-              <a:t>Situate proofs within modeling fault analysis/mitigation</a:t>
-            </a:r>
-          </a:p>
-          <a:p>
-            <a:pPr lvl="1"/>
-            <a:r>
-              <a:rPr lang="en-US" dirty="0"/>
-              <a:t>Supports arguments that the set of lemmas are complete and correct</a:t>
-            </a:r>
-          </a:p>
-          <a:p>
-            <a:r>
-              <a:rPr lang="en-US" dirty="0"/>
-              <a:t>Additional tool support to reduce human error</a:t>
-            </a:r>
-          </a:p>
-          <a:p>
-            <a:pPr lvl="1"/>
-            <a:r>
-              <a:rPr lang="en-US" dirty="0"/>
-              <a:t>E.g., </a:t>
-            </a:r>
-            <a:r>
-              <a:rPr lang="en-US" dirty="0" smtClean="0"/>
-              <a:t>lemmas </a:t>
-            </a:r>
-            <a:r>
-              <a:rPr lang="en-US" dirty="0"/>
-              <a:t>and repetitive infrastructure are developed manually</a:t>
-            </a:r>
-          </a:p>
-          <a:p>
-            <a:pPr lvl="1"/>
-            <a:r>
-              <a:rPr lang="en-US" dirty="0"/>
-              <a:t>Minimize repetitive concerns in the argument about human error</a:t>
-            </a:r>
-          </a:p>
-          <a:p>
-            <a:r>
-              <a:rPr lang="en-US" dirty="0"/>
-              <a:t>Enhanced integration between AADL and AGREE </a:t>
-            </a:r>
-          </a:p>
-          <a:p>
-            <a:pPr lvl="1"/>
-            <a:r>
-              <a:rPr lang="en-US" dirty="0"/>
-              <a:t>Minimize repetitive arguments about AADL and AGREE consistency/agreement</a:t>
-            </a:r>
-          </a:p>
-          <a:p>
-            <a:r>
-              <a:rPr lang="en-US" dirty="0"/>
-              <a:t>A simpler higher-level protocol state machine spec for validation</a:t>
-            </a:r>
-          </a:p>
-          <a:p>
-            <a:pPr lvl="1"/>
-            <a:r>
-              <a:rPr lang="en-US" dirty="0"/>
-              <a:t>Provide a structure to validate against</a:t>
-            </a:r>
-          </a:p>
-          <a:p>
-            <a:pPr lvl="1"/>
-            <a:r>
-              <a:rPr lang="en-US" dirty="0"/>
-              <a:t>Simplify validation activity and simplify validation </a:t>
-            </a:r>
-            <a:r>
-              <a:rPr lang="en-US" dirty="0" smtClean="0"/>
-              <a:t>arguments</a:t>
-            </a:r>
-            <a:endParaRPr lang="en-US" dirty="0"/>
-          </a:p>
-        </p:txBody>
-      </p:sp>
-      <p:sp>
-        <p:nvSpPr>
-          <p:cNvPr id="5" name="Footer Placeholder 3"/>
-          <p:cNvSpPr txBox="1">
-            <a:spLocks/>
-          </p:cNvSpPr>
-          <p:nvPr/>
-        </p:nvSpPr>
-        <p:spPr>
-          <a:xfrm>
-            <a:off x="102476" y="6437441"/>
-            <a:ext cx="4532586" cy="306936"/>
-          </a:xfrm>
-          <a:prstGeom prst="rect">
-            <a:avLst/>
-          </a:prstGeom>
-        </p:spPr>
-        <p:txBody>
-          <a:bodyPr vert="horz" lIns="91440" tIns="45720" rIns="91440" bIns="45720" rtlCol="0" anchor="ctr"/>
-          <a:lstStyle>
-            <a:defPPr>
-              <a:defRPr lang="en-US"/>
-            </a:defPPr>
-            <a:lvl1pPr marL="0" algn="ctr" defTabSz="914400" rtl="0" eaLnBrk="1" latinLnBrk="0" hangingPunct="1">
-              <a:defRPr sz="1400" kern="1200">
-                <a:solidFill>
-                  <a:srgbClr val="000000"/>
-                </a:solidFill>
-                <a:latin typeface="+mn-lt"/>
-                <a:ea typeface="+mn-ea"/>
-                <a:cs typeface="+mn-cs"/>
-              </a:defRPr>
-            </a:lvl1pPr>
-            <a:lvl2pPr marL="457200" algn="l" defTabSz="914400" rtl="0" eaLnBrk="1" latinLnBrk="0" hangingPunct="1">
-              <a:defRPr sz="1800" kern="1200">
-                <a:solidFill>
-                  <a:schemeClr val="tx1"/>
-                </a:solidFill>
-                <a:latin typeface="+mn-lt"/>
-                <a:ea typeface="+mn-ea"/>
-                <a:cs typeface="+mn-cs"/>
-              </a:defRPr>
-            </a:lvl2pPr>
-            <a:lvl3pPr marL="914400" algn="l" defTabSz="914400" rtl="0" eaLnBrk="1" latinLnBrk="0" hangingPunct="1">
-              <a:defRPr sz="1800" kern="1200">
-                <a:solidFill>
-                  <a:schemeClr val="tx1"/>
-                </a:solidFill>
-                <a:latin typeface="+mn-lt"/>
-                <a:ea typeface="+mn-ea"/>
-                <a:cs typeface="+mn-cs"/>
-              </a:defRPr>
-            </a:lvl3pPr>
-            <a:lvl4pPr marL="1371600" algn="l" defTabSz="914400" rtl="0" eaLnBrk="1" latinLnBrk="0" hangingPunct="1">
-              <a:defRPr sz="1800" kern="1200">
-                <a:solidFill>
-                  <a:schemeClr val="tx1"/>
-                </a:solidFill>
-                <a:latin typeface="+mn-lt"/>
-                <a:ea typeface="+mn-ea"/>
-                <a:cs typeface="+mn-cs"/>
-              </a:defRPr>
-            </a:lvl4pPr>
-            <a:lvl5pPr marL="1828800" algn="l" defTabSz="914400" rtl="0" eaLnBrk="1" latinLnBrk="0" hangingPunct="1">
-              <a:defRPr sz="1800" kern="1200">
-                <a:solidFill>
-                  <a:schemeClr val="tx1"/>
-                </a:solidFill>
-                <a:latin typeface="+mn-lt"/>
-                <a:ea typeface="+mn-ea"/>
-                <a:cs typeface="+mn-cs"/>
-              </a:defRPr>
-            </a:lvl5pPr>
-            <a:lvl6pPr marL="2286000" algn="l" defTabSz="914400" rtl="0" eaLnBrk="1" latinLnBrk="0" hangingPunct="1">
-              <a:defRPr sz="1800" kern="1200">
-                <a:solidFill>
-                  <a:schemeClr val="tx1"/>
-                </a:solidFill>
-                <a:latin typeface="+mn-lt"/>
-                <a:ea typeface="+mn-ea"/>
-                <a:cs typeface="+mn-cs"/>
-              </a:defRPr>
-            </a:lvl6pPr>
-            <a:lvl7pPr marL="2743200" algn="l" defTabSz="914400" rtl="0" eaLnBrk="1" latinLnBrk="0" hangingPunct="1">
-              <a:defRPr sz="1800" kern="1200">
-                <a:solidFill>
-                  <a:schemeClr val="tx1"/>
-                </a:solidFill>
-                <a:latin typeface="+mn-lt"/>
-                <a:ea typeface="+mn-ea"/>
-                <a:cs typeface="+mn-cs"/>
-              </a:defRPr>
-            </a:lvl7pPr>
-            <a:lvl8pPr marL="3200400" algn="l" defTabSz="914400" rtl="0" eaLnBrk="1" latinLnBrk="0" hangingPunct="1">
-              <a:defRPr sz="1800" kern="1200">
-                <a:solidFill>
-                  <a:schemeClr val="tx1"/>
-                </a:solidFill>
-                <a:latin typeface="+mn-lt"/>
-                <a:ea typeface="+mn-ea"/>
-                <a:cs typeface="+mn-cs"/>
-              </a:defRPr>
-            </a:lvl8pPr>
-            <a:lvl9pPr marL="3657600" algn="l" defTabSz="914400" rtl="0" eaLnBrk="1" latinLnBrk="0" hangingPunct="1">
-              <a:defRPr sz="1800" kern="1200">
-                <a:solidFill>
-                  <a:schemeClr val="tx1"/>
-                </a:solidFill>
-                <a:latin typeface="+mn-lt"/>
-                <a:ea typeface="+mn-ea"/>
-                <a:cs typeface="+mn-cs"/>
-              </a:defRPr>
-            </a:lvl9pPr>
-          </a:lstStyle>
-          <a:p>
-            <a:pPr algn="l"/>
-            <a:r>
-              <a:rPr lang="en-US" dirty="0" smtClean="0"/>
-              <a:t>Dependable Computing</a:t>
-            </a:r>
-            <a:endParaRPr lang="en-US" dirty="0"/>
-          </a:p>
-        </p:txBody>
-      </p:sp>
-      <p:sp>
-        <p:nvSpPr>
-          <p:cNvPr id="7" name="Footer Placeholder 6"/>
-          <p:cNvSpPr>
-            <a:spLocks noGrp="1"/>
-          </p:cNvSpPr>
-          <p:nvPr>
-            <p:ph type="ftr" sz="quarter" idx="11"/>
-          </p:nvPr>
-        </p:nvSpPr>
-        <p:spPr/>
-        <p:txBody>
-          <a:bodyPr/>
-          <a:lstStyle/>
-          <a:p>
-            <a:r>
-              <a:rPr lang="en-US" smtClean="0"/>
-              <a:t>Architecture Group</a:t>
-            </a:r>
-            <a:endParaRPr lang="en-US"/>
-          </a:p>
-        </p:txBody>
-      </p:sp>
-    </p:spTree>
-    <p:extLst>
-      <p:ext uri="{BB962C8B-B14F-4D97-AF65-F5344CB8AC3E}">
-        <p14:creationId xmlns:p14="http://schemas.microsoft.com/office/powerpoint/2010/main" val="1512231083"/>
-      </p:ext>
-    </p:extLst>
-  </p:cSld>
-  <p:clrMapOvr>
-    <a:masterClrMapping/>
-  </p:clrMapOvr>
-  <mc:AlternateContent xmlns:mc="http://schemas.openxmlformats.org/markup-compatibility/2006" xmlns:p14="http://schemas.microsoft.com/office/powerpoint/2010/main">
-    <mc:Choice Requires="p14">
-      <p:transition spd="slow" p14:dur="2000"/>
-    </mc:Choice>
-    <mc:Fallback xmlns="">
-      <p:transition spd="slow"/>
-    </mc:Fallback>
-  </mc:AlternateContent>
-  <p:timing>
-    <p:tnLst>
-      <p:par>
-        <p:cTn id="1" dur="indefinite" restart="never" nodeType="tmRoot"/>
-      </p:par>
-    </p:tnLst>
-  </p:timing>
-</p:sld>
-</file>
-
-<file path=ppt/slides/slide31.xml><?xml version="1.0" encoding="utf-8"?>
-<p:sld xmlns:a="http://schemas.openxmlformats.org/drawingml/2006/main" xmlns:r="http://schemas.openxmlformats.org/officeDocument/2006/relationships" xmlns:p="http://schemas.openxmlformats.org/presentationml/2006/main">
-  <p:cSld>
-    <p:spTree>
-      <p:nvGrpSpPr>
-        <p:cNvPr id="1" name=""/>
-        <p:cNvGrpSpPr/>
-        <p:nvPr/>
-      </p:nvGrpSpPr>
-      <p:grpSpPr>
-        <a:xfrm>
-          <a:off x="0" y="0"/>
-          <a:ext cx="0" cy="0"/>
-          <a:chOff x="0" y="0"/>
-          <a:chExt cx="0" cy="0"/>
-        </a:xfrm>
-      </p:grpSpPr>
-      <p:sp>
-        <p:nvSpPr>
-          <p:cNvPr id="2" name="Title 1"/>
-          <p:cNvSpPr>
-            <a:spLocks noGrp="1"/>
-          </p:cNvSpPr>
-          <p:nvPr>
-            <p:ph type="title"/>
-          </p:nvPr>
-        </p:nvSpPr>
-        <p:spPr/>
-        <p:txBody>
-          <a:bodyPr/>
-          <a:lstStyle/>
-          <a:p>
-            <a:r>
-              <a:rPr lang="en-US" dirty="0" smtClean="0"/>
-              <a:t>Stateflow Representation</a:t>
-            </a:r>
-            <a:endParaRPr lang="en-US" dirty="0"/>
-          </a:p>
-        </p:txBody>
-      </p:sp>
-      <p:sp>
-        <p:nvSpPr>
-          <p:cNvPr id="3" name="Content Placeholder 2"/>
-          <p:cNvSpPr>
-            <a:spLocks noGrp="1"/>
-          </p:cNvSpPr>
-          <p:nvPr>
-            <p:ph idx="1"/>
-          </p:nvPr>
-        </p:nvSpPr>
-        <p:spPr/>
-        <p:txBody>
-          <a:bodyPr>
-            <a:normAutofit lnSpcReduction="10000"/>
-          </a:bodyPr>
-          <a:lstStyle/>
-          <a:p>
-            <a:r>
               <a:rPr lang="en-US" dirty="0" smtClean="0"/>
               <a:t>Benefits</a:t>
             </a:r>
@@ -20706,11 +20602,7 @@
             </a:r>
             <a:r>
               <a:rPr lang="en-US" dirty="0" smtClean="0"/>
-              <a:t>abstractions </a:t>
-            </a:r>
-            <a:r>
-              <a:rPr lang="en-US" dirty="0" smtClean="0"/>
-              <a:t>cross-checked </a:t>
+              <a:t>abstractions cross-checked </a:t>
             </a:r>
             <a:r>
               <a:rPr lang="en-US" dirty="0"/>
@@ -20928,7 +20820,7 @@
 </p:sld>
 </file>
 
-<file path=ppt/slides/slide32.xml><?xml version="1.0" encoding="utf-8"?>
+<file path=ppt/slides/slide31.xml><?xml version="1.0" encoding="utf-8"?>
 <p:sld xmlns:a="http://schemas.openxmlformats.org/drawingml/2006/main" xmlns:r="http://schemas.openxmlformats.org/officeDocument/2006/relationships" xmlns:p="http://schemas.openxmlformats.org/presentationml/2006/main">
   <p:cSld>
     <p:spTree>
@@ -20996,7 +20888,7 @@
 </p:sld>
 </file>
 
-<file path=ppt/slides/slide33.xml><?xml version="1.0" encoding="utf-8"?>
+<file path=ppt/slides/slide32.xml><?xml version="1.0" encoding="utf-8"?>
 <p:sld xmlns:a="http://schemas.openxmlformats.org/drawingml/2006/main" xmlns:r="http://schemas.openxmlformats.org/officeDocument/2006/relationships" xmlns:p="http://schemas.openxmlformats.org/presentationml/2006/main">
   <p:cSld>
     <p:spTree>
@@ -21784,6 +21676,235 @@
 </p:sld>
 </file>
 
+<file path=ppt/slides/slide33.xml><?xml version="1.0" encoding="utf-8"?>
+<p:sld xmlns:a="http://schemas.openxmlformats.org/drawingml/2006/main" xmlns:r="http://schemas.openxmlformats.org/officeDocument/2006/relationships" xmlns:p="http://schemas.openxmlformats.org/presentationml/2006/main">
+  <p:cSld>
+    <p:spTree>
+      <p:nvGrpSpPr>
+        <p:cNvPr id="1" name=""/>
+        <p:cNvGrpSpPr/>
+        <p:nvPr/>
+      </p:nvGrpSpPr>
+      <p:grpSpPr>
+        <a:xfrm>
+          <a:off x="0" y="0"/>
+          <a:ext cx="0" cy="0"/>
+          <a:chOff x="0" y="0"/>
+          <a:chExt cx="0" cy="0"/>
+        </a:xfrm>
+      </p:grpSpPr>
+      <p:sp>
+        <p:nvSpPr>
+          <p:cNvPr id="2" name="Title 1"/>
+          <p:cNvSpPr>
+            <a:spLocks noGrp="1"/>
+          </p:cNvSpPr>
+          <p:nvPr>
+            <p:ph type="title"/>
+          </p:nvPr>
+        </p:nvSpPr>
+        <p:spPr/>
+        <p:txBody>
+          <a:bodyPr/>
+          <a:lstStyle/>
+          <a:p>
+            <a:r>
+              <a:rPr lang="en-US" dirty="0" smtClean="0"/>
+              <a:t>Lessons Learned</a:t>
+            </a:r>
+            <a:endParaRPr lang="en-US" dirty="0"/>
+          </a:p>
+        </p:txBody>
+      </p:sp>
+      <p:sp>
+        <p:nvSpPr>
+          <p:cNvPr id="3" name="Content Placeholder 2"/>
+          <p:cNvSpPr>
+            <a:spLocks noGrp="1"/>
+          </p:cNvSpPr>
+          <p:nvPr>
+            <p:ph idx="1"/>
+          </p:nvPr>
+        </p:nvSpPr>
+        <p:spPr/>
+        <p:txBody>
+          <a:bodyPr>
+            <a:normAutofit lnSpcReduction="10000"/>
+          </a:bodyPr>
+          <a:lstStyle/>
+          <a:p>
+            <a:pPr>
+              <a:lnSpc>
+                <a:spcPct val="100000"/>
+              </a:lnSpc>
+              <a:spcBef>
+                <a:spcPts val="200"/>
+              </a:spcBef>
+            </a:pPr>
+            <a:r>
+              <a:rPr lang="en-US" dirty="0" smtClean="0"/>
+              <a:t>Many problems are identified through the process of formalization, before analysis</a:t>
+            </a:r>
+          </a:p>
+          <a:p>
+            <a:pPr>
+              <a:lnSpc>
+                <a:spcPct val="100000"/>
+              </a:lnSpc>
+              <a:spcBef>
+                <a:spcPts val="200"/>
+              </a:spcBef>
+            </a:pPr>
+            <a:r>
+              <a:rPr lang="en-US" dirty="0" smtClean="0"/>
+              <a:t>Data types (or an ontology), ports, and connections can be automatically extracted from code (with some moderate up front work)</a:t>
+            </a:r>
+          </a:p>
+          <a:p>
+            <a:pPr>
+              <a:lnSpc>
+                <a:spcPct val="100000"/>
+              </a:lnSpc>
+              <a:spcBef>
+                <a:spcPts val="200"/>
+              </a:spcBef>
+            </a:pPr>
+            <a:r>
+              <a:rPr lang="en-US" dirty="0" smtClean="0"/>
+              <a:t>Reusable (template) properties help find common mistakes</a:t>
+            </a:r>
+          </a:p>
+          <a:p>
+            <a:pPr>
+              <a:lnSpc>
+                <a:spcPct val="100000"/>
+              </a:lnSpc>
+              <a:spcBef>
+                <a:spcPts val="200"/>
+              </a:spcBef>
+            </a:pPr>
+            <a:r>
+              <a:rPr lang="en-US" dirty="0" smtClean="0"/>
+              <a:t>Not every error can be detected with a template property--a review of the specification itself is still worthwhile</a:t>
+            </a:r>
+          </a:p>
+          <a:p>
+            <a:pPr>
+              <a:lnSpc>
+                <a:spcPct val="100000"/>
+              </a:lnSpc>
+              <a:spcBef>
+                <a:spcPts val="200"/>
+              </a:spcBef>
+            </a:pPr>
+            <a:r>
+              <a:rPr lang="en-US" dirty="0" smtClean="0"/>
+              <a:t>Assurance arguments are useful to capture the “rest of the story”</a:t>
+            </a:r>
+          </a:p>
+          <a:p>
+            <a:pPr>
+              <a:lnSpc>
+                <a:spcPct val="100000"/>
+              </a:lnSpc>
+              <a:spcBef>
+                <a:spcPts val="200"/>
+              </a:spcBef>
+            </a:pPr>
+            <a:r>
+              <a:rPr lang="en-US" dirty="0" smtClean="0"/>
+              <a:t>SpeAR, ASSERT, AADL/AGREE, and </a:t>
+            </a:r>
+            <a:r>
+              <a:rPr lang="en-US" dirty="0" err="1" smtClean="0"/>
+              <a:t>QVtrace</a:t>
+            </a:r>
+            <a:r>
+              <a:rPr lang="en-US" dirty="0" smtClean="0"/>
+              <a:t> are all very capable analysis tools. There are synergies between them.</a:t>
+            </a:r>
+          </a:p>
+          <a:p>
+            <a:pPr>
+              <a:lnSpc>
+                <a:spcPct val="100000"/>
+              </a:lnSpc>
+              <a:spcBef>
+                <a:spcPts val="200"/>
+              </a:spcBef>
+            </a:pPr>
+            <a:r>
+              <a:rPr lang="en-US" dirty="0" smtClean="0"/>
+              <a:t>Challenges: arrays, inheritance</a:t>
+            </a:r>
+          </a:p>
+          <a:p>
+            <a:pPr>
+              <a:lnSpc>
+                <a:spcPct val="100000"/>
+              </a:lnSpc>
+              <a:spcBef>
+                <a:spcPts val="200"/>
+              </a:spcBef>
+            </a:pPr>
+            <a:endParaRPr lang="en-US" dirty="0" smtClean="0"/>
+          </a:p>
+          <a:p>
+            <a:endParaRPr lang="en-US" dirty="0"/>
+          </a:p>
+        </p:txBody>
+      </p:sp>
+      <p:sp>
+        <p:nvSpPr>
+          <p:cNvPr id="6" name="Footer Placeholder 5"/>
+          <p:cNvSpPr>
+            <a:spLocks noGrp="1"/>
+          </p:cNvSpPr>
+          <p:nvPr>
+            <p:ph type="ftr" sz="quarter" idx="11"/>
+          </p:nvPr>
+        </p:nvSpPr>
+        <p:spPr/>
+        <p:txBody>
+          <a:bodyPr/>
+          <a:lstStyle/>
+          <a:p>
+            <a:r>
+              <a:rPr lang="en-US" smtClean="0"/>
+              <a:t>Architecture Group</a:t>
+            </a:r>
+            <a:endParaRPr lang="en-US"/>
+          </a:p>
+        </p:txBody>
+      </p:sp>
+    </p:spTree>
+    <p:extLst>
+      <p:ext uri="{BB962C8B-B14F-4D97-AF65-F5344CB8AC3E}">
+        <p14:creationId xmlns:p14="http://schemas.microsoft.com/office/powerpoint/2010/main" val="3123488723"/>
+      </p:ext>
+    </p:extLst>
+  </p:cSld>
+  <p:clrMapOvr>
+    <a:masterClrMapping/>
+  </p:clrMapOvr>
+  <mc:AlternateContent xmlns:mc="http://schemas.openxmlformats.org/markup-compatibility/2006" xmlns:p14="http://schemas.microsoft.com/office/powerpoint/2010/main">
+    <mc:Choice Requires="p14">
+      <p:transition spd="slow" p14:dur="2000"/>
+    </mc:Choice>
+    <mc:Fallback xmlns="">
+      <p:transition spd="slow"/>
+    </mc:Fallback>
+  </mc:AlternateContent>
+  <p:timing>
+    <p:tnLst>
+      <p:par>
+        <p:cTn id="1" dur="indefinite" restart="never" nodeType="tmRoot"/>
+      </p:par>
+    </p:tnLst>
+  </p:timing>
+</p:sld>
+</file>
+
 <file path=ppt/slides/slide34.xml><?xml version="1.0" encoding="utf-8"?>
 <p:sld xmlns:a="http://schemas.openxmlformats.org/drawingml/2006/main" xmlns:r="http://schemas.openxmlformats.org/officeDocument/2006/relationships" xmlns:p="http://schemas.openxmlformats.org/presentationml/2006/main">
   <p:cSld>
@@ -21818,7 +21939,7 @@
           <a:p>
             <a:r>
               <a:rPr lang="en-US" dirty="0" smtClean="0"/>
-              <a:t>Lessons Learned</a:t>
+              <a:t>Recommended Future Directions</a:t>
             </a:r>
             <a:endParaRPr lang="en-US" dirty="0"/>
           </a:p>
@@ -21836,9 +21957,7 @@
         </p:nvSpPr>
         <p:spPr/>
         <p:txBody>
-          <a:bodyPr>
-            <a:normAutofit lnSpcReduction="10000"/>
-          </a:bodyPr>
+          <a:bodyPr/>
           <a:lstStyle/>
           <a:p>
             <a:pPr>
@@ -21851,7 +21970,7 @@
             </a:pPr>
             <a:r>
               <a:rPr lang="en-US" dirty="0" smtClean="0"/>
-              <a:t>Many problems are identified through the process of formalization, before analysis</a:t>
+              <a:t>Write contracts for the remaining thirty-one components</a:t>
             </a:r>
           </a:p>
           <a:p>
@@ -21863,10 +21982,7 @@
                 <a:spcPts val="200"/>
               </a:spcBef>
             </a:pPr>
-            <a:r>
-              <a:rPr lang="en-US" dirty="0" smtClean="0"/>
-              <a:t>Data types (or an ontology), ports, and connections can be automatically extracted from code (with some moderate up front work)</a:t>
-            </a:r>
+            <a:endParaRPr lang="en-US" dirty="0" smtClean="0"/>
           </a:p>
           <a:p>
             <a:pPr>
@@ -21879,7 +21995,7 @@
             </a:pPr>
             <a:r>
               <a:rPr lang="en-US" dirty="0" smtClean="0"/>
-              <a:t>Reusable (template) properties help find common mistakes</a:t>
+              <a:t>State/compose and analyze system-level properties (in progress)</a:t>
             </a:r>
           </a:p>
           <a:p>
@@ -21891,10 +22007,7 @@
                 <a:spcPts val="200"/>
               </a:spcBef>
             </a:pPr>
-            <a:r>
-              <a:rPr lang="en-US" dirty="0" smtClean="0"/>
-              <a:t>Not every error can be detected with a template property--a review of the specification itself is still worthwhile</a:t>
-            </a:r>
+            <a:endParaRPr lang="en-US" dirty="0" smtClean="0"/>
           </a:p>
           <a:p>
             <a:pPr>
@@ -21907,7 +22020,7 @@
             </a:pPr>
             <a:r>
               <a:rPr lang="en-US" dirty="0" smtClean="0"/>
-              <a:t>Assurance arguments are useful to capture the “rest of the story”</a:t>
+              <a:t>Generate code from AADL</a:t>
             </a:r>
           </a:p>
           <a:p>
@@ -21919,18 +22032,7 @@
                 <a:spcPts val="200"/>
               </a:spcBef>
             </a:pPr>
-            <a:r>
-              <a:rPr lang="en-US" dirty="0" smtClean="0"/>
-              <a:t>SpeAR, ASSERT, AADL/AGREE, and </a:t>
-            </a:r>
-            <a:r>
-              <a:rPr lang="en-US" dirty="0" err="1" smtClean="0"/>
-              <a:t>QVtrace</a:t>
-            </a:r>
-            <a:r>
-              <a:rPr lang="en-US" dirty="0" smtClean="0"/>
-              <a:t> are all very capable analysis tools. There are synergies between them.</a:t>
-            </a:r>
+            <a:endParaRPr lang="en-US" dirty="0" smtClean="0"/>
           </a:p>
           <a:p>
             <a:pPr>
@@ -21943,8 +22045,63 @@
             </a:pPr>
             <a:r>
               <a:rPr lang="en-US" dirty="0" smtClean="0"/>
-              <a:t>Challenges: arrays, inheritance</a:t>
-            </a:r>
+              <a:t>Generate test cases from AGREE and run on </a:t>
+            </a:r>
+            <a:r>
+              <a:rPr lang="en-US" dirty="0" err="1" smtClean="0"/>
+              <a:t>UxAS</a:t>
+            </a:r>
+            <a:r>
+              <a:rPr lang="en-US" dirty="0" smtClean="0"/>
+              <a:t> implementation</a:t>
+            </a:r>
+          </a:p>
+          <a:p>
+            <a:pPr>
+              <a:lnSpc>
+                <a:spcPct val="100000"/>
+              </a:lnSpc>
+              <a:spcBef>
+                <a:spcPts val="200"/>
+              </a:spcBef>
+            </a:pPr>
+            <a:endParaRPr lang="en-US" dirty="0" smtClean="0"/>
+          </a:p>
+          <a:p>
+            <a:pPr>
+              <a:lnSpc>
+                <a:spcPct val="100000"/>
+              </a:lnSpc>
+              <a:spcBef>
+                <a:spcPts val="200"/>
+              </a:spcBef>
+            </a:pPr>
+            <a:r>
+              <a:rPr lang="en-US" dirty="0" smtClean="0"/>
+              <a:t>Continue documenting decisions and the assurance case for the architecture</a:t>
+            </a:r>
+          </a:p>
+          <a:p>
+            <a:pPr>
+              <a:lnSpc>
+                <a:spcPct val="100000"/>
+              </a:lnSpc>
+              <a:spcBef>
+                <a:spcPts val="200"/>
+              </a:spcBef>
+            </a:pPr>
+            <a:endParaRPr lang="en-US" dirty="0" smtClean="0"/>
+          </a:p>
+          <a:p>
+            <a:pPr>
+              <a:lnSpc>
+                <a:spcPct val="100000"/>
+              </a:lnSpc>
+              <a:spcBef>
+                <a:spcPts val="200"/>
+              </a:spcBef>
+            </a:pPr>
+            <a:endParaRPr lang="en-US" dirty="0" smtClean="0"/>
           </a:p>
           <a:p>
             <a:pPr>
@@ -21988,7 +22145,7 @@
     </p:spTree>
     <p:extLst>
       <p:ext uri="{BB962C8B-B14F-4D97-AF65-F5344CB8AC3E}">
-        <p14:creationId xmlns:p14="http://schemas.microsoft.com/office/powerpoint/2010/main" val="3123488723"/>
+        <p14:creationId xmlns:p14="http://schemas.microsoft.com/office/powerpoint/2010/main" val="2472667537"/>
       </p:ext>
     </p:extLst>
   </p:cSld>
@@ -22032,271 +22189,6 @@
       </p:grpSpPr>
       <p:sp>
         <p:nvSpPr>
-          <p:cNvPr id="2" name="Title 1"/>
-          <p:cNvSpPr>
-            <a:spLocks noGrp="1"/>
-          </p:cNvSpPr>
-          <p:nvPr>
-            <p:ph type="title"/>
-          </p:nvPr>
-        </p:nvSpPr>
-        <p:spPr/>
-        <p:txBody>
-          <a:bodyPr/>
-          <a:lstStyle/>
-          <a:p>
-            <a:r>
-              <a:rPr lang="en-US" dirty="0" smtClean="0"/>
-              <a:t>Recommended Future Directions</a:t>
-            </a:r>
-            <a:endParaRPr lang="en-US" dirty="0"/>
-          </a:p>
-        </p:txBody>
-      </p:sp>
-      <p:sp>
-        <p:nvSpPr>
-          <p:cNvPr id="3" name="Content Placeholder 2"/>
-          <p:cNvSpPr>
-            <a:spLocks noGrp="1"/>
-          </p:cNvSpPr>
-          <p:nvPr>
-            <p:ph idx="1"/>
-          </p:nvPr>
-        </p:nvSpPr>
-        <p:spPr/>
-        <p:txBody>
-          <a:bodyPr/>
-          <a:lstStyle/>
-          <a:p>
-            <a:pPr>
-              <a:lnSpc>
-                <a:spcPct val="100000"/>
-              </a:lnSpc>
-              <a:spcBef>
-                <a:spcPts val="200"/>
-              </a:spcBef>
-            </a:pPr>
-            <a:r>
-              <a:rPr lang="en-US" dirty="0" smtClean="0"/>
-              <a:t>Write contracts for the remaining thirty-one components</a:t>
-            </a:r>
-          </a:p>
-          <a:p>
-            <a:pPr>
-              <a:lnSpc>
-                <a:spcPct val="100000"/>
-              </a:lnSpc>
-              <a:spcBef>
-                <a:spcPts val="200"/>
-              </a:spcBef>
-            </a:pPr>
-            <a:endParaRPr lang="en-US" dirty="0" smtClean="0"/>
-          </a:p>
-          <a:p>
-            <a:pPr>
-              <a:lnSpc>
-                <a:spcPct val="100000"/>
-              </a:lnSpc>
-              <a:spcBef>
-                <a:spcPts val="200"/>
-              </a:spcBef>
-            </a:pPr>
-            <a:r>
-              <a:rPr lang="en-US" dirty="0" smtClean="0"/>
-              <a:t>State/compose and analyze system-level properties (in progress)</a:t>
-            </a:r>
-          </a:p>
-          <a:p>
-            <a:pPr>
-              <a:lnSpc>
-                <a:spcPct val="100000"/>
-              </a:lnSpc>
-              <a:spcBef>
-                <a:spcPts val="200"/>
-              </a:spcBef>
-            </a:pPr>
-            <a:endParaRPr lang="en-US" dirty="0" smtClean="0"/>
-          </a:p>
-          <a:p>
-            <a:pPr>
-              <a:lnSpc>
-                <a:spcPct val="100000"/>
-              </a:lnSpc>
-              <a:spcBef>
-                <a:spcPts val="200"/>
-              </a:spcBef>
-            </a:pPr>
-            <a:r>
-              <a:rPr lang="en-US" dirty="0" smtClean="0"/>
-              <a:t>Generate code from AADL</a:t>
-            </a:r>
-          </a:p>
-          <a:p>
-            <a:pPr>
-              <a:lnSpc>
-                <a:spcPct val="100000"/>
-              </a:lnSpc>
-              <a:spcBef>
-                <a:spcPts val="200"/>
-              </a:spcBef>
-            </a:pPr>
-            <a:endParaRPr lang="en-US" dirty="0" smtClean="0"/>
-          </a:p>
-          <a:p>
-            <a:pPr>
-              <a:lnSpc>
-                <a:spcPct val="100000"/>
-              </a:lnSpc>
-              <a:spcBef>
-                <a:spcPts val="200"/>
-              </a:spcBef>
-            </a:pPr>
-            <a:r>
-              <a:rPr lang="en-US" dirty="0" smtClean="0"/>
-              <a:t>Generate test cases from AGREE and run on </a:t>
-            </a:r>
-            <a:r>
-              <a:rPr lang="en-US" dirty="0" err="1" smtClean="0"/>
-              <a:t>UxAS</a:t>
-            </a:r>
-            <a:r>
-              <a:rPr lang="en-US" dirty="0" smtClean="0"/>
-              <a:t> implementation</a:t>
-            </a:r>
-          </a:p>
-          <a:p>
-            <a:pPr>
-              <a:lnSpc>
-                <a:spcPct val="100000"/>
-              </a:lnSpc>
-              <a:spcBef>
-                <a:spcPts val="200"/>
-              </a:spcBef>
-            </a:pPr>
-            <a:endParaRPr lang="en-US" dirty="0" smtClean="0"/>
-          </a:p>
-          <a:p>
-            <a:pPr>
-              <a:lnSpc>
-                <a:spcPct val="100000"/>
-              </a:lnSpc>
-              <a:spcBef>
-                <a:spcPts val="200"/>
-              </a:spcBef>
-            </a:pPr>
-            <a:r>
-              <a:rPr lang="en-US" dirty="0" smtClean="0"/>
-              <a:t>Continue documenting decisions and the assurance case for the architecture</a:t>
-            </a:r>
-          </a:p>
-          <a:p>
-            <a:pPr>
-              <a:lnSpc>
-                <a:spcPct val="100000"/>
-              </a:lnSpc>
-              <a:spcBef>
-                <a:spcPts val="200"/>
-              </a:spcBef>
-            </a:pPr>
-            <a:endParaRPr lang="en-US" dirty="0" smtClean="0"/>
-          </a:p>
-          <a:p>
-            <a:pPr>
-              <a:lnSpc>
-                <a:spcPct val="100000"/>
-              </a:lnSpc>
-              <a:spcBef>
-                <a:spcPts val="200"/>
-              </a:spcBef>
-            </a:pPr>
-            <a:endParaRPr lang="en-US" dirty="0" smtClean="0"/>
-          </a:p>
-          <a:p>
-            <a:pPr>
-              <a:lnSpc>
-                <a:spcPct val="100000"/>
-              </a:lnSpc>
-              <a:spcBef>
-                <a:spcPts val="200"/>
-              </a:spcBef>
-            </a:pPr>
-            <a:endParaRPr lang="en-US" dirty="0" smtClean="0"/>
-          </a:p>
-          <a:p>
-            <a:endParaRPr lang="en-US" dirty="0"/>
-          </a:p>
-        </p:txBody>
-      </p:sp>
-      <p:sp>
-        <p:nvSpPr>
-          <p:cNvPr id="6" name="Footer Placeholder 5"/>
-          <p:cNvSpPr>
-            <a:spLocks noGrp="1"/>
-          </p:cNvSpPr>
-          <p:nvPr>
-            <p:ph type="ftr" sz="quarter" idx="11"/>
-          </p:nvPr>
-        </p:nvSpPr>
-        <p:spPr/>
-        <p:txBody>
-          <a:bodyPr/>
-          <a:lstStyle/>
-          <a:p>
-            <a:r>
-              <a:rPr lang="en-US" smtClean="0"/>
-              <a:t>Architecture Group</a:t>
-            </a:r>
-            <a:endParaRPr lang="en-US"/>
-          </a:p>
-        </p:txBody>
-      </p:sp>
-    </p:spTree>
-    <p:extLst>
-      <p:ext uri="{BB962C8B-B14F-4D97-AF65-F5344CB8AC3E}">
-        <p14:creationId xmlns:p14="http://schemas.microsoft.com/office/powerpoint/2010/main" val="2472667537"/>
-      </p:ext>
-    </p:extLst>
-  </p:cSld>
-  <p:clrMapOvr>
-    <a:masterClrMapping/>
-  </p:clrMapOvr>
-  <mc:AlternateContent xmlns:mc="http://schemas.openxmlformats.org/markup-compatibility/2006" xmlns:p14="http://schemas.microsoft.com/office/powerpoint/2010/main">
-    <mc:Choice Requires="p14">
-      <p:transition spd="slow" p14:dur="2000"/>
-    </mc:Choice>
-    <mc:Fallback xmlns="">
-      <p:transition spd="slow"/>
-    </mc:Fallback>
-  </mc:AlternateContent>
-  <p:timing>
-    <p:tnLst>
-      <p:par>
-        <p:cTn id="1" dur="indefinite" restart="never" nodeType="tmRoot"/>
-      </p:par>
-    </p:tnLst>
-  </p:timing>
-</p:sld>
-</file>
-
-<file path=ppt/slides/slide36.xml><?xml version="1.0" encoding="utf-8"?>
-<p:sld xmlns:a="http://schemas.openxmlformats.org/drawingml/2006/main" xmlns:r="http://schemas.openxmlformats.org/officeDocument/2006/relationships" xmlns:p="http://schemas.openxmlformats.org/presentationml/2006/main">
-  <p:cSld>
-    <p:spTree>
-      <p:nvGrpSpPr>
-        <p:cNvPr id="1" name=""/>
-        <p:cNvGrpSpPr/>
-        <p:nvPr/>
-      </p:nvGrpSpPr>
-      <p:grpSpPr>
-        <a:xfrm>
-          <a:off x="0" y="0"/>
-          <a:ext cx="0" cy="0"/>
-          <a:chOff x="0" y="0"/>
-          <a:chExt cx="0" cy="0"/>
-        </a:xfrm>
-      </p:grpSpPr>
-      <p:sp>
-        <p:nvSpPr>
           <p:cNvPr id="4" name="Title 3"/>
           <p:cNvSpPr>
             <a:spLocks noGrp="1"/>
@@ -22365,7 +22257,7 @@
 </p:sld>
 </file>
 
-<file path=ppt/slides/slide37.xml><?xml version="1.0" encoding="utf-8"?>
+<file path=ppt/slides/slide36.xml><?xml version="1.0" encoding="utf-8"?>
 <p:sld xmlns:a="http://schemas.openxmlformats.org/drawingml/2006/main" xmlns:r="http://schemas.openxmlformats.org/officeDocument/2006/relationships" xmlns:p="http://schemas.openxmlformats.org/presentationml/2006/main">
   <p:cSld>
     <p:spTree>
@@ -23839,7 +23731,7 @@
 </p:sld>
 </file>
 
-<file path=ppt/slides/slide38.xml><?xml version="1.0" encoding="utf-8"?>
+<file path=ppt/slides/slide37.xml><?xml version="1.0" encoding="utf-8"?>
 <p:sld xmlns:a="http://schemas.openxmlformats.org/drawingml/2006/main" xmlns:r="http://schemas.openxmlformats.org/officeDocument/2006/relationships" xmlns:p="http://schemas.openxmlformats.org/presentationml/2006/main">
   <p:cSld>
     <p:spTree>
@@ -24132,6 +24024,325 @@
     <p:bldLst>
       <p:bldP spid="6" grpId="0" animBg="1"/>
     </p:bldLst>
+  </p:timing>
+</p:sld>
+</file>
+
+<file path=ppt/slides/slide38.xml><?xml version="1.0" encoding="utf-8"?>
+<p:sld xmlns:a="http://schemas.openxmlformats.org/drawingml/2006/main" xmlns:r="http://schemas.openxmlformats.org/officeDocument/2006/relationships" xmlns:p="http://schemas.openxmlformats.org/presentationml/2006/main">
+  <p:cSld>
+    <p:spTree>
+      <p:nvGrpSpPr>
+        <p:cNvPr id="1" name=""/>
+        <p:cNvGrpSpPr/>
+        <p:nvPr/>
+      </p:nvGrpSpPr>
+      <p:grpSpPr>
+        <a:xfrm>
+          <a:off x="0" y="0"/>
+          <a:ext cx="0" cy="0"/>
+          <a:chOff x="0" y="0"/>
+          <a:chExt cx="0" cy="0"/>
+        </a:xfrm>
+      </p:grpSpPr>
+      <p:sp>
+        <p:nvSpPr>
+          <p:cNvPr id="2" name="Title 1"/>
+          <p:cNvSpPr>
+            <a:spLocks noGrp="1"/>
+          </p:cNvSpPr>
+          <p:nvPr>
+            <p:ph type="title"/>
+          </p:nvPr>
+        </p:nvSpPr>
+        <p:spPr/>
+        <p:txBody>
+          <a:bodyPr/>
+          <a:lstStyle/>
+          <a:p>
+            <a:r>
+              <a:rPr lang="en-US" dirty="0" smtClean="0"/>
+              <a:t>Argument-Derived Observations</a:t>
+            </a:r>
+            <a:endParaRPr lang="en-US" dirty="0"/>
+          </a:p>
+        </p:txBody>
+      </p:sp>
+      <p:sp>
+        <p:nvSpPr>
+          <p:cNvPr id="3" name="Content Placeholder 2"/>
+          <p:cNvSpPr>
+            <a:spLocks noGrp="1"/>
+          </p:cNvSpPr>
+          <p:nvPr>
+            <p:ph idx="1"/>
+          </p:nvPr>
+        </p:nvSpPr>
+        <p:spPr/>
+        <p:txBody>
+          <a:bodyPr>
+            <a:normAutofit lnSpcReduction="10000"/>
+          </a:bodyPr>
+          <a:lstStyle/>
+          <a:p>
+            <a:r>
+              <a:rPr lang="en-US" dirty="0"/>
+              <a:t>Best practices/standards for AADL/AGREE use are needed</a:t>
+            </a:r>
+          </a:p>
+          <a:p>
+            <a:pPr lvl="1"/>
+            <a:r>
+              <a:rPr lang="en-US" dirty="0"/>
+              <a:t>Situate proofs within modeling fault analysis/mitigation</a:t>
+            </a:r>
+          </a:p>
+          <a:p>
+            <a:pPr lvl="1"/>
+            <a:r>
+              <a:rPr lang="en-US" dirty="0"/>
+              <a:t>Supports arguments that the set of lemmas are complete and correct</a:t>
+            </a:r>
+          </a:p>
+          <a:p>
+            <a:r>
+              <a:rPr lang="en-US" dirty="0"/>
+              <a:t>Additional tool support to reduce human error</a:t>
+            </a:r>
+          </a:p>
+          <a:p>
+            <a:pPr lvl="1"/>
+            <a:r>
+              <a:rPr lang="en-US" dirty="0"/>
+              <a:t>E.g., </a:t>
+            </a:r>
+            <a:r>
+              <a:rPr lang="en-US" dirty="0" smtClean="0"/>
+              <a:t>lemmas </a:t>
+            </a:r>
+            <a:r>
+              <a:rPr lang="en-US" dirty="0"/>
+              <a:t>and repetitive infrastructure are developed manually</a:t>
+            </a:r>
+          </a:p>
+          <a:p>
+            <a:pPr lvl="1"/>
+            <a:r>
+              <a:rPr lang="en-US" dirty="0"/>
+              <a:t>Minimize repetitive concerns in the argument about human error</a:t>
+            </a:r>
+          </a:p>
+          <a:p>
+            <a:r>
+              <a:rPr lang="en-US" dirty="0"/>
+              <a:t>Enhanced integration between AADL and AGREE </a:t>
+            </a:r>
+          </a:p>
+          <a:p>
+            <a:pPr lvl="1"/>
+            <a:r>
+              <a:rPr lang="en-US" dirty="0"/>
+              <a:t>Minimize repetitive arguments about AADL and AGREE consistency/agreement</a:t>
+            </a:r>
+          </a:p>
+          <a:p>
+            <a:r>
+              <a:rPr lang="en-US" dirty="0"/>
+              <a:t>A simpler higher-level protocol state machine spec for validation</a:t>
+            </a:r>
+          </a:p>
+          <a:p>
+            <a:pPr lvl="1"/>
+            <a:r>
+              <a:rPr lang="en-US" dirty="0"/>
+              <a:t>Provide a structure to validate against</a:t>
+            </a:r>
+          </a:p>
+          <a:p>
+            <a:pPr lvl="1"/>
+            <a:r>
+              <a:rPr lang="en-US" dirty="0"/>
+              <a:t>Simplify validation activity and simplify validation </a:t>
+            </a:r>
+            <a:r>
+              <a:rPr lang="en-US" dirty="0" smtClean="0"/>
+              <a:t>arguments</a:t>
+            </a:r>
+            <a:endParaRPr lang="en-US" dirty="0"/>
+          </a:p>
+        </p:txBody>
+      </p:sp>
+      <p:sp>
+        <p:nvSpPr>
+          <p:cNvPr id="5" name="Footer Placeholder 3"/>
+          <p:cNvSpPr txBox="1">
+            <a:spLocks/>
+          </p:cNvSpPr>
+          <p:nvPr/>
+        </p:nvSpPr>
+        <p:spPr>
+          <a:xfrm>
+            <a:off x="102476" y="6437441"/>
+            <a:ext cx="4532586" cy="306936"/>
+          </a:xfrm>
+          <a:prstGeom prst="rect">
+            <a:avLst/>
+          </a:prstGeom>
+        </p:spPr>
+        <p:txBody>
+          <a:bodyPr vert="horz" lIns="91440" tIns="45720" rIns="91440" bIns="45720" rtlCol="0" anchor="ctr"/>
+          <a:lstStyle>
+            <a:defPPr>
+              <a:defRPr lang="en-US"/>
+            </a:defPPr>
+            <a:lvl1pPr marL="0" algn="ctr" defTabSz="914400" rtl="0" eaLnBrk="1" latinLnBrk="0" hangingPunct="1">
+              <a:defRPr sz="1400" kern="1200">
+                <a:solidFill>
+                  <a:srgbClr val="000000"/>
+                </a:solidFill>
+                <a:latin typeface="+mn-lt"/>
+                <a:ea typeface="+mn-ea"/>
+                <a:cs typeface="+mn-cs"/>
+              </a:defRPr>
+            </a:lvl1pPr>
+            <a:lvl2pPr marL="457200" algn="l" defTabSz="914400" rtl="0" eaLnBrk="1" latinLnBrk="0" hangingPunct="1">
+              <a:defRPr sz="1800" kern="1200">
+                <a:solidFill>
+                  <a:schemeClr val="tx1"/>
+                </a:solidFill>
+                <a:latin typeface="+mn-lt"/>
+                <a:ea typeface="+mn-ea"/>
+                <a:cs typeface="+mn-cs"/>
+              </a:defRPr>
+            </a:lvl2pPr>
+            <a:lvl3pPr marL="914400" algn="l" defTabSz="914400" rtl="0" eaLnBrk="1" latinLnBrk="0" hangingPunct="1">
+              <a:defRPr sz="1800" kern="1200">
+                <a:solidFill>
+                  <a:schemeClr val="tx1"/>
+                </a:solidFill>
+                <a:latin typeface="+mn-lt"/>
+                <a:ea typeface="+mn-ea"/>
+                <a:cs typeface="+mn-cs"/>
+              </a:defRPr>
+            </a:lvl3pPr>
+            <a:lvl4pPr marL="1371600" algn="l" defTabSz="914400" rtl="0" eaLnBrk="1" latinLnBrk="0" hangingPunct="1">
+              <a:defRPr sz="1800" kern="1200">
+                <a:solidFill>
+                  <a:schemeClr val="tx1"/>
+                </a:solidFill>
+                <a:latin typeface="+mn-lt"/>
+                <a:ea typeface="+mn-ea"/>
+                <a:cs typeface="+mn-cs"/>
+              </a:defRPr>
+            </a:lvl4pPr>
+            <a:lvl5pPr marL="1828800" algn="l" defTabSz="914400" rtl="0" eaLnBrk="1" latinLnBrk="0" hangingPunct="1">
+              <a:defRPr sz="1800" kern="1200">
+                <a:solidFill>
+                  <a:schemeClr val="tx1"/>
+                </a:solidFill>
+                <a:latin typeface="+mn-lt"/>
+                <a:ea typeface="+mn-ea"/>
+                <a:cs typeface="+mn-cs"/>
+              </a:defRPr>
+            </a:lvl5pPr>
+            <a:lvl6pPr marL="2286000" algn="l" defTabSz="914400" rtl="0" eaLnBrk="1" latinLnBrk="0" hangingPunct="1">
+              <a:defRPr sz="1800" kern="1200">
+                <a:solidFill>
+                  <a:schemeClr val="tx1"/>
+                </a:solidFill>
+                <a:latin typeface="+mn-lt"/>
+                <a:ea typeface="+mn-ea"/>
+                <a:cs typeface="+mn-cs"/>
+              </a:defRPr>
+            </a:lvl6pPr>
+            <a:lvl7pPr marL="2743200" algn="l" defTabSz="914400" rtl="0" eaLnBrk="1" latinLnBrk="0" hangingPunct="1">
+              <a:defRPr sz="1800" kern="1200">
+                <a:solidFill>
+                  <a:schemeClr val="tx1"/>
+                </a:solidFill>
+                <a:latin typeface="+mn-lt"/>
+                <a:ea typeface="+mn-ea"/>
+                <a:cs typeface="+mn-cs"/>
+              </a:defRPr>
+            </a:lvl7pPr>
+            <a:lvl8pPr marL="3200400" algn="l" defTabSz="914400" rtl="0" eaLnBrk="1" latinLnBrk="0" hangingPunct="1">
+              <a:defRPr sz="1800" kern="1200">
+                <a:solidFill>
+                  <a:schemeClr val="tx1"/>
+                </a:solidFill>
+                <a:latin typeface="+mn-lt"/>
+                <a:ea typeface="+mn-ea"/>
+                <a:cs typeface="+mn-cs"/>
+              </a:defRPr>
+            </a:lvl8pPr>
+            <a:lvl9pPr marL="3657600" algn="l" defTabSz="914400" rtl="0" eaLnBrk="1" latinLnBrk="0" hangingPunct="1">
+              <a:defRPr sz="1800" kern="1200">
+                <a:solidFill>
+                  <a:schemeClr val="tx1"/>
+                </a:solidFill>
+                <a:latin typeface="+mn-lt"/>
+                <a:ea typeface="+mn-ea"/>
+                <a:cs typeface="+mn-cs"/>
+              </a:defRPr>
+            </a:lvl9pPr>
+          </a:lstStyle>
+          <a:p>
+            <a:pPr algn="l"/>
+            <a:r>
+              <a:rPr lang="en-US" dirty="0" smtClean="0"/>
+              <a:t>Dependable Computing</a:t>
+            </a:r>
+            <a:endParaRPr lang="en-US" dirty="0"/>
+          </a:p>
+        </p:txBody>
+      </p:sp>
+      <p:sp>
+        <p:nvSpPr>
+          <p:cNvPr id="7" name="Footer Placeholder 6"/>
+          <p:cNvSpPr>
+            <a:spLocks noGrp="1"/>
+          </p:cNvSpPr>
+          <p:nvPr>
+            <p:ph type="ftr" sz="quarter" idx="11"/>
+          </p:nvPr>
+        </p:nvSpPr>
+        <p:spPr/>
+        <p:txBody>
+          <a:bodyPr/>
+          <a:lstStyle/>
+          <a:p>
+            <a:r>
+              <a:rPr lang="en-US" smtClean="0"/>
+              <a:t>Architecture Group</a:t>
+            </a:r>
+            <a:endParaRPr lang="en-US"/>
+          </a:p>
+        </p:txBody>
+      </p:sp>
+    </p:spTree>
+    <p:extLst>
+      <p:ext uri="{BB962C8B-B14F-4D97-AF65-F5344CB8AC3E}">
+        <p14:creationId xmlns:p14="http://schemas.microsoft.com/office/powerpoint/2010/main" val="1512231083"/>
+      </p:ext>
+    </p:extLst>
+  </p:cSld>
+  <p:clrMapOvr>
+    <a:masterClrMapping/>
+  </p:clrMapOvr>
+  <mc:AlternateContent xmlns:mc="http://schemas.openxmlformats.org/markup-compatibility/2006" xmlns:p14="http://schemas.microsoft.com/office/powerpoint/2010/main">
+    <mc:Choice Requires="p14">
+      <p:transition spd="slow" p14:dur="2000"/>
+    </mc:Choice>
+    <mc:Fallback xmlns="">
+      <p:transition spd="slow"/>
+    </mc:Fallback>
+  </mc:AlternateContent>
+  <p:timing>
+    <p:tnLst>
+      <p:par>
+        <p:cTn id="1" dur="indefinite" restart="never" nodeType="tmRoot"/>
+      </p:par>
+    </p:tnLst>
   </p:timing>
 </p:sld>
 </file>
@@ -26048,15 +26259,7 @@
                   <a:srgbClr val="0000FF"/>
                 </a:solidFill>
               </a:rPr>
-              <a:t>(AFRL/LQ, </a:t>
-            </a:r>
-            <a:r>
-              <a:rPr lang="en-US" dirty="0" smtClean="0">
-                <a:solidFill>
-                  <a:srgbClr val="0000FF"/>
-                </a:solidFill>
-              </a:rPr>
-              <a:t>RC</a:t>
+              <a:t>(AFRL/LQ, RC</a:t>
             </a:r>
             <a:r>
               <a:rPr lang="en-US" dirty="0">
@@ -26103,21 +26306,8 @@
                   <a:srgbClr val="0000FF"/>
                 </a:solidFill>
               </a:rPr>
-              <a:t>(DC, RC, </a:t>
-            </a:r>
-            <a:r>
-              <a:rPr lang="en-US" dirty="0" smtClean="0">
-                <a:solidFill>
-                  <a:srgbClr val="0000FF"/>
-                </a:solidFill>
-              </a:rPr>
-              <a:t>LQ)</a:t>
-            </a:r>
-            <a:endParaRPr lang="en-US" dirty="0" smtClean="0">
-              <a:solidFill>
-                <a:srgbClr val="0000FF"/>
-              </a:solidFill>
-            </a:endParaRPr>
+              <a:t>(DC, RC, LQ)</a:t>
+            </a:r>
           </a:p>
           <a:p>
             <a:pPr lvl="1" fontAlgn="base"/>
@@ -26131,21 +26321,8 @@
                   <a:srgbClr val="0000FF"/>
                 </a:solidFill>
               </a:rPr>
-              <a:t>(DC, </a:t>
-            </a:r>
-            <a:r>
-              <a:rPr lang="en-US" dirty="0" smtClean="0">
-                <a:solidFill>
-                  <a:srgbClr val="0000FF"/>
-                </a:solidFill>
-              </a:rPr>
-              <a:t>RC, LQ/AFRL)</a:t>
-            </a:r>
-            <a:endParaRPr lang="en-US" dirty="0" smtClean="0">
-              <a:solidFill>
-                <a:srgbClr val="0000FF"/>
-              </a:solidFill>
-            </a:endParaRPr>
+              <a:t>(DC, RC, LQ/AFRL)</a:t>
+            </a:r>
           </a:p>
           <a:p>
             <a:pPr fontAlgn="base"/>

</xml_diff>

<commit_message>
presentation updates - expected final version for S5
</commit_message>
<xml_diff>
--- a/presentations/S5_SoI_Architecture_Group.pptx
+++ b/presentations/S5_SoI_Architecture_Group.pptx
@@ -16,8 +16,8 @@
     <p:sldId id="288" r:id="rId7"/>
     <p:sldId id="323" r:id="rId8"/>
     <p:sldId id="291" r:id="rId9"/>
-    <p:sldId id="332" r:id="rId10"/>
-    <p:sldId id="333" r:id="rId11"/>
+    <p:sldId id="339" r:id="rId10"/>
+    <p:sldId id="338" r:id="rId11"/>
     <p:sldId id="293" r:id="rId12"/>
     <p:sldId id="294" r:id="rId13"/>
     <p:sldId id="324" r:id="rId14"/>
@@ -5817,6 +5817,291 @@
           <a:chExt cx="0" cy="0"/>
         </a:xfrm>
       </p:grpSpPr>
+      <p:grpSp>
+        <p:nvGrpSpPr>
+          <p:cNvPr id="50" name="Group 49"/>
+          <p:cNvGrpSpPr>
+            <a:grpSpLocks noChangeAspect="1"/>
+          </p:cNvGrpSpPr>
+          <p:nvPr/>
+        </p:nvGrpSpPr>
+        <p:grpSpPr>
+          <a:xfrm>
+            <a:off x="7450341" y="4151977"/>
+            <a:ext cx="4609787" cy="1691593"/>
+            <a:chOff x="5240562" y="4325746"/>
+            <a:chExt cx="4936702" cy="1811557"/>
+          </a:xfrm>
+        </p:grpSpPr>
+        <p:sp>
+          <p:nvSpPr>
+            <p:cNvPr id="32" name="Rectangle 31"/>
+            <p:cNvSpPr>
+              <a:spLocks noChangeAspect="1"/>
+            </p:cNvSpPr>
+            <p:nvPr/>
+          </p:nvSpPr>
+          <p:spPr>
+            <a:xfrm>
+              <a:off x="5240562" y="4325746"/>
+              <a:ext cx="4936702" cy="1811557"/>
+            </a:xfrm>
+            <a:prstGeom prst="rect">
+              <a:avLst/>
+            </a:prstGeom>
+            <a:solidFill>
+              <a:schemeClr val="bg1"/>
+            </a:solidFill>
+            <a:ln>
+              <a:solidFill>
+                <a:schemeClr val="tx1"/>
+              </a:solidFill>
+            </a:ln>
+            <a:effectLst>
+              <a:outerShdw blurRad="50800" dist="38100" dir="2700000" algn="tl" rotWithShape="0">
+                <a:prstClr val="black">
+                  <a:alpha val="40000"/>
+                </a:prstClr>
+              </a:outerShdw>
+            </a:effectLst>
+          </p:spPr>
+          <p:style>
+            <a:lnRef idx="2">
+              <a:schemeClr val="accent1">
+                <a:shade val="50000"/>
+              </a:schemeClr>
+            </a:lnRef>
+            <a:fillRef idx="1">
+              <a:schemeClr val="accent1"/>
+            </a:fillRef>
+            <a:effectRef idx="0">
+              <a:schemeClr val="accent1"/>
+            </a:effectRef>
+            <a:fontRef idx="minor">
+              <a:schemeClr val="lt1"/>
+            </a:fontRef>
+          </p:style>
+          <p:txBody>
+            <a:bodyPr rtlCol="0" anchor="ctr"/>
+            <a:lstStyle/>
+            <a:p>
+              <a:pPr algn="ctr"/>
+              <a:endParaRPr lang="en-US">
+                <a:solidFill>
+                  <a:prstClr val="white"/>
+                </a:solidFill>
+              </a:endParaRPr>
+            </a:p>
+          </p:txBody>
+        </p:sp>
+        <p:sp>
+          <p:nvSpPr>
+            <p:cNvPr id="49" name="TextBox 48"/>
+            <p:cNvSpPr txBox="1"/>
+            <p:nvPr/>
+          </p:nvSpPr>
+          <p:spPr>
+            <a:xfrm>
+              <a:off x="6310133" y="4423927"/>
+              <a:ext cx="2797561" cy="400110"/>
+            </a:xfrm>
+            <a:prstGeom prst="rect">
+              <a:avLst/>
+            </a:prstGeom>
+            <a:noFill/>
+          </p:spPr>
+          <p:txBody>
+            <a:bodyPr wrap="none" rtlCol="0">
+              <a:spAutoFit/>
+            </a:bodyPr>
+            <a:lstStyle/>
+            <a:p>
+              <a:r>
+                <a:rPr lang="en-US" sz="2000" b="1" dirty="0" smtClean="0">
+                  <a:solidFill>
+                    <a:prstClr val="black"/>
+                  </a:solidFill>
+                </a:rPr>
+                <a:t>Communication Services</a:t>
+              </a:r>
+              <a:endParaRPr lang="en-US" sz="2000" b="1" dirty="0">
+                <a:solidFill>
+                  <a:prstClr val="black"/>
+                </a:solidFill>
+              </a:endParaRPr>
+            </a:p>
+          </p:txBody>
+        </p:sp>
+      </p:grpSp>
+      <p:pic>
+        <p:nvPicPr>
+          <p:cNvPr id="6" name="Picture 5"/>
+          <p:cNvPicPr>
+            <a:picLocks noChangeAspect="1"/>
+          </p:cNvPicPr>
+          <p:nvPr/>
+        </p:nvPicPr>
+        <p:blipFill>
+          <a:blip r:embed="rId2">
+            <a:extLst>
+              <a:ext uri="{28A0092B-C50C-407E-A947-70E740481C1C}">
+                <a14:useLocalDpi xmlns:a14="http://schemas.microsoft.com/office/drawing/2010/main" val="0"/>
+              </a:ext>
+            </a:extLst>
+          </a:blip>
+          <a:stretch>
+            <a:fillRect/>
+          </a:stretch>
+        </p:blipFill>
+        <p:spPr>
+          <a:xfrm>
+            <a:off x="7570320" y="4619108"/>
+            <a:ext cx="4369827" cy="1066775"/>
+          </a:xfrm>
+          <a:prstGeom prst="rect">
+            <a:avLst/>
+          </a:prstGeom>
+        </p:spPr>
+      </p:pic>
+      <p:grpSp>
+        <p:nvGrpSpPr>
+          <p:cNvPr id="51" name="Group 50"/>
+          <p:cNvGrpSpPr>
+            <a:grpSpLocks noChangeAspect="1"/>
+          </p:cNvGrpSpPr>
+          <p:nvPr/>
+        </p:nvGrpSpPr>
+        <p:grpSpPr>
+          <a:xfrm>
+            <a:off x="7703119" y="2566100"/>
+            <a:ext cx="4357009" cy="1456292"/>
+            <a:chOff x="7872605" y="3317556"/>
+            <a:chExt cx="3896909" cy="1326875"/>
+          </a:xfrm>
+        </p:grpSpPr>
+        <p:sp>
+          <p:nvSpPr>
+            <p:cNvPr id="33" name="Rectangle 32"/>
+            <p:cNvSpPr/>
+            <p:nvPr/>
+          </p:nvSpPr>
+          <p:spPr>
+            <a:xfrm>
+              <a:off x="7872605" y="3317556"/>
+              <a:ext cx="3896909" cy="1326875"/>
+            </a:xfrm>
+            <a:prstGeom prst="rect">
+              <a:avLst/>
+            </a:prstGeom>
+            <a:solidFill>
+              <a:schemeClr val="bg1"/>
+            </a:solidFill>
+            <a:ln>
+              <a:solidFill>
+                <a:schemeClr val="tx1"/>
+              </a:solidFill>
+            </a:ln>
+            <a:effectLst>
+              <a:outerShdw blurRad="50800" dist="38100" dir="2700000" algn="tl" rotWithShape="0">
+                <a:prstClr val="black">
+                  <a:alpha val="40000"/>
+                </a:prstClr>
+              </a:outerShdw>
+            </a:effectLst>
+          </p:spPr>
+          <p:style>
+            <a:lnRef idx="2">
+              <a:schemeClr val="accent1">
+                <a:shade val="50000"/>
+              </a:schemeClr>
+            </a:lnRef>
+            <a:fillRef idx="1">
+              <a:schemeClr val="accent1"/>
+            </a:fillRef>
+            <a:effectRef idx="0">
+              <a:schemeClr val="accent1"/>
+            </a:effectRef>
+            <a:fontRef idx="minor">
+              <a:schemeClr val="lt1"/>
+            </a:fontRef>
+          </p:style>
+          <p:txBody>
+            <a:bodyPr rtlCol="0" anchor="ctr"/>
+            <a:lstStyle/>
+            <a:p>
+              <a:pPr algn="ctr"/>
+              <a:endParaRPr lang="en-US">
+                <a:solidFill>
+                  <a:prstClr val="white"/>
+                </a:solidFill>
+              </a:endParaRPr>
+            </a:p>
+          </p:txBody>
+        </p:sp>
+        <p:sp>
+          <p:nvSpPr>
+            <p:cNvPr id="48" name="TextBox 47"/>
+            <p:cNvSpPr txBox="1"/>
+            <p:nvPr/>
+          </p:nvSpPr>
+          <p:spPr>
+            <a:xfrm>
+              <a:off x="8686851" y="3412385"/>
+              <a:ext cx="2253827" cy="306423"/>
+            </a:xfrm>
+            <a:prstGeom prst="rect">
+              <a:avLst/>
+            </a:prstGeom>
+            <a:noFill/>
+          </p:spPr>
+          <p:txBody>
+            <a:bodyPr wrap="none" rtlCol="0">
+              <a:spAutoFit/>
+            </a:bodyPr>
+            <a:lstStyle/>
+            <a:p>
+              <a:pPr algn="ctr"/>
+              <a:r>
+                <a:rPr lang="en-US" sz="2000" b="1" dirty="0" smtClean="0">
+                  <a:solidFill>
+                    <a:prstClr val="black"/>
+                  </a:solidFill>
+                </a:rPr>
+                <a:t>Logging and Data Services</a:t>
+              </a:r>
+              <a:endParaRPr lang="en-US" sz="2000" b="1" dirty="0">
+                <a:solidFill>
+                  <a:prstClr val="black"/>
+                </a:solidFill>
+              </a:endParaRPr>
+            </a:p>
+          </p:txBody>
+        </p:sp>
+      </p:grpSp>
+      <p:pic>
+        <p:nvPicPr>
+          <p:cNvPr id="5" name="Picture 4"/>
+          <p:cNvPicPr>
+            <a:picLocks noChangeAspect="1"/>
+          </p:cNvPicPr>
+          <p:nvPr/>
+        </p:nvPicPr>
+        <p:blipFill>
+          <a:blip r:embed="rId3"/>
+          <a:stretch>
+            <a:fillRect/>
+          </a:stretch>
+        </p:blipFill>
+        <p:spPr>
+          <a:xfrm>
+            <a:off x="7785039" y="3078298"/>
+            <a:ext cx="4189631" cy="856109"/>
+          </a:xfrm>
+          <a:prstGeom prst="rect">
+            <a:avLst/>
+          </a:prstGeom>
+        </p:spPr>
+      </p:pic>
       <p:sp>
         <p:nvSpPr>
           <p:cNvPr id="9" name="Footer Placeholder 3"/>
@@ -6110,7 +6395,7 @@
             <p:nvPr/>
           </p:nvPicPr>
           <p:blipFill rotWithShape="1">
-            <a:blip r:embed="rId2"/>
+            <a:blip r:embed="rId4"/>
             <a:srcRect t="4780" b="50278"/>
             <a:stretch/>
           </p:blipFill>
@@ -6247,7 +6532,7 @@
             <p:nvPr/>
           </p:nvPicPr>
           <p:blipFill rotWithShape="1">
-            <a:blip r:embed="rId2"/>
+            <a:blip r:embed="rId4"/>
             <a:srcRect t="76457"/>
             <a:stretch/>
           </p:blipFill>
@@ -6290,145 +6575,6 @@
                   </a:solidFill>
                 </a:rPr>
                 <a:t>Data Types</a:t>
-              </a:r>
-              <a:endParaRPr lang="en-US" sz="2000" b="1" dirty="0">
-                <a:solidFill>
-                  <a:prstClr val="black"/>
-                </a:solidFill>
-              </a:endParaRPr>
-            </a:p>
-          </p:txBody>
-        </p:sp>
-      </p:grpSp>
-      <p:grpSp>
-        <p:nvGrpSpPr>
-          <p:cNvPr id="51" name="Group 50"/>
-          <p:cNvGrpSpPr>
-            <a:grpSpLocks noChangeAspect="1"/>
-          </p:cNvGrpSpPr>
-          <p:nvPr/>
-        </p:nvGrpSpPr>
-        <p:grpSpPr>
-          <a:xfrm>
-            <a:off x="7703119" y="2566100"/>
-            <a:ext cx="4357009" cy="1456292"/>
-            <a:chOff x="7872605" y="3317556"/>
-            <a:chExt cx="3896909" cy="1326875"/>
-          </a:xfrm>
-        </p:grpSpPr>
-        <p:sp>
-          <p:nvSpPr>
-            <p:cNvPr id="33" name="Rectangle 32"/>
-            <p:cNvSpPr/>
-            <p:nvPr/>
-          </p:nvSpPr>
-          <p:spPr>
-            <a:xfrm>
-              <a:off x="7872605" y="3317556"/>
-              <a:ext cx="3896909" cy="1326875"/>
-            </a:xfrm>
-            <a:prstGeom prst="rect">
-              <a:avLst/>
-            </a:prstGeom>
-            <a:solidFill>
-              <a:schemeClr val="bg1"/>
-            </a:solidFill>
-            <a:ln>
-              <a:solidFill>
-                <a:schemeClr val="tx1"/>
-              </a:solidFill>
-            </a:ln>
-            <a:effectLst>
-              <a:outerShdw blurRad="50800" dist="38100" dir="2700000" algn="tl" rotWithShape="0">
-                <a:prstClr val="black">
-                  <a:alpha val="40000"/>
-                </a:prstClr>
-              </a:outerShdw>
-            </a:effectLst>
-          </p:spPr>
-          <p:style>
-            <a:lnRef idx="2">
-              <a:schemeClr val="accent1">
-                <a:shade val="50000"/>
-              </a:schemeClr>
-            </a:lnRef>
-            <a:fillRef idx="1">
-              <a:schemeClr val="accent1"/>
-            </a:fillRef>
-            <a:effectRef idx="0">
-              <a:schemeClr val="accent1"/>
-            </a:effectRef>
-            <a:fontRef idx="minor">
-              <a:schemeClr val="lt1"/>
-            </a:fontRef>
-          </p:style>
-          <p:txBody>
-            <a:bodyPr rtlCol="0" anchor="ctr"/>
-            <a:lstStyle/>
-            <a:p>
-              <a:pPr algn="ctr"/>
-              <a:endParaRPr lang="en-US">
-                <a:solidFill>
-                  <a:prstClr val="white"/>
-                </a:solidFill>
-              </a:endParaRPr>
-            </a:p>
-          </p:txBody>
-        </p:sp>
-        <p:pic>
-          <p:nvPicPr>
-            <p:cNvPr id="3" name="Picture 2"/>
-            <p:cNvPicPr>
-              <a:picLocks noChangeAspect="1"/>
-            </p:cNvPicPr>
-            <p:nvPr/>
-          </p:nvPicPr>
-          <p:blipFill rotWithShape="1">
-            <a:blip r:embed="rId3"/>
-            <a:srcRect t="63436" b="21906"/>
-            <a:stretch/>
-          </p:blipFill>
-          <p:spPr>
-            <a:xfrm>
-              <a:off x="7947578" y="3770306"/>
-              <a:ext cx="3746960" cy="790575"/>
-            </a:xfrm>
-            <a:prstGeom prst="rect">
-              <a:avLst/>
-            </a:prstGeom>
-            <a:noFill/>
-          </p:spPr>
-        </p:pic>
-        <p:sp>
-          <p:nvSpPr>
-            <p:cNvPr id="48" name="TextBox 47"/>
-            <p:cNvSpPr txBox="1"/>
-            <p:nvPr/>
-          </p:nvSpPr>
-          <p:spPr>
-            <a:xfrm>
-              <a:off x="8686851" y="3412385"/>
-              <a:ext cx="2253827" cy="306423"/>
-            </a:xfrm>
-            <a:prstGeom prst="rect">
-              <a:avLst/>
-            </a:prstGeom>
-            <a:noFill/>
-          </p:spPr>
-          <p:txBody>
-            <a:bodyPr wrap="none" rtlCol="0">
-              <a:spAutoFit/>
-            </a:bodyPr>
-            <a:lstStyle/>
-            <a:p>
-              <a:pPr algn="ctr"/>
-              <a:r>
-                <a:rPr lang="en-US" sz="2000" b="1" dirty="0" smtClean="0">
-                  <a:solidFill>
-                    <a:prstClr val="black"/>
-                  </a:solidFill>
-                </a:rPr>
-                <a:t>Logging and Data Services</a:t>
               </a:r>
               <a:endParaRPr lang="en-US" sz="2000" b="1" dirty="0">
                 <a:solidFill>
@@ -6523,7 +6669,7 @@
             <p:nvPr/>
           </p:nvPicPr>
           <p:blipFill rotWithShape="1">
-            <a:blip r:embed="rId2"/>
+            <a:blip r:embed="rId4"/>
             <a:srcRect t="59201" b="31067"/>
             <a:stretch/>
           </p:blipFill>
@@ -6577,146 +6723,6 @@
           </p:txBody>
         </p:sp>
       </p:grpSp>
-      <p:grpSp>
-        <p:nvGrpSpPr>
-          <p:cNvPr id="50" name="Group 49"/>
-          <p:cNvGrpSpPr>
-            <a:grpSpLocks noChangeAspect="1"/>
-          </p:cNvGrpSpPr>
-          <p:nvPr/>
-        </p:nvGrpSpPr>
-        <p:grpSpPr>
-          <a:xfrm>
-            <a:off x="7450341" y="4151977"/>
-            <a:ext cx="4609787" cy="1691593"/>
-            <a:chOff x="5240562" y="4325746"/>
-            <a:chExt cx="4936702" cy="1811557"/>
-          </a:xfrm>
-        </p:grpSpPr>
-        <p:sp>
-          <p:nvSpPr>
-            <p:cNvPr id="32" name="Rectangle 31"/>
-            <p:cNvSpPr>
-              <a:spLocks noChangeAspect="1"/>
-            </p:cNvSpPr>
-            <p:nvPr/>
-          </p:nvSpPr>
-          <p:spPr>
-            <a:xfrm>
-              <a:off x="5240562" y="4325746"/>
-              <a:ext cx="4936702" cy="1811557"/>
-            </a:xfrm>
-            <a:prstGeom prst="rect">
-              <a:avLst/>
-            </a:prstGeom>
-            <a:solidFill>
-              <a:schemeClr val="bg1"/>
-            </a:solidFill>
-            <a:ln>
-              <a:solidFill>
-                <a:schemeClr val="tx1"/>
-              </a:solidFill>
-            </a:ln>
-            <a:effectLst>
-              <a:outerShdw blurRad="50800" dist="38100" dir="2700000" algn="tl" rotWithShape="0">
-                <a:prstClr val="black">
-                  <a:alpha val="40000"/>
-                </a:prstClr>
-              </a:outerShdw>
-            </a:effectLst>
-          </p:spPr>
-          <p:style>
-            <a:lnRef idx="2">
-              <a:schemeClr val="accent1">
-                <a:shade val="50000"/>
-              </a:schemeClr>
-            </a:lnRef>
-            <a:fillRef idx="1">
-              <a:schemeClr val="accent1"/>
-            </a:fillRef>
-            <a:effectRef idx="0">
-              <a:schemeClr val="accent1"/>
-            </a:effectRef>
-            <a:fontRef idx="minor">
-              <a:schemeClr val="lt1"/>
-            </a:fontRef>
-          </p:style>
-          <p:txBody>
-            <a:bodyPr rtlCol="0" anchor="ctr"/>
-            <a:lstStyle/>
-            <a:p>
-              <a:pPr algn="ctr"/>
-              <a:endParaRPr lang="en-US">
-                <a:solidFill>
-                  <a:prstClr val="white"/>
-                </a:solidFill>
-              </a:endParaRPr>
-            </a:p>
-          </p:txBody>
-        </p:sp>
-        <p:pic>
-          <p:nvPicPr>
-            <p:cNvPr id="31" name="Picture 30"/>
-            <p:cNvPicPr>
-              <a:picLocks noChangeAspect="1"/>
-            </p:cNvPicPr>
-            <p:nvPr/>
-          </p:nvPicPr>
-          <p:blipFill rotWithShape="1">
-            <a:blip r:embed="rId3"/>
-            <a:srcRect t="82841" b="205"/>
-            <a:stretch/>
-          </p:blipFill>
-          <p:spPr>
-            <a:xfrm>
-              <a:off x="5351669" y="4895790"/>
-              <a:ext cx="4689329" cy="1144374"/>
-            </a:xfrm>
-            <a:prstGeom prst="rect">
-              <a:avLst/>
-            </a:prstGeom>
-            <a:noFill/>
-          </p:spPr>
-        </p:pic>
-        <p:sp>
-          <p:nvSpPr>
-            <p:cNvPr id="49" name="TextBox 48"/>
-            <p:cNvSpPr txBox="1"/>
-            <p:nvPr/>
-          </p:nvSpPr>
-          <p:spPr>
-            <a:xfrm>
-              <a:off x="6310133" y="4423927"/>
-              <a:ext cx="2797561" cy="400110"/>
-            </a:xfrm>
-            <a:prstGeom prst="rect">
-              <a:avLst/>
-            </a:prstGeom>
-            <a:noFill/>
-          </p:spPr>
-          <p:txBody>
-            <a:bodyPr wrap="none" rtlCol="0">
-              <a:spAutoFit/>
-            </a:bodyPr>
-            <a:lstStyle/>
-            <a:p>
-              <a:r>
-                <a:rPr lang="en-US" sz="2000" b="1" dirty="0" smtClean="0">
-                  <a:solidFill>
-                    <a:prstClr val="black"/>
-                  </a:solidFill>
-                </a:rPr>
-                <a:t>Communication Services</a:t>
-              </a:r>
-              <a:endParaRPr lang="en-US" sz="2000" b="1" dirty="0">
-                <a:solidFill>
-                  <a:prstClr val="black"/>
-                </a:solidFill>
-              </a:endParaRPr>
-            </a:p>
-          </p:txBody>
-        </p:sp>
-      </p:grpSp>
       <p:pic>
         <p:nvPicPr>
           <p:cNvPr id="34" name="Picture 33"/>
@@ -6726,7 +6732,7 @@
           <p:nvPr/>
         </p:nvPicPr>
         <p:blipFill>
-          <a:blip r:embed="rId4"/>
+          <a:blip r:embed="rId5"/>
           <a:stretch>
             <a:fillRect/>
           </a:stretch>
@@ -6868,7 +6874,7 @@
     </p:spTree>
     <p:extLst>
       <p:ext uri="{BB962C8B-B14F-4D97-AF65-F5344CB8AC3E}">
-        <p14:creationId xmlns:p14="http://schemas.microsoft.com/office/powerpoint/2010/main" val="3801224785"/>
+        <p14:creationId xmlns:p14="http://schemas.microsoft.com/office/powerpoint/2010/main" val="2651972069"/>
       </p:ext>
     </p:extLst>
   </p:cSld>
@@ -11128,8 +11134,8 @@
         </p:nvSpPr>
         <p:spPr>
           <a:xfrm>
-            <a:off x="-60161" y="1386680"/>
-            <a:ext cx="12591076" cy="369332"/>
+            <a:off x="115262" y="1386680"/>
+            <a:ext cx="11856780" cy="369332"/>
           </a:xfrm>
           <a:prstGeom prst="rect">
             <a:avLst/>
@@ -12366,15 +12372,15 @@
         </p:nvSpPr>
         <p:spPr>
           <a:xfrm>
-            <a:off x="-60161" y="4546986"/>
-            <a:ext cx="12591076" cy="1969770"/>
+            <a:off x="210065" y="4546986"/>
+            <a:ext cx="11761976" cy="1969770"/>
           </a:xfrm>
           <a:prstGeom prst="rect">
             <a:avLst/>
           </a:prstGeom>
         </p:spPr>
         <p:txBody>
-          <a:bodyPr wrap="none">
+          <a:bodyPr wrap="square">
             <a:spAutoFit/>
           </a:bodyPr>
           <a:lstStyle/>
@@ -12450,54 +12456,38 @@
                 <a:latin typeface="Times New Roman" panose="02020603050405020304" pitchFamily="18" charset="0"/>
                 <a:cs typeface="Times New Roman" panose="02020603050405020304" pitchFamily="18" charset="0"/>
               </a:rPr>
-              <a:t>ime-dependent properties,</a:t>
-            </a:r>
-          </a:p>
-          <a:p>
-            <a:pPr lvl="1"/>
+              <a:t>ime-dependent </a:t>
+            </a:r>
             <a:r>
               <a:rPr lang="en-US" sz="2000" dirty="0" smtClean="0">
                 <a:latin typeface="Times New Roman" panose="02020603050405020304" pitchFamily="18" charset="0"/>
                 <a:cs typeface="Times New Roman" panose="02020603050405020304" pitchFamily="18" charset="0"/>
               </a:rPr>
-              <a:t>e.g., speed = [position – </a:t>
-            </a:r>
-            <a:r>
-              <a:rPr lang="en-US" sz="2000" dirty="0" smtClean="0">
-                <a:solidFill>
-                  <a:srgbClr val="FF0000"/>
-                </a:solidFill>
-                <a:latin typeface="Times New Roman" panose="02020603050405020304" pitchFamily="18" charset="0"/>
-                <a:cs typeface="Times New Roman" panose="02020603050405020304" pitchFamily="18" charset="0"/>
-              </a:rPr>
-              <a:t>previous</a:t>
-            </a:r>
+              <a:t>properties</a:t>
+            </a:r>
+            <a:endParaRPr lang="en-US" sz="2000" dirty="0" smtClean="0">
+              <a:latin typeface="Times New Roman" panose="02020603050405020304" pitchFamily="18" charset="0"/>
+              <a:cs typeface="Times New Roman" panose="02020603050405020304" pitchFamily="18" charset="0"/>
+            </a:endParaRPr>
+          </a:p>
+          <a:p>
+            <a:pPr marL="285750" indent="-285750">
+              <a:buFont typeface="Arial" panose="020B0604020202020204" pitchFamily="34" charset="0"/>
+              <a:buChar char="•"/>
+            </a:pPr>
             <a:r>
               <a:rPr lang="en-US" sz="2000" dirty="0" smtClean="0">
                 <a:latin typeface="Times New Roman" panose="02020603050405020304" pitchFamily="18" charset="0"/>
                 <a:cs typeface="Times New Roman" panose="02020603050405020304" pitchFamily="18" charset="0"/>
               </a:rPr>
-              <a:t>(position)]/(sample-period).</a:t>
-            </a:r>
-          </a:p>
-          <a:p>
-            <a:pPr marL="285750" indent="-285750">
-              <a:buFont typeface="Arial" panose="020B0604020202020204" pitchFamily="34" charset="0"/>
-              <a:buChar char="•"/>
-            </a:pPr>
-            <a:r>
-              <a:rPr lang="en-US" sz="2000" dirty="0">
-                <a:latin typeface="Times New Roman" panose="02020603050405020304" pitchFamily="18" charset="0"/>
-                <a:cs typeface="Times New Roman" panose="02020603050405020304" pitchFamily="18" charset="0"/>
-              </a:rPr>
-              <a:t>E</a:t>
+              <a:t>Extension </a:t>
             </a:r>
             <a:r>
               <a:rPr lang="en-US" sz="2000" dirty="0" smtClean="0">
                 <a:latin typeface="Times New Roman" panose="02020603050405020304" pitchFamily="18" charset="0"/>
                 <a:cs typeface="Times New Roman" panose="02020603050405020304" pitchFamily="18" charset="0"/>
               </a:rPr>
-              <a:t>xtension to Time-dependent properties completed under </a:t>
+              <a:t>to Time-dependent properties completed under </a:t>
             </a:r>
             <a:r>
               <a:rPr lang="en-US" sz="2000" dirty="0" err="1" smtClean="0">
@@ -12513,15 +12503,19 @@
               </a:rPr>
               <a:t>, more details presented under Hybrid Systems group </a:t>
             </a:r>
-          </a:p>
-          <a:p>
-            <a:pPr lvl="1"/>
             <a:r>
               <a:rPr lang="en-US" sz="2000" dirty="0" smtClean="0">
                 <a:latin typeface="Times New Roman" panose="02020603050405020304" pitchFamily="18" charset="0"/>
                 <a:cs typeface="Times New Roman" panose="02020603050405020304" pitchFamily="18" charset="0"/>
               </a:rPr>
-              <a:t>(our compositional reasoning framework applies not only to Cyber components, but also to Physical components)</a:t>
+              <a:t>(</a:t>
+            </a:r>
+            <a:r>
+              <a:rPr lang="en-US" sz="2000" dirty="0" smtClean="0">
+                <a:latin typeface="Times New Roman" panose="02020603050405020304" pitchFamily="18" charset="0"/>
+                <a:cs typeface="Times New Roman" panose="02020603050405020304" pitchFamily="18" charset="0"/>
+              </a:rPr>
+              <a:t>our compositional reasoning framework applies not only to Cyber components, but also to Physical components)</a:t>
             </a:r>
           </a:p>
           <a:p>
@@ -20438,22 +20432,25 @@
             </a:pPr>
             <a:r>
               <a:rPr lang="en-US" dirty="0" smtClean="0"/>
-              <a:t>Challenges: arrays, inheritance</a:t>
-            </a:r>
-          </a:p>
-          <a:p>
-            <a:pPr>
+              <a:t>Challenges: arrays, </a:t>
+            </a:r>
+            <a:r>
+              <a:rPr lang="en-US" dirty="0" smtClean="0"/>
+              <a:t>inheritance, polymorphism</a:t>
+            </a:r>
+            <a:endParaRPr lang="en-US" dirty="0" smtClean="0"/>
+          </a:p>
+          <a:p>
+            <a:pPr marL="0" indent="0">
               <a:lnSpc>
                 <a:spcPct val="100000"/>
               </a:lnSpc>
               <a:spcBef>
                 <a:spcPts val="200"/>
               </a:spcBef>
+              <a:buNone/>
             </a:pPr>
             <a:endParaRPr lang="en-US" dirty="0" smtClean="0"/>
-          </a:p>
-          <a:p>
-            <a:endParaRPr lang="en-US" dirty="0"/>
           </a:p>
         </p:txBody>
       </p:sp>
@@ -24745,10 +24742,10 @@
           <a:lstStyle/>
           <a:p>
             <a:r>
-              <a:rPr lang="en-US" smtClean="0"/>
+              <a:rPr lang="en-US" dirty="0" smtClean="0"/>
               <a:t>Architecture Group</a:t>
             </a:r>
-            <a:endParaRPr lang="en-US"/>
+            <a:endParaRPr lang="en-US" dirty="0"/>
           </a:p>
         </p:txBody>
       </p:sp>
@@ -24833,7 +24830,12 @@
             <p:ph idx="1"/>
           </p:nvPr>
         </p:nvSpPr>
-        <p:spPr/>
+        <p:spPr>
+          <a:xfrm>
+            <a:off x="210065" y="1508510"/>
+            <a:ext cx="11664778" cy="4910613"/>
+          </a:xfrm>
+        </p:spPr>
         <p:txBody>
           <a:bodyPr>
             <a:normAutofit fontScale="85000" lnSpcReduction="20000"/>
@@ -24878,7 +24880,15 @@
             <a:pPr lvl="1" fontAlgn="base"/>
             <a:r>
               <a:rPr lang="en-US" dirty="0" smtClean="0"/>
-              <a:t>Created formal contracts for nine services and tasks based on the </a:t>
+              <a:t>Created formal contracts for nine </a:t>
+            </a:r>
+            <a:r>
+              <a:rPr lang="en-US" dirty="0" smtClean="0"/>
+              <a:t>services/tasks </a:t>
+            </a:r>
+            <a:r>
+              <a:rPr lang="en-US" dirty="0" smtClean="0"/>
+              <a:t>based on the </a:t>
             </a:r>
             <a:r>
               <a:rPr lang="en-US" dirty="0" err="1" smtClean="0"/>
@@ -24886,7 +24896,7 @@
             </a:r>
             <a:r>
               <a:rPr lang="en-US" dirty="0" smtClean="0"/>
-              <a:t> Wiki and conversations with the developer </a:t>
+              <a:t> Wiki </a:t>
             </a:r>
             <a:r>
               <a:rPr lang="en-US" dirty="0" smtClean="0">
@@ -24894,7 +24904,15 @@
                   <a:srgbClr val="0000FF"/>
                 </a:solidFill>
               </a:rPr>
-              <a:t>(DC, RC)</a:t>
+              <a:t>(</a:t>
+            </a:r>
+            <a:r>
+              <a:rPr lang="en-US" dirty="0" smtClean="0">
+                <a:solidFill>
+                  <a:srgbClr val="0000FF"/>
+                </a:solidFill>
+              </a:rPr>
+              <a:t>DC, RC)</a:t>
             </a:r>
           </a:p>
           <a:p>
@@ -25044,15 +25062,31 @@
             <a:pPr fontAlgn="base"/>
             <a:r>
               <a:rPr lang="en-US" dirty="0"/>
-              <a:t>Connected </a:t>
+              <a:t>Demonstrated LMCP </a:t>
+            </a:r>
+            <a:r>
+              <a:rPr lang="en-US" dirty="0" smtClean="0"/>
+              <a:t>(</a:t>
+            </a:r>
+            <a:r>
+              <a:rPr lang="en-US" dirty="0" err="1" smtClean="0"/>
+              <a:t>UxAS</a:t>
+            </a:r>
+            <a:r>
+              <a:rPr lang="en-US" dirty="0" smtClean="0"/>
+              <a:t> messaging format) &lt;--&gt; </a:t>
+            </a:r>
+            <a:r>
+              <a:rPr lang="en-US" dirty="0"/>
+              <a:t>ROS communications and extracted static message types into ROS .</a:t>
             </a:r>
             <a:r>
               <a:rPr lang="en-US" dirty="0" err="1"/>
-              <a:t>UxAS</a:t>
+              <a:t>msg</a:t>
             </a:r>
             <a:r>
               <a:rPr lang="en-US" dirty="0"/>
-              <a:t> to the Robot Operating System (ROS) </a:t>
+              <a:t> format </a:t>
             </a:r>
             <a:r>
               <a:rPr lang="en-US" dirty="0">
@@ -25150,7 +25184,7 @@
         </p:nvSpPr>
         <p:spPr>
           <a:xfrm>
-            <a:off x="6221710" y="3244334"/>
+            <a:off x="6214783" y="3054687"/>
             <a:ext cx="5200278" cy="379294"/>
           </a:xfrm>
           <a:prstGeom prst="rect">
@@ -30703,143 +30737,6 @@
       </p:grpSp>
       <p:grpSp>
         <p:nvGrpSpPr>
-          <p:cNvPr id="45" name="Group 44"/>
-          <p:cNvGrpSpPr>
-            <a:grpSpLocks noChangeAspect="1"/>
-          </p:cNvGrpSpPr>
-          <p:nvPr/>
-        </p:nvGrpSpPr>
-        <p:grpSpPr>
-          <a:xfrm>
-            <a:off x="5411690" y="1267285"/>
-            <a:ext cx="4570821" cy="3439129"/>
-            <a:chOff x="4559057" y="1479288"/>
-            <a:chExt cx="3962966" cy="2981773"/>
-          </a:xfrm>
-        </p:grpSpPr>
-        <p:sp>
-          <p:nvSpPr>
-            <p:cNvPr id="18" name="Rectangle 17"/>
-            <p:cNvSpPr/>
-            <p:nvPr/>
-          </p:nvSpPr>
-          <p:spPr>
-            <a:xfrm>
-              <a:off x="4559057" y="1479288"/>
-              <a:ext cx="3962966" cy="2981773"/>
-            </a:xfrm>
-            <a:prstGeom prst="rect">
-              <a:avLst/>
-            </a:prstGeom>
-            <a:solidFill>
-              <a:schemeClr val="bg1"/>
-            </a:solidFill>
-            <a:ln>
-              <a:solidFill>
-                <a:schemeClr val="tx1"/>
-              </a:solidFill>
-            </a:ln>
-            <a:effectLst>
-              <a:outerShdw blurRad="50800" dist="38100" dir="2700000" algn="tl" rotWithShape="0">
-                <a:prstClr val="black">
-                  <a:alpha val="40000"/>
-                </a:prstClr>
-              </a:outerShdw>
-            </a:effectLst>
-          </p:spPr>
-          <p:style>
-            <a:lnRef idx="2">
-              <a:schemeClr val="accent1">
-                <a:shade val="50000"/>
-              </a:schemeClr>
-            </a:lnRef>
-            <a:fillRef idx="1">
-              <a:schemeClr val="accent1"/>
-            </a:fillRef>
-            <a:effectRef idx="0">
-              <a:schemeClr val="accent1"/>
-            </a:effectRef>
-            <a:fontRef idx="minor">
-              <a:schemeClr val="lt1"/>
-            </a:fontRef>
-          </p:style>
-          <p:txBody>
-            <a:bodyPr rtlCol="0" anchor="ctr"/>
-            <a:lstStyle/>
-            <a:p>
-              <a:pPr algn="ctr"/>
-              <a:endParaRPr lang="en-US">
-                <a:solidFill>
-                  <a:prstClr val="white"/>
-                </a:solidFill>
-              </a:endParaRPr>
-            </a:p>
-          </p:txBody>
-        </p:sp>
-        <p:pic>
-          <p:nvPicPr>
-            <p:cNvPr id="13" name="Picture 12"/>
-            <p:cNvPicPr>
-              <a:picLocks noChangeAspect="1"/>
-            </p:cNvPicPr>
-            <p:nvPr/>
-          </p:nvPicPr>
-          <p:blipFill rotWithShape="1">
-            <a:blip r:embed="rId2"/>
-            <a:srcRect t="4780" b="50278"/>
-            <a:stretch/>
-          </p:blipFill>
-          <p:spPr>
-            <a:xfrm>
-              <a:off x="4677558" y="1953879"/>
-              <a:ext cx="3755461" cy="2419350"/>
-            </a:xfrm>
-            <a:prstGeom prst="rect">
-              <a:avLst/>
-            </a:prstGeom>
-          </p:spPr>
-        </p:pic>
-        <p:sp>
-          <p:nvSpPr>
-            <p:cNvPr id="42" name="TextBox 41"/>
-            <p:cNvSpPr txBox="1"/>
-            <p:nvPr/>
-          </p:nvSpPr>
-          <p:spPr>
-            <a:xfrm>
-              <a:off x="6186829" y="1516919"/>
-              <a:ext cx="745012" cy="400110"/>
-            </a:xfrm>
-            <a:prstGeom prst="rect">
-              <a:avLst/>
-            </a:prstGeom>
-            <a:noFill/>
-          </p:spPr>
-          <p:txBody>
-            <a:bodyPr wrap="none" rtlCol="0">
-              <a:spAutoFit/>
-            </a:bodyPr>
-            <a:lstStyle/>
-            <a:p>
-              <a:r>
-                <a:rPr lang="en-US" sz="2000" b="1" dirty="0" smtClean="0">
-                  <a:solidFill>
-                    <a:prstClr val="black"/>
-                  </a:solidFill>
-                </a:rPr>
-                <a:t>Tasks</a:t>
-              </a:r>
-              <a:endParaRPr lang="en-US" sz="2000" b="1" dirty="0">
-                <a:solidFill>
-                  <a:prstClr val="black"/>
-                </a:solidFill>
-              </a:endParaRPr>
-            </a:p>
-          </p:txBody>
-        </p:sp>
-      </p:grpSp>
-      <p:grpSp>
-        <p:nvGrpSpPr>
           <p:cNvPr id="47" name="Group 46"/>
           <p:cNvGrpSpPr>
             <a:grpSpLocks noChangeAspect="1"/>
@@ -30977,7 +30874,7 @@
       </p:grpSp>
       <p:grpSp>
         <p:nvGrpSpPr>
-          <p:cNvPr id="46" name="Group 45"/>
+          <p:cNvPr id="51" name="Group 50"/>
           <p:cNvGrpSpPr>
             <a:grpSpLocks noChangeAspect="1"/>
           </p:cNvGrpSpPr>
@@ -30985,22 +30882,22 @@
         </p:nvGrpSpPr>
         <p:grpSpPr>
           <a:xfrm>
-            <a:off x="5446772" y="4791656"/>
-            <a:ext cx="4512694" cy="1059101"/>
-            <a:chOff x="7348849" y="1337771"/>
-            <a:chExt cx="4436213" cy="1041152"/>
+            <a:off x="7703119" y="2566100"/>
+            <a:ext cx="4357009" cy="1456292"/>
+            <a:chOff x="7872605" y="3317556"/>
+            <a:chExt cx="3896909" cy="1326875"/>
           </a:xfrm>
         </p:grpSpPr>
         <p:sp>
           <p:nvSpPr>
-            <p:cNvPr id="19" name="Rectangle 18"/>
+            <p:cNvPr id="33" name="Rectangle 32"/>
             <p:cNvSpPr/>
             <p:nvPr/>
           </p:nvSpPr>
           <p:spPr>
             <a:xfrm>
-              <a:off x="7348849" y="1351267"/>
-              <a:ext cx="4436213" cy="1027656"/>
+              <a:off x="7872605" y="3317556"/>
+              <a:ext cx="3896909" cy="1326875"/>
             </a:xfrm>
             <a:prstGeom prst="rect">
               <a:avLst/>
@@ -31050,39 +30947,16 @@
             </a:p>
           </p:txBody>
         </p:sp>
-        <p:pic>
-          <p:nvPicPr>
-            <p:cNvPr id="16" name="Picture 15"/>
-            <p:cNvPicPr>
-              <a:picLocks noChangeAspect="1"/>
-            </p:cNvPicPr>
-            <p:nvPr/>
-          </p:nvPicPr>
-          <p:blipFill rotWithShape="1">
-            <a:blip r:embed="rId2"/>
-            <a:srcRect t="59201" b="31067"/>
-            <a:stretch/>
-          </p:blipFill>
-          <p:spPr>
-            <a:xfrm>
-              <a:off x="7404824" y="1741727"/>
-              <a:ext cx="4337287" cy="605037"/>
-            </a:xfrm>
-            <a:prstGeom prst="rect">
-              <a:avLst/>
-            </a:prstGeom>
-          </p:spPr>
-        </p:pic>
         <p:sp>
           <p:nvSpPr>
-            <p:cNvPr id="43" name="TextBox 42"/>
+            <p:cNvPr id="48" name="TextBox 47"/>
             <p:cNvSpPr txBox="1"/>
             <p:nvPr/>
           </p:nvSpPr>
           <p:spPr>
             <a:xfrm>
-              <a:off x="8965668" y="1337771"/>
-              <a:ext cx="1202573" cy="400110"/>
+              <a:off x="8686851" y="3412385"/>
+              <a:ext cx="2253827" cy="306423"/>
             </a:xfrm>
             <a:prstGeom prst="rect">
               <a:avLst/>
@@ -31102,7 +30976,7 @@
                     <a:prstClr val="black"/>
                   </a:solidFill>
                 </a:rPr>
-                <a:t>Scenarios</a:t>
+                <a:t>Logging and Data Services</a:t>
               </a:r>
               <a:endParaRPr lang="en-US" sz="2000" b="1" dirty="0">
                 <a:solidFill>
@@ -31113,9 +30987,149 @@
           </p:txBody>
         </p:sp>
       </p:grpSp>
+      <p:grpSp>
+        <p:nvGrpSpPr>
+          <p:cNvPr id="50" name="Group 49"/>
+          <p:cNvGrpSpPr>
+            <a:grpSpLocks noChangeAspect="1"/>
+          </p:cNvGrpSpPr>
+          <p:nvPr/>
+        </p:nvGrpSpPr>
+        <p:grpSpPr>
+          <a:xfrm>
+            <a:off x="7450341" y="4151977"/>
+            <a:ext cx="4609787" cy="1691593"/>
+            <a:chOff x="5240562" y="4325746"/>
+            <a:chExt cx="4936702" cy="1811557"/>
+          </a:xfrm>
+        </p:grpSpPr>
+        <p:sp>
+          <p:nvSpPr>
+            <p:cNvPr id="32" name="Rectangle 31"/>
+            <p:cNvSpPr>
+              <a:spLocks noChangeAspect="1"/>
+            </p:cNvSpPr>
+            <p:nvPr/>
+          </p:nvSpPr>
+          <p:spPr>
+            <a:xfrm>
+              <a:off x="5240562" y="4325746"/>
+              <a:ext cx="4936702" cy="1811557"/>
+            </a:xfrm>
+            <a:prstGeom prst="rect">
+              <a:avLst/>
+            </a:prstGeom>
+            <a:solidFill>
+              <a:schemeClr val="bg1"/>
+            </a:solidFill>
+            <a:ln>
+              <a:solidFill>
+                <a:schemeClr val="tx1"/>
+              </a:solidFill>
+            </a:ln>
+            <a:effectLst>
+              <a:outerShdw blurRad="50800" dist="38100" dir="2700000" algn="tl" rotWithShape="0">
+                <a:prstClr val="black">
+                  <a:alpha val="40000"/>
+                </a:prstClr>
+              </a:outerShdw>
+            </a:effectLst>
+          </p:spPr>
+          <p:style>
+            <a:lnRef idx="2">
+              <a:schemeClr val="accent1">
+                <a:shade val="50000"/>
+              </a:schemeClr>
+            </a:lnRef>
+            <a:fillRef idx="1">
+              <a:schemeClr val="accent1"/>
+            </a:fillRef>
+            <a:effectRef idx="0">
+              <a:schemeClr val="accent1"/>
+            </a:effectRef>
+            <a:fontRef idx="minor">
+              <a:schemeClr val="lt1"/>
+            </a:fontRef>
+          </p:style>
+          <p:txBody>
+            <a:bodyPr rtlCol="0" anchor="ctr"/>
+            <a:lstStyle/>
+            <a:p>
+              <a:pPr algn="ctr"/>
+              <a:endParaRPr lang="en-US">
+                <a:solidFill>
+                  <a:prstClr val="white"/>
+                </a:solidFill>
+              </a:endParaRPr>
+            </a:p>
+          </p:txBody>
+        </p:sp>
+        <p:sp>
+          <p:nvSpPr>
+            <p:cNvPr id="49" name="TextBox 48"/>
+            <p:cNvSpPr txBox="1"/>
+            <p:nvPr/>
+          </p:nvSpPr>
+          <p:spPr>
+            <a:xfrm>
+              <a:off x="6310133" y="4423927"/>
+              <a:ext cx="2797561" cy="400110"/>
+            </a:xfrm>
+            <a:prstGeom prst="rect">
+              <a:avLst/>
+            </a:prstGeom>
+            <a:noFill/>
+          </p:spPr>
+          <p:txBody>
+            <a:bodyPr wrap="none" rtlCol="0">
+              <a:spAutoFit/>
+            </a:bodyPr>
+            <a:lstStyle/>
+            <a:p>
+              <a:r>
+                <a:rPr lang="en-US" sz="2000" b="1" dirty="0" smtClean="0">
+                  <a:solidFill>
+                    <a:prstClr val="black"/>
+                  </a:solidFill>
+                </a:rPr>
+                <a:t>Communication Services</a:t>
+              </a:r>
+              <a:endParaRPr lang="en-US" sz="2000" b="1" dirty="0">
+                <a:solidFill>
+                  <a:prstClr val="black"/>
+                </a:solidFill>
+              </a:endParaRPr>
+            </a:p>
+          </p:txBody>
+        </p:sp>
+      </p:grpSp>
+      <p:pic>
+        <p:nvPicPr>
+          <p:cNvPr id="34" name="Picture 33"/>
+          <p:cNvPicPr>
+            <a:picLocks noChangeAspect="1"/>
+          </p:cNvPicPr>
+          <p:nvPr/>
+        </p:nvPicPr>
+        <p:blipFill>
+          <a:blip r:embed="rId3"/>
+          <a:stretch>
+            <a:fillRect/>
+          </a:stretch>
+        </p:blipFill>
+        <p:spPr>
+          <a:xfrm>
+            <a:off x="106191" y="2723444"/>
+            <a:ext cx="5160387" cy="3965939"/>
+          </a:xfrm>
+          <a:prstGeom prst="rect">
+            <a:avLst/>
+          </a:prstGeom>
+        </p:spPr>
+      </p:pic>
       <p:sp>
         <p:nvSpPr>
-          <p:cNvPr id="22" name="Footer Placeholder 3"/>
+          <p:cNvPr id="35" name="Footer Placeholder 3"/>
           <p:cNvSpPr txBox="1">
             <a:spLocks/>
           </p:cNvSpPr>
@@ -31246,15 +31260,45 @@
           <p:nvPr/>
         </p:nvPicPr>
         <p:blipFill>
-          <a:blip r:embed="rId3"/>
+          <a:blip r:embed="rId4"/>
           <a:stretch>
             <a:fillRect/>
           </a:stretch>
         </p:blipFill>
         <p:spPr>
           <a:xfrm>
-            <a:off x="106191" y="2723444"/>
-            <a:ext cx="5160387" cy="3965939"/>
+            <a:off x="7785039" y="3078298"/>
+            <a:ext cx="4189631" cy="856109"/>
+          </a:xfrm>
+          <a:prstGeom prst="rect">
+            <a:avLst/>
+          </a:prstGeom>
+        </p:spPr>
+      </p:pic>
+      <p:pic>
+        <p:nvPicPr>
+          <p:cNvPr id="6" name="Picture 5"/>
+          <p:cNvPicPr>
+            <a:picLocks noChangeAspect="1"/>
+          </p:cNvPicPr>
+          <p:nvPr/>
+        </p:nvPicPr>
+        <p:blipFill>
+          <a:blip r:embed="rId5">
+            <a:extLst>
+              <a:ext uri="{28A0092B-C50C-407E-A947-70E740481C1C}">
+                <a14:useLocalDpi xmlns:a14="http://schemas.microsoft.com/office/drawing/2010/main" val="0"/>
+              </a:ext>
+            </a:extLst>
+          </a:blip>
+          <a:stretch>
+            <a:fillRect/>
+          </a:stretch>
+        </p:blipFill>
+        <p:spPr>
+          <a:xfrm>
+            <a:off x="7570320" y="4619108"/>
+            <a:ext cx="4369827" cy="1066775"/>
           </a:xfrm>
           <a:prstGeom prst="rect">
             <a:avLst/>
@@ -31264,7 +31308,7 @@
     </p:spTree>
     <p:extLst>
       <p:ext uri="{BB962C8B-B14F-4D97-AF65-F5344CB8AC3E}">
-        <p14:creationId xmlns:p14="http://schemas.microsoft.com/office/powerpoint/2010/main" val="2357698760"/>
+        <p14:creationId xmlns:p14="http://schemas.microsoft.com/office/powerpoint/2010/main" val="1959146874"/>
       </p:ext>
     </p:extLst>
   </p:cSld>

</xml_diff>

<commit_message>
presentation updates - expected final version for S5 with GE's new slide
</commit_message>
<xml_diff>
--- a/presentations/S5_SoI_Architecture_Group.pptx
+++ b/presentations/S5_SoI_Architecture_Group.pptx
@@ -25,25 +25,25 @@
     <p:sldId id="336" r:id="rId16"/>
     <p:sldId id="337" r:id="rId17"/>
     <p:sldId id="312" r:id="rId18"/>
-    <p:sldId id="327" r:id="rId19"/>
-    <p:sldId id="328" r:id="rId20"/>
-    <p:sldId id="329" r:id="rId21"/>
-    <p:sldId id="330" r:id="rId22"/>
-    <p:sldId id="331" r:id="rId23"/>
-    <p:sldId id="315" r:id="rId24"/>
-    <p:sldId id="279" r:id="rId25"/>
-    <p:sldId id="289" r:id="rId26"/>
-    <p:sldId id="335" r:id="rId27"/>
-    <p:sldId id="326" r:id="rId28"/>
-    <p:sldId id="266" r:id="rId29"/>
-    <p:sldId id="268" r:id="rId30"/>
-    <p:sldId id="295" r:id="rId31"/>
-    <p:sldId id="305" r:id="rId32"/>
-    <p:sldId id="261" r:id="rId33"/>
-    <p:sldId id="262" r:id="rId34"/>
-    <p:sldId id="306" r:id="rId35"/>
-    <p:sldId id="313" r:id="rId36"/>
-    <p:sldId id="290" r:id="rId37"/>
+    <p:sldId id="340" r:id="rId19"/>
+    <p:sldId id="327" r:id="rId20"/>
+    <p:sldId id="328" r:id="rId21"/>
+    <p:sldId id="329" r:id="rId22"/>
+    <p:sldId id="330" r:id="rId23"/>
+    <p:sldId id="331" r:id="rId24"/>
+    <p:sldId id="315" r:id="rId25"/>
+    <p:sldId id="279" r:id="rId26"/>
+    <p:sldId id="289" r:id="rId27"/>
+    <p:sldId id="335" r:id="rId28"/>
+    <p:sldId id="326" r:id="rId29"/>
+    <p:sldId id="266" r:id="rId30"/>
+    <p:sldId id="268" r:id="rId31"/>
+    <p:sldId id="295" r:id="rId32"/>
+    <p:sldId id="305" r:id="rId33"/>
+    <p:sldId id="261" r:id="rId34"/>
+    <p:sldId id="262" r:id="rId35"/>
+    <p:sldId id="306" r:id="rId36"/>
+    <p:sldId id="313" r:id="rId37"/>
     <p:sldId id="269" r:id="rId38"/>
   </p:sldIdLst>
   <p:sldSz cx="12192000" cy="6858000"/>
@@ -870,7 +870,7 @@
           <a:p>
             <a:fld id="{563BCB51-F13E-4501-921D-7D4EB39EDE9B}" type="slidenum">
               <a:rPr lang="en-US" smtClean="0"/>
-              <a:t>18</a:t>
+              <a:t>19</a:t>
             </a:fld>
             <a:endParaRPr lang="en-US"/>
           </a:p>
@@ -954,7 +954,7 @@
           <a:p>
             <a:fld id="{563BCB51-F13E-4501-921D-7D4EB39EDE9B}" type="slidenum">
               <a:rPr lang="en-US" smtClean="0"/>
-              <a:t>23</a:t>
+              <a:t>24</a:t>
             </a:fld>
             <a:endParaRPr lang="en-US"/>
           </a:p>
@@ -1048,7 +1048,7 @@
           <a:p>
             <a:fld id="{563BCB51-F13E-4501-921D-7D4EB39EDE9B}" type="slidenum">
               <a:rPr lang="en-US" smtClean="0"/>
-              <a:t>24</a:t>
+              <a:t>25</a:t>
             </a:fld>
             <a:endParaRPr lang="en-US"/>
           </a:p>
@@ -1132,7 +1132,7 @@
           <a:p>
             <a:fld id="{563BCB51-F13E-4501-921D-7D4EB39EDE9B}" type="slidenum">
               <a:rPr lang="en-US" smtClean="0"/>
-              <a:t>29</a:t>
+              <a:t>30</a:t>
             </a:fld>
             <a:endParaRPr lang="en-US"/>
           </a:p>
@@ -1224,7 +1224,7 @@
           <a:p>
             <a:fld id="{563BCB51-F13E-4501-921D-7D4EB39EDE9B}" type="slidenum">
               <a:rPr lang="en-US" smtClean="0"/>
-              <a:t>30</a:t>
+              <a:t>31</a:t>
             </a:fld>
             <a:endParaRPr lang="en-US"/>
           </a:p>
@@ -1308,7 +1308,7 @@
           <a:p>
             <a:fld id="{563BCB51-F13E-4501-921D-7D4EB39EDE9B}" type="slidenum">
               <a:rPr lang="en-US" smtClean="0"/>
-              <a:t>31</a:t>
+              <a:t>32</a:t>
             </a:fld>
             <a:endParaRPr lang="en-US"/>
           </a:p>
@@ -1440,7 +1440,7 @@
           <a:p>
             <a:fld id="{563BCB51-F13E-4501-921D-7D4EB39EDE9B}" type="slidenum">
               <a:rPr lang="en-US" smtClean="0"/>
-              <a:t>32</a:t>
+              <a:t>33</a:t>
             </a:fld>
             <a:endParaRPr lang="en-US"/>
           </a:p>
@@ -1563,7 +1563,7 @@
           <a:p>
             <a:fld id="{563BCB51-F13E-4501-921D-7D4EB39EDE9B}" type="slidenum">
               <a:rPr lang="en-US" smtClean="0"/>
-              <a:t>33</a:t>
+              <a:t>34</a:t>
             </a:fld>
             <a:endParaRPr lang="en-US"/>
           </a:p>
@@ -1741,7 +1741,7 @@
           <a:p>
             <a:fld id="{563BCB51-F13E-4501-921D-7D4EB39EDE9B}" type="slidenum">
               <a:rPr lang="en-US" smtClean="0"/>
-              <a:t>34</a:t>
+              <a:t>35</a:t>
             </a:fld>
             <a:endParaRPr lang="en-US"/>
           </a:p>
@@ -1833,7 +1833,7 @@
           <a:p>
             <a:fld id="{563BCB51-F13E-4501-921D-7D4EB39EDE9B}" type="slidenum">
               <a:rPr lang="en-US" smtClean="0"/>
-              <a:t>35</a:t>
+              <a:t>36</a:t>
             </a:fld>
             <a:endParaRPr lang="en-US"/>
           </a:p>
@@ -7764,7 +7764,15 @@
           <a:p>
             <a:r>
               <a:rPr lang="en-US" dirty="0" smtClean="0"/>
-              <a:t>System-level contracts</a:t>
+              <a:t>System-Level </a:t>
+            </a:r>
+            <a:r>
+              <a:rPr lang="en-US" dirty="0"/>
+              <a:t>C</a:t>
+            </a:r>
+            <a:r>
+              <a:rPr lang="en-US" dirty="0" smtClean="0"/>
+              <a:t>ontracts</a:t>
             </a:r>
             <a:endParaRPr lang="en-US" dirty="0"/>
           </a:p>
@@ -8147,7 +8155,15 @@
           <a:p>
             <a:r>
               <a:rPr lang="en-US" dirty="0" smtClean="0"/>
-              <a:t>System-level contracts</a:t>
+              <a:t>System-Level </a:t>
+            </a:r>
+            <a:r>
+              <a:rPr lang="en-US" dirty="0" smtClean="0"/>
+              <a:t>Co</a:t>
+            </a:r>
+            <a:r>
+              <a:rPr lang="en-US" dirty="0" smtClean="0"/>
+              <a:t>ntracts</a:t>
             </a:r>
             <a:endParaRPr lang="en-US" dirty="0"/>
           </a:p>
@@ -12456,38 +12472,20 @@
                 <a:latin typeface="Times New Roman" panose="02020603050405020304" pitchFamily="18" charset="0"/>
                 <a:cs typeface="Times New Roman" panose="02020603050405020304" pitchFamily="18" charset="0"/>
               </a:rPr>
-              <a:t>ime-dependent </a:t>
-            </a:r>
+              <a:t>ime-dependent properties</a:t>
+            </a:r>
+          </a:p>
+          <a:p>
+            <a:pPr marL="285750" indent="-285750">
+              <a:buFont typeface="Arial" panose="020B0604020202020204" pitchFamily="34" charset="0"/>
+              <a:buChar char="•"/>
+            </a:pPr>
             <a:r>
               <a:rPr lang="en-US" sz="2000" dirty="0" smtClean="0">
                 <a:latin typeface="Times New Roman" panose="02020603050405020304" pitchFamily="18" charset="0"/>
                 <a:cs typeface="Times New Roman" panose="02020603050405020304" pitchFamily="18" charset="0"/>
               </a:rPr>
-              <a:t>properties</a:t>
-            </a:r>
-            <a:endParaRPr lang="en-US" sz="2000" dirty="0" smtClean="0">
-              <a:latin typeface="Times New Roman" panose="02020603050405020304" pitchFamily="18" charset="0"/>
-              <a:cs typeface="Times New Roman" panose="02020603050405020304" pitchFamily="18" charset="0"/>
-            </a:endParaRPr>
-          </a:p>
-          <a:p>
-            <a:pPr marL="285750" indent="-285750">
-              <a:buFont typeface="Arial" panose="020B0604020202020204" pitchFamily="34" charset="0"/>
-              <a:buChar char="•"/>
-            </a:pPr>
-            <a:r>
-              <a:rPr lang="en-US" sz="2000" dirty="0" smtClean="0">
-                <a:latin typeface="Times New Roman" panose="02020603050405020304" pitchFamily="18" charset="0"/>
-                <a:cs typeface="Times New Roman" panose="02020603050405020304" pitchFamily="18" charset="0"/>
-              </a:rPr>
-              <a:t>Extension </a:t>
-            </a:r>
-            <a:r>
-              <a:rPr lang="en-US" sz="2000" dirty="0" smtClean="0">
-                <a:latin typeface="Times New Roman" panose="02020603050405020304" pitchFamily="18" charset="0"/>
-                <a:cs typeface="Times New Roman" panose="02020603050405020304" pitchFamily="18" charset="0"/>
-              </a:rPr>
-              <a:t>to Time-dependent properties completed under </a:t>
+              <a:t>Extension to Time-dependent properties completed under </a:t>
             </a:r>
             <a:r>
               <a:rPr lang="en-US" sz="2000" dirty="0" err="1" smtClean="0">
@@ -12501,21 +12499,7 @@
                 <a:latin typeface="Times New Roman" panose="02020603050405020304" pitchFamily="18" charset="0"/>
                 <a:cs typeface="Times New Roman" panose="02020603050405020304" pitchFamily="18" charset="0"/>
               </a:rPr>
-              <a:t>, more details presented under Hybrid Systems group </a:t>
-            </a:r>
-            <a:r>
-              <a:rPr lang="en-US" sz="2000" dirty="0" smtClean="0">
-                <a:latin typeface="Times New Roman" panose="02020603050405020304" pitchFamily="18" charset="0"/>
-                <a:cs typeface="Times New Roman" panose="02020603050405020304" pitchFamily="18" charset="0"/>
-              </a:rPr>
-              <a:t>(</a:t>
-            </a:r>
-            <a:r>
-              <a:rPr lang="en-US" sz="2000" dirty="0" smtClean="0">
-                <a:latin typeface="Times New Roman" panose="02020603050405020304" pitchFamily="18" charset="0"/>
-                <a:cs typeface="Times New Roman" panose="02020603050405020304" pitchFamily="18" charset="0"/>
-              </a:rPr>
-              <a:t>our compositional reasoning framework applies not only to Cyber components, but also to Physical components)</a:t>
+              <a:t>, more details presented under Hybrid Systems group (our compositional reasoning framework applies not only to Cyber components, but also to Physical components)</a:t>
             </a:r>
           </a:p>
           <a:p>
@@ -13626,45 +13610,20 @@
         </p:nvSpPr>
         <p:spPr/>
         <p:txBody>
-          <a:bodyPr>
-            <a:normAutofit fontScale="90000"/>
-          </a:bodyPr>
+          <a:bodyPr/>
           <a:lstStyle/>
           <a:p>
+            <a:pPr algn="ctr"/>
             <a:r>
               <a:rPr lang="en-US" dirty="0"/>
-              <a:t>Modeling UxAS System Architecture in SADL Ontology</a:t>
+              <a:t>ASSERT™ Requirement Analysis Checks </a:t>
             </a:r>
           </a:p>
         </p:txBody>
       </p:sp>
-      <p:pic>
-        <p:nvPicPr>
-          <p:cNvPr id="4" name="Picture 3"/>
-          <p:cNvPicPr>
-            <a:picLocks noChangeAspect="1"/>
-          </p:cNvPicPr>
-          <p:nvPr/>
-        </p:nvPicPr>
-        <p:blipFill>
-          <a:blip r:embed="rId3"/>
-          <a:stretch>
-            <a:fillRect/>
-          </a:stretch>
-        </p:blipFill>
-        <p:spPr>
-          <a:xfrm>
-            <a:off x="1128567" y="1514924"/>
-            <a:ext cx="9853662" cy="4678486"/>
-          </a:xfrm>
-          <a:prstGeom prst="rect">
-            <a:avLst/>
-          </a:prstGeom>
-        </p:spPr>
-      </p:pic>
       <p:sp>
         <p:nvSpPr>
-          <p:cNvPr id="5" name="Footer Placeholder 4"/>
+          <p:cNvPr id="3" name="Footer Placeholder 2"/>
           <p:cNvSpPr>
             <a:spLocks noGrp="1"/>
           </p:cNvSpPr>
@@ -13678,141 +13637,109 @@
           <a:lstStyle/>
           <a:p>
             <a:r>
-              <a:rPr lang="en-US" smtClean="0"/>
+              <a:rPr lang="en-US" dirty="0"/>
               <a:t>Architecture Group</a:t>
             </a:r>
-            <a:endParaRPr lang="en-US"/>
           </a:p>
         </p:txBody>
       </p:sp>
       <p:sp>
         <p:nvSpPr>
-          <p:cNvPr id="7" name="Footer Placeholder 3"/>
-          <p:cNvSpPr txBox="1">
-            <a:spLocks/>
-          </p:cNvSpPr>
+          <p:cNvPr id="4" name="TextBox 3"/>
+          <p:cNvSpPr txBox="1"/>
           <p:nvPr/>
         </p:nvSpPr>
         <p:spPr>
           <a:xfrm>
-            <a:off x="102476" y="6437441"/>
-            <a:ext cx="4532586" cy="306936"/>
+            <a:off x="718456" y="1828799"/>
+            <a:ext cx="10965543" cy="3477875"/>
           </a:xfrm>
           <a:prstGeom prst="rect">
             <a:avLst/>
           </a:prstGeom>
+          <a:noFill/>
         </p:spPr>
         <p:txBody>
-          <a:bodyPr vert="horz" lIns="91440" tIns="45720" rIns="91440" bIns="45720" rtlCol="0" anchor="ctr"/>
-          <a:lstStyle>
-            <a:defPPr>
-              <a:defRPr lang="en-US"/>
-            </a:defPPr>
-            <a:lvl1pPr marL="0" algn="ctr" defTabSz="914400" rtl="0" eaLnBrk="1" latinLnBrk="0" hangingPunct="1">
-              <a:defRPr sz="1400" kern="1200">
-                <a:solidFill>
-                  <a:srgbClr val="000000"/>
-                </a:solidFill>
-                <a:latin typeface="+mn-lt"/>
-                <a:ea typeface="+mn-ea"/>
-                <a:cs typeface="+mn-cs"/>
-              </a:defRPr>
-            </a:lvl1pPr>
-            <a:lvl2pPr marL="457200" algn="l" defTabSz="914400" rtl="0" eaLnBrk="1" latinLnBrk="0" hangingPunct="1">
-              <a:defRPr sz="1800" kern="1200">
-                <a:solidFill>
-                  <a:schemeClr val="tx1"/>
-                </a:solidFill>
-                <a:latin typeface="+mn-lt"/>
-                <a:ea typeface="+mn-ea"/>
-                <a:cs typeface="+mn-cs"/>
-              </a:defRPr>
-            </a:lvl2pPr>
-            <a:lvl3pPr marL="914400" algn="l" defTabSz="914400" rtl="0" eaLnBrk="1" latinLnBrk="0" hangingPunct="1">
-              <a:defRPr sz="1800" kern="1200">
-                <a:solidFill>
-                  <a:schemeClr val="tx1"/>
-                </a:solidFill>
-                <a:latin typeface="+mn-lt"/>
-                <a:ea typeface="+mn-ea"/>
-                <a:cs typeface="+mn-cs"/>
-              </a:defRPr>
-            </a:lvl3pPr>
-            <a:lvl4pPr marL="1371600" algn="l" defTabSz="914400" rtl="0" eaLnBrk="1" latinLnBrk="0" hangingPunct="1">
-              <a:defRPr sz="1800" kern="1200">
-                <a:solidFill>
-                  <a:schemeClr val="tx1"/>
-                </a:solidFill>
-                <a:latin typeface="+mn-lt"/>
-                <a:ea typeface="+mn-ea"/>
-                <a:cs typeface="+mn-cs"/>
-              </a:defRPr>
-            </a:lvl4pPr>
-            <a:lvl5pPr marL="1828800" algn="l" defTabSz="914400" rtl="0" eaLnBrk="1" latinLnBrk="0" hangingPunct="1">
-              <a:defRPr sz="1800" kern="1200">
-                <a:solidFill>
-                  <a:schemeClr val="tx1"/>
-                </a:solidFill>
-                <a:latin typeface="+mn-lt"/>
-                <a:ea typeface="+mn-ea"/>
-                <a:cs typeface="+mn-cs"/>
-              </a:defRPr>
-            </a:lvl5pPr>
-            <a:lvl6pPr marL="2286000" algn="l" defTabSz="914400" rtl="0" eaLnBrk="1" latinLnBrk="0" hangingPunct="1">
-              <a:defRPr sz="1800" kern="1200">
-                <a:solidFill>
-                  <a:schemeClr val="tx1"/>
-                </a:solidFill>
-                <a:latin typeface="+mn-lt"/>
-                <a:ea typeface="+mn-ea"/>
-                <a:cs typeface="+mn-cs"/>
-              </a:defRPr>
-            </a:lvl6pPr>
-            <a:lvl7pPr marL="2743200" algn="l" defTabSz="914400" rtl="0" eaLnBrk="1" latinLnBrk="0" hangingPunct="1">
-              <a:defRPr sz="1800" kern="1200">
-                <a:solidFill>
-                  <a:schemeClr val="tx1"/>
-                </a:solidFill>
-                <a:latin typeface="+mn-lt"/>
-                <a:ea typeface="+mn-ea"/>
-                <a:cs typeface="+mn-cs"/>
-              </a:defRPr>
-            </a:lvl7pPr>
-            <a:lvl8pPr marL="3200400" algn="l" defTabSz="914400" rtl="0" eaLnBrk="1" latinLnBrk="0" hangingPunct="1">
-              <a:defRPr sz="1800" kern="1200">
-                <a:solidFill>
-                  <a:schemeClr val="tx1"/>
-                </a:solidFill>
-                <a:latin typeface="+mn-lt"/>
-                <a:ea typeface="+mn-ea"/>
-                <a:cs typeface="+mn-cs"/>
-              </a:defRPr>
-            </a:lvl8pPr>
-            <a:lvl9pPr marL="3657600" algn="l" defTabSz="914400" rtl="0" eaLnBrk="1" latinLnBrk="0" hangingPunct="1">
-              <a:defRPr sz="1800" kern="1200">
-                <a:solidFill>
-                  <a:schemeClr val="tx1"/>
-                </a:solidFill>
-                <a:latin typeface="+mn-lt"/>
-                <a:ea typeface="+mn-ea"/>
-                <a:cs typeface="+mn-cs"/>
-              </a:defRPr>
-            </a:lvl9pPr>
-          </a:lstStyle>
-          <a:p>
-            <a:pPr algn="l"/>
-            <a:r>
-              <a:rPr lang="en-US" dirty="0" smtClean="0"/>
-              <a:t>GE</a:t>
-            </a:r>
-            <a:endParaRPr lang="en-US" dirty="0"/>
+          <a:bodyPr wrap="square" rtlCol="0">
+            <a:spAutoFit/>
+          </a:bodyPr>
+          <a:lstStyle/>
+          <a:p>
+            <a:pPr marL="285750" indent="-285750">
+              <a:buFont typeface="Arial" panose="020B0604020202020204" pitchFamily="34" charset="0"/>
+              <a:buChar char="•"/>
+            </a:pPr>
+            <a:r>
+              <a:rPr lang="en-US" sz="2000" b="1" dirty="0"/>
+              <a:t>Contingency: </a:t>
+            </a:r>
+            <a:r>
+              <a:rPr lang="en-US" sz="2000" dirty="0"/>
+              <a:t>Contingency analysis fails for requirement r if it is provably false (unrealizable) or true (redundant) under all value assignments to variables of r.</a:t>
+            </a:r>
+          </a:p>
+          <a:p>
+            <a:pPr marL="285750" indent="-285750">
+              <a:buFont typeface="Arial" panose="020B0604020202020204" pitchFamily="34" charset="0"/>
+              <a:buChar char="•"/>
+            </a:pPr>
+            <a:r>
+              <a:rPr lang="en-US" sz="2000" b="1" dirty="0"/>
+              <a:t>Conflict: </a:t>
+            </a:r>
+            <a:r>
+              <a:rPr lang="en-US" sz="2000" dirty="0"/>
+              <a:t>requirements r1 and r2 that set a common controlled variable v, if for some input value of the monitored variables r1 assigns v to a different value than r2</a:t>
+            </a:r>
+          </a:p>
+          <a:p>
+            <a:pPr marL="285750" indent="-285750">
+              <a:buFont typeface="Arial" panose="020B0604020202020204" pitchFamily="34" charset="0"/>
+              <a:buChar char="•"/>
+            </a:pPr>
+            <a:r>
+              <a:rPr lang="en-US" sz="2000" b="1" dirty="0"/>
+              <a:t>Completeness: </a:t>
+            </a:r>
+            <a:r>
+              <a:rPr lang="en-US" sz="2000" dirty="0"/>
+              <a:t>A set of requirements with the same controlled variable is complete if there is a requirement for all values of the monitored variables in the set.</a:t>
+            </a:r>
+          </a:p>
+          <a:p>
+            <a:pPr marL="285750" indent="-285750">
+              <a:buFont typeface="Arial" panose="020B0604020202020204" pitchFamily="34" charset="0"/>
+              <a:buChar char="•"/>
+            </a:pPr>
+            <a:r>
+              <a:rPr lang="en-US" sz="2000" b="1" dirty="0"/>
+              <a:t>Subjectivity: </a:t>
+            </a:r>
+            <a:r>
+              <a:rPr lang="en-US" sz="2000" dirty="0"/>
+              <a:t>controlled variable v with respect to requirements R fails if there is some output value for v (in the type domain of v) that is not assigned (set) by any requirement in R.</a:t>
+            </a:r>
+          </a:p>
+          <a:p>
+            <a:pPr marL="285750" indent="-285750">
+              <a:buFont typeface="Arial" panose="020B0604020202020204" pitchFamily="34" charset="0"/>
+              <a:buChar char="•"/>
+            </a:pPr>
+            <a:r>
+              <a:rPr lang="en-US" sz="2000" b="1" dirty="0"/>
+              <a:t>Independence: </a:t>
+            </a:r>
+            <a:r>
+              <a:rPr lang="en-US" sz="2000" dirty="0"/>
+              <a:t>Independence Analysis for requirement r with respect to requirements R fails if the conjunction of 'when' parts of R implies the 'when' part of r and both R and r set the controlled variable of r to the same value.</a:t>
+            </a:r>
           </a:p>
         </p:txBody>
       </p:sp>
     </p:spTree>
     <p:extLst>
       <p:ext uri="{BB962C8B-B14F-4D97-AF65-F5344CB8AC3E}">
-        <p14:creationId xmlns:p14="http://schemas.microsoft.com/office/powerpoint/2010/main" val="1742350916"/>
+        <p14:creationId xmlns:p14="http://schemas.microsoft.com/office/powerpoint/2010/main" val="92091782"/>
       </p:ext>
     </p:extLst>
   </p:cSld>
@@ -13863,7 +13790,429 @@
           </a:bodyPr>
           <a:lstStyle/>
           <a:p>
-            <a:pPr algn="ctr"/>
+            <a:r>
+              <a:rPr lang="en-US" dirty="0"/>
+              <a:t>Modeling UxAS System Architecture in SADL Ontology</a:t>
+            </a:r>
+          </a:p>
+        </p:txBody>
+      </p:sp>
+      <p:pic>
+        <p:nvPicPr>
+          <p:cNvPr id="4" name="Picture 3"/>
+          <p:cNvPicPr>
+            <a:picLocks noChangeAspect="1"/>
+          </p:cNvPicPr>
+          <p:nvPr/>
+        </p:nvPicPr>
+        <p:blipFill>
+          <a:blip r:embed="rId3"/>
+          <a:stretch>
+            <a:fillRect/>
+          </a:stretch>
+        </p:blipFill>
+        <p:spPr>
+          <a:xfrm>
+            <a:off x="1128567" y="1514924"/>
+            <a:ext cx="9853662" cy="4678486"/>
+          </a:xfrm>
+          <a:prstGeom prst="rect">
+            <a:avLst/>
+          </a:prstGeom>
+        </p:spPr>
+      </p:pic>
+      <p:sp>
+        <p:nvSpPr>
+          <p:cNvPr id="5" name="Footer Placeholder 4"/>
+          <p:cNvSpPr>
+            <a:spLocks noGrp="1"/>
+          </p:cNvSpPr>
+          <p:nvPr>
+            <p:ph type="ftr" sz="quarter" idx="11"/>
+          </p:nvPr>
+        </p:nvSpPr>
+        <p:spPr/>
+        <p:txBody>
+          <a:bodyPr/>
+          <a:lstStyle/>
+          <a:p>
+            <a:r>
+              <a:rPr lang="en-US" smtClean="0"/>
+              <a:t>Architecture Group</a:t>
+            </a:r>
+            <a:endParaRPr lang="en-US"/>
+          </a:p>
+        </p:txBody>
+      </p:sp>
+      <p:sp>
+        <p:nvSpPr>
+          <p:cNvPr id="7" name="Footer Placeholder 3"/>
+          <p:cNvSpPr txBox="1">
+            <a:spLocks/>
+          </p:cNvSpPr>
+          <p:nvPr/>
+        </p:nvSpPr>
+        <p:spPr>
+          <a:xfrm>
+            <a:off x="102476" y="6437441"/>
+            <a:ext cx="4532586" cy="306936"/>
+          </a:xfrm>
+          <a:prstGeom prst="rect">
+            <a:avLst/>
+          </a:prstGeom>
+        </p:spPr>
+        <p:txBody>
+          <a:bodyPr vert="horz" lIns="91440" tIns="45720" rIns="91440" bIns="45720" rtlCol="0" anchor="ctr"/>
+          <a:lstStyle>
+            <a:defPPr>
+              <a:defRPr lang="en-US"/>
+            </a:defPPr>
+            <a:lvl1pPr marL="0" algn="ctr" defTabSz="914400" rtl="0" eaLnBrk="1" latinLnBrk="0" hangingPunct="1">
+              <a:defRPr sz="1400" kern="1200">
+                <a:solidFill>
+                  <a:srgbClr val="000000"/>
+                </a:solidFill>
+                <a:latin typeface="+mn-lt"/>
+                <a:ea typeface="+mn-ea"/>
+                <a:cs typeface="+mn-cs"/>
+              </a:defRPr>
+            </a:lvl1pPr>
+            <a:lvl2pPr marL="457200" algn="l" defTabSz="914400" rtl="0" eaLnBrk="1" latinLnBrk="0" hangingPunct="1">
+              <a:defRPr sz="1800" kern="1200">
+                <a:solidFill>
+                  <a:schemeClr val="tx1"/>
+                </a:solidFill>
+                <a:latin typeface="+mn-lt"/>
+                <a:ea typeface="+mn-ea"/>
+                <a:cs typeface="+mn-cs"/>
+              </a:defRPr>
+            </a:lvl2pPr>
+            <a:lvl3pPr marL="914400" algn="l" defTabSz="914400" rtl="0" eaLnBrk="1" latinLnBrk="0" hangingPunct="1">
+              <a:defRPr sz="1800" kern="1200">
+                <a:solidFill>
+                  <a:schemeClr val="tx1"/>
+                </a:solidFill>
+                <a:latin typeface="+mn-lt"/>
+                <a:ea typeface="+mn-ea"/>
+                <a:cs typeface="+mn-cs"/>
+              </a:defRPr>
+            </a:lvl3pPr>
+            <a:lvl4pPr marL="1371600" algn="l" defTabSz="914400" rtl="0" eaLnBrk="1" latinLnBrk="0" hangingPunct="1">
+              <a:defRPr sz="1800" kern="1200">
+                <a:solidFill>
+                  <a:schemeClr val="tx1"/>
+                </a:solidFill>
+                <a:latin typeface="+mn-lt"/>
+                <a:ea typeface="+mn-ea"/>
+                <a:cs typeface="+mn-cs"/>
+              </a:defRPr>
+            </a:lvl4pPr>
+            <a:lvl5pPr marL="1828800" algn="l" defTabSz="914400" rtl="0" eaLnBrk="1" latinLnBrk="0" hangingPunct="1">
+              <a:defRPr sz="1800" kern="1200">
+                <a:solidFill>
+                  <a:schemeClr val="tx1"/>
+                </a:solidFill>
+                <a:latin typeface="+mn-lt"/>
+                <a:ea typeface="+mn-ea"/>
+                <a:cs typeface="+mn-cs"/>
+              </a:defRPr>
+            </a:lvl5pPr>
+            <a:lvl6pPr marL="2286000" algn="l" defTabSz="914400" rtl="0" eaLnBrk="1" latinLnBrk="0" hangingPunct="1">
+              <a:defRPr sz="1800" kern="1200">
+                <a:solidFill>
+                  <a:schemeClr val="tx1"/>
+                </a:solidFill>
+                <a:latin typeface="+mn-lt"/>
+                <a:ea typeface="+mn-ea"/>
+                <a:cs typeface="+mn-cs"/>
+              </a:defRPr>
+            </a:lvl6pPr>
+            <a:lvl7pPr marL="2743200" algn="l" defTabSz="914400" rtl="0" eaLnBrk="1" latinLnBrk="0" hangingPunct="1">
+              <a:defRPr sz="1800" kern="1200">
+                <a:solidFill>
+                  <a:schemeClr val="tx1"/>
+                </a:solidFill>
+                <a:latin typeface="+mn-lt"/>
+                <a:ea typeface="+mn-ea"/>
+                <a:cs typeface="+mn-cs"/>
+              </a:defRPr>
+            </a:lvl7pPr>
+            <a:lvl8pPr marL="3200400" algn="l" defTabSz="914400" rtl="0" eaLnBrk="1" latinLnBrk="0" hangingPunct="1">
+              <a:defRPr sz="1800" kern="1200">
+                <a:solidFill>
+                  <a:schemeClr val="tx1"/>
+                </a:solidFill>
+                <a:latin typeface="+mn-lt"/>
+                <a:ea typeface="+mn-ea"/>
+                <a:cs typeface="+mn-cs"/>
+              </a:defRPr>
+            </a:lvl8pPr>
+            <a:lvl9pPr marL="3657600" algn="l" defTabSz="914400" rtl="0" eaLnBrk="1" latinLnBrk="0" hangingPunct="1">
+              <a:defRPr sz="1800" kern="1200">
+                <a:solidFill>
+                  <a:schemeClr val="tx1"/>
+                </a:solidFill>
+                <a:latin typeface="+mn-lt"/>
+                <a:ea typeface="+mn-ea"/>
+                <a:cs typeface="+mn-cs"/>
+              </a:defRPr>
+            </a:lvl9pPr>
+          </a:lstStyle>
+          <a:p>
+            <a:pPr algn="l"/>
+            <a:r>
+              <a:rPr lang="en-US" dirty="0" smtClean="0"/>
+              <a:t>GE</a:t>
+            </a:r>
+            <a:endParaRPr lang="en-US" dirty="0"/>
+          </a:p>
+        </p:txBody>
+      </p:sp>
+    </p:spTree>
+    <p:extLst>
+      <p:ext uri="{BB962C8B-B14F-4D97-AF65-F5344CB8AC3E}">
+        <p14:creationId xmlns:p14="http://schemas.microsoft.com/office/powerpoint/2010/main" val="1742350916"/>
+      </p:ext>
+    </p:extLst>
+  </p:cSld>
+  <p:clrMapOvr>
+    <a:masterClrMapping/>
+  </p:clrMapOvr>
+  <p:timing>
+    <p:tnLst>
+      <p:par>
+        <p:cTn id="1" dur="indefinite" restart="never" nodeType="tmRoot"/>
+      </p:par>
+    </p:tnLst>
+  </p:timing>
+</p:sld>
+</file>
+
+<file path=ppt/slides/slide2.xml><?xml version="1.0" encoding="utf-8"?>
+<p:sld xmlns:a="http://schemas.openxmlformats.org/drawingml/2006/main" xmlns:r="http://schemas.openxmlformats.org/officeDocument/2006/relationships" xmlns:p="http://schemas.openxmlformats.org/presentationml/2006/main">
+  <p:cSld>
+    <p:spTree>
+      <p:nvGrpSpPr>
+        <p:cNvPr id="1" name=""/>
+        <p:cNvGrpSpPr/>
+        <p:nvPr/>
+      </p:nvGrpSpPr>
+      <p:grpSpPr>
+        <a:xfrm>
+          <a:off x="0" y="0"/>
+          <a:ext cx="0" cy="0"/>
+          <a:chOff x="0" y="0"/>
+          <a:chExt cx="0" cy="0"/>
+        </a:xfrm>
+      </p:grpSpPr>
+      <p:sp>
+        <p:nvSpPr>
+          <p:cNvPr id="2" name="Title 1"/>
+          <p:cNvSpPr>
+            <a:spLocks noGrp="1"/>
+          </p:cNvSpPr>
+          <p:nvPr>
+            <p:ph type="title"/>
+          </p:nvPr>
+        </p:nvSpPr>
+        <p:spPr/>
+        <p:txBody>
+          <a:bodyPr/>
+          <a:lstStyle/>
+          <a:p>
+            <a:r>
+              <a:rPr lang="en-US" dirty="0" smtClean="0"/>
+              <a:t>Agenda</a:t>
+            </a:r>
+            <a:endParaRPr lang="en-US" dirty="0"/>
+          </a:p>
+        </p:txBody>
+      </p:sp>
+      <p:sp>
+        <p:nvSpPr>
+          <p:cNvPr id="3" name="Content Placeholder 2"/>
+          <p:cNvSpPr>
+            <a:spLocks noGrp="1"/>
+          </p:cNvSpPr>
+          <p:nvPr>
+            <p:ph idx="1"/>
+          </p:nvPr>
+        </p:nvSpPr>
+        <p:spPr/>
+        <p:txBody>
+          <a:bodyPr/>
+          <a:lstStyle/>
+          <a:p>
+            <a:pPr>
+              <a:lnSpc>
+                <a:spcPct val="100000"/>
+              </a:lnSpc>
+              <a:spcBef>
+                <a:spcPts val="200"/>
+              </a:spcBef>
+            </a:pPr>
+            <a:r>
+              <a:rPr lang="en-US" dirty="0" smtClean="0"/>
+              <a:t>Group Description</a:t>
+            </a:r>
+          </a:p>
+          <a:p>
+            <a:pPr>
+              <a:lnSpc>
+                <a:spcPct val="100000"/>
+              </a:lnSpc>
+              <a:spcBef>
+                <a:spcPts val="200"/>
+              </a:spcBef>
+            </a:pPr>
+            <a:r>
+              <a:rPr lang="en-US" dirty="0" smtClean="0"/>
+              <a:t>Group Objectives</a:t>
+            </a:r>
+          </a:p>
+          <a:p>
+            <a:pPr>
+              <a:lnSpc>
+                <a:spcPct val="100000"/>
+              </a:lnSpc>
+              <a:spcBef>
+                <a:spcPts val="200"/>
+              </a:spcBef>
+            </a:pPr>
+            <a:r>
+              <a:rPr lang="en-US" dirty="0" smtClean="0"/>
+              <a:t>Group Accomplishments</a:t>
+            </a:r>
+          </a:p>
+          <a:p>
+            <a:pPr>
+              <a:lnSpc>
+                <a:spcPct val="100000"/>
+              </a:lnSpc>
+              <a:spcBef>
+                <a:spcPts val="200"/>
+              </a:spcBef>
+            </a:pPr>
+            <a:r>
+              <a:rPr lang="en-US" dirty="0" smtClean="0"/>
+              <a:t>Lessons Learned</a:t>
+            </a:r>
+          </a:p>
+          <a:p>
+            <a:pPr>
+              <a:lnSpc>
+                <a:spcPct val="100000"/>
+              </a:lnSpc>
+              <a:spcBef>
+                <a:spcPts val="200"/>
+              </a:spcBef>
+            </a:pPr>
+            <a:r>
+              <a:rPr lang="en-US" dirty="0" smtClean="0"/>
+              <a:t>Recommended Future Directions</a:t>
+            </a:r>
+          </a:p>
+          <a:p>
+            <a:pPr>
+              <a:lnSpc>
+                <a:spcPct val="100000"/>
+              </a:lnSpc>
+              <a:spcBef>
+                <a:spcPts val="200"/>
+              </a:spcBef>
+            </a:pPr>
+            <a:endParaRPr lang="en-US" dirty="0" smtClean="0"/>
+          </a:p>
+          <a:p>
+            <a:endParaRPr lang="en-US" dirty="0"/>
+          </a:p>
+        </p:txBody>
+      </p:sp>
+      <p:sp>
+        <p:nvSpPr>
+          <p:cNvPr id="6" name="Footer Placeholder 5"/>
+          <p:cNvSpPr>
+            <a:spLocks noGrp="1"/>
+          </p:cNvSpPr>
+          <p:nvPr>
+            <p:ph type="ftr" sz="quarter" idx="11"/>
+          </p:nvPr>
+        </p:nvSpPr>
+        <p:spPr/>
+        <p:txBody>
+          <a:bodyPr/>
+          <a:lstStyle/>
+          <a:p>
+            <a:r>
+              <a:rPr lang="en-US" smtClean="0"/>
+              <a:t>Architecture Group</a:t>
+            </a:r>
+            <a:endParaRPr lang="en-US"/>
+          </a:p>
+        </p:txBody>
+      </p:sp>
+    </p:spTree>
+    <p:extLst>
+      <p:ext uri="{BB962C8B-B14F-4D97-AF65-F5344CB8AC3E}">
+        <p14:creationId xmlns:p14="http://schemas.microsoft.com/office/powerpoint/2010/main" val="1165000552"/>
+      </p:ext>
+    </p:extLst>
+  </p:cSld>
+  <p:clrMapOvr>
+    <a:masterClrMapping/>
+  </p:clrMapOvr>
+  <mc:AlternateContent xmlns:mc="http://schemas.openxmlformats.org/markup-compatibility/2006" xmlns:p14="http://schemas.microsoft.com/office/powerpoint/2010/main">
+    <mc:Choice Requires="p14">
+      <p:transition spd="slow" p14:dur="2000"/>
+    </mc:Choice>
+    <mc:Fallback xmlns="">
+      <p:transition spd="slow"/>
+    </mc:Fallback>
+  </mc:AlternateContent>
+  <p:timing>
+    <p:tnLst>
+      <p:par>
+        <p:cTn id="1" dur="indefinite" restart="never" nodeType="tmRoot"/>
+      </p:par>
+    </p:tnLst>
+  </p:timing>
+</p:sld>
+</file>
+
+<file path=ppt/slides/slide20.xml><?xml version="1.0" encoding="utf-8"?>
+<p:sld xmlns:a="http://schemas.openxmlformats.org/drawingml/2006/main" xmlns:r="http://schemas.openxmlformats.org/officeDocument/2006/relationships" xmlns:p="http://schemas.openxmlformats.org/presentationml/2006/main">
+  <p:cSld>
+    <p:spTree>
+      <p:nvGrpSpPr>
+        <p:cNvPr id="1" name=""/>
+        <p:cNvGrpSpPr/>
+        <p:nvPr/>
+      </p:nvGrpSpPr>
+      <p:grpSpPr>
+        <a:xfrm>
+          <a:off x="0" y="0"/>
+          <a:ext cx="0" cy="0"/>
+          <a:chOff x="0" y="0"/>
+          <a:chExt cx="0" cy="0"/>
+        </a:xfrm>
+      </p:grpSpPr>
+      <p:sp>
+        <p:nvSpPr>
+          <p:cNvPr id="2" name="Title 1"/>
+          <p:cNvSpPr>
+            <a:spLocks noGrp="1"/>
+          </p:cNvSpPr>
+          <p:nvPr>
+            <p:ph type="title"/>
+          </p:nvPr>
+        </p:nvSpPr>
+        <p:spPr/>
+        <p:txBody>
+          <a:bodyPr>
+            <a:normAutofit fontScale="90000"/>
+          </a:bodyPr>
+          <a:lstStyle/>
+          <a:p>
             <a:r>
               <a:rPr lang="en-US" dirty="0"/>
               <a:t>Modeling Message Type Definition in SADL Ontology</a:t>
@@ -14066,198 +14415,7 @@
 </p:sld>
 </file>
 
-<file path=ppt/slides/slide2.xml><?xml version="1.0" encoding="utf-8"?>
-<p:sld xmlns:a="http://schemas.openxmlformats.org/drawingml/2006/main" xmlns:r="http://schemas.openxmlformats.org/officeDocument/2006/relationships" xmlns:p="http://schemas.openxmlformats.org/presentationml/2006/main">
-  <p:cSld>
-    <p:spTree>
-      <p:nvGrpSpPr>
-        <p:cNvPr id="1" name=""/>
-        <p:cNvGrpSpPr/>
-        <p:nvPr/>
-      </p:nvGrpSpPr>
-      <p:grpSpPr>
-        <a:xfrm>
-          <a:off x="0" y="0"/>
-          <a:ext cx="0" cy="0"/>
-          <a:chOff x="0" y="0"/>
-          <a:chExt cx="0" cy="0"/>
-        </a:xfrm>
-      </p:grpSpPr>
-      <p:sp>
-        <p:nvSpPr>
-          <p:cNvPr id="2" name="Title 1"/>
-          <p:cNvSpPr>
-            <a:spLocks noGrp="1"/>
-          </p:cNvSpPr>
-          <p:nvPr>
-            <p:ph type="title"/>
-          </p:nvPr>
-        </p:nvSpPr>
-        <p:spPr/>
-        <p:txBody>
-          <a:bodyPr/>
-          <a:lstStyle/>
-          <a:p>
-            <a:r>
-              <a:rPr lang="en-US" dirty="0" smtClean="0"/>
-              <a:t>Agenda</a:t>
-            </a:r>
-            <a:endParaRPr lang="en-US" dirty="0"/>
-          </a:p>
-        </p:txBody>
-      </p:sp>
-      <p:sp>
-        <p:nvSpPr>
-          <p:cNvPr id="3" name="Content Placeholder 2"/>
-          <p:cNvSpPr>
-            <a:spLocks noGrp="1"/>
-          </p:cNvSpPr>
-          <p:nvPr>
-            <p:ph idx="1"/>
-          </p:nvPr>
-        </p:nvSpPr>
-        <p:spPr/>
-        <p:txBody>
-          <a:bodyPr/>
-          <a:lstStyle/>
-          <a:p>
-            <a:pPr>
-              <a:lnSpc>
-                <a:spcPct val="100000"/>
-              </a:lnSpc>
-              <a:spcBef>
-                <a:spcPts val="200"/>
-              </a:spcBef>
-            </a:pPr>
-            <a:r>
-              <a:rPr lang="en-US" dirty="0" smtClean="0"/>
-              <a:t>Group Description</a:t>
-            </a:r>
-          </a:p>
-          <a:p>
-            <a:pPr>
-              <a:lnSpc>
-                <a:spcPct val="100000"/>
-              </a:lnSpc>
-              <a:spcBef>
-                <a:spcPts val="200"/>
-              </a:spcBef>
-            </a:pPr>
-            <a:r>
-              <a:rPr lang="en-US" dirty="0" smtClean="0"/>
-              <a:t>Group Objectives</a:t>
-            </a:r>
-          </a:p>
-          <a:p>
-            <a:pPr>
-              <a:lnSpc>
-                <a:spcPct val="100000"/>
-              </a:lnSpc>
-              <a:spcBef>
-                <a:spcPts val="200"/>
-              </a:spcBef>
-            </a:pPr>
-            <a:r>
-              <a:rPr lang="en-US" dirty="0" smtClean="0"/>
-              <a:t>Group Accomplishments</a:t>
-            </a:r>
-          </a:p>
-          <a:p>
-            <a:pPr>
-              <a:lnSpc>
-                <a:spcPct val="100000"/>
-              </a:lnSpc>
-              <a:spcBef>
-                <a:spcPts val="200"/>
-              </a:spcBef>
-            </a:pPr>
-            <a:r>
-              <a:rPr lang="en-US" dirty="0" smtClean="0"/>
-              <a:t>Lessons Learned</a:t>
-            </a:r>
-          </a:p>
-          <a:p>
-            <a:pPr>
-              <a:lnSpc>
-                <a:spcPct val="100000"/>
-              </a:lnSpc>
-              <a:spcBef>
-                <a:spcPts val="200"/>
-              </a:spcBef>
-            </a:pPr>
-            <a:r>
-              <a:rPr lang="en-US" dirty="0" smtClean="0"/>
-              <a:t>Recommended Future Directions</a:t>
-            </a:r>
-          </a:p>
-          <a:p>
-            <a:pPr>
-              <a:lnSpc>
-                <a:spcPct val="100000"/>
-              </a:lnSpc>
-              <a:spcBef>
-                <a:spcPts val="200"/>
-              </a:spcBef>
-            </a:pPr>
-            <a:endParaRPr lang="en-US" dirty="0" smtClean="0"/>
-          </a:p>
-          <a:p>
-            <a:endParaRPr lang="en-US" dirty="0"/>
-          </a:p>
-        </p:txBody>
-      </p:sp>
-      <p:sp>
-        <p:nvSpPr>
-          <p:cNvPr id="6" name="Footer Placeholder 5"/>
-          <p:cNvSpPr>
-            <a:spLocks noGrp="1"/>
-          </p:cNvSpPr>
-          <p:nvPr>
-            <p:ph type="ftr" sz="quarter" idx="11"/>
-          </p:nvPr>
-        </p:nvSpPr>
-        <p:spPr/>
-        <p:txBody>
-          <a:bodyPr/>
-          <a:lstStyle/>
-          <a:p>
-            <a:r>
-              <a:rPr lang="en-US" smtClean="0"/>
-              <a:t>Architecture Group</a:t>
-            </a:r>
-            <a:endParaRPr lang="en-US"/>
-          </a:p>
-        </p:txBody>
-      </p:sp>
-    </p:spTree>
-    <p:extLst>
-      <p:ext uri="{BB962C8B-B14F-4D97-AF65-F5344CB8AC3E}">
-        <p14:creationId xmlns:p14="http://schemas.microsoft.com/office/powerpoint/2010/main" val="1165000552"/>
-      </p:ext>
-    </p:extLst>
-  </p:cSld>
-  <p:clrMapOvr>
-    <a:masterClrMapping/>
-  </p:clrMapOvr>
-  <mc:AlternateContent xmlns:mc="http://schemas.openxmlformats.org/markup-compatibility/2006" xmlns:p14="http://schemas.microsoft.com/office/powerpoint/2010/main">
-    <mc:Choice Requires="p14">
-      <p:transition spd="slow" p14:dur="2000"/>
-    </mc:Choice>
-    <mc:Fallback xmlns="">
-      <p:transition spd="slow"/>
-    </mc:Fallback>
-  </mc:AlternateContent>
-  <p:timing>
-    <p:tnLst>
-      <p:par>
-        <p:cTn id="1" dur="indefinite" restart="never" nodeType="tmRoot"/>
-      </p:par>
-    </p:tnLst>
-  </p:timing>
-</p:sld>
-</file>
-
-<file path=ppt/slides/slide20.xml><?xml version="1.0" encoding="utf-8"?>
+<file path=ppt/slides/slide21.xml><?xml version="1.0" encoding="utf-8"?>
 <p:sld xmlns:a="http://schemas.openxmlformats.org/drawingml/2006/main" xmlns:r="http://schemas.openxmlformats.org/officeDocument/2006/relationships" xmlns:p="http://schemas.openxmlformats.org/presentationml/2006/main">
   <p:cSld>
     <p:spTree>
@@ -15461,7 +15619,7 @@
 </p:sld>
 </file>
 
-<file path=ppt/slides/slide21.xml><?xml version="1.0" encoding="utf-8"?>
+<file path=ppt/slides/slide22.xml><?xml version="1.0" encoding="utf-8"?>
 <p:sld xmlns:a="http://schemas.openxmlformats.org/drawingml/2006/main" xmlns:r="http://schemas.openxmlformats.org/officeDocument/2006/relationships" xmlns:p="http://schemas.openxmlformats.org/presentationml/2006/main">
   <p:cSld>
     <p:spTree>
@@ -15495,10 +15653,17 @@
           </a:bodyPr>
           <a:lstStyle/>
           <a:p>
-            <a:pPr algn="ctr"/>
             <a:r>
               <a:rPr lang="en-US" dirty="0"/>
-              <a:t>Illustrative example: Sample AADL Contracts Captured in SADL  </a:t>
+              <a:t>Illustrative </a:t>
+            </a:r>
+            <a:r>
+              <a:rPr lang="en-US" dirty="0" smtClean="0"/>
+              <a:t>Example</a:t>
+            </a:r>
+            <a:r>
+              <a:rPr lang="en-US" dirty="0"/>
+              <a:t>: Sample AADL Contracts Captured in SADL  </a:t>
             </a:r>
           </a:p>
         </p:txBody>
@@ -15703,7 +15868,7 @@
 </p:sld>
 </file>
 
-<file path=ppt/slides/slide22.xml><?xml version="1.0" encoding="utf-8"?>
+<file path=ppt/slides/slide23.xml><?xml version="1.0" encoding="utf-8"?>
 <p:sld xmlns:a="http://schemas.openxmlformats.org/drawingml/2006/main" xmlns:r="http://schemas.openxmlformats.org/officeDocument/2006/relationships" xmlns:p="http://schemas.openxmlformats.org/presentationml/2006/main">
   <p:cSld>
     <p:spTree>
@@ -15735,10 +15900,17 @@
           <a:bodyPr/>
           <a:lstStyle/>
           <a:p>
-            <a:pPr algn="ctr"/>
             <a:r>
               <a:rPr lang="en-US" dirty="0"/>
-              <a:t>Illustrative example: </a:t>
+              <a:t>Illustrative </a:t>
+            </a:r>
+            <a:r>
+              <a:rPr lang="en-US" dirty="0" smtClean="0"/>
+              <a:t>Example</a:t>
+            </a:r>
+            <a:r>
+              <a:rPr lang="en-US" dirty="0"/>
+              <a:t>: </a:t>
             </a:r>
             <a:r>
               <a:rPr lang="en-US" dirty="0" smtClean="0"/>
@@ -16466,7 +16638,7 @@
 </p:sld>
 </file>
 
-<file path=ppt/slides/slide23.xml><?xml version="1.0" encoding="utf-8"?>
+<file path=ppt/slides/slide24.xml><?xml version="1.0" encoding="utf-8"?>
 <p:sld xmlns:a="http://schemas.openxmlformats.org/drawingml/2006/main" xmlns:r="http://schemas.openxmlformats.org/officeDocument/2006/relationships" xmlns:p="http://schemas.openxmlformats.org/presentationml/2006/main">
   <p:cSld>
     <p:spTree>
@@ -16513,7 +16685,15 @@
             </a:r>
             <a:r>
               <a:rPr lang="en-US" sz="4000" dirty="0"/>
-              <a:t>example: Modified </a:t>
+              <a:t>E</a:t>
+            </a:r>
+            <a:r>
+              <a:rPr lang="en-US" sz="4000" dirty="0" smtClean="0"/>
+              <a:t>xample</a:t>
+            </a:r>
+            <a:r>
+              <a:rPr lang="en-US" sz="4000" dirty="0"/>
+              <a:t>: Modified </a:t>
             </a:r>
             <a:r>
               <a:rPr lang="en-US" sz="4000" dirty="0" smtClean="0"/>
@@ -16825,75 +17005,6 @@
       </p:sp>
       <p:sp>
         <p:nvSpPr>
-          <p:cNvPr id="3" name="TextBox 2"/>
-          <p:cNvSpPr txBox="1"/>
-          <p:nvPr/>
-        </p:nvSpPr>
-        <p:spPr>
-          <a:xfrm>
-            <a:off x="8050491" y="1462820"/>
-            <a:ext cx="3889463" cy="1323439"/>
-          </a:xfrm>
-          <a:prstGeom prst="rect">
-            <a:avLst/>
-          </a:prstGeom>
-          <a:solidFill>
-            <a:schemeClr val="accent1">
-              <a:lumMod val="60000"/>
-              <a:lumOff val="40000"/>
-            </a:schemeClr>
-          </a:solidFill>
-        </p:spPr>
-        <p:txBody>
-          <a:bodyPr wrap="square" rtlCol="0">
-            <a:spAutoFit/>
-          </a:bodyPr>
-          <a:lstStyle/>
-          <a:p>
-            <a:r>
-              <a:rPr lang="en-US" sz="1600" dirty="0"/>
-              <a:t>A</a:t>
-            </a:r>
-            <a:r>
-              <a:rPr lang="en-US" sz="1600" dirty="0" smtClean="0"/>
-              <a:t>nalysis enabled:</a:t>
-            </a:r>
-          </a:p>
-          <a:p>
-            <a:pPr marL="285750" indent="-285750">
-              <a:buFont typeface="Arial" panose="020B0604020202020204" pitchFamily="34" charset="0"/>
-              <a:buChar char="•"/>
-            </a:pPr>
-            <a:r>
-              <a:rPr lang="en-US" sz="1600" dirty="0" smtClean="0"/>
-              <a:t>Redundancy check</a:t>
-            </a:r>
-          </a:p>
-          <a:p>
-            <a:pPr marL="285750" indent="-285750">
-              <a:buFont typeface="Arial" panose="020B0604020202020204" pitchFamily="34" charset="0"/>
-              <a:buChar char="•"/>
-            </a:pPr>
-            <a:r>
-              <a:rPr lang="en-US" sz="1600" dirty="0" smtClean="0"/>
-              <a:t>Conflict check</a:t>
-            </a:r>
-          </a:p>
-          <a:p>
-            <a:pPr marL="285750" indent="-285750">
-              <a:buFont typeface="Arial" panose="020B0604020202020204" pitchFamily="34" charset="0"/>
-              <a:buChar char="•"/>
-            </a:pPr>
-            <a:r>
-              <a:rPr lang="en-US" sz="1600" dirty="0" smtClean="0"/>
-              <a:t>Completeness check (e.g., handle all cases of a variable’s value)</a:t>
-            </a:r>
-            <a:endParaRPr lang="en-US" sz="1600" dirty="0"/>
-          </a:p>
-        </p:txBody>
-      </p:sp>
-      <p:sp>
-        <p:nvSpPr>
           <p:cNvPr id="8" name="Footer Placeholder 7"/>
           <p:cNvSpPr>
             <a:spLocks noGrp="1"/>
@@ -16919,241 +17030,6 @@
     <p:extLst>
       <p:ext uri="{BB962C8B-B14F-4D97-AF65-F5344CB8AC3E}">
         <p14:creationId xmlns:p14="http://schemas.microsoft.com/office/powerpoint/2010/main" val="2157516037"/>
-      </p:ext>
-    </p:extLst>
-  </p:cSld>
-  <p:clrMapOvr>
-    <a:masterClrMapping/>
-  </p:clrMapOvr>
-  <mc:AlternateContent xmlns:mc="http://schemas.openxmlformats.org/markup-compatibility/2006" xmlns:p14="http://schemas.microsoft.com/office/powerpoint/2010/main">
-    <mc:Choice Requires="p14">
-      <p:transition spd="slow" p14:dur="2000"/>
-    </mc:Choice>
-    <mc:Fallback xmlns="">
-      <p:transition spd="slow"/>
-    </mc:Fallback>
-  </mc:AlternateContent>
-  <p:timing>
-    <p:tnLst>
-      <p:par>
-        <p:cTn id="1" dur="indefinite" restart="never" nodeType="tmRoot"/>
-      </p:par>
-    </p:tnLst>
-  </p:timing>
-</p:sld>
-</file>
-
-<file path=ppt/slides/slide24.xml><?xml version="1.0" encoding="utf-8"?>
-<p:sld xmlns:a="http://schemas.openxmlformats.org/drawingml/2006/main" xmlns:r="http://schemas.openxmlformats.org/officeDocument/2006/relationships" xmlns:p="http://schemas.openxmlformats.org/presentationml/2006/main">
-  <p:cSld>
-    <p:spTree>
-      <p:nvGrpSpPr>
-        <p:cNvPr id="1" name=""/>
-        <p:cNvGrpSpPr/>
-        <p:nvPr/>
-      </p:nvGrpSpPr>
-      <p:grpSpPr>
-        <a:xfrm>
-          <a:off x="0" y="0"/>
-          <a:ext cx="0" cy="0"/>
-          <a:chOff x="0" y="0"/>
-          <a:chExt cx="0" cy="0"/>
-        </a:xfrm>
-      </p:grpSpPr>
-      <p:sp>
-        <p:nvSpPr>
-          <p:cNvPr id="2" name="Title 1"/>
-          <p:cNvSpPr>
-            <a:spLocks noGrp="1"/>
-          </p:cNvSpPr>
-          <p:nvPr>
-            <p:ph type="title"/>
-          </p:nvPr>
-        </p:nvSpPr>
-        <p:spPr/>
-        <p:txBody>
-          <a:bodyPr>
-            <a:normAutofit fontScale="90000"/>
-          </a:bodyPr>
-          <a:lstStyle/>
-          <a:p>
-            <a:r>
-              <a:rPr lang="en-US" dirty="0" smtClean="0"/>
-              <a:t>From the lead developer: </a:t>
-            </a:r>
-            <a:br>
-              <a:rPr lang="en-US" dirty="0" smtClean="0"/>
-            </a:br>
-            <a:r>
-              <a:rPr lang="en-US" dirty="0" smtClean="0"/>
-              <a:t>Impact of Formalization on </a:t>
-            </a:r>
-            <a:r>
-              <a:rPr lang="en-US" dirty="0" err="1" smtClean="0"/>
-              <a:t>UxAS</a:t>
-            </a:r>
-            <a:endParaRPr lang="en-US" dirty="0"/>
-          </a:p>
-        </p:txBody>
-      </p:sp>
-      <p:sp>
-        <p:nvSpPr>
-          <p:cNvPr id="3" name="Content Placeholder 2"/>
-          <p:cNvSpPr>
-            <a:spLocks noGrp="1"/>
-          </p:cNvSpPr>
-          <p:nvPr>
-            <p:ph idx="1"/>
-          </p:nvPr>
-        </p:nvSpPr>
-        <p:spPr/>
-        <p:txBody>
-          <a:bodyPr>
-            <a:normAutofit/>
-          </a:bodyPr>
-          <a:lstStyle/>
-          <a:p>
-            <a:r>
-              <a:rPr lang="en-US" dirty="0" smtClean="0"/>
-              <a:t>Recognition of key assumptions</a:t>
-            </a:r>
-          </a:p>
-          <a:p>
-            <a:pPr lvl="1"/>
-            <a:r>
-              <a:rPr lang="en-US" dirty="0" smtClean="0"/>
-              <a:t>IDs are unique (not guaranteed by the implementation today)</a:t>
-            </a:r>
-          </a:p>
-          <a:p>
-            <a:r>
-              <a:rPr lang="en-US" dirty="0" smtClean="0"/>
-              <a:t>Illumination of design flaws</a:t>
-            </a:r>
-          </a:p>
-          <a:p>
-            <a:pPr lvl="1"/>
-            <a:r>
-              <a:rPr lang="en-US" dirty="0" smtClean="0"/>
-              <a:t>Missing ID checks</a:t>
-            </a:r>
-          </a:p>
-          <a:p>
-            <a:pPr lvl="1"/>
-            <a:r>
-              <a:rPr lang="en-US" dirty="0" smtClean="0"/>
-              <a:t>All services need to use the Route Planner for routes to ensure there is no conflict with an airspace constraint</a:t>
-            </a:r>
-          </a:p>
-          <a:p>
-            <a:r>
-              <a:rPr lang="en-US" dirty="0" smtClean="0"/>
-              <a:t>Restructuring to avoid redundant or problematic logic</a:t>
-            </a:r>
-          </a:p>
-          <a:p>
-            <a:pPr lvl="1"/>
-            <a:r>
-              <a:rPr lang="en-US" dirty="0" smtClean="0"/>
-              <a:t>Split </a:t>
-            </a:r>
-            <a:r>
-              <a:rPr lang="en-US" dirty="0" err="1" smtClean="0"/>
-              <a:t>RouteAggregatorService</a:t>
-            </a:r>
-            <a:r>
-              <a:rPr lang="en-US" dirty="0" smtClean="0"/>
-              <a:t> into two services for two functional roles</a:t>
-            </a:r>
-          </a:p>
-          <a:p>
-            <a:pPr lvl="1"/>
-            <a:r>
-              <a:rPr lang="en-US" dirty="0" smtClean="0"/>
-              <a:t>Removal of some dead code in the Route Planner</a:t>
-            </a:r>
-          </a:p>
-        </p:txBody>
-      </p:sp>
-      <p:sp>
-        <p:nvSpPr>
-          <p:cNvPr id="5" name="Rectangle 4"/>
-          <p:cNvSpPr/>
-          <p:nvPr/>
-        </p:nvSpPr>
-        <p:spPr>
-          <a:xfrm>
-            <a:off x="3659944" y="5409544"/>
-            <a:ext cx="5200278" cy="592333"/>
-          </a:xfrm>
-          <a:prstGeom prst="rect">
-            <a:avLst/>
-          </a:prstGeom>
-        </p:spPr>
-        <p:style>
-          <a:lnRef idx="2">
-            <a:schemeClr val="accent1">
-              <a:shade val="50000"/>
-            </a:schemeClr>
-          </a:lnRef>
-          <a:fillRef idx="1">
-            <a:schemeClr val="accent1"/>
-          </a:fillRef>
-          <a:effectRef idx="0">
-            <a:schemeClr val="accent1"/>
-          </a:effectRef>
-          <a:fontRef idx="minor">
-            <a:schemeClr val="lt1"/>
-          </a:fontRef>
-        </p:style>
-        <p:txBody>
-          <a:bodyPr rtlCol="0" anchor="ctr"/>
-          <a:lstStyle/>
-          <a:p>
-            <a:pPr algn="ctr"/>
-            <a:r>
-              <a:rPr lang="en-US" b="1" i="1" dirty="0" smtClean="0"/>
-              <a:t>We improved </a:t>
-            </a:r>
-            <a:r>
-              <a:rPr lang="en-US" b="1" i="1" dirty="0" err="1" smtClean="0"/>
-              <a:t>UxAS</a:t>
-            </a:r>
-            <a:r>
-              <a:rPr lang="en-US" b="1" i="1" dirty="0" smtClean="0"/>
-              <a:t> through formalization</a:t>
-            </a:r>
-            <a:endParaRPr lang="en-US" b="1" i="1" dirty="0"/>
-          </a:p>
-        </p:txBody>
-      </p:sp>
-      <p:sp>
-        <p:nvSpPr>
-          <p:cNvPr id="7" name="Footer Placeholder 6"/>
-          <p:cNvSpPr>
-            <a:spLocks noGrp="1"/>
-          </p:cNvSpPr>
-          <p:nvPr>
-            <p:ph type="ftr" sz="quarter" idx="11"/>
-          </p:nvPr>
-        </p:nvSpPr>
-        <p:spPr/>
-        <p:txBody>
-          <a:bodyPr/>
-          <a:lstStyle/>
-          <a:p>
-            <a:r>
-              <a:rPr lang="en-US" smtClean="0"/>
-              <a:t>Architecture Group</a:t>
-            </a:r>
-            <a:endParaRPr lang="en-US"/>
-          </a:p>
-        </p:txBody>
-      </p:sp>
-    </p:spTree>
-    <p:extLst>
-      <p:ext uri="{BB962C8B-B14F-4D97-AF65-F5344CB8AC3E}">
-        <p14:creationId xmlns:p14="http://schemas.microsoft.com/office/powerpoint/2010/main" val="3185477435"/>
       </p:ext>
     </p:extLst>
   </p:cSld>
@@ -17197,6 +17073,241 @@
       </p:grpSpPr>
       <p:sp>
         <p:nvSpPr>
+          <p:cNvPr id="2" name="Title 1"/>
+          <p:cNvSpPr>
+            <a:spLocks noGrp="1"/>
+          </p:cNvSpPr>
+          <p:nvPr>
+            <p:ph type="title"/>
+          </p:nvPr>
+        </p:nvSpPr>
+        <p:spPr/>
+        <p:txBody>
+          <a:bodyPr>
+            <a:normAutofit fontScale="90000"/>
+          </a:bodyPr>
+          <a:lstStyle/>
+          <a:p>
+            <a:r>
+              <a:rPr lang="en-US" dirty="0" smtClean="0"/>
+              <a:t>From the lead developer: </a:t>
+            </a:r>
+            <a:br>
+              <a:rPr lang="en-US" dirty="0" smtClean="0"/>
+            </a:br>
+            <a:r>
+              <a:rPr lang="en-US" dirty="0" smtClean="0"/>
+              <a:t>Impact of Formalization on </a:t>
+            </a:r>
+            <a:r>
+              <a:rPr lang="en-US" dirty="0" err="1" smtClean="0"/>
+              <a:t>UxAS</a:t>
+            </a:r>
+            <a:endParaRPr lang="en-US" dirty="0"/>
+          </a:p>
+        </p:txBody>
+      </p:sp>
+      <p:sp>
+        <p:nvSpPr>
+          <p:cNvPr id="3" name="Content Placeholder 2"/>
+          <p:cNvSpPr>
+            <a:spLocks noGrp="1"/>
+          </p:cNvSpPr>
+          <p:nvPr>
+            <p:ph idx="1"/>
+          </p:nvPr>
+        </p:nvSpPr>
+        <p:spPr/>
+        <p:txBody>
+          <a:bodyPr>
+            <a:normAutofit/>
+          </a:bodyPr>
+          <a:lstStyle/>
+          <a:p>
+            <a:r>
+              <a:rPr lang="en-US" dirty="0" smtClean="0"/>
+              <a:t>Recognition of key assumptions</a:t>
+            </a:r>
+          </a:p>
+          <a:p>
+            <a:pPr lvl="1"/>
+            <a:r>
+              <a:rPr lang="en-US" dirty="0" smtClean="0"/>
+              <a:t>IDs are unique (not guaranteed by the implementation today)</a:t>
+            </a:r>
+          </a:p>
+          <a:p>
+            <a:r>
+              <a:rPr lang="en-US" dirty="0" smtClean="0"/>
+              <a:t>Illumination of design flaws</a:t>
+            </a:r>
+          </a:p>
+          <a:p>
+            <a:pPr lvl="1"/>
+            <a:r>
+              <a:rPr lang="en-US" dirty="0" smtClean="0"/>
+              <a:t>Missing ID checks</a:t>
+            </a:r>
+          </a:p>
+          <a:p>
+            <a:pPr lvl="1"/>
+            <a:r>
+              <a:rPr lang="en-US" dirty="0" smtClean="0"/>
+              <a:t>All services need to use the Route Planner for routes to ensure there is no conflict with an airspace constraint</a:t>
+            </a:r>
+          </a:p>
+          <a:p>
+            <a:r>
+              <a:rPr lang="en-US" dirty="0" smtClean="0"/>
+              <a:t>Restructuring to avoid redundant or problematic logic</a:t>
+            </a:r>
+          </a:p>
+          <a:p>
+            <a:pPr lvl="1"/>
+            <a:r>
+              <a:rPr lang="en-US" dirty="0" smtClean="0"/>
+              <a:t>Split </a:t>
+            </a:r>
+            <a:r>
+              <a:rPr lang="en-US" dirty="0" err="1" smtClean="0"/>
+              <a:t>RouteAggregatorService</a:t>
+            </a:r>
+            <a:r>
+              <a:rPr lang="en-US" dirty="0" smtClean="0"/>
+              <a:t> into two services for two functional roles</a:t>
+            </a:r>
+          </a:p>
+          <a:p>
+            <a:pPr lvl="1"/>
+            <a:r>
+              <a:rPr lang="en-US" dirty="0" smtClean="0"/>
+              <a:t>Removal of some dead code in the Route Planner</a:t>
+            </a:r>
+          </a:p>
+        </p:txBody>
+      </p:sp>
+      <p:sp>
+        <p:nvSpPr>
+          <p:cNvPr id="5" name="Rectangle 4"/>
+          <p:cNvSpPr/>
+          <p:nvPr/>
+        </p:nvSpPr>
+        <p:spPr>
+          <a:xfrm>
+            <a:off x="3659944" y="5409544"/>
+            <a:ext cx="5200278" cy="592333"/>
+          </a:xfrm>
+          <a:prstGeom prst="rect">
+            <a:avLst/>
+          </a:prstGeom>
+        </p:spPr>
+        <p:style>
+          <a:lnRef idx="2">
+            <a:schemeClr val="accent1">
+              <a:shade val="50000"/>
+            </a:schemeClr>
+          </a:lnRef>
+          <a:fillRef idx="1">
+            <a:schemeClr val="accent1"/>
+          </a:fillRef>
+          <a:effectRef idx="0">
+            <a:schemeClr val="accent1"/>
+          </a:effectRef>
+          <a:fontRef idx="minor">
+            <a:schemeClr val="lt1"/>
+          </a:fontRef>
+        </p:style>
+        <p:txBody>
+          <a:bodyPr rtlCol="0" anchor="ctr"/>
+          <a:lstStyle/>
+          <a:p>
+            <a:pPr algn="ctr"/>
+            <a:r>
+              <a:rPr lang="en-US" b="1" i="1" dirty="0" smtClean="0"/>
+              <a:t>We improved </a:t>
+            </a:r>
+            <a:r>
+              <a:rPr lang="en-US" b="1" i="1" dirty="0" err="1" smtClean="0"/>
+              <a:t>UxAS</a:t>
+            </a:r>
+            <a:r>
+              <a:rPr lang="en-US" b="1" i="1" dirty="0" smtClean="0"/>
+              <a:t> through formalization</a:t>
+            </a:r>
+            <a:endParaRPr lang="en-US" b="1" i="1" dirty="0"/>
+          </a:p>
+        </p:txBody>
+      </p:sp>
+      <p:sp>
+        <p:nvSpPr>
+          <p:cNvPr id="7" name="Footer Placeholder 6"/>
+          <p:cNvSpPr>
+            <a:spLocks noGrp="1"/>
+          </p:cNvSpPr>
+          <p:nvPr>
+            <p:ph type="ftr" sz="quarter" idx="11"/>
+          </p:nvPr>
+        </p:nvSpPr>
+        <p:spPr/>
+        <p:txBody>
+          <a:bodyPr/>
+          <a:lstStyle/>
+          <a:p>
+            <a:r>
+              <a:rPr lang="en-US" smtClean="0"/>
+              <a:t>Architecture Group</a:t>
+            </a:r>
+            <a:endParaRPr lang="en-US"/>
+          </a:p>
+        </p:txBody>
+      </p:sp>
+    </p:spTree>
+    <p:extLst>
+      <p:ext uri="{BB962C8B-B14F-4D97-AF65-F5344CB8AC3E}">
+        <p14:creationId xmlns:p14="http://schemas.microsoft.com/office/powerpoint/2010/main" val="3185477435"/>
+      </p:ext>
+    </p:extLst>
+  </p:cSld>
+  <p:clrMapOvr>
+    <a:masterClrMapping/>
+  </p:clrMapOvr>
+  <mc:AlternateContent xmlns:mc="http://schemas.openxmlformats.org/markup-compatibility/2006" xmlns:p14="http://schemas.microsoft.com/office/powerpoint/2010/main">
+    <mc:Choice Requires="p14">
+      <p:transition spd="slow" p14:dur="2000"/>
+    </mc:Choice>
+    <mc:Fallback xmlns="">
+      <p:transition spd="slow"/>
+    </mc:Fallback>
+  </mc:AlternateContent>
+  <p:timing>
+    <p:tnLst>
+      <p:par>
+        <p:cTn id="1" dur="indefinite" restart="never" nodeType="tmRoot"/>
+      </p:par>
+    </p:tnLst>
+  </p:timing>
+</p:sld>
+</file>
+
+<file path=ppt/slides/slide26.xml><?xml version="1.0" encoding="utf-8"?>
+<p:sld xmlns:a="http://schemas.openxmlformats.org/drawingml/2006/main" xmlns:r="http://schemas.openxmlformats.org/officeDocument/2006/relationships" xmlns:p="http://schemas.openxmlformats.org/presentationml/2006/main">
+  <p:cSld>
+    <p:spTree>
+      <p:nvGrpSpPr>
+        <p:cNvPr id="1" name=""/>
+        <p:cNvGrpSpPr/>
+        <p:nvPr/>
+      </p:nvGrpSpPr>
+      <p:grpSpPr>
+        <a:xfrm>
+          <a:off x="0" y="0"/>
+          <a:ext cx="0" cy="0"/>
+          <a:chOff x="0" y="0"/>
+          <a:chExt cx="0" cy="0"/>
+        </a:xfrm>
+      </p:grpSpPr>
+      <p:sp>
+        <p:nvSpPr>
           <p:cNvPr id="4" name="Title 3"/>
           <p:cNvSpPr>
             <a:spLocks noGrp="1"/>
@@ -17265,7 +17376,7 @@
 </p:sld>
 </file>
 
-<file path=ppt/slides/slide26.xml><?xml version="1.0" encoding="utf-8"?>
+<file path=ppt/slides/slide27.xml><?xml version="1.0" encoding="utf-8"?>
 <p:sld xmlns:a="http://schemas.openxmlformats.org/drawingml/2006/main" xmlns:r="http://schemas.openxmlformats.org/officeDocument/2006/relationships" xmlns:p="http://schemas.openxmlformats.org/presentationml/2006/main">
   <p:cSld>
     <p:spTree>
@@ -17669,7 +17780,7 @@
 </p:sld>
 </file>
 
-<file path=ppt/slides/slide27.xml><?xml version="1.0" encoding="utf-8"?>
+<file path=ppt/slides/slide28.xml><?xml version="1.0" encoding="utf-8"?>
 <p:sld xmlns:a="http://schemas.openxmlformats.org/drawingml/2006/main" xmlns:r="http://schemas.openxmlformats.org/officeDocument/2006/relationships" xmlns:p="http://schemas.openxmlformats.org/presentationml/2006/main">
   <p:cSld>
     <p:spTree>
@@ -18064,7 +18175,7 @@
 </p:sld>
 </file>
 
-<file path=ppt/slides/slide28.xml><?xml version="1.0" encoding="utf-8"?>
+<file path=ppt/slides/slide29.xml><?xml version="1.0" encoding="utf-8"?>
 <p:sld xmlns:a="http://schemas.openxmlformats.org/drawingml/2006/main" xmlns:r="http://schemas.openxmlformats.org/officeDocument/2006/relationships" xmlns:p="http://schemas.openxmlformats.org/presentationml/2006/main">
   <p:cSld>
     <p:spTree>
@@ -18358,361 +18469,6 @@
     <p:extLst>
       <p:ext uri="{BB962C8B-B14F-4D97-AF65-F5344CB8AC3E}">
         <p14:creationId xmlns:p14="http://schemas.microsoft.com/office/powerpoint/2010/main" val="286898037"/>
-      </p:ext>
-    </p:extLst>
-  </p:cSld>
-  <p:clrMapOvr>
-    <a:masterClrMapping/>
-  </p:clrMapOvr>
-  <mc:AlternateContent xmlns:mc="http://schemas.openxmlformats.org/markup-compatibility/2006" xmlns:p14="http://schemas.microsoft.com/office/powerpoint/2010/main">
-    <mc:Choice Requires="p14">
-      <p:transition spd="slow" p14:dur="2000"/>
-    </mc:Choice>
-    <mc:Fallback xmlns="">
-      <p:transition spd="slow"/>
-    </mc:Fallback>
-  </mc:AlternateContent>
-  <p:timing>
-    <p:tnLst>
-      <p:par>
-        <p:cTn id="1" dur="indefinite" restart="never" nodeType="tmRoot"/>
-      </p:par>
-    </p:tnLst>
-  </p:timing>
-</p:sld>
-</file>
-
-<file path=ppt/slides/slide29.xml><?xml version="1.0" encoding="utf-8"?>
-<p:sld xmlns:a="http://schemas.openxmlformats.org/drawingml/2006/main" xmlns:r="http://schemas.openxmlformats.org/officeDocument/2006/relationships" xmlns:p="http://schemas.openxmlformats.org/presentationml/2006/main">
-  <p:cSld>
-    <p:spTree>
-      <p:nvGrpSpPr>
-        <p:cNvPr id="1" name=""/>
-        <p:cNvGrpSpPr/>
-        <p:nvPr/>
-      </p:nvGrpSpPr>
-      <p:grpSpPr>
-        <a:xfrm>
-          <a:off x="0" y="0"/>
-          <a:ext cx="0" cy="0"/>
-          <a:chOff x="0" y="0"/>
-          <a:chExt cx="0" cy="0"/>
-        </a:xfrm>
-      </p:grpSpPr>
-      <p:sp>
-        <p:nvSpPr>
-          <p:cNvPr id="2" name="Title 1"/>
-          <p:cNvSpPr>
-            <a:spLocks noGrp="1"/>
-          </p:cNvSpPr>
-          <p:nvPr>
-            <p:ph type="title"/>
-          </p:nvPr>
-        </p:nvSpPr>
-        <p:spPr/>
-        <p:txBody>
-          <a:bodyPr/>
-          <a:lstStyle/>
-          <a:p>
-            <a:r>
-              <a:rPr lang="en-US" dirty="0" smtClean="0"/>
-              <a:t>Stateflow Representation</a:t>
-            </a:r>
-            <a:endParaRPr lang="en-US" dirty="0"/>
-          </a:p>
-        </p:txBody>
-      </p:sp>
-      <p:sp>
-        <p:nvSpPr>
-          <p:cNvPr id="3" name="Content Placeholder 2"/>
-          <p:cNvSpPr>
-            <a:spLocks noGrp="1"/>
-          </p:cNvSpPr>
-          <p:nvPr>
-            <p:ph idx="1"/>
-          </p:nvPr>
-        </p:nvSpPr>
-        <p:spPr/>
-        <p:txBody>
-          <a:bodyPr>
-            <a:normAutofit lnSpcReduction="10000"/>
-          </a:bodyPr>
-          <a:lstStyle/>
-          <a:p>
-            <a:r>
-              <a:rPr lang="en-US" dirty="0"/>
-              <a:t>Created a Stateflow representation of the Task Service Base state machine</a:t>
-            </a:r>
-          </a:p>
-          <a:p>
-            <a:r>
-              <a:rPr lang="en-US" dirty="0" smtClean="0"/>
-              <a:t>Benefits</a:t>
-            </a:r>
-          </a:p>
-          <a:p>
-            <a:pPr lvl="1"/>
-            <a:r>
-              <a:rPr lang="en-US" dirty="0"/>
-              <a:t>Evidence in the assurance argument: “gold standard state machine”</a:t>
-            </a:r>
-          </a:p>
-          <a:p>
-            <a:pPr lvl="1"/>
-            <a:r>
-              <a:rPr lang="en-US" dirty="0" smtClean="0"/>
-              <a:t>Enable simulation</a:t>
-            </a:r>
-          </a:p>
-          <a:p>
-            <a:pPr lvl="1"/>
-            <a:r>
-              <a:rPr lang="en-US" dirty="0" smtClean="0"/>
-              <a:t>Enable analysis from Simulink</a:t>
-            </a:r>
-          </a:p>
-          <a:p>
-            <a:pPr lvl="2"/>
-            <a:r>
-              <a:rPr lang="en-US" dirty="0" err="1" smtClean="0"/>
-              <a:t>QVtrace</a:t>
-            </a:r>
-            <a:endParaRPr lang="en-US" dirty="0" smtClean="0"/>
-          </a:p>
-          <a:p>
-            <a:pPr lvl="2"/>
-            <a:r>
-              <a:rPr lang="en-US" dirty="0" smtClean="0"/>
-              <a:t>Simulink-to-PVS</a:t>
-            </a:r>
-          </a:p>
-          <a:p>
-            <a:pPr lvl="2"/>
-            <a:r>
-              <a:rPr lang="en-US" dirty="0" smtClean="0"/>
-              <a:t>Simulink Design Verifier</a:t>
-            </a:r>
-          </a:p>
-          <a:p>
-            <a:pPr lvl="1"/>
-            <a:r>
-              <a:rPr lang="en-US" dirty="0" smtClean="0"/>
-              <a:t>Visualize counterexamples</a:t>
-            </a:r>
-          </a:p>
-          <a:p>
-            <a:pPr>
-              <a:lnSpc>
-                <a:spcPct val="100000"/>
-              </a:lnSpc>
-              <a:spcBef>
-                <a:spcPts val="200"/>
-              </a:spcBef>
-            </a:pPr>
-            <a:r>
-              <a:rPr lang="en-US" dirty="0" smtClean="0"/>
-              <a:t>Simulink/Stateflow abstractions cross-checked </a:t>
-            </a:r>
-            <a:r>
-              <a:rPr lang="en-US" dirty="0"/>
-              <a:t>with </a:t>
-            </a:r>
-            <a:r>
-              <a:rPr lang="en-US" dirty="0" smtClean="0"/>
-              <a:t>AADL/AGREE </a:t>
-            </a:r>
-            <a:r>
-              <a:rPr lang="en-US" dirty="0"/>
-              <a:t>model</a:t>
-            </a:r>
-          </a:p>
-          <a:p>
-            <a:pPr lvl="1">
-              <a:lnSpc>
-                <a:spcPct val="100000"/>
-              </a:lnSpc>
-              <a:spcBef>
-                <a:spcPts val="200"/>
-              </a:spcBef>
-            </a:pPr>
-            <a:r>
-              <a:rPr lang="en-US" dirty="0" smtClean="0"/>
-              <a:t>Found erroneous </a:t>
-            </a:r>
-            <a:r>
-              <a:rPr lang="en-US" dirty="0"/>
-              <a:t>initial conditions, unused from/</a:t>
-            </a:r>
-            <a:r>
-              <a:rPr lang="en-US" dirty="0" err="1"/>
-              <a:t>goto</a:t>
-            </a:r>
-            <a:r>
-              <a:rPr lang="en-US" dirty="0"/>
-              <a:t> flags, and incorrect settings on if-else </a:t>
-            </a:r>
-            <a:r>
-              <a:rPr lang="en-US" dirty="0" smtClean="0"/>
-              <a:t>cases in Stateflow model</a:t>
-            </a:r>
-            <a:endParaRPr lang="en-US" dirty="0"/>
-          </a:p>
-          <a:p>
-            <a:endParaRPr lang="en-US" dirty="0"/>
-          </a:p>
-        </p:txBody>
-      </p:sp>
-      <p:sp>
-        <p:nvSpPr>
-          <p:cNvPr id="5" name="Footer Placeholder 3"/>
-          <p:cNvSpPr txBox="1">
-            <a:spLocks/>
-          </p:cNvSpPr>
-          <p:nvPr/>
-        </p:nvSpPr>
-        <p:spPr>
-          <a:xfrm>
-            <a:off x="102476" y="6437441"/>
-            <a:ext cx="4532586" cy="306936"/>
-          </a:xfrm>
-          <a:prstGeom prst="rect">
-            <a:avLst/>
-          </a:prstGeom>
-        </p:spPr>
-        <p:txBody>
-          <a:bodyPr vert="horz" lIns="91440" tIns="45720" rIns="91440" bIns="45720" rtlCol="0" anchor="ctr"/>
-          <a:lstStyle>
-            <a:defPPr>
-              <a:defRPr lang="en-US"/>
-            </a:defPPr>
-            <a:lvl1pPr marL="0" algn="ctr" defTabSz="914400" rtl="0" eaLnBrk="1" latinLnBrk="0" hangingPunct="1">
-              <a:defRPr sz="1400" kern="1200">
-                <a:solidFill>
-                  <a:srgbClr val="000000"/>
-                </a:solidFill>
-                <a:latin typeface="+mn-lt"/>
-                <a:ea typeface="+mn-ea"/>
-                <a:cs typeface="+mn-cs"/>
-              </a:defRPr>
-            </a:lvl1pPr>
-            <a:lvl2pPr marL="457200" algn="l" defTabSz="914400" rtl="0" eaLnBrk="1" latinLnBrk="0" hangingPunct="1">
-              <a:defRPr sz="1800" kern="1200">
-                <a:solidFill>
-                  <a:schemeClr val="tx1"/>
-                </a:solidFill>
-                <a:latin typeface="+mn-lt"/>
-                <a:ea typeface="+mn-ea"/>
-                <a:cs typeface="+mn-cs"/>
-              </a:defRPr>
-            </a:lvl2pPr>
-            <a:lvl3pPr marL="914400" algn="l" defTabSz="914400" rtl="0" eaLnBrk="1" latinLnBrk="0" hangingPunct="1">
-              <a:defRPr sz="1800" kern="1200">
-                <a:solidFill>
-                  <a:schemeClr val="tx1"/>
-                </a:solidFill>
-                <a:latin typeface="+mn-lt"/>
-                <a:ea typeface="+mn-ea"/>
-                <a:cs typeface="+mn-cs"/>
-              </a:defRPr>
-            </a:lvl3pPr>
-            <a:lvl4pPr marL="1371600" algn="l" defTabSz="914400" rtl="0" eaLnBrk="1" latinLnBrk="0" hangingPunct="1">
-              <a:defRPr sz="1800" kern="1200">
-                <a:solidFill>
-                  <a:schemeClr val="tx1"/>
-                </a:solidFill>
-                <a:latin typeface="+mn-lt"/>
-                <a:ea typeface="+mn-ea"/>
-                <a:cs typeface="+mn-cs"/>
-              </a:defRPr>
-            </a:lvl4pPr>
-            <a:lvl5pPr marL="1828800" algn="l" defTabSz="914400" rtl="0" eaLnBrk="1" latinLnBrk="0" hangingPunct="1">
-              <a:defRPr sz="1800" kern="1200">
-                <a:solidFill>
-                  <a:schemeClr val="tx1"/>
-                </a:solidFill>
-                <a:latin typeface="+mn-lt"/>
-                <a:ea typeface="+mn-ea"/>
-                <a:cs typeface="+mn-cs"/>
-              </a:defRPr>
-            </a:lvl5pPr>
-            <a:lvl6pPr marL="2286000" algn="l" defTabSz="914400" rtl="0" eaLnBrk="1" latinLnBrk="0" hangingPunct="1">
-              <a:defRPr sz="1800" kern="1200">
-                <a:solidFill>
-                  <a:schemeClr val="tx1"/>
-                </a:solidFill>
-                <a:latin typeface="+mn-lt"/>
-                <a:ea typeface="+mn-ea"/>
-                <a:cs typeface="+mn-cs"/>
-              </a:defRPr>
-            </a:lvl6pPr>
-            <a:lvl7pPr marL="2743200" algn="l" defTabSz="914400" rtl="0" eaLnBrk="1" latinLnBrk="0" hangingPunct="1">
-              <a:defRPr sz="1800" kern="1200">
-                <a:solidFill>
-                  <a:schemeClr val="tx1"/>
-                </a:solidFill>
-                <a:latin typeface="+mn-lt"/>
-                <a:ea typeface="+mn-ea"/>
-                <a:cs typeface="+mn-cs"/>
-              </a:defRPr>
-            </a:lvl7pPr>
-            <a:lvl8pPr marL="3200400" algn="l" defTabSz="914400" rtl="0" eaLnBrk="1" latinLnBrk="0" hangingPunct="1">
-              <a:defRPr sz="1800" kern="1200">
-                <a:solidFill>
-                  <a:schemeClr val="tx1"/>
-                </a:solidFill>
-                <a:latin typeface="+mn-lt"/>
-                <a:ea typeface="+mn-ea"/>
-                <a:cs typeface="+mn-cs"/>
-              </a:defRPr>
-            </a:lvl8pPr>
-            <a:lvl9pPr marL="3657600" algn="l" defTabSz="914400" rtl="0" eaLnBrk="1" latinLnBrk="0" hangingPunct="1">
-              <a:defRPr sz="1800" kern="1200">
-                <a:solidFill>
-                  <a:schemeClr val="tx1"/>
-                </a:solidFill>
-                <a:latin typeface="+mn-lt"/>
-                <a:ea typeface="+mn-ea"/>
-                <a:cs typeface="+mn-cs"/>
-              </a:defRPr>
-            </a:lvl9pPr>
-          </a:lstStyle>
-          <a:p>
-            <a:pPr algn="l"/>
-            <a:r>
-              <a:rPr lang="en-US" dirty="0" smtClean="0"/>
-              <a:t>Lockheed Martin, Dependable Computing, Rockwell Collins</a:t>
-            </a:r>
-            <a:endParaRPr lang="en-US" dirty="0"/>
-          </a:p>
-        </p:txBody>
-      </p:sp>
-      <p:sp>
-        <p:nvSpPr>
-          <p:cNvPr id="7" name="Footer Placeholder 6"/>
-          <p:cNvSpPr>
-            <a:spLocks noGrp="1"/>
-          </p:cNvSpPr>
-          <p:nvPr>
-            <p:ph type="ftr" sz="quarter" idx="11"/>
-          </p:nvPr>
-        </p:nvSpPr>
-        <p:spPr/>
-        <p:txBody>
-          <a:bodyPr/>
-          <a:lstStyle/>
-          <a:p>
-            <a:r>
-              <a:rPr lang="en-US" dirty="0" smtClean="0"/>
-              <a:t>Architecture Group</a:t>
-            </a:r>
-            <a:endParaRPr lang="en-US" dirty="0"/>
-          </a:p>
-        </p:txBody>
-      </p:sp>
-    </p:spTree>
-    <p:extLst>
-      <p:ext uri="{BB962C8B-B14F-4D97-AF65-F5344CB8AC3E}">
-        <p14:creationId xmlns:p14="http://schemas.microsoft.com/office/powerpoint/2010/main" val="1619698478"/>
       </p:ext>
     </p:extLst>
   </p:cSld>
@@ -19434,6 +19190,361 @@
           <a:chExt cx="0" cy="0"/>
         </a:xfrm>
       </p:grpSpPr>
+      <p:sp>
+        <p:nvSpPr>
+          <p:cNvPr id="2" name="Title 1"/>
+          <p:cNvSpPr>
+            <a:spLocks noGrp="1"/>
+          </p:cNvSpPr>
+          <p:nvPr>
+            <p:ph type="title"/>
+          </p:nvPr>
+        </p:nvSpPr>
+        <p:spPr/>
+        <p:txBody>
+          <a:bodyPr/>
+          <a:lstStyle/>
+          <a:p>
+            <a:r>
+              <a:rPr lang="en-US" dirty="0" smtClean="0"/>
+              <a:t>Stateflow Representation</a:t>
+            </a:r>
+            <a:endParaRPr lang="en-US" dirty="0"/>
+          </a:p>
+        </p:txBody>
+      </p:sp>
+      <p:sp>
+        <p:nvSpPr>
+          <p:cNvPr id="3" name="Content Placeholder 2"/>
+          <p:cNvSpPr>
+            <a:spLocks noGrp="1"/>
+          </p:cNvSpPr>
+          <p:nvPr>
+            <p:ph idx="1"/>
+          </p:nvPr>
+        </p:nvSpPr>
+        <p:spPr/>
+        <p:txBody>
+          <a:bodyPr>
+            <a:normAutofit lnSpcReduction="10000"/>
+          </a:bodyPr>
+          <a:lstStyle/>
+          <a:p>
+            <a:r>
+              <a:rPr lang="en-US" dirty="0"/>
+              <a:t>Created a Stateflow representation of the Task Service Base state machine</a:t>
+            </a:r>
+          </a:p>
+          <a:p>
+            <a:r>
+              <a:rPr lang="en-US" dirty="0" smtClean="0"/>
+              <a:t>Benefits</a:t>
+            </a:r>
+          </a:p>
+          <a:p>
+            <a:pPr lvl="1"/>
+            <a:r>
+              <a:rPr lang="en-US" dirty="0"/>
+              <a:t>Evidence in the assurance argument: “gold standard state machine”</a:t>
+            </a:r>
+          </a:p>
+          <a:p>
+            <a:pPr lvl="1"/>
+            <a:r>
+              <a:rPr lang="en-US" dirty="0" smtClean="0"/>
+              <a:t>Enable simulation</a:t>
+            </a:r>
+          </a:p>
+          <a:p>
+            <a:pPr lvl="1"/>
+            <a:r>
+              <a:rPr lang="en-US" dirty="0" smtClean="0"/>
+              <a:t>Enable analysis from Simulink</a:t>
+            </a:r>
+          </a:p>
+          <a:p>
+            <a:pPr lvl="2"/>
+            <a:r>
+              <a:rPr lang="en-US" dirty="0" err="1" smtClean="0"/>
+              <a:t>QVtrace</a:t>
+            </a:r>
+            <a:endParaRPr lang="en-US" dirty="0" smtClean="0"/>
+          </a:p>
+          <a:p>
+            <a:pPr lvl="2"/>
+            <a:r>
+              <a:rPr lang="en-US" dirty="0" smtClean="0"/>
+              <a:t>Simulink-to-PVS</a:t>
+            </a:r>
+          </a:p>
+          <a:p>
+            <a:pPr lvl="2"/>
+            <a:r>
+              <a:rPr lang="en-US" dirty="0" smtClean="0"/>
+              <a:t>Simulink Design Verifier</a:t>
+            </a:r>
+          </a:p>
+          <a:p>
+            <a:pPr lvl="1"/>
+            <a:r>
+              <a:rPr lang="en-US" dirty="0" smtClean="0"/>
+              <a:t>Visualize counterexamples</a:t>
+            </a:r>
+          </a:p>
+          <a:p>
+            <a:pPr>
+              <a:lnSpc>
+                <a:spcPct val="100000"/>
+              </a:lnSpc>
+              <a:spcBef>
+                <a:spcPts val="200"/>
+              </a:spcBef>
+            </a:pPr>
+            <a:r>
+              <a:rPr lang="en-US" dirty="0" smtClean="0"/>
+              <a:t>Simulink/Stateflow abstractions cross-checked </a:t>
+            </a:r>
+            <a:r>
+              <a:rPr lang="en-US" dirty="0"/>
+              <a:t>with </a:t>
+            </a:r>
+            <a:r>
+              <a:rPr lang="en-US" dirty="0" smtClean="0"/>
+              <a:t>AADL/AGREE </a:t>
+            </a:r>
+            <a:r>
+              <a:rPr lang="en-US" dirty="0"/>
+              <a:t>model</a:t>
+            </a:r>
+          </a:p>
+          <a:p>
+            <a:pPr lvl="1">
+              <a:lnSpc>
+                <a:spcPct val="100000"/>
+              </a:lnSpc>
+              <a:spcBef>
+                <a:spcPts val="200"/>
+              </a:spcBef>
+            </a:pPr>
+            <a:r>
+              <a:rPr lang="en-US" dirty="0" smtClean="0"/>
+              <a:t>Found erroneous </a:t>
+            </a:r>
+            <a:r>
+              <a:rPr lang="en-US" dirty="0"/>
+              <a:t>initial conditions, unused from/</a:t>
+            </a:r>
+            <a:r>
+              <a:rPr lang="en-US" dirty="0" err="1"/>
+              <a:t>goto</a:t>
+            </a:r>
+            <a:r>
+              <a:rPr lang="en-US" dirty="0"/>
+              <a:t> flags, and incorrect settings on if-else </a:t>
+            </a:r>
+            <a:r>
+              <a:rPr lang="en-US" dirty="0" smtClean="0"/>
+              <a:t>cases in Stateflow model</a:t>
+            </a:r>
+            <a:endParaRPr lang="en-US" dirty="0"/>
+          </a:p>
+          <a:p>
+            <a:endParaRPr lang="en-US" dirty="0"/>
+          </a:p>
+        </p:txBody>
+      </p:sp>
+      <p:sp>
+        <p:nvSpPr>
+          <p:cNvPr id="5" name="Footer Placeholder 3"/>
+          <p:cNvSpPr txBox="1">
+            <a:spLocks/>
+          </p:cNvSpPr>
+          <p:nvPr/>
+        </p:nvSpPr>
+        <p:spPr>
+          <a:xfrm>
+            <a:off x="102476" y="6437441"/>
+            <a:ext cx="4532586" cy="306936"/>
+          </a:xfrm>
+          <a:prstGeom prst="rect">
+            <a:avLst/>
+          </a:prstGeom>
+        </p:spPr>
+        <p:txBody>
+          <a:bodyPr vert="horz" lIns="91440" tIns="45720" rIns="91440" bIns="45720" rtlCol="0" anchor="ctr"/>
+          <a:lstStyle>
+            <a:defPPr>
+              <a:defRPr lang="en-US"/>
+            </a:defPPr>
+            <a:lvl1pPr marL="0" algn="ctr" defTabSz="914400" rtl="0" eaLnBrk="1" latinLnBrk="0" hangingPunct="1">
+              <a:defRPr sz="1400" kern="1200">
+                <a:solidFill>
+                  <a:srgbClr val="000000"/>
+                </a:solidFill>
+                <a:latin typeface="+mn-lt"/>
+                <a:ea typeface="+mn-ea"/>
+                <a:cs typeface="+mn-cs"/>
+              </a:defRPr>
+            </a:lvl1pPr>
+            <a:lvl2pPr marL="457200" algn="l" defTabSz="914400" rtl="0" eaLnBrk="1" latinLnBrk="0" hangingPunct="1">
+              <a:defRPr sz="1800" kern="1200">
+                <a:solidFill>
+                  <a:schemeClr val="tx1"/>
+                </a:solidFill>
+                <a:latin typeface="+mn-lt"/>
+                <a:ea typeface="+mn-ea"/>
+                <a:cs typeface="+mn-cs"/>
+              </a:defRPr>
+            </a:lvl2pPr>
+            <a:lvl3pPr marL="914400" algn="l" defTabSz="914400" rtl="0" eaLnBrk="1" latinLnBrk="0" hangingPunct="1">
+              <a:defRPr sz="1800" kern="1200">
+                <a:solidFill>
+                  <a:schemeClr val="tx1"/>
+                </a:solidFill>
+                <a:latin typeface="+mn-lt"/>
+                <a:ea typeface="+mn-ea"/>
+                <a:cs typeface="+mn-cs"/>
+              </a:defRPr>
+            </a:lvl3pPr>
+            <a:lvl4pPr marL="1371600" algn="l" defTabSz="914400" rtl="0" eaLnBrk="1" latinLnBrk="0" hangingPunct="1">
+              <a:defRPr sz="1800" kern="1200">
+                <a:solidFill>
+                  <a:schemeClr val="tx1"/>
+                </a:solidFill>
+                <a:latin typeface="+mn-lt"/>
+                <a:ea typeface="+mn-ea"/>
+                <a:cs typeface="+mn-cs"/>
+              </a:defRPr>
+            </a:lvl4pPr>
+            <a:lvl5pPr marL="1828800" algn="l" defTabSz="914400" rtl="0" eaLnBrk="1" latinLnBrk="0" hangingPunct="1">
+              <a:defRPr sz="1800" kern="1200">
+                <a:solidFill>
+                  <a:schemeClr val="tx1"/>
+                </a:solidFill>
+                <a:latin typeface="+mn-lt"/>
+                <a:ea typeface="+mn-ea"/>
+                <a:cs typeface="+mn-cs"/>
+              </a:defRPr>
+            </a:lvl5pPr>
+            <a:lvl6pPr marL="2286000" algn="l" defTabSz="914400" rtl="0" eaLnBrk="1" latinLnBrk="0" hangingPunct="1">
+              <a:defRPr sz="1800" kern="1200">
+                <a:solidFill>
+                  <a:schemeClr val="tx1"/>
+                </a:solidFill>
+                <a:latin typeface="+mn-lt"/>
+                <a:ea typeface="+mn-ea"/>
+                <a:cs typeface="+mn-cs"/>
+              </a:defRPr>
+            </a:lvl6pPr>
+            <a:lvl7pPr marL="2743200" algn="l" defTabSz="914400" rtl="0" eaLnBrk="1" latinLnBrk="0" hangingPunct="1">
+              <a:defRPr sz="1800" kern="1200">
+                <a:solidFill>
+                  <a:schemeClr val="tx1"/>
+                </a:solidFill>
+                <a:latin typeface="+mn-lt"/>
+                <a:ea typeface="+mn-ea"/>
+                <a:cs typeface="+mn-cs"/>
+              </a:defRPr>
+            </a:lvl7pPr>
+            <a:lvl8pPr marL="3200400" algn="l" defTabSz="914400" rtl="0" eaLnBrk="1" latinLnBrk="0" hangingPunct="1">
+              <a:defRPr sz="1800" kern="1200">
+                <a:solidFill>
+                  <a:schemeClr val="tx1"/>
+                </a:solidFill>
+                <a:latin typeface="+mn-lt"/>
+                <a:ea typeface="+mn-ea"/>
+                <a:cs typeface="+mn-cs"/>
+              </a:defRPr>
+            </a:lvl8pPr>
+            <a:lvl9pPr marL="3657600" algn="l" defTabSz="914400" rtl="0" eaLnBrk="1" latinLnBrk="0" hangingPunct="1">
+              <a:defRPr sz="1800" kern="1200">
+                <a:solidFill>
+                  <a:schemeClr val="tx1"/>
+                </a:solidFill>
+                <a:latin typeface="+mn-lt"/>
+                <a:ea typeface="+mn-ea"/>
+                <a:cs typeface="+mn-cs"/>
+              </a:defRPr>
+            </a:lvl9pPr>
+          </a:lstStyle>
+          <a:p>
+            <a:pPr algn="l"/>
+            <a:r>
+              <a:rPr lang="en-US" dirty="0" smtClean="0"/>
+              <a:t>Lockheed Martin, Dependable Computing, Rockwell Collins</a:t>
+            </a:r>
+            <a:endParaRPr lang="en-US" dirty="0"/>
+          </a:p>
+        </p:txBody>
+      </p:sp>
+      <p:sp>
+        <p:nvSpPr>
+          <p:cNvPr id="7" name="Footer Placeholder 6"/>
+          <p:cNvSpPr>
+            <a:spLocks noGrp="1"/>
+          </p:cNvSpPr>
+          <p:nvPr>
+            <p:ph type="ftr" sz="quarter" idx="11"/>
+          </p:nvPr>
+        </p:nvSpPr>
+        <p:spPr/>
+        <p:txBody>
+          <a:bodyPr/>
+          <a:lstStyle/>
+          <a:p>
+            <a:r>
+              <a:rPr lang="en-US" dirty="0" smtClean="0"/>
+              <a:t>Architecture Group</a:t>
+            </a:r>
+            <a:endParaRPr lang="en-US" dirty="0"/>
+          </a:p>
+        </p:txBody>
+      </p:sp>
+    </p:spTree>
+    <p:extLst>
+      <p:ext uri="{BB962C8B-B14F-4D97-AF65-F5344CB8AC3E}">
+        <p14:creationId xmlns:p14="http://schemas.microsoft.com/office/powerpoint/2010/main" val="1619698478"/>
+      </p:ext>
+    </p:extLst>
+  </p:cSld>
+  <p:clrMapOvr>
+    <a:masterClrMapping/>
+  </p:clrMapOvr>
+  <mc:AlternateContent xmlns:mc="http://schemas.openxmlformats.org/markup-compatibility/2006" xmlns:p14="http://schemas.microsoft.com/office/powerpoint/2010/main">
+    <mc:Choice Requires="p14">
+      <p:transition spd="slow" p14:dur="2000"/>
+    </mc:Choice>
+    <mc:Fallback xmlns="">
+      <p:transition spd="slow"/>
+    </mc:Fallback>
+  </mc:AlternateContent>
+  <p:timing>
+    <p:tnLst>
+      <p:par>
+        <p:cTn id="1" dur="indefinite" restart="never" nodeType="tmRoot"/>
+      </p:par>
+    </p:tnLst>
+  </p:timing>
+</p:sld>
+</file>
+
+<file path=ppt/slides/slide31.xml><?xml version="1.0" encoding="utf-8"?>
+<p:sld xmlns:a="http://schemas.openxmlformats.org/drawingml/2006/main" xmlns:r="http://schemas.openxmlformats.org/officeDocument/2006/relationships" xmlns:p="http://schemas.openxmlformats.org/presentationml/2006/main">
+  <p:cSld>
+    <p:spTree>
+      <p:nvGrpSpPr>
+        <p:cNvPr id="1" name=""/>
+        <p:cNvGrpSpPr/>
+        <p:nvPr/>
+      </p:nvGrpSpPr>
+      <p:grpSpPr>
+        <a:xfrm>
+          <a:off x="0" y="0"/>
+          <a:ext cx="0" cy="0"/>
+          <a:chOff x="0" y="0"/>
+          <a:chExt cx="0" cy="0"/>
+        </a:xfrm>
+      </p:grpSpPr>
       <p:pic>
         <p:nvPicPr>
           <p:cNvPr id="5" name="Picture 4"/>
@@ -19485,7 +19596,7 @@
 </p:sld>
 </file>
 
-<file path=ppt/slides/slide31.xml><?xml version="1.0" encoding="utf-8"?>
+<file path=ppt/slides/slide32.xml><?xml version="1.0" encoding="utf-8"?>
 <p:sld xmlns:a="http://schemas.openxmlformats.org/drawingml/2006/main" xmlns:r="http://schemas.openxmlformats.org/officeDocument/2006/relationships" xmlns:p="http://schemas.openxmlformats.org/presentationml/2006/main">
   <p:cSld>
     <p:spTree>
@@ -20273,238 +20384,6 @@
 </p:sld>
 </file>
 
-<file path=ppt/slides/slide32.xml><?xml version="1.0" encoding="utf-8"?>
-<p:sld xmlns:a="http://schemas.openxmlformats.org/drawingml/2006/main" xmlns:r="http://schemas.openxmlformats.org/officeDocument/2006/relationships" xmlns:p="http://schemas.openxmlformats.org/presentationml/2006/main">
-  <p:cSld>
-    <p:spTree>
-      <p:nvGrpSpPr>
-        <p:cNvPr id="1" name=""/>
-        <p:cNvGrpSpPr/>
-        <p:nvPr/>
-      </p:nvGrpSpPr>
-      <p:grpSpPr>
-        <a:xfrm>
-          <a:off x="0" y="0"/>
-          <a:ext cx="0" cy="0"/>
-          <a:chOff x="0" y="0"/>
-          <a:chExt cx="0" cy="0"/>
-        </a:xfrm>
-      </p:grpSpPr>
-      <p:sp>
-        <p:nvSpPr>
-          <p:cNvPr id="2" name="Title 1"/>
-          <p:cNvSpPr>
-            <a:spLocks noGrp="1"/>
-          </p:cNvSpPr>
-          <p:nvPr>
-            <p:ph type="title"/>
-          </p:nvPr>
-        </p:nvSpPr>
-        <p:spPr/>
-        <p:txBody>
-          <a:bodyPr/>
-          <a:lstStyle/>
-          <a:p>
-            <a:r>
-              <a:rPr lang="en-US" dirty="0" smtClean="0"/>
-              <a:t>Lessons Learned</a:t>
-            </a:r>
-            <a:endParaRPr lang="en-US" dirty="0"/>
-          </a:p>
-        </p:txBody>
-      </p:sp>
-      <p:sp>
-        <p:nvSpPr>
-          <p:cNvPr id="3" name="Content Placeholder 2"/>
-          <p:cNvSpPr>
-            <a:spLocks noGrp="1"/>
-          </p:cNvSpPr>
-          <p:nvPr>
-            <p:ph idx="1"/>
-          </p:nvPr>
-        </p:nvSpPr>
-        <p:spPr/>
-        <p:txBody>
-          <a:bodyPr>
-            <a:normAutofit lnSpcReduction="10000"/>
-          </a:bodyPr>
-          <a:lstStyle/>
-          <a:p>
-            <a:pPr>
-              <a:lnSpc>
-                <a:spcPct val="100000"/>
-              </a:lnSpc>
-              <a:spcBef>
-                <a:spcPts val="200"/>
-              </a:spcBef>
-            </a:pPr>
-            <a:r>
-              <a:rPr lang="en-US" dirty="0" smtClean="0"/>
-              <a:t>Many problems are identified through the process of formalization, before analysis</a:t>
-            </a:r>
-          </a:p>
-          <a:p>
-            <a:pPr>
-              <a:lnSpc>
-                <a:spcPct val="100000"/>
-              </a:lnSpc>
-              <a:spcBef>
-                <a:spcPts val="200"/>
-              </a:spcBef>
-            </a:pPr>
-            <a:r>
-              <a:rPr lang="en-US" dirty="0" smtClean="0"/>
-              <a:t>Data types, ports, and connections (or an ontology) can be automatically extracted from code (with some moderate up front work)</a:t>
-            </a:r>
-          </a:p>
-          <a:p>
-            <a:pPr>
-              <a:lnSpc>
-                <a:spcPct val="100000"/>
-              </a:lnSpc>
-              <a:spcBef>
-                <a:spcPts val="200"/>
-              </a:spcBef>
-            </a:pPr>
-            <a:r>
-              <a:rPr lang="en-US" dirty="0" smtClean="0"/>
-              <a:t>Reusable (template) properties help find common mistakes</a:t>
-            </a:r>
-          </a:p>
-          <a:p>
-            <a:pPr>
-              <a:lnSpc>
-                <a:spcPct val="100000"/>
-              </a:lnSpc>
-              <a:spcBef>
-                <a:spcPts val="200"/>
-              </a:spcBef>
-            </a:pPr>
-            <a:r>
-              <a:rPr lang="en-US" dirty="0" smtClean="0"/>
-              <a:t>Not every error can be detected with a template property--a review of the specification itself is still worthwhile</a:t>
-            </a:r>
-          </a:p>
-          <a:p>
-            <a:pPr>
-              <a:lnSpc>
-                <a:spcPct val="100000"/>
-              </a:lnSpc>
-              <a:spcBef>
-                <a:spcPts val="200"/>
-              </a:spcBef>
-            </a:pPr>
-            <a:r>
-              <a:rPr lang="en-US" dirty="0" smtClean="0"/>
-              <a:t>Assurance arguments are useful to capture the “rest of the story”</a:t>
-            </a:r>
-          </a:p>
-          <a:p>
-            <a:pPr>
-              <a:lnSpc>
-                <a:spcPct val="100000"/>
-              </a:lnSpc>
-              <a:spcBef>
-                <a:spcPts val="200"/>
-              </a:spcBef>
-            </a:pPr>
-            <a:r>
-              <a:rPr lang="en-US" dirty="0" smtClean="0"/>
-              <a:t>SpeAR, ASSERT, AADL/AGREE, and </a:t>
-            </a:r>
-            <a:r>
-              <a:rPr lang="en-US" dirty="0" err="1" smtClean="0"/>
-              <a:t>QVtrace</a:t>
-            </a:r>
-            <a:r>
-              <a:rPr lang="en-US" dirty="0" smtClean="0"/>
-              <a:t> are all very capable analysis tools. There are synergies between them.</a:t>
-            </a:r>
-          </a:p>
-          <a:p>
-            <a:pPr>
-              <a:lnSpc>
-                <a:spcPct val="100000"/>
-              </a:lnSpc>
-              <a:spcBef>
-                <a:spcPts val="200"/>
-              </a:spcBef>
-            </a:pPr>
-            <a:r>
-              <a:rPr lang="en-US" dirty="0" smtClean="0"/>
-              <a:t>Challenges: arrays, </a:t>
-            </a:r>
-            <a:r>
-              <a:rPr lang="en-US" dirty="0" smtClean="0"/>
-              <a:t>inheritance, polymorphism</a:t>
-            </a:r>
-            <a:endParaRPr lang="en-US" dirty="0" smtClean="0"/>
-          </a:p>
-          <a:p>
-            <a:pPr marL="0" indent="0">
-              <a:lnSpc>
-                <a:spcPct val="100000"/>
-              </a:lnSpc>
-              <a:spcBef>
-                <a:spcPts val="200"/>
-              </a:spcBef>
-              <a:buNone/>
-            </a:pPr>
-            <a:endParaRPr lang="en-US" dirty="0" smtClean="0"/>
-          </a:p>
-        </p:txBody>
-      </p:sp>
-      <p:sp>
-        <p:nvSpPr>
-          <p:cNvPr id="6" name="Footer Placeholder 5"/>
-          <p:cNvSpPr>
-            <a:spLocks noGrp="1"/>
-          </p:cNvSpPr>
-          <p:nvPr>
-            <p:ph type="ftr" sz="quarter" idx="11"/>
-          </p:nvPr>
-        </p:nvSpPr>
-        <p:spPr/>
-        <p:txBody>
-          <a:bodyPr/>
-          <a:lstStyle/>
-          <a:p>
-            <a:r>
-              <a:rPr lang="en-US" dirty="0" smtClean="0"/>
-              <a:t>Architecture Group</a:t>
-            </a:r>
-            <a:endParaRPr lang="en-US" dirty="0"/>
-          </a:p>
-        </p:txBody>
-      </p:sp>
-    </p:spTree>
-    <p:extLst>
-      <p:ext uri="{BB962C8B-B14F-4D97-AF65-F5344CB8AC3E}">
-        <p14:creationId xmlns:p14="http://schemas.microsoft.com/office/powerpoint/2010/main" val="3123488723"/>
-      </p:ext>
-    </p:extLst>
-  </p:cSld>
-  <p:clrMapOvr>
-    <a:masterClrMapping/>
-  </p:clrMapOvr>
-  <mc:AlternateContent xmlns:mc="http://schemas.openxmlformats.org/markup-compatibility/2006" xmlns:p14="http://schemas.microsoft.com/office/powerpoint/2010/main">
-    <mc:Choice Requires="p14">
-      <p:transition spd="slow" p14:dur="2000"/>
-    </mc:Choice>
-    <mc:Fallback xmlns="">
-      <p:transition spd="slow"/>
-    </mc:Fallback>
-  </mc:AlternateContent>
-  <p:timing>
-    <p:tnLst>
-      <p:par>
-        <p:cTn id="1" dur="indefinite" restart="never" nodeType="tmRoot"/>
-      </p:par>
-    </p:tnLst>
-  </p:timing>
-</p:sld>
-</file>
-
 <file path=ppt/slides/slide33.xml><?xml version="1.0" encoding="utf-8"?>
 <p:sld xmlns:a="http://schemas.openxmlformats.org/drawingml/2006/main" xmlns:r="http://schemas.openxmlformats.org/officeDocument/2006/relationships" xmlns:p="http://schemas.openxmlformats.org/presentationml/2006/main">
   <p:cSld>
@@ -20539,7 +20418,7 @@
           <a:p>
             <a:r>
               <a:rPr lang="en-US" dirty="0" smtClean="0"/>
-              <a:t>Recommended Future Directions</a:t>
+              <a:t>Lessons Learned</a:t>
             </a:r>
             <a:endParaRPr lang="en-US" dirty="0"/>
           </a:p>
@@ -20557,7 +20436,9 @@
         </p:nvSpPr>
         <p:spPr/>
         <p:txBody>
-          <a:bodyPr/>
+          <a:bodyPr>
+            <a:normAutofit lnSpcReduction="10000"/>
+          </a:bodyPr>
           <a:lstStyle/>
           <a:p>
             <a:pPr>
@@ -20570,7 +20451,7 @@
             </a:pPr>
             <a:r>
               <a:rPr lang="en-US" dirty="0" smtClean="0"/>
-              <a:t>Write contracts for the remaining thirty-one components</a:t>
+              <a:t>Many problems are identified through the process of formalization, before analysis</a:t>
             </a:r>
           </a:p>
           <a:p>
@@ -20582,7 +20463,10 @@
                 <a:spcPts val="200"/>
               </a:spcBef>
             </a:pPr>
-            <a:endParaRPr lang="en-US" dirty="0" smtClean="0"/>
+            <a:r>
+              <a:rPr lang="en-US" dirty="0" smtClean="0"/>
+              <a:t>Data types, ports, and connections (or an ontology) can be automatically extracted from code (with some moderate up front work)</a:t>
+            </a:r>
           </a:p>
           <a:p>
             <a:pPr>
@@ -20595,7 +20479,7 @@
             </a:pPr>
             <a:r>
               <a:rPr lang="en-US" dirty="0" smtClean="0"/>
-              <a:t>State/compose and analyze system-level properties (in progress)</a:t>
+              <a:t>Reusable (template) properties help find common mistakes</a:t>
             </a:r>
           </a:p>
           <a:p>
@@ -20607,7 +20491,10 @@
                 <a:spcPts val="200"/>
               </a:spcBef>
             </a:pPr>
-            <a:endParaRPr lang="en-US" dirty="0" smtClean="0"/>
+            <a:r>
+              <a:rPr lang="en-US" dirty="0" smtClean="0"/>
+              <a:t>Not every error can be detected with a template property--a review of the specification itself is still worthwhile</a:t>
+            </a:r>
           </a:p>
           <a:p>
             <a:pPr>
@@ -20620,7 +20507,7 @@
             </a:pPr>
             <a:r>
               <a:rPr lang="en-US" dirty="0" smtClean="0"/>
-              <a:t>Generate code from AADL</a:t>
+              <a:t>Assurance arguments are useful to capture the “rest of the story”</a:t>
             </a:r>
           </a:p>
           <a:p>
@@ -20632,7 +20519,18 @@
                 <a:spcPts val="200"/>
               </a:spcBef>
             </a:pPr>
-            <a:endParaRPr lang="en-US" dirty="0" smtClean="0"/>
+            <a:r>
+              <a:rPr lang="en-US" dirty="0" smtClean="0"/>
+              <a:t>SpeAR, ASSERT, AADL/AGREE, and </a:t>
+            </a:r>
+            <a:r>
+              <a:rPr lang="en-US" dirty="0" err="1" smtClean="0"/>
+              <a:t>QVtrace</a:t>
+            </a:r>
+            <a:r>
+              <a:rPr lang="en-US" dirty="0" smtClean="0"/>
+              <a:t> are all very capable analysis tools. There are synergies between them.</a:t>
+            </a:r>
           </a:p>
           <a:p>
             <a:pPr>
@@ -20645,77 +20543,20 @@
             </a:pPr>
             <a:r>
               <a:rPr lang="en-US" dirty="0" smtClean="0"/>
-              <a:t>Generate test cases from AGREE and run on </a:t>
-            </a:r>
-            <a:r>
-              <a:rPr lang="en-US" dirty="0" err="1" smtClean="0"/>
-              <a:t>UxAS</a:t>
-            </a:r>
-            <a:r>
-              <a:rPr lang="en-US" dirty="0" smtClean="0"/>
-              <a:t> implementation</a:t>
-            </a:r>
-          </a:p>
-          <a:p>
-            <a:pPr>
+              <a:t>Challenges: arrays, inheritance, polymorphism</a:t>
+            </a:r>
+          </a:p>
+          <a:p>
+            <a:pPr marL="0" indent="0">
               <a:lnSpc>
                 <a:spcPct val="100000"/>
               </a:lnSpc>
               <a:spcBef>
                 <a:spcPts val="200"/>
               </a:spcBef>
+              <a:buNone/>
             </a:pPr>
             <a:endParaRPr lang="en-US" dirty="0" smtClean="0"/>
-          </a:p>
-          <a:p>
-            <a:pPr>
-              <a:lnSpc>
-                <a:spcPct val="100000"/>
-              </a:lnSpc>
-              <a:spcBef>
-                <a:spcPts val="200"/>
-              </a:spcBef>
-            </a:pPr>
-            <a:r>
-              <a:rPr lang="en-US" dirty="0" smtClean="0"/>
-              <a:t>Continue documenting decisions and the assurance case for the architecture</a:t>
-            </a:r>
-          </a:p>
-          <a:p>
-            <a:pPr>
-              <a:lnSpc>
-                <a:spcPct val="100000"/>
-              </a:lnSpc>
-              <a:spcBef>
-                <a:spcPts val="200"/>
-              </a:spcBef>
-            </a:pPr>
-            <a:endParaRPr lang="en-US" dirty="0" smtClean="0"/>
-          </a:p>
-          <a:p>
-            <a:pPr>
-              <a:lnSpc>
-                <a:spcPct val="100000"/>
-              </a:lnSpc>
-              <a:spcBef>
-                <a:spcPts val="200"/>
-              </a:spcBef>
-            </a:pPr>
-            <a:endParaRPr lang="en-US" dirty="0" smtClean="0"/>
-          </a:p>
-          <a:p>
-            <a:pPr>
-              <a:lnSpc>
-                <a:spcPct val="100000"/>
-              </a:lnSpc>
-              <a:spcBef>
-                <a:spcPts val="200"/>
-              </a:spcBef>
-            </a:pPr>
-            <a:endParaRPr lang="en-US" dirty="0" smtClean="0"/>
-          </a:p>
-          <a:p>
-            <a:endParaRPr lang="en-US" dirty="0"/>
           </a:p>
         </p:txBody>
       </p:sp>
@@ -20735,17 +20576,17 @@
           <a:lstStyle/>
           <a:p>
             <a:r>
-              <a:rPr lang="en-US" smtClean="0"/>
+              <a:rPr lang="en-US" dirty="0" smtClean="0"/>
               <a:t>Architecture Group</a:t>
             </a:r>
-            <a:endParaRPr lang="en-US"/>
+            <a:endParaRPr lang="en-US" dirty="0"/>
           </a:p>
         </p:txBody>
       </p:sp>
     </p:spTree>
     <p:extLst>
       <p:ext uri="{BB962C8B-B14F-4D97-AF65-F5344CB8AC3E}">
-        <p14:creationId xmlns:p14="http://schemas.microsoft.com/office/powerpoint/2010/main" val="2472667537"/>
+        <p14:creationId xmlns:p14="http://schemas.microsoft.com/office/powerpoint/2010/main" val="3123488723"/>
       </p:ext>
     </p:extLst>
   </p:cSld>
@@ -20789,6 +20630,271 @@
       </p:grpSpPr>
       <p:sp>
         <p:nvSpPr>
+          <p:cNvPr id="2" name="Title 1"/>
+          <p:cNvSpPr>
+            <a:spLocks noGrp="1"/>
+          </p:cNvSpPr>
+          <p:nvPr>
+            <p:ph type="title"/>
+          </p:nvPr>
+        </p:nvSpPr>
+        <p:spPr/>
+        <p:txBody>
+          <a:bodyPr/>
+          <a:lstStyle/>
+          <a:p>
+            <a:r>
+              <a:rPr lang="en-US" dirty="0" smtClean="0"/>
+              <a:t>Recommended Future Directions</a:t>
+            </a:r>
+            <a:endParaRPr lang="en-US" dirty="0"/>
+          </a:p>
+        </p:txBody>
+      </p:sp>
+      <p:sp>
+        <p:nvSpPr>
+          <p:cNvPr id="3" name="Content Placeholder 2"/>
+          <p:cNvSpPr>
+            <a:spLocks noGrp="1"/>
+          </p:cNvSpPr>
+          <p:nvPr>
+            <p:ph idx="1"/>
+          </p:nvPr>
+        </p:nvSpPr>
+        <p:spPr/>
+        <p:txBody>
+          <a:bodyPr/>
+          <a:lstStyle/>
+          <a:p>
+            <a:pPr>
+              <a:lnSpc>
+                <a:spcPct val="100000"/>
+              </a:lnSpc>
+              <a:spcBef>
+                <a:spcPts val="200"/>
+              </a:spcBef>
+            </a:pPr>
+            <a:r>
+              <a:rPr lang="en-US" dirty="0" smtClean="0"/>
+              <a:t>Write contracts for the remaining thirty-one components</a:t>
+            </a:r>
+          </a:p>
+          <a:p>
+            <a:pPr>
+              <a:lnSpc>
+                <a:spcPct val="100000"/>
+              </a:lnSpc>
+              <a:spcBef>
+                <a:spcPts val="200"/>
+              </a:spcBef>
+            </a:pPr>
+            <a:endParaRPr lang="en-US" dirty="0" smtClean="0"/>
+          </a:p>
+          <a:p>
+            <a:pPr>
+              <a:lnSpc>
+                <a:spcPct val="100000"/>
+              </a:lnSpc>
+              <a:spcBef>
+                <a:spcPts val="200"/>
+              </a:spcBef>
+            </a:pPr>
+            <a:r>
+              <a:rPr lang="en-US" dirty="0" smtClean="0"/>
+              <a:t>State/compose and analyze system-level properties (in progress)</a:t>
+            </a:r>
+          </a:p>
+          <a:p>
+            <a:pPr>
+              <a:lnSpc>
+                <a:spcPct val="100000"/>
+              </a:lnSpc>
+              <a:spcBef>
+                <a:spcPts val="200"/>
+              </a:spcBef>
+            </a:pPr>
+            <a:endParaRPr lang="en-US" dirty="0" smtClean="0"/>
+          </a:p>
+          <a:p>
+            <a:pPr>
+              <a:lnSpc>
+                <a:spcPct val="100000"/>
+              </a:lnSpc>
+              <a:spcBef>
+                <a:spcPts val="200"/>
+              </a:spcBef>
+            </a:pPr>
+            <a:r>
+              <a:rPr lang="en-US" dirty="0" smtClean="0"/>
+              <a:t>Generate code from AADL</a:t>
+            </a:r>
+          </a:p>
+          <a:p>
+            <a:pPr>
+              <a:lnSpc>
+                <a:spcPct val="100000"/>
+              </a:lnSpc>
+              <a:spcBef>
+                <a:spcPts val="200"/>
+              </a:spcBef>
+            </a:pPr>
+            <a:endParaRPr lang="en-US" dirty="0" smtClean="0"/>
+          </a:p>
+          <a:p>
+            <a:pPr>
+              <a:lnSpc>
+                <a:spcPct val="100000"/>
+              </a:lnSpc>
+              <a:spcBef>
+                <a:spcPts val="200"/>
+              </a:spcBef>
+            </a:pPr>
+            <a:r>
+              <a:rPr lang="en-US" dirty="0" smtClean="0"/>
+              <a:t>Generate test cases from AGREE and run on </a:t>
+            </a:r>
+            <a:r>
+              <a:rPr lang="en-US" dirty="0" err="1" smtClean="0"/>
+              <a:t>UxAS</a:t>
+            </a:r>
+            <a:r>
+              <a:rPr lang="en-US" dirty="0" smtClean="0"/>
+              <a:t> implementation</a:t>
+            </a:r>
+          </a:p>
+          <a:p>
+            <a:pPr>
+              <a:lnSpc>
+                <a:spcPct val="100000"/>
+              </a:lnSpc>
+              <a:spcBef>
+                <a:spcPts val="200"/>
+              </a:spcBef>
+            </a:pPr>
+            <a:endParaRPr lang="en-US" dirty="0" smtClean="0"/>
+          </a:p>
+          <a:p>
+            <a:pPr>
+              <a:lnSpc>
+                <a:spcPct val="100000"/>
+              </a:lnSpc>
+              <a:spcBef>
+                <a:spcPts val="200"/>
+              </a:spcBef>
+            </a:pPr>
+            <a:r>
+              <a:rPr lang="en-US" dirty="0" smtClean="0"/>
+              <a:t>Continue documenting decisions and the assurance case for the architecture</a:t>
+            </a:r>
+          </a:p>
+          <a:p>
+            <a:pPr>
+              <a:lnSpc>
+                <a:spcPct val="100000"/>
+              </a:lnSpc>
+              <a:spcBef>
+                <a:spcPts val="200"/>
+              </a:spcBef>
+            </a:pPr>
+            <a:endParaRPr lang="en-US" dirty="0" smtClean="0"/>
+          </a:p>
+          <a:p>
+            <a:pPr>
+              <a:lnSpc>
+                <a:spcPct val="100000"/>
+              </a:lnSpc>
+              <a:spcBef>
+                <a:spcPts val="200"/>
+              </a:spcBef>
+            </a:pPr>
+            <a:endParaRPr lang="en-US" dirty="0" smtClean="0"/>
+          </a:p>
+          <a:p>
+            <a:pPr>
+              <a:lnSpc>
+                <a:spcPct val="100000"/>
+              </a:lnSpc>
+              <a:spcBef>
+                <a:spcPts val="200"/>
+              </a:spcBef>
+            </a:pPr>
+            <a:endParaRPr lang="en-US" dirty="0" smtClean="0"/>
+          </a:p>
+          <a:p>
+            <a:endParaRPr lang="en-US" dirty="0"/>
+          </a:p>
+        </p:txBody>
+      </p:sp>
+      <p:sp>
+        <p:nvSpPr>
+          <p:cNvPr id="6" name="Footer Placeholder 5"/>
+          <p:cNvSpPr>
+            <a:spLocks noGrp="1"/>
+          </p:cNvSpPr>
+          <p:nvPr>
+            <p:ph type="ftr" sz="quarter" idx="11"/>
+          </p:nvPr>
+        </p:nvSpPr>
+        <p:spPr/>
+        <p:txBody>
+          <a:bodyPr/>
+          <a:lstStyle/>
+          <a:p>
+            <a:r>
+              <a:rPr lang="en-US" smtClean="0"/>
+              <a:t>Architecture Group</a:t>
+            </a:r>
+            <a:endParaRPr lang="en-US"/>
+          </a:p>
+        </p:txBody>
+      </p:sp>
+    </p:spTree>
+    <p:extLst>
+      <p:ext uri="{BB962C8B-B14F-4D97-AF65-F5344CB8AC3E}">
+        <p14:creationId xmlns:p14="http://schemas.microsoft.com/office/powerpoint/2010/main" val="2472667537"/>
+      </p:ext>
+    </p:extLst>
+  </p:cSld>
+  <p:clrMapOvr>
+    <a:masterClrMapping/>
+  </p:clrMapOvr>
+  <mc:AlternateContent xmlns:mc="http://schemas.openxmlformats.org/markup-compatibility/2006" xmlns:p14="http://schemas.microsoft.com/office/powerpoint/2010/main">
+    <mc:Choice Requires="p14">
+      <p:transition spd="slow" p14:dur="2000"/>
+    </mc:Choice>
+    <mc:Fallback xmlns="">
+      <p:transition spd="slow"/>
+    </mc:Fallback>
+  </mc:AlternateContent>
+  <p:timing>
+    <p:tnLst>
+      <p:par>
+        <p:cTn id="1" dur="indefinite" restart="never" nodeType="tmRoot"/>
+      </p:par>
+    </p:tnLst>
+  </p:timing>
+</p:sld>
+</file>
+
+<file path=ppt/slides/slide35.xml><?xml version="1.0" encoding="utf-8"?>
+<p:sld xmlns:a="http://schemas.openxmlformats.org/drawingml/2006/main" xmlns:r="http://schemas.openxmlformats.org/officeDocument/2006/relationships" xmlns:p="http://schemas.openxmlformats.org/presentationml/2006/main">
+  <p:cSld>
+    <p:spTree>
+      <p:nvGrpSpPr>
+        <p:cNvPr id="1" name=""/>
+        <p:cNvGrpSpPr/>
+        <p:nvPr/>
+      </p:nvGrpSpPr>
+      <p:grpSpPr>
+        <a:xfrm>
+          <a:off x="0" y="0"/>
+          <a:ext cx="0" cy="0"/>
+          <a:chOff x="0" y="0"/>
+          <a:chExt cx="0" cy="0"/>
+        </a:xfrm>
+      </p:grpSpPr>
+      <p:sp>
+        <p:nvSpPr>
           <p:cNvPr id="4" name="Title 3"/>
           <p:cNvSpPr>
             <a:spLocks noGrp="1"/>
@@ -20857,7 +20963,7 @@
 </p:sld>
 </file>
 
-<file path=ppt/slides/slide35.xml><?xml version="1.0" encoding="utf-8"?>
+<file path=ppt/slides/slide36.xml><?xml version="1.0" encoding="utf-8"?>
 <p:sld xmlns:a="http://schemas.openxmlformats.org/drawingml/2006/main" xmlns:r="http://schemas.openxmlformats.org/officeDocument/2006/relationships" xmlns:p="http://schemas.openxmlformats.org/presentationml/2006/main">
   <p:cSld>
     <p:spTree>
@@ -22331,303 +22437,6 @@
 </p:sld>
 </file>
 
-<file path=ppt/slides/slide36.xml><?xml version="1.0" encoding="utf-8"?>
-<p:sld xmlns:a="http://schemas.openxmlformats.org/drawingml/2006/main" xmlns:r="http://schemas.openxmlformats.org/officeDocument/2006/relationships" xmlns:p="http://schemas.openxmlformats.org/presentationml/2006/main">
-  <p:cSld>
-    <p:spTree>
-      <p:nvGrpSpPr>
-        <p:cNvPr id="1" name=""/>
-        <p:cNvGrpSpPr/>
-        <p:nvPr/>
-      </p:nvGrpSpPr>
-      <p:grpSpPr>
-        <a:xfrm>
-          <a:off x="0" y="0"/>
-          <a:ext cx="0" cy="0"/>
-          <a:chOff x="0" y="0"/>
-          <a:chExt cx="0" cy="0"/>
-        </a:xfrm>
-      </p:grpSpPr>
-      <p:sp>
-        <p:nvSpPr>
-          <p:cNvPr id="2" name="Title 1"/>
-          <p:cNvSpPr>
-            <a:spLocks noGrp="1"/>
-          </p:cNvSpPr>
-          <p:nvPr>
-            <p:ph type="title"/>
-          </p:nvPr>
-        </p:nvSpPr>
-        <p:spPr/>
-        <p:txBody>
-          <a:bodyPr/>
-          <a:lstStyle/>
-          <a:p>
-            <a:r>
-              <a:rPr lang="en-US" dirty="0" smtClean="0"/>
-              <a:t>Producing the Formal Architecture</a:t>
-            </a:r>
-            <a:endParaRPr lang="en-US" dirty="0"/>
-          </a:p>
-        </p:txBody>
-      </p:sp>
-      <p:sp>
-        <p:nvSpPr>
-          <p:cNvPr id="3" name="Content Placeholder 2"/>
-          <p:cNvSpPr>
-            <a:spLocks noGrp="1"/>
-          </p:cNvSpPr>
-          <p:nvPr>
-            <p:ph idx="1"/>
-          </p:nvPr>
-        </p:nvSpPr>
-        <p:spPr>
-          <a:xfrm>
-            <a:off x="210065" y="1508511"/>
-            <a:ext cx="8993312" cy="4668452"/>
-          </a:xfrm>
-        </p:spPr>
-        <p:txBody>
-          <a:bodyPr>
-            <a:normAutofit/>
-          </a:bodyPr>
-          <a:lstStyle/>
-          <a:p>
-            <a:r>
-              <a:rPr lang="en-US" dirty="0" smtClean="0"/>
-              <a:t>The formal architecture relied on the documentation that was found on the </a:t>
-            </a:r>
-            <a:r>
-              <a:rPr lang="en-US" dirty="0" err="1" smtClean="0"/>
-              <a:t>UxAS</a:t>
-            </a:r>
-            <a:r>
-              <a:rPr lang="en-US" dirty="0" smtClean="0"/>
-              <a:t> Wiki page.</a:t>
-            </a:r>
-          </a:p>
-          <a:p>
-            <a:pPr lvl="1"/>
-            <a:r>
-              <a:rPr lang="en-US" dirty="0" smtClean="0"/>
-              <a:t>Direct code decomposition was going to be too intensive to meet objectives efficiently.</a:t>
-            </a:r>
-          </a:p>
-          <a:p>
-            <a:pPr lvl="1"/>
-            <a:r>
-              <a:rPr lang="en-US" dirty="0" smtClean="0"/>
-              <a:t>Through formalization, gaps were identified.</a:t>
-            </a:r>
-          </a:p>
-          <a:p>
-            <a:pPr marL="457200" lvl="1" indent="0">
-              <a:buNone/>
-            </a:pPr>
-            <a:endParaRPr lang="en-US" dirty="0" smtClean="0"/>
-          </a:p>
-          <a:p>
-            <a:endParaRPr lang="en-US" dirty="0"/>
-          </a:p>
-          <a:p>
-            <a:pPr lvl="1"/>
-            <a:endParaRPr lang="en-US" dirty="0" smtClean="0"/>
-          </a:p>
-        </p:txBody>
-      </p:sp>
-      <p:pic>
-        <p:nvPicPr>
-          <p:cNvPr id="5" name="Picture 4"/>
-          <p:cNvPicPr>
-            <a:picLocks noChangeAspect="1"/>
-          </p:cNvPicPr>
-          <p:nvPr/>
-        </p:nvPicPr>
-        <p:blipFill>
-          <a:blip r:embed="rId3"/>
-          <a:stretch>
-            <a:fillRect/>
-          </a:stretch>
-        </p:blipFill>
-        <p:spPr>
-          <a:xfrm>
-            <a:off x="9345881" y="1524032"/>
-            <a:ext cx="2764233" cy="4614116"/>
-          </a:xfrm>
-          <a:prstGeom prst="rect">
-            <a:avLst/>
-          </a:prstGeom>
-        </p:spPr>
-      </p:pic>
-      <p:sp>
-        <p:nvSpPr>
-          <p:cNvPr id="6" name="Rectangle 5"/>
-          <p:cNvSpPr/>
-          <p:nvPr/>
-        </p:nvSpPr>
-        <p:spPr>
-          <a:xfrm>
-            <a:off x="1200522" y="4271636"/>
-            <a:ext cx="6287069" cy="819124"/>
-          </a:xfrm>
-          <a:prstGeom prst="rect">
-            <a:avLst/>
-          </a:prstGeom>
-        </p:spPr>
-        <p:style>
-          <a:lnRef idx="2">
-            <a:schemeClr val="accent1">
-              <a:shade val="50000"/>
-            </a:schemeClr>
-          </a:lnRef>
-          <a:fillRef idx="1">
-            <a:schemeClr val="accent1"/>
-          </a:fillRef>
-          <a:effectRef idx="0">
-            <a:schemeClr val="accent1"/>
-          </a:effectRef>
-          <a:fontRef idx="minor">
-            <a:schemeClr val="lt1"/>
-          </a:fontRef>
-        </p:style>
-        <p:txBody>
-          <a:bodyPr rtlCol="0" anchor="ctr"/>
-          <a:lstStyle/>
-          <a:p>
-            <a:pPr algn="ctr"/>
-            <a:r>
-              <a:rPr lang="en-US" b="1" i="1" dirty="0" smtClean="0"/>
-              <a:t>Just the effort to formalize components proved extremely valuable to the SMEs, even before the analysis.</a:t>
-            </a:r>
-            <a:endParaRPr lang="en-US" b="1" i="1" dirty="0"/>
-          </a:p>
-        </p:txBody>
-      </p:sp>
-      <p:sp>
-        <p:nvSpPr>
-          <p:cNvPr id="8" name="Footer Placeholder 7"/>
-          <p:cNvSpPr>
-            <a:spLocks noGrp="1"/>
-          </p:cNvSpPr>
-          <p:nvPr>
-            <p:ph type="ftr" sz="quarter" idx="11"/>
-          </p:nvPr>
-        </p:nvSpPr>
-        <p:spPr/>
-        <p:txBody>
-          <a:bodyPr/>
-          <a:lstStyle/>
-          <a:p>
-            <a:r>
-              <a:rPr lang="en-US" smtClean="0"/>
-              <a:t>Architecture Group</a:t>
-            </a:r>
-            <a:endParaRPr lang="en-US"/>
-          </a:p>
-        </p:txBody>
-      </p:sp>
-    </p:spTree>
-    <p:custDataLst>
-      <p:tags r:id="rId1"/>
-    </p:custDataLst>
-    <p:extLst>
-      <p:ext uri="{BB962C8B-B14F-4D97-AF65-F5344CB8AC3E}">
-        <p14:creationId xmlns:p14="http://schemas.microsoft.com/office/powerpoint/2010/main" val="112893349"/>
-      </p:ext>
-    </p:extLst>
-  </p:cSld>
-  <p:clrMapOvr>
-    <a:masterClrMapping/>
-  </p:clrMapOvr>
-  <mc:AlternateContent xmlns:mc="http://schemas.openxmlformats.org/markup-compatibility/2006" xmlns:p14="http://schemas.microsoft.com/office/powerpoint/2010/main">
-    <mc:Choice Requires="p14">
-      <p:transition spd="slow" p14:dur="2000"/>
-    </mc:Choice>
-    <mc:Fallback xmlns="">
-      <p:transition spd="slow"/>
-    </mc:Fallback>
-  </mc:AlternateContent>
-  <p:timing>
-    <p:tnLst>
-      <p:par>
-        <p:cTn id="1" dur="indefinite" restart="never" nodeType="tmRoot">
-          <p:childTnLst>
-            <p:seq concurrent="1" nextAc="seek">
-              <p:cTn id="2" dur="indefinite" nodeType="mainSeq">
-                <p:childTnLst>
-                  <p:par>
-                    <p:cTn id="3" fill="hold">
-                      <p:stCondLst>
-                        <p:cond delay="indefinite"/>
-                      </p:stCondLst>
-                      <p:childTnLst>
-                        <p:par>
-                          <p:cTn id="4" fill="hold">
-                            <p:stCondLst>
-                              <p:cond delay="0"/>
-                            </p:stCondLst>
-                            <p:childTnLst>
-                              <p:par>
-                                <p:cTn id="5" presetID="1" presetClass="entr" presetSubtype="0" fill="hold" grpId="0" nodeType="clickEffect">
-                                  <p:stCondLst>
-                                    <p:cond delay="0"/>
-                                  </p:stCondLst>
-                                  <p:childTnLst>
-                                    <p:set>
-                                      <p:cBhvr>
-                                        <p:cTn id="6" dur="1" fill="hold">
-                                          <p:stCondLst>
-                                            <p:cond delay="0"/>
-                                          </p:stCondLst>
-                                        </p:cTn>
-                                        <p:tgtEl>
-                                          <p:spTgt spid="6"/>
-                                        </p:tgtEl>
-                                        <p:attrNameLst>
-                                          <p:attrName>style.visibility</p:attrName>
-                                        </p:attrNameLst>
-                                      </p:cBhvr>
-                                      <p:to>
-                                        <p:strVal val="visible"/>
-                                      </p:to>
-                                    </p:set>
-                                  </p:childTnLst>
-                                </p:cTn>
-                              </p:par>
-                            </p:childTnLst>
-                          </p:cTn>
-                        </p:par>
-                      </p:childTnLst>
-                    </p:cTn>
-                  </p:par>
-                </p:childTnLst>
-              </p:cTn>
-              <p:prevCondLst>
-                <p:cond evt="onPrev" delay="0">
-                  <p:tgtEl>
-                    <p:sldTgt/>
-                  </p:tgtEl>
-                </p:cond>
-              </p:prevCondLst>
-              <p:nextCondLst>
-                <p:cond evt="onNext" delay="0">
-                  <p:tgtEl>
-                    <p:sldTgt/>
-                  </p:tgtEl>
-                </p:cond>
-              </p:nextCondLst>
-            </p:seq>
-          </p:childTnLst>
-        </p:cTn>
-      </p:par>
-    </p:tnLst>
-    <p:bldLst>
-      <p:bldP spid="6" grpId="0" animBg="1"/>
-    </p:bldLst>
-  </p:timing>
-</p:sld>
-</file>
-
 <file path=ppt/slides/slide37.xml><?xml version="1.0" encoding="utf-8"?>
 <p:sld xmlns:a="http://schemas.openxmlformats.org/drawingml/2006/main" xmlns:r="http://schemas.openxmlformats.org/officeDocument/2006/relationships" xmlns:p="http://schemas.openxmlformats.org/presentationml/2006/main">
   <p:cSld>
@@ -24880,15 +24689,7 @@
             <a:pPr lvl="1" fontAlgn="base"/>
             <a:r>
               <a:rPr lang="en-US" dirty="0" smtClean="0"/>
-              <a:t>Created formal contracts for nine </a:t>
-            </a:r>
-            <a:r>
-              <a:rPr lang="en-US" dirty="0" smtClean="0"/>
-              <a:t>services/tasks </a:t>
-            </a:r>
-            <a:r>
-              <a:rPr lang="en-US" dirty="0" smtClean="0"/>
-              <a:t>based on the </a:t>
+              <a:t>Created formal contracts for nine services/tasks based on the </a:t>
             </a:r>
             <a:r>
               <a:rPr lang="en-US" dirty="0" err="1" smtClean="0"/>
@@ -24904,15 +24705,7 @@
                   <a:srgbClr val="0000FF"/>
                 </a:solidFill>
               </a:rPr>
-              <a:t>(</a:t>
-            </a:r>
-            <a:r>
-              <a:rPr lang="en-US" dirty="0" smtClean="0">
-                <a:solidFill>
-                  <a:srgbClr val="0000FF"/>
-                </a:solidFill>
-              </a:rPr>
-              <a:t>DC, RC)</a:t>
+              <a:t>(DC, RC)</a:t>
             </a:r>
           </a:p>
           <a:p>
@@ -24992,11 +24785,7 @@
             <a:pPr fontAlgn="base"/>
             <a:r>
               <a:rPr lang="en-US" dirty="0" smtClean="0"/>
-              <a:t>Enhanced tool </a:t>
-            </a:r>
-            <a:r>
-              <a:rPr lang="en-US" dirty="0" smtClean="0"/>
-              <a:t>(RELIQE) to </a:t>
+              <a:t>Enhanced tool (RELIQE) to </a:t>
             </a:r>
             <a:r>
               <a:rPr lang="en-US" dirty="0"/>
@@ -31345,12 +31134,6 @@
 </p:tagLst>
 </file>
 
-<file path=ppt/tags/tag3.xml><?xml version="1.0" encoding="utf-8"?>
-<p:tagLst xmlns:a="http://schemas.openxmlformats.org/drawingml/2006/main" xmlns:r="http://schemas.openxmlformats.org/officeDocument/2006/relationships" xmlns:p="http://schemas.openxmlformats.org/presentationml/2006/main">
-  <p:tag name="TIMING" val="|0.2"/>
-</p:tagLst>
-</file>
-
 <file path=ppt/theme/theme1.xml><?xml version="1.0" encoding="utf-8"?>
 <a:theme xmlns:a="http://schemas.openxmlformats.org/drawingml/2006/main" name="Office Theme">
   <a:themeElements>

</xml_diff>

<commit_message>
presentation updates - expected final version for S5 with some minor edits
</commit_message>
<xml_diff>
--- a/presentations/S5_SoI_Architecture_Group.pptx
+++ b/presentations/S5_SoI_Architecture_Group.pptx
@@ -8079,7 +8079,7 @@
       </p:sp>
       <p:pic>
         <p:nvPicPr>
-          <p:cNvPr id="4" name="Picture 3"/>
+          <p:cNvPr id="5" name="Picture 4"/>
           <p:cNvPicPr>
             <a:picLocks noChangeAspect="1"/>
           </p:cNvPicPr>
@@ -8093,8 +8093,8 @@
         </p:blipFill>
         <p:spPr>
           <a:xfrm>
-            <a:off x="674594" y="4946918"/>
-            <a:ext cx="10122358" cy="846351"/>
+            <a:off x="674594" y="4831651"/>
+            <a:ext cx="10453008" cy="928125"/>
           </a:xfrm>
           <a:prstGeom prst="rect">
             <a:avLst/>
@@ -8155,15 +8155,7 @@
           <a:p>
             <a:r>
               <a:rPr lang="en-US" dirty="0" smtClean="0"/>
-              <a:t>System-Level </a:t>
-            </a:r>
-            <a:r>
-              <a:rPr lang="en-US" dirty="0" smtClean="0"/>
-              <a:t>Co</a:t>
-            </a:r>
-            <a:r>
-              <a:rPr lang="en-US" dirty="0" smtClean="0"/>
-              <a:t>ntracts</a:t>
+              <a:t>System-Level Contracts</a:t>
             </a:r>
             <a:endParaRPr lang="en-US" dirty="0"/>
           </a:p>
@@ -13613,7 +13605,6 @@
           <a:bodyPr/>
           <a:lstStyle/>
           <a:p>
-            <a:pPr algn="ctr"/>
             <a:r>
               <a:rPr lang="en-US" dirty="0"/>
               <a:t>ASSERT™ Requirement Analysis Checks </a:t>
@@ -17165,16 +17156,16 @@
           <a:p>
             <a:pPr lvl="1"/>
             <a:r>
+              <a:rPr lang="en-US" smtClean="0"/>
+              <a:t>Split </a:t>
+            </a:r>
+            <a:r>
+              <a:rPr lang="en-US" smtClean="0"/>
+              <a:t>Route Aggregator Service </a:t>
+            </a:r>
+            <a:r>
               <a:rPr lang="en-US" dirty="0" smtClean="0"/>
-              <a:t>Split </a:t>
-            </a:r>
-            <a:r>
-              <a:rPr lang="en-US" dirty="0" err="1" smtClean="0"/>
-              <a:t>RouteAggregatorService</a:t>
-            </a:r>
-            <a:r>
-              <a:rPr lang="en-US" dirty="0" smtClean="0"/>
-              <a:t> into two services for two functional roles</a:t>
+              <a:t>into two services for two functional roles</a:t>
             </a:r>
           </a:p>
           <a:p>

</xml_diff>